<commit_message>
commit fin de journée 23/03 avec préparation présentation
</commit_message>
<xml_diff>
--- a/Travail_realise/Presentations/Utilisation_du_RaPC_pour_la_segmentation_d_images.pptx
+++ b/Travail_realise/Presentations/Utilisation_du_RaPC_pour_la_segmentation_d_images.pptx
@@ -5,7 +5,7 @@
     <p:sldMasterId id="2147483648" r:id="rId1"/>
   </p:sldMasterIdLst>
   <p:notesMasterIdLst>
-    <p:notesMasterId r:id="rId27"/>
+    <p:notesMasterId r:id="rId29"/>
   </p:notesMasterIdLst>
   <p:sldIdLst>
     <p:sldId id="256" r:id="rId2"/>
@@ -33,6 +33,8 @@
     <p:sldId id="280" r:id="rId24"/>
     <p:sldId id="281" r:id="rId25"/>
     <p:sldId id="273" r:id="rId26"/>
+    <p:sldId id="283" r:id="rId27"/>
+    <p:sldId id="284" r:id="rId28"/>
   </p:sldIdLst>
   <p:sldSz cx="12192000" cy="6858000"/>
   <p:notesSz cx="6858000" cy="9144000"/>
@@ -221,7 +223,7 @@
           <a:p>
             <a:fld id="{3BF17BC6-DB60-45E7-9D02-F2D1FB25D0FA}" type="datetimeFigureOut">
               <a:rPr lang="fr-FR" smtClean="0"/>
-              <a:t>17/03/2017</a:t>
+              <a:t>23/03/2017</a:t>
             </a:fld>
             <a:endParaRPr lang="fr-FR"/>
           </a:p>
@@ -2589,7 +2591,7 @@
           <a:p>
             <a:fld id="{B13A3E0C-43BD-4BD3-9D98-E47133C0F16B}" type="datetime1">
               <a:rPr lang="en-US" smtClean="0"/>
-              <a:t>3/17/2017</a:t>
+              <a:t>3/23/2017</a:t>
             </a:fld>
             <a:endParaRPr lang="en-US" dirty="0"/>
           </a:p>
@@ -2885,7 +2887,7 @@
           <a:p>
             <a:fld id="{DEAE60AC-6FB4-4151-AF18-32B957CEA5B2}" type="datetime1">
               <a:rPr lang="en-US" smtClean="0"/>
-              <a:t>3/17/2017</a:t>
+              <a:t>3/23/2017</a:t>
             </a:fld>
             <a:endParaRPr lang="en-US" dirty="0"/>
           </a:p>
@@ -3133,7 +3135,7 @@
           <a:p>
             <a:fld id="{49AF46AD-D75C-4BBC-B0EE-EB1C4A750FFF}" type="datetime1">
               <a:rPr lang="en-US" smtClean="0"/>
-              <a:t>3/17/2017</a:t>
+              <a:t>3/23/2017</a:t>
             </a:fld>
             <a:endParaRPr lang="en-US" dirty="0"/>
           </a:p>
@@ -3673,7 +3675,7 @@
           <a:p>
             <a:fld id="{B3EBDC74-5C10-4051-A6E3-AA9EF5D2777A}" type="datetime1">
               <a:rPr lang="en-US" smtClean="0"/>
-              <a:t>3/17/2017</a:t>
+              <a:t>3/23/2017</a:t>
             </a:fld>
             <a:endParaRPr lang="en-US" dirty="0"/>
           </a:p>
@@ -3921,7 +3923,7 @@
           <a:p>
             <a:fld id="{A45DC689-383C-4C65-9A99-BE249E8E6DA6}" type="datetime1">
               <a:rPr lang="en-US" smtClean="0"/>
-              <a:t>3/17/2017</a:t>
+              <a:t>3/23/2017</a:t>
             </a:fld>
             <a:endParaRPr lang="en-US" dirty="0"/>
           </a:p>
@@ -4453,7 +4455,7 @@
           <a:p>
             <a:fld id="{CD908F51-167A-4815-AAA7-25CFFE4B423B}" type="datetime1">
               <a:rPr lang="en-US" smtClean="0"/>
-              <a:t>3/17/2017</a:t>
+              <a:t>3/23/2017</a:t>
             </a:fld>
             <a:endParaRPr lang="en-US" dirty="0"/>
           </a:p>
@@ -4750,7 +4752,7 @@
           <a:p>
             <a:fld id="{575B863B-5F62-4D1B-A811-2497203129B2}" type="datetime1">
               <a:rPr lang="en-US" smtClean="0"/>
-              <a:t>3/17/2017</a:t>
+              <a:t>3/23/2017</a:t>
             </a:fld>
             <a:endParaRPr lang="en-US" dirty="0"/>
           </a:p>
@@ -4924,7 +4926,7 @@
           <a:p>
             <a:fld id="{2C9DBC4B-3B74-49C1-839E-BABE36E5940B}" type="datetime1">
               <a:rPr lang="en-US" smtClean="0"/>
-              <a:t>3/17/2017</a:t>
+              <a:t>3/23/2017</a:t>
             </a:fld>
             <a:endParaRPr lang="en-US" dirty="0"/>
           </a:p>
@@ -5104,7 +5106,7 @@
           <a:p>
             <a:fld id="{F235FBA5-93E2-443B-A8CE-27C1480288D2}" type="datetime1">
               <a:rPr lang="en-US" smtClean="0"/>
-              <a:t>3/17/2017</a:t>
+              <a:t>3/23/2017</a:t>
             </a:fld>
             <a:endParaRPr lang="en-US" dirty="0"/>
           </a:p>
@@ -5274,7 +5276,7 @@
           <a:p>
             <a:fld id="{41689828-3518-4A8E-AE0E-F7C6B57D9567}" type="datetime1">
               <a:rPr lang="en-US" smtClean="0"/>
-              <a:t>3/17/2017</a:t>
+              <a:t>3/23/2017</a:t>
             </a:fld>
             <a:endParaRPr lang="en-US" dirty="0"/>
           </a:p>
@@ -5525,7 +5527,7 @@
           <a:p>
             <a:fld id="{8049D5B7-E950-4F1F-896A-2428B09F2CC0}" type="datetime1">
               <a:rPr lang="en-US" smtClean="0"/>
-              <a:t>3/17/2017</a:t>
+              <a:t>3/23/2017</a:t>
             </a:fld>
             <a:endParaRPr lang="en-US" dirty="0"/>
           </a:p>
@@ -5822,7 +5824,7 @@
           <a:p>
             <a:fld id="{933C9C39-ED98-4B12-9750-FA3EA5E008D8}" type="datetime1">
               <a:rPr lang="en-US" smtClean="0"/>
-              <a:t>3/17/2017</a:t>
+              <a:t>3/23/2017</a:t>
             </a:fld>
             <a:endParaRPr lang="en-US" dirty="0"/>
           </a:p>
@@ -6264,7 +6266,7 @@
           <a:p>
             <a:fld id="{E9232F9C-7B0D-40AC-879E-D399781AA9DD}" type="datetime1">
               <a:rPr lang="en-US" smtClean="0"/>
-              <a:t>3/17/2017</a:t>
+              <a:t>3/23/2017</a:t>
             </a:fld>
             <a:endParaRPr lang="en-US" dirty="0"/>
           </a:p>
@@ -6382,7 +6384,7 @@
           <a:p>
             <a:fld id="{50646EB0-DC39-4154-9CE8-BEB693E1778F}" type="datetime1">
               <a:rPr lang="en-US" smtClean="0"/>
-              <a:t>3/17/2017</a:t>
+              <a:t>3/23/2017</a:t>
             </a:fld>
             <a:endParaRPr lang="en-US" dirty="0"/>
           </a:p>
@@ -6477,7 +6479,7 @@
           <a:p>
             <a:fld id="{1862B018-388A-4D00-857F-89E0E298EDB9}" type="datetime1">
               <a:rPr lang="en-US" smtClean="0"/>
-              <a:t>3/17/2017</a:t>
+              <a:t>3/23/2017</a:t>
             </a:fld>
             <a:endParaRPr lang="en-US" dirty="0"/>
           </a:p>
@@ -6760,7 +6762,7 @@
           <a:p>
             <a:fld id="{5876601C-147A-40D7-86CA-8C540E946C34}" type="datetime1">
               <a:rPr lang="en-US" smtClean="0"/>
-              <a:t>3/17/2017</a:t>
+              <a:t>3/23/2017</a:t>
             </a:fld>
             <a:endParaRPr lang="en-US" dirty="0"/>
           </a:p>
@@ -7051,7 +7053,7 @@
           <a:p>
             <a:fld id="{B25ACF09-D22D-44AC-9A23-30C84696D0B5}" type="datetime1">
               <a:rPr lang="en-US" smtClean="0"/>
-              <a:t>3/17/2017</a:t>
+              <a:t>3/23/2017</a:t>
             </a:fld>
             <a:endParaRPr lang="en-US" dirty="0"/>
           </a:p>
@@ -7581,7 +7583,7 @@
           <a:p>
             <a:fld id="{ED468347-93DD-4B15-A18F-1C554DAB4580}" type="datetime1">
               <a:rPr lang="en-US" smtClean="0"/>
-              <a:t>3/17/2017</a:t>
+              <a:t>3/23/2017</a:t>
             </a:fld>
             <a:endParaRPr lang="en-US" dirty="0"/>
           </a:p>
@@ -9866,13 +9868,8 @@
           <a:p>
             <a:r>
               <a:rPr lang="fr-FR" dirty="0" smtClean="0"/>
-              <a:t>Après évaluation, les caractéristiques statistiques / de textures sont les plus </a:t>
-            </a:r>
-            <a:r>
-              <a:rPr lang="fr-FR" dirty="0" smtClean="0"/>
-              <a:t>adaptées à notre cas d’étude</a:t>
-            </a:r>
-            <a:endParaRPr lang="fr-FR" dirty="0" smtClean="0"/>
+              <a:t>Après évaluation, les caractéristiques statistiques / de textures sont les plus adaptées à notre cas d’étude</a:t>
+            </a:r>
           </a:p>
           <a:p>
             <a:endParaRPr lang="fr-FR" dirty="0"/>
@@ -10736,8 +10733,8 @@
         </p:nvSpPr>
         <p:spPr>
           <a:xfrm>
-            <a:off x="1484310" y="1810656"/>
-            <a:ext cx="10018713" cy="3632201"/>
+            <a:off x="1484310" y="1513490"/>
+            <a:ext cx="10018713" cy="4966138"/>
           </a:xfrm>
         </p:spPr>
         <p:txBody>
@@ -10780,23 +10777,22 @@
             </a:pPr>
             <a:r>
               <a:rPr lang="fr-FR" dirty="0" smtClean="0"/>
-              <a:t>Dans notre cas d’étude</a:t>
+              <a:t>Dans notre cas </a:t>
+            </a:r>
+            <a:r>
+              <a:rPr lang="fr-FR" dirty="0" smtClean="0"/>
+              <a:t>d’étude</a:t>
             </a:r>
           </a:p>
           <a:p>
             <a:pPr marL="514350" indent="-514350">
               <a:buSzPct val="120000"/>
+              <a:buFont typeface="+mj-lt"/>
               <a:buAutoNum type="romanUcPeriod"/>
             </a:pPr>
             <a:r>
-              <a:rPr lang="fr-FR" dirty="0" smtClean="0">
-                <a:solidFill>
-                  <a:schemeClr val="bg2">
-                    <a:lumMod val="75000"/>
-                  </a:schemeClr>
-                </a:solidFill>
-              </a:rPr>
-              <a:t>Mesure de Similarité</a:t>
+              <a:rPr lang="fr-FR" dirty="0" smtClean="0"/>
+              <a:t>Implémentation </a:t>
             </a:r>
           </a:p>
           <a:p>
@@ -10804,14 +10800,8 @@
               <a:buSzPct val="120000"/>
             </a:pPr>
             <a:r>
-              <a:rPr lang="fr-FR" dirty="0" smtClean="0">
-                <a:solidFill>
-                  <a:schemeClr val="bg2">
-                    <a:lumMod val="75000"/>
-                  </a:schemeClr>
-                </a:solidFill>
-              </a:rPr>
-              <a:t>Etat de l’art</a:t>
+              <a:rPr lang="fr-FR" dirty="0" smtClean="0"/>
+              <a:t>Segmentation par croissance de régions</a:t>
             </a:r>
           </a:p>
           <a:p>
@@ -10819,20 +10809,34 @@
               <a:buSzPct val="120000"/>
             </a:pPr>
             <a:r>
-              <a:rPr lang="fr-FR" dirty="0" smtClean="0">
-                <a:solidFill>
-                  <a:schemeClr val="bg2">
-                    <a:lumMod val="75000"/>
-                  </a:schemeClr>
-                </a:solidFill>
-              </a:rPr>
-              <a:t>Dans notre cas d’étude</a:t>
-            </a:r>
-          </a:p>
-          <a:p>
-            <a:pPr marL="971550" lvl="1" indent="-514350">
+              <a:rPr lang="fr-FR" dirty="0" smtClean="0"/>
+              <a:t>Base de cas</a:t>
+            </a:r>
+          </a:p>
+          <a:p>
+            <a:pPr lvl="1">
+              <a:buSzPct val="120000"/>
+            </a:pPr>
+            <a:r>
+              <a:rPr lang="fr-FR" dirty="0" smtClean="0"/>
+              <a:t>Entr</a:t>
+            </a:r>
+            <a:r>
+              <a:rPr lang="fr-FR" dirty="0" smtClean="0"/>
+              <a:t>ées / Sorties</a:t>
+            </a:r>
+            <a:endParaRPr lang="fr-FR" dirty="0" smtClean="0"/>
+          </a:p>
+          <a:p>
+            <a:pPr marL="514350" indent="-514350">
+              <a:buSzPct val="120000"/>
+              <a:buFont typeface="+mj-lt"/>
               <a:buAutoNum type="romanUcPeriod"/>
             </a:pPr>
+            <a:r>
+              <a:rPr lang="fr-FR" dirty="0" smtClean="0"/>
+              <a:t>Problèmes liés à la segmentation par croissance de régions</a:t>
+            </a:r>
             <a:endParaRPr lang="fr-FR" dirty="0" smtClean="0"/>
           </a:p>
           <a:p>
@@ -12202,7 +12206,11 @@
             </a:r>
             <a:r>
               <a:rPr lang="fr-FR" dirty="0" smtClean="0"/>
-              <a:t>, autre ?</a:t>
+              <a:t>, autre </a:t>
+            </a:r>
+            <a:r>
+              <a:rPr lang="fr-FR" dirty="0" smtClean="0"/>
+              <a:t>?</a:t>
             </a:r>
             <a:endParaRPr lang="fr-FR" dirty="0"/>
           </a:p>
@@ -12957,6 +12965,431 @@
 </p:sld>
 </file>
 
+<file path=ppt/slides/slide26.xml><?xml version="1.0" encoding="utf-8"?>
+<p:sld xmlns:a="http://schemas.openxmlformats.org/drawingml/2006/main" xmlns:r="http://schemas.openxmlformats.org/officeDocument/2006/relationships" xmlns:p="http://schemas.openxmlformats.org/presentationml/2006/main">
+  <p:cSld>
+    <p:spTree>
+      <p:nvGrpSpPr>
+        <p:cNvPr id="1" name=""/>
+        <p:cNvGrpSpPr/>
+        <p:nvPr/>
+      </p:nvGrpSpPr>
+      <p:grpSpPr>
+        <a:xfrm>
+          <a:off x="0" y="0"/>
+          <a:ext cx="0" cy="0"/>
+          <a:chOff x="0" y="0"/>
+          <a:chExt cx="0" cy="0"/>
+        </a:xfrm>
+      </p:grpSpPr>
+      <p:sp>
+        <p:nvSpPr>
+          <p:cNvPr id="2" name="Titre 1"/>
+          <p:cNvSpPr>
+            <a:spLocks noGrp="1"/>
+          </p:cNvSpPr>
+          <p:nvPr>
+            <p:ph type="title"/>
+          </p:nvPr>
+        </p:nvSpPr>
+        <p:spPr>
+          <a:xfrm>
+            <a:off x="1484310" y="312313"/>
+            <a:ext cx="10018713" cy="1327301"/>
+          </a:xfrm>
+        </p:spPr>
+        <p:txBody>
+          <a:bodyPr/>
+          <a:lstStyle/>
+          <a:p>
+            <a:pPr algn="l"/>
+            <a:r>
+              <a:rPr lang="fr-FR" dirty="0" smtClean="0"/>
+              <a:t>III. </a:t>
+            </a:r>
+            <a:r>
+              <a:rPr lang="fr-FR" dirty="0" smtClean="0"/>
+              <a:t>Implémentation</a:t>
+            </a:r>
+            <a:r>
+              <a:rPr lang="fr-FR" dirty="0" smtClean="0"/>
+              <a:t/>
+            </a:r>
+            <a:br>
+              <a:rPr lang="fr-FR" dirty="0" smtClean="0"/>
+            </a:br>
+            <a:endParaRPr lang="fr-FR" dirty="0"/>
+          </a:p>
+        </p:txBody>
+      </p:sp>
+      <p:sp>
+        <p:nvSpPr>
+          <p:cNvPr id="3" name="Espace réservé du contenu 2"/>
+          <p:cNvSpPr>
+            <a:spLocks noGrp="1"/>
+          </p:cNvSpPr>
+          <p:nvPr>
+            <p:ph idx="1"/>
+          </p:nvPr>
+        </p:nvSpPr>
+        <p:spPr>
+          <a:xfrm>
+            <a:off x="1484310" y="1639614"/>
+            <a:ext cx="10577061" cy="4592642"/>
+          </a:xfrm>
+        </p:spPr>
+        <p:txBody>
+          <a:bodyPr anchor="t">
+            <a:normAutofit fontScale="92500" lnSpcReduction="10000"/>
+          </a:bodyPr>
+          <a:lstStyle/>
+          <a:p>
+            <a:pPr marL="0" indent="0">
+              <a:buNone/>
+            </a:pPr>
+            <a:r>
+              <a:rPr lang="fr-FR" dirty="0" smtClean="0"/>
+              <a:t>TODO</a:t>
+            </a:r>
+          </a:p>
+          <a:p>
+            <a:pPr>
+              <a:buFontTx/>
+              <a:buChar char="-"/>
+            </a:pPr>
+            <a:r>
+              <a:rPr lang="fr-FR" dirty="0" smtClean="0"/>
+              <a:t>Montrer comment j’ai codé : </a:t>
+            </a:r>
+          </a:p>
+          <a:p>
+            <a:pPr lvl="1">
+              <a:buFontTx/>
+              <a:buChar char="-"/>
+            </a:pPr>
+            <a:r>
+              <a:rPr lang="fr-FR" dirty="0" smtClean="0"/>
+              <a:t>ImageJ</a:t>
+            </a:r>
+          </a:p>
+          <a:p>
+            <a:pPr lvl="1">
+              <a:buFontTx/>
+              <a:buChar char="-"/>
+            </a:pPr>
+            <a:r>
+              <a:rPr lang="fr-FR" dirty="0" smtClean="0"/>
+              <a:t>UML</a:t>
+            </a:r>
+          </a:p>
+          <a:p>
+            <a:pPr lvl="1">
+              <a:buFontTx/>
+              <a:buChar char="-"/>
+            </a:pPr>
+            <a:r>
+              <a:rPr lang="fr-FR" dirty="0" smtClean="0"/>
+              <a:t>Base de cas </a:t>
+            </a:r>
+          </a:p>
+          <a:p>
+            <a:pPr lvl="1">
+              <a:buFontTx/>
+              <a:buChar char="-"/>
+            </a:pPr>
+            <a:r>
+              <a:rPr lang="fr-FR" dirty="0" smtClean="0"/>
+              <a:t>E/S</a:t>
+            </a:r>
+          </a:p>
+          <a:p>
+            <a:pPr lvl="1">
+              <a:buFontTx/>
+              <a:buChar char="-"/>
+            </a:pPr>
+            <a:r>
+              <a:rPr lang="fr-FR" dirty="0" smtClean="0"/>
+              <a:t>Exécution</a:t>
+            </a:r>
+          </a:p>
+          <a:p>
+            <a:pPr lvl="1">
+              <a:buFontTx/>
+              <a:buChar char="-"/>
+            </a:pPr>
+            <a:r>
+              <a:rPr lang="fr-FR" dirty="0" smtClean="0"/>
+              <a:t>Couleurs</a:t>
+            </a:r>
+          </a:p>
+          <a:p>
+            <a:pPr lvl="1">
+              <a:buFontTx/>
+              <a:buChar char="-"/>
+            </a:pPr>
+            <a:r>
+              <a:rPr lang="fr-FR" dirty="0" smtClean="0"/>
+              <a:t>Ouverture</a:t>
+            </a:r>
+          </a:p>
+          <a:p>
+            <a:pPr lvl="1">
+              <a:buFontTx/>
+              <a:buChar char="-"/>
+            </a:pPr>
+            <a:r>
+              <a:rPr lang="fr-FR" dirty="0" smtClean="0"/>
+              <a:t>Fusion possible des régions</a:t>
+            </a:r>
+          </a:p>
+          <a:p>
+            <a:pPr lvl="1">
+              <a:buFontTx/>
+              <a:buChar char="-"/>
+            </a:pPr>
+            <a:r>
+              <a:rPr lang="fr-FR" dirty="0" smtClean="0"/>
+              <a:t>Etc.</a:t>
+            </a:r>
+            <a:endParaRPr lang="fr-FR" dirty="0"/>
+          </a:p>
+          <a:p>
+            <a:pPr marL="0" indent="0">
+              <a:buNone/>
+            </a:pPr>
+            <a:endParaRPr lang="fr-FR" dirty="0" smtClean="0"/>
+          </a:p>
+          <a:p>
+            <a:pPr marL="514350" indent="-514350">
+              <a:buAutoNum type="romanUcPeriod"/>
+            </a:pPr>
+            <a:endParaRPr lang="fr-FR" dirty="0"/>
+          </a:p>
+        </p:txBody>
+      </p:sp>
+      <p:sp>
+        <p:nvSpPr>
+          <p:cNvPr id="5" name="Espace réservé du numéro de diapositive 4"/>
+          <p:cNvSpPr>
+            <a:spLocks noGrp="1"/>
+          </p:cNvSpPr>
+          <p:nvPr>
+            <p:ph type="sldNum" sz="quarter" idx="12"/>
+          </p:nvPr>
+        </p:nvSpPr>
+        <p:spPr/>
+        <p:txBody>
+          <a:bodyPr/>
+          <a:lstStyle/>
+          <a:p>
+            <a:fld id="{D57F1E4F-1CFF-5643-939E-217C01CDF565}" type="slidenum">
+              <a:rPr lang="en-US" smtClean="0"/>
+              <a:pPr/>
+              <a:t>26</a:t>
+            </a:fld>
+            <a:endParaRPr lang="en-US" dirty="0"/>
+          </a:p>
+        </p:txBody>
+      </p:sp>
+    </p:spTree>
+    <p:extLst>
+      <p:ext uri="{BB962C8B-B14F-4D97-AF65-F5344CB8AC3E}">
+        <p14:creationId xmlns:p14="http://schemas.microsoft.com/office/powerpoint/2010/main" val="1025363274"/>
+      </p:ext>
+    </p:extLst>
+  </p:cSld>
+  <p:clrMapOvr>
+    <a:masterClrMapping/>
+  </p:clrMapOvr>
+  <p:timing>
+    <p:tnLst>
+      <p:par>
+        <p:cTn id="1" dur="indefinite" restart="never" nodeType="tmRoot"/>
+      </p:par>
+    </p:tnLst>
+  </p:timing>
+</p:sld>
+</file>
+
+<file path=ppt/slides/slide27.xml><?xml version="1.0" encoding="utf-8"?>
+<p:sld xmlns:a="http://schemas.openxmlformats.org/drawingml/2006/main" xmlns:r="http://schemas.openxmlformats.org/officeDocument/2006/relationships" xmlns:p="http://schemas.openxmlformats.org/presentationml/2006/main">
+  <p:cSld>
+    <p:spTree>
+      <p:nvGrpSpPr>
+        <p:cNvPr id="1" name=""/>
+        <p:cNvGrpSpPr/>
+        <p:nvPr/>
+      </p:nvGrpSpPr>
+      <p:grpSpPr>
+        <a:xfrm>
+          <a:off x="0" y="0"/>
+          <a:ext cx="0" cy="0"/>
+          <a:chOff x="0" y="0"/>
+          <a:chExt cx="0" cy="0"/>
+        </a:xfrm>
+      </p:grpSpPr>
+      <p:sp>
+        <p:nvSpPr>
+          <p:cNvPr id="2" name="Titre 1"/>
+          <p:cNvSpPr>
+            <a:spLocks noGrp="1"/>
+          </p:cNvSpPr>
+          <p:nvPr>
+            <p:ph type="title"/>
+          </p:nvPr>
+        </p:nvSpPr>
+        <p:spPr>
+          <a:xfrm>
+            <a:off x="1484310" y="312313"/>
+            <a:ext cx="10018713" cy="1327301"/>
+          </a:xfrm>
+        </p:spPr>
+        <p:txBody>
+          <a:bodyPr/>
+          <a:lstStyle/>
+          <a:p>
+            <a:pPr algn="l"/>
+            <a:r>
+              <a:rPr lang="fr-FR" dirty="0" smtClean="0"/>
+              <a:t>IV. Problèmes liés à la segmentation</a:t>
+            </a:r>
+            <a:br>
+              <a:rPr lang="fr-FR" dirty="0" smtClean="0"/>
+            </a:br>
+            <a:endParaRPr lang="fr-FR" dirty="0"/>
+          </a:p>
+        </p:txBody>
+      </p:sp>
+      <p:sp>
+        <p:nvSpPr>
+          <p:cNvPr id="3" name="Espace réservé du contenu 2"/>
+          <p:cNvSpPr>
+            <a:spLocks noGrp="1"/>
+          </p:cNvSpPr>
+          <p:nvPr>
+            <p:ph idx="1"/>
+          </p:nvPr>
+        </p:nvSpPr>
+        <p:spPr>
+          <a:xfrm>
+            <a:off x="1484310" y="1810656"/>
+            <a:ext cx="10577061" cy="3632201"/>
+          </a:xfrm>
+        </p:spPr>
+        <p:txBody>
+          <a:bodyPr anchor="t">
+            <a:normAutofit/>
+          </a:bodyPr>
+          <a:lstStyle/>
+          <a:p>
+            <a:pPr marL="0" indent="0">
+              <a:buNone/>
+            </a:pPr>
+            <a:r>
+              <a:rPr lang="fr-FR" dirty="0" smtClean="0"/>
+              <a:t>TODO</a:t>
+            </a:r>
+          </a:p>
+          <a:p>
+            <a:pPr>
+              <a:buFontTx/>
+              <a:buChar char="-"/>
+            </a:pPr>
+            <a:r>
+              <a:rPr lang="fr-FR" dirty="0" smtClean="0"/>
+              <a:t>Image simple ça marche bien (montrer seuils, germes, ouverture, etc.)</a:t>
+            </a:r>
+          </a:p>
+          <a:p>
+            <a:pPr>
+              <a:buFontTx/>
+              <a:buChar char="-"/>
+            </a:pPr>
+            <a:r>
+              <a:rPr lang="fr-FR" dirty="0" smtClean="0"/>
+              <a:t>Image compliquée c’est la merde (montrer problèmes </a:t>
+            </a:r>
+            <a:r>
+              <a:rPr lang="fr-FR" dirty="0" err="1" smtClean="0"/>
+              <a:t>niv</a:t>
+            </a:r>
+            <a:r>
+              <a:rPr lang="fr-FR" dirty="0" smtClean="0"/>
+              <a:t>. Gris, seuils, prétraitements </a:t>
+            </a:r>
+            <a:r>
+              <a:rPr lang="fr-FR" dirty="0" err="1" smtClean="0"/>
+              <a:t>imageJ</a:t>
+            </a:r>
+            <a:r>
+              <a:rPr lang="fr-FR" dirty="0" smtClean="0"/>
+              <a:t>, </a:t>
+            </a:r>
+          </a:p>
+          <a:p>
+            <a:pPr marL="0" indent="0">
+              <a:buNone/>
+            </a:pPr>
+            <a:endParaRPr lang="fr-FR" dirty="0"/>
+          </a:p>
+          <a:p>
+            <a:pPr marL="0" indent="0">
+              <a:buNone/>
+            </a:pPr>
+            <a:endParaRPr lang="fr-FR" dirty="0" smtClean="0"/>
+          </a:p>
+          <a:p>
+            <a:pPr marL="514350" indent="-514350">
+              <a:buAutoNum type="romanUcPeriod"/>
+            </a:pPr>
+            <a:endParaRPr lang="fr-FR" dirty="0"/>
+          </a:p>
+        </p:txBody>
+      </p:sp>
+      <p:sp>
+        <p:nvSpPr>
+          <p:cNvPr id="5" name="Espace réservé du numéro de diapositive 4"/>
+          <p:cNvSpPr>
+            <a:spLocks noGrp="1"/>
+          </p:cNvSpPr>
+          <p:nvPr>
+            <p:ph type="sldNum" sz="quarter" idx="12"/>
+          </p:nvPr>
+        </p:nvSpPr>
+        <p:spPr/>
+        <p:txBody>
+          <a:bodyPr/>
+          <a:lstStyle/>
+          <a:p>
+            <a:fld id="{D57F1E4F-1CFF-5643-939E-217C01CDF565}" type="slidenum">
+              <a:rPr lang="en-US" smtClean="0"/>
+              <a:pPr/>
+              <a:t>27</a:t>
+            </a:fld>
+            <a:endParaRPr lang="en-US" dirty="0"/>
+          </a:p>
+        </p:txBody>
+      </p:sp>
+    </p:spTree>
+    <p:extLst>
+      <p:ext uri="{BB962C8B-B14F-4D97-AF65-F5344CB8AC3E}">
+        <p14:creationId xmlns:p14="http://schemas.microsoft.com/office/powerpoint/2010/main" val="1006993935"/>
+      </p:ext>
+    </p:extLst>
+  </p:cSld>
+  <p:clrMapOvr>
+    <a:masterClrMapping/>
+  </p:clrMapOvr>
+  <p:timing>
+    <p:tnLst>
+      <p:par>
+        <p:cTn id="1" dur="indefinite" restart="never" nodeType="tmRoot"/>
+      </p:par>
+    </p:tnLst>
+  </p:timing>
+</p:sld>
+</file>
+
 <file path=ppt/slides/slide3.xml><?xml version="1.0" encoding="utf-8"?>
 <p:sld xmlns:a="http://schemas.openxmlformats.org/drawingml/2006/main" xmlns:r="http://schemas.openxmlformats.org/officeDocument/2006/relationships" xmlns:p="http://schemas.openxmlformats.org/presentationml/2006/main">
   <p:cSld>
@@ -13251,15 +13684,25 @@
             </a:pPr>
             <a:r>
               <a:rPr lang="fr-FR" sz="2200" dirty="0" smtClean="0"/>
-              <a:t>Idée </a:t>
-            </a:r>
+              <a:t>Idée : à partir d’un scanner donné,</a:t>
+            </a:r>
+          </a:p>
+          <a:p>
+            <a:pPr marL="0" indent="0">
+              <a:buNone/>
+            </a:pPr>
             <a:r>
               <a:rPr lang="fr-FR" sz="2200" dirty="0" smtClean="0"/>
-              <a:t>: à partir d’un scanner </a:t>
-            </a:r>
+              <a:t> déterminer la position optimale des </a:t>
+            </a:r>
+          </a:p>
+          <a:p>
+            <a:pPr marL="0" indent="0">
+              <a:buNone/>
+            </a:pPr>
             <a:r>
               <a:rPr lang="fr-FR" sz="2200" dirty="0" smtClean="0"/>
-              <a:t>donné,</a:t>
+              <a:t>pixels germes (+seuils) </a:t>
             </a:r>
           </a:p>
           <a:p>
@@ -13268,53 +13711,16 @@
             </a:pPr>
             <a:r>
               <a:rPr lang="fr-FR" sz="2200" dirty="0" smtClean="0"/>
-              <a:t> </a:t>
-            </a:r>
+              <a:t>en vue d’une segmentation </a:t>
+            </a:r>
+          </a:p>
+          <a:p>
+            <a:pPr marL="0" indent="0">
+              <a:buNone/>
+            </a:pPr>
             <a:r>
               <a:rPr lang="fr-FR" sz="2200" dirty="0" smtClean="0"/>
-              <a:t>déterminer la position optimale des </a:t>
-            </a:r>
-            <a:endParaRPr lang="fr-FR" sz="2200" dirty="0" smtClean="0"/>
-          </a:p>
-          <a:p>
-            <a:pPr marL="0" indent="0">
-              <a:buNone/>
-            </a:pPr>
-            <a:r>
-              <a:rPr lang="fr-FR" sz="2200" dirty="0" smtClean="0"/>
-              <a:t>pixels </a:t>
-            </a:r>
-            <a:r>
-              <a:rPr lang="fr-FR" sz="2200" dirty="0" smtClean="0"/>
-              <a:t>germes (+seuils) </a:t>
-            </a:r>
-            <a:endParaRPr lang="fr-FR" sz="2200" dirty="0" smtClean="0"/>
-          </a:p>
-          <a:p>
-            <a:pPr marL="0" indent="0">
-              <a:buNone/>
-            </a:pPr>
-            <a:r>
-              <a:rPr lang="fr-FR" sz="2200" dirty="0" smtClean="0"/>
-              <a:t>en </a:t>
-            </a:r>
-            <a:r>
-              <a:rPr lang="fr-FR" sz="2200" dirty="0" smtClean="0"/>
-              <a:t>vue d’une segmentation </a:t>
-            </a:r>
-            <a:endParaRPr lang="fr-FR" sz="2200" dirty="0" smtClean="0"/>
-          </a:p>
-          <a:p>
-            <a:pPr marL="0" indent="0">
-              <a:buNone/>
-            </a:pPr>
-            <a:r>
-              <a:rPr lang="fr-FR" sz="2200" dirty="0" smtClean="0"/>
-              <a:t>par </a:t>
-            </a:r>
-            <a:r>
-              <a:rPr lang="fr-FR" sz="2200" dirty="0" smtClean="0"/>
-              <a:t>croissance de régions.</a:t>
+              <a:t>par croissance de régions.</a:t>
             </a:r>
           </a:p>
           <a:p>
@@ -13341,13 +13747,7 @@
               <a:rPr lang="fr-FR" sz="2200" dirty="0" smtClean="0">
                 <a:sym typeface="Wingdings" panose="05000000000000000000" pitchFamily="2" charset="2"/>
               </a:rPr>
-              <a:t>Scanner </a:t>
-            </a:r>
-            <a:r>
-              <a:rPr lang="fr-FR" sz="2200" dirty="0" smtClean="0">
-                <a:sym typeface="Wingdings" panose="05000000000000000000" pitchFamily="2" charset="2"/>
-              </a:rPr>
-              <a:t>+ informations (« image » / « nonimage »)   positions des germes + seuils</a:t>
+              <a:t>Scanner + informations (« image » / « nonimage »)   positions des germes + seuils</a:t>
             </a:r>
             <a:endParaRPr lang="fr-FR" sz="2200" dirty="0" smtClean="0"/>
           </a:p>
@@ -13553,11 +13953,7 @@
           <a:p>
             <a:r>
               <a:rPr lang="fr-FR" dirty="0" smtClean="0"/>
-              <a:t>(+Description</a:t>
-            </a:r>
-            <a:r>
-              <a:rPr lang="fr-FR" dirty="0" smtClean="0"/>
-              <a:t>)</a:t>
+              <a:t>(+Description)</a:t>
             </a:r>
           </a:p>
           <a:p>

</xml_diff>

<commit_message>
ajout de deux parties dans la presentation (implementation et problemes de segmentation)
</commit_message>
<xml_diff>
--- a/Travail_realise/Presentations/Utilisation_du_RaPC_pour_la_segmentation_d_images.pptx
+++ b/Travail_realise/Presentations/Utilisation_du_RaPC_pour_la_segmentation_d_images.pptx
@@ -5,7 +5,7 @@
     <p:sldMasterId id="2147483648" r:id="rId1"/>
   </p:sldMasterIdLst>
   <p:notesMasterIdLst>
-    <p:notesMasterId r:id="rId29"/>
+    <p:notesMasterId r:id="rId41"/>
   </p:notesMasterIdLst>
   <p:sldIdLst>
     <p:sldId id="256" r:id="rId2"/>
@@ -34,7 +34,19 @@
     <p:sldId id="281" r:id="rId25"/>
     <p:sldId id="273" r:id="rId26"/>
     <p:sldId id="283" r:id="rId27"/>
-    <p:sldId id="284" r:id="rId28"/>
+    <p:sldId id="285" r:id="rId28"/>
+    <p:sldId id="286" r:id="rId29"/>
+    <p:sldId id="288" r:id="rId30"/>
+    <p:sldId id="287" r:id="rId31"/>
+    <p:sldId id="289" r:id="rId32"/>
+    <p:sldId id="290" r:id="rId33"/>
+    <p:sldId id="291" r:id="rId34"/>
+    <p:sldId id="284" r:id="rId35"/>
+    <p:sldId id="292" r:id="rId36"/>
+    <p:sldId id="293" r:id="rId37"/>
+    <p:sldId id="294" r:id="rId38"/>
+    <p:sldId id="295" r:id="rId39"/>
+    <p:sldId id="296" r:id="rId40"/>
   </p:sldIdLst>
   <p:sldSz cx="12192000" cy="6858000"/>
   <p:notesSz cx="6858000" cy="9144000"/>
@@ -223,7 +235,7 @@
           <a:p>
             <a:fld id="{3BF17BC6-DB60-45E7-9D02-F2D1FB25D0FA}" type="datetimeFigureOut">
               <a:rPr lang="fr-FR" smtClean="0"/>
-              <a:t>23/03/2017</a:t>
+              <a:t>24/03/2017</a:t>
             </a:fld>
             <a:endParaRPr lang="fr-FR"/>
           </a:p>
@@ -1219,6 +1231,272 @@
     <p:extLst>
       <p:ext uri="{BB962C8B-B14F-4D97-AF65-F5344CB8AC3E}">
         <p14:creationId xmlns:p14="http://schemas.microsoft.com/office/powerpoint/2010/main" val="1466584535"/>
+      </p:ext>
+    </p:extLst>
+  </p:cSld>
+  <p:clrMapOvr>
+    <a:masterClrMapping/>
+  </p:clrMapOvr>
+</p:notes>
+</file>
+
+<file path=ppt/notesSlides/notesSlide17.xml><?xml version="1.0" encoding="utf-8"?>
+<p:notes xmlns:a="http://schemas.openxmlformats.org/drawingml/2006/main" xmlns:r="http://schemas.openxmlformats.org/officeDocument/2006/relationships" xmlns:p="http://schemas.openxmlformats.org/presentationml/2006/main">
+  <p:cSld>
+    <p:spTree>
+      <p:nvGrpSpPr>
+        <p:cNvPr id="1" name=""/>
+        <p:cNvGrpSpPr/>
+        <p:nvPr/>
+      </p:nvGrpSpPr>
+      <p:grpSpPr>
+        <a:xfrm>
+          <a:off x="0" y="0"/>
+          <a:ext cx="0" cy="0"/>
+          <a:chOff x="0" y="0"/>
+          <a:chExt cx="0" cy="0"/>
+        </a:xfrm>
+      </p:grpSpPr>
+      <p:sp>
+        <p:nvSpPr>
+          <p:cNvPr id="2" name="Espace réservé de l'image des diapositives 1"/>
+          <p:cNvSpPr>
+            <a:spLocks noGrp="1" noRot="1" noChangeAspect="1"/>
+          </p:cNvSpPr>
+          <p:nvPr>
+            <p:ph type="sldImg"/>
+          </p:nvPr>
+        </p:nvSpPr>
+        <p:spPr/>
+      </p:sp>
+      <p:sp>
+        <p:nvSpPr>
+          <p:cNvPr id="3" name="Espace réservé des commentaires 2"/>
+          <p:cNvSpPr>
+            <a:spLocks noGrp="1"/>
+          </p:cNvSpPr>
+          <p:nvPr>
+            <p:ph type="body" idx="1"/>
+          </p:nvPr>
+        </p:nvSpPr>
+        <p:spPr/>
+        <p:txBody>
+          <a:bodyPr/>
+          <a:lstStyle/>
+          <a:p>
+            <a:endParaRPr lang="fr-FR" dirty="0"/>
+          </a:p>
+        </p:txBody>
+      </p:sp>
+      <p:sp>
+        <p:nvSpPr>
+          <p:cNvPr id="4" name="Espace réservé du numéro de diapositive 3"/>
+          <p:cNvSpPr>
+            <a:spLocks noGrp="1"/>
+          </p:cNvSpPr>
+          <p:nvPr>
+            <p:ph type="sldNum" sz="quarter" idx="10"/>
+          </p:nvPr>
+        </p:nvSpPr>
+        <p:spPr/>
+        <p:txBody>
+          <a:bodyPr/>
+          <a:lstStyle/>
+          <a:p>
+            <a:fld id="{5984FE70-0D1D-40C7-9F56-3FAF97D50752}" type="slidenum">
+              <a:rPr lang="fr-FR" smtClean="0"/>
+              <a:t>32</a:t>
+            </a:fld>
+            <a:endParaRPr lang="fr-FR"/>
+          </a:p>
+        </p:txBody>
+      </p:sp>
+    </p:spTree>
+    <p:extLst>
+      <p:ext uri="{BB962C8B-B14F-4D97-AF65-F5344CB8AC3E}">
+        <p14:creationId xmlns:p14="http://schemas.microsoft.com/office/powerpoint/2010/main" val="3029521272"/>
+      </p:ext>
+    </p:extLst>
+  </p:cSld>
+  <p:clrMapOvr>
+    <a:masterClrMapping/>
+  </p:clrMapOvr>
+</p:notes>
+</file>
+
+<file path=ppt/notesSlides/notesSlide18.xml><?xml version="1.0" encoding="utf-8"?>
+<p:notes xmlns:a="http://schemas.openxmlformats.org/drawingml/2006/main" xmlns:r="http://schemas.openxmlformats.org/officeDocument/2006/relationships" xmlns:p="http://schemas.openxmlformats.org/presentationml/2006/main">
+  <p:cSld>
+    <p:spTree>
+      <p:nvGrpSpPr>
+        <p:cNvPr id="1" name=""/>
+        <p:cNvGrpSpPr/>
+        <p:nvPr/>
+      </p:nvGrpSpPr>
+      <p:grpSpPr>
+        <a:xfrm>
+          <a:off x="0" y="0"/>
+          <a:ext cx="0" cy="0"/>
+          <a:chOff x="0" y="0"/>
+          <a:chExt cx="0" cy="0"/>
+        </a:xfrm>
+      </p:grpSpPr>
+      <p:sp>
+        <p:nvSpPr>
+          <p:cNvPr id="2" name="Espace réservé de l'image des diapositives 1"/>
+          <p:cNvSpPr>
+            <a:spLocks noGrp="1" noRot="1" noChangeAspect="1"/>
+          </p:cNvSpPr>
+          <p:nvPr>
+            <p:ph type="sldImg"/>
+          </p:nvPr>
+        </p:nvSpPr>
+        <p:spPr/>
+      </p:sp>
+      <p:sp>
+        <p:nvSpPr>
+          <p:cNvPr id="3" name="Espace réservé des commentaires 2"/>
+          <p:cNvSpPr>
+            <a:spLocks noGrp="1"/>
+          </p:cNvSpPr>
+          <p:nvPr>
+            <p:ph type="body" idx="1"/>
+          </p:nvPr>
+        </p:nvSpPr>
+        <p:spPr/>
+        <p:txBody>
+          <a:bodyPr/>
+          <a:lstStyle/>
+          <a:p>
+            <a:r>
+              <a:rPr lang="fr-FR" dirty="0" smtClean="0"/>
+              <a:t>Tumeur : seuils trop</a:t>
+            </a:r>
+            <a:r>
+              <a:rPr lang="fr-FR" baseline="0" dirty="0" smtClean="0"/>
+              <a:t> permissifs</a:t>
+            </a:r>
+          </a:p>
+          <a:p>
+            <a:r>
+              <a:rPr lang="fr-FR" baseline="0" dirty="0" smtClean="0"/>
+              <a:t>Rein : seuils trop contraignants</a:t>
+            </a:r>
+            <a:endParaRPr lang="fr-FR" dirty="0"/>
+          </a:p>
+        </p:txBody>
+      </p:sp>
+      <p:sp>
+        <p:nvSpPr>
+          <p:cNvPr id="4" name="Espace réservé du numéro de diapositive 3"/>
+          <p:cNvSpPr>
+            <a:spLocks noGrp="1"/>
+          </p:cNvSpPr>
+          <p:nvPr>
+            <p:ph type="sldNum" sz="quarter" idx="10"/>
+          </p:nvPr>
+        </p:nvSpPr>
+        <p:spPr/>
+        <p:txBody>
+          <a:bodyPr/>
+          <a:lstStyle/>
+          <a:p>
+            <a:fld id="{5984FE70-0D1D-40C7-9F56-3FAF97D50752}" type="slidenum">
+              <a:rPr lang="fr-FR" smtClean="0"/>
+              <a:t>36</a:t>
+            </a:fld>
+            <a:endParaRPr lang="fr-FR"/>
+          </a:p>
+        </p:txBody>
+      </p:sp>
+    </p:spTree>
+    <p:extLst>
+      <p:ext uri="{BB962C8B-B14F-4D97-AF65-F5344CB8AC3E}">
+        <p14:creationId xmlns:p14="http://schemas.microsoft.com/office/powerpoint/2010/main" val="316203356"/>
+      </p:ext>
+    </p:extLst>
+  </p:cSld>
+  <p:clrMapOvr>
+    <a:masterClrMapping/>
+  </p:clrMapOvr>
+</p:notes>
+</file>
+
+<file path=ppt/notesSlides/notesSlide19.xml><?xml version="1.0" encoding="utf-8"?>
+<p:notes xmlns:a="http://schemas.openxmlformats.org/drawingml/2006/main" xmlns:r="http://schemas.openxmlformats.org/officeDocument/2006/relationships" xmlns:p="http://schemas.openxmlformats.org/presentationml/2006/main">
+  <p:cSld>
+    <p:spTree>
+      <p:nvGrpSpPr>
+        <p:cNvPr id="1" name=""/>
+        <p:cNvGrpSpPr/>
+        <p:nvPr/>
+      </p:nvGrpSpPr>
+      <p:grpSpPr>
+        <a:xfrm>
+          <a:off x="0" y="0"/>
+          <a:ext cx="0" cy="0"/>
+          <a:chOff x="0" y="0"/>
+          <a:chExt cx="0" cy="0"/>
+        </a:xfrm>
+      </p:grpSpPr>
+      <p:sp>
+        <p:nvSpPr>
+          <p:cNvPr id="2" name="Espace réservé de l'image des diapositives 1"/>
+          <p:cNvSpPr>
+            <a:spLocks noGrp="1" noRot="1" noChangeAspect="1"/>
+          </p:cNvSpPr>
+          <p:nvPr>
+            <p:ph type="sldImg"/>
+          </p:nvPr>
+        </p:nvSpPr>
+        <p:spPr/>
+      </p:sp>
+      <p:sp>
+        <p:nvSpPr>
+          <p:cNvPr id="3" name="Espace réservé des commentaires 2"/>
+          <p:cNvSpPr>
+            <a:spLocks noGrp="1"/>
+          </p:cNvSpPr>
+          <p:nvPr>
+            <p:ph type="body" idx="1"/>
+          </p:nvPr>
+        </p:nvSpPr>
+        <p:spPr/>
+        <p:txBody>
+          <a:bodyPr/>
+          <a:lstStyle/>
+          <a:p>
+            <a:endParaRPr lang="fr-FR"/>
+          </a:p>
+        </p:txBody>
+      </p:sp>
+      <p:sp>
+        <p:nvSpPr>
+          <p:cNvPr id="4" name="Espace réservé du numéro de diapositive 3"/>
+          <p:cNvSpPr>
+            <a:spLocks noGrp="1"/>
+          </p:cNvSpPr>
+          <p:nvPr>
+            <p:ph type="sldNum" sz="quarter" idx="10"/>
+          </p:nvPr>
+        </p:nvSpPr>
+        <p:spPr/>
+        <p:txBody>
+          <a:bodyPr/>
+          <a:lstStyle/>
+          <a:p>
+            <a:fld id="{5984FE70-0D1D-40C7-9F56-3FAF97D50752}" type="slidenum">
+              <a:rPr lang="fr-FR" smtClean="0"/>
+              <a:t>39</a:t>
+            </a:fld>
+            <a:endParaRPr lang="fr-FR"/>
+          </a:p>
+        </p:txBody>
+      </p:sp>
+    </p:spTree>
+    <p:extLst>
+      <p:ext uri="{BB962C8B-B14F-4D97-AF65-F5344CB8AC3E}">
+        <p14:creationId xmlns:p14="http://schemas.microsoft.com/office/powerpoint/2010/main" val="3570101583"/>
       </p:ext>
     </p:extLst>
   </p:cSld>
@@ -2591,7 +2869,7 @@
           <a:p>
             <a:fld id="{B13A3E0C-43BD-4BD3-9D98-E47133C0F16B}" type="datetime1">
               <a:rPr lang="en-US" smtClean="0"/>
-              <a:t>3/23/2017</a:t>
+              <a:t>3/24/2017</a:t>
             </a:fld>
             <a:endParaRPr lang="en-US" dirty="0"/>
           </a:p>
@@ -2887,7 +3165,7 @@
           <a:p>
             <a:fld id="{DEAE60AC-6FB4-4151-AF18-32B957CEA5B2}" type="datetime1">
               <a:rPr lang="en-US" smtClean="0"/>
-              <a:t>3/23/2017</a:t>
+              <a:t>3/24/2017</a:t>
             </a:fld>
             <a:endParaRPr lang="en-US" dirty="0"/>
           </a:p>
@@ -3135,7 +3413,7 @@
           <a:p>
             <a:fld id="{49AF46AD-D75C-4BBC-B0EE-EB1C4A750FFF}" type="datetime1">
               <a:rPr lang="en-US" smtClean="0"/>
-              <a:t>3/23/2017</a:t>
+              <a:t>3/24/2017</a:t>
             </a:fld>
             <a:endParaRPr lang="en-US" dirty="0"/>
           </a:p>
@@ -3675,7 +3953,7 @@
           <a:p>
             <a:fld id="{B3EBDC74-5C10-4051-A6E3-AA9EF5D2777A}" type="datetime1">
               <a:rPr lang="en-US" smtClean="0"/>
-              <a:t>3/23/2017</a:t>
+              <a:t>3/24/2017</a:t>
             </a:fld>
             <a:endParaRPr lang="en-US" dirty="0"/>
           </a:p>
@@ -3923,7 +4201,7 @@
           <a:p>
             <a:fld id="{A45DC689-383C-4C65-9A99-BE249E8E6DA6}" type="datetime1">
               <a:rPr lang="en-US" smtClean="0"/>
-              <a:t>3/23/2017</a:t>
+              <a:t>3/24/2017</a:t>
             </a:fld>
             <a:endParaRPr lang="en-US" dirty="0"/>
           </a:p>
@@ -4455,7 +4733,7 @@
           <a:p>
             <a:fld id="{CD908F51-167A-4815-AAA7-25CFFE4B423B}" type="datetime1">
               <a:rPr lang="en-US" smtClean="0"/>
-              <a:t>3/23/2017</a:t>
+              <a:t>3/24/2017</a:t>
             </a:fld>
             <a:endParaRPr lang="en-US" dirty="0"/>
           </a:p>
@@ -4752,7 +5030,7 @@
           <a:p>
             <a:fld id="{575B863B-5F62-4D1B-A811-2497203129B2}" type="datetime1">
               <a:rPr lang="en-US" smtClean="0"/>
-              <a:t>3/23/2017</a:t>
+              <a:t>3/24/2017</a:t>
             </a:fld>
             <a:endParaRPr lang="en-US" dirty="0"/>
           </a:p>
@@ -4926,7 +5204,7 @@
           <a:p>
             <a:fld id="{2C9DBC4B-3B74-49C1-839E-BABE36E5940B}" type="datetime1">
               <a:rPr lang="en-US" smtClean="0"/>
-              <a:t>3/23/2017</a:t>
+              <a:t>3/24/2017</a:t>
             </a:fld>
             <a:endParaRPr lang="en-US" dirty="0"/>
           </a:p>
@@ -5106,7 +5384,7 @@
           <a:p>
             <a:fld id="{F235FBA5-93E2-443B-A8CE-27C1480288D2}" type="datetime1">
               <a:rPr lang="en-US" smtClean="0"/>
-              <a:t>3/23/2017</a:t>
+              <a:t>3/24/2017</a:t>
             </a:fld>
             <a:endParaRPr lang="en-US" dirty="0"/>
           </a:p>
@@ -5276,7 +5554,7 @@
           <a:p>
             <a:fld id="{41689828-3518-4A8E-AE0E-F7C6B57D9567}" type="datetime1">
               <a:rPr lang="en-US" smtClean="0"/>
-              <a:t>3/23/2017</a:t>
+              <a:t>3/24/2017</a:t>
             </a:fld>
             <a:endParaRPr lang="en-US" dirty="0"/>
           </a:p>
@@ -5527,7 +5805,7 @@
           <a:p>
             <a:fld id="{8049D5B7-E950-4F1F-896A-2428B09F2CC0}" type="datetime1">
               <a:rPr lang="en-US" smtClean="0"/>
-              <a:t>3/23/2017</a:t>
+              <a:t>3/24/2017</a:t>
             </a:fld>
             <a:endParaRPr lang="en-US" dirty="0"/>
           </a:p>
@@ -5824,7 +6102,7 @@
           <a:p>
             <a:fld id="{933C9C39-ED98-4B12-9750-FA3EA5E008D8}" type="datetime1">
               <a:rPr lang="en-US" smtClean="0"/>
-              <a:t>3/23/2017</a:t>
+              <a:t>3/24/2017</a:t>
             </a:fld>
             <a:endParaRPr lang="en-US" dirty="0"/>
           </a:p>
@@ -6266,7 +6544,7 @@
           <a:p>
             <a:fld id="{E9232F9C-7B0D-40AC-879E-D399781AA9DD}" type="datetime1">
               <a:rPr lang="en-US" smtClean="0"/>
-              <a:t>3/23/2017</a:t>
+              <a:t>3/24/2017</a:t>
             </a:fld>
             <a:endParaRPr lang="en-US" dirty="0"/>
           </a:p>
@@ -6384,7 +6662,7 @@
           <a:p>
             <a:fld id="{50646EB0-DC39-4154-9CE8-BEB693E1778F}" type="datetime1">
               <a:rPr lang="en-US" smtClean="0"/>
-              <a:t>3/23/2017</a:t>
+              <a:t>3/24/2017</a:t>
             </a:fld>
             <a:endParaRPr lang="en-US" dirty="0"/>
           </a:p>
@@ -6479,7 +6757,7 @@
           <a:p>
             <a:fld id="{1862B018-388A-4D00-857F-89E0E298EDB9}" type="datetime1">
               <a:rPr lang="en-US" smtClean="0"/>
-              <a:t>3/23/2017</a:t>
+              <a:t>3/24/2017</a:t>
             </a:fld>
             <a:endParaRPr lang="en-US" dirty="0"/>
           </a:p>
@@ -6762,7 +7040,7 @@
           <a:p>
             <a:fld id="{5876601C-147A-40D7-86CA-8C540E946C34}" type="datetime1">
               <a:rPr lang="en-US" smtClean="0"/>
-              <a:t>3/23/2017</a:t>
+              <a:t>3/24/2017</a:t>
             </a:fld>
             <a:endParaRPr lang="en-US" dirty="0"/>
           </a:p>
@@ -7053,7 +7331,7 @@
           <a:p>
             <a:fld id="{B25ACF09-D22D-44AC-9A23-30C84696D0B5}" type="datetime1">
               <a:rPr lang="en-US" smtClean="0"/>
-              <a:t>3/23/2017</a:t>
+              <a:t>3/24/2017</a:t>
             </a:fld>
             <a:endParaRPr lang="en-US" dirty="0"/>
           </a:p>
@@ -7583,7 +7861,7 @@
           <a:p>
             <a:fld id="{ED468347-93DD-4B15-A18F-1C554DAB4580}" type="datetime1">
               <a:rPr lang="en-US" smtClean="0"/>
-              <a:t>3/23/2017</a:t>
+              <a:t>3/24/2017</a:t>
             </a:fld>
             <a:endParaRPr lang="en-US" dirty="0"/>
           </a:p>
@@ -10777,11 +11055,7 @@
             </a:pPr>
             <a:r>
               <a:rPr lang="fr-FR" dirty="0" smtClean="0"/>
-              <a:t>Dans notre cas </a:t>
-            </a:r>
-            <a:r>
-              <a:rPr lang="fr-FR" dirty="0" smtClean="0"/>
-              <a:t>d’étude</a:t>
+              <a:t>Dans notre cas d’étude</a:t>
             </a:r>
           </a:p>
           <a:p>
@@ -10819,13 +11093,8 @@
             </a:pPr>
             <a:r>
               <a:rPr lang="fr-FR" dirty="0" smtClean="0"/>
-              <a:t>Entr</a:t>
-            </a:r>
-            <a:r>
-              <a:rPr lang="fr-FR" dirty="0" smtClean="0"/>
-              <a:t>ées / Sorties</a:t>
-            </a:r>
-            <a:endParaRPr lang="fr-FR" dirty="0" smtClean="0"/>
+              <a:t>Entrées / Sorties</a:t>
+            </a:r>
           </a:p>
           <a:p>
             <a:pPr marL="514350" indent="-514350">
@@ -10837,7 +11106,6 @@
               <a:rPr lang="fr-FR" dirty="0" smtClean="0"/>
               <a:t>Problèmes liés à la segmentation par croissance de régions</a:t>
             </a:r>
-            <a:endParaRPr lang="fr-FR" dirty="0" smtClean="0"/>
           </a:p>
           <a:p>
             <a:pPr marL="514350" indent="-514350">
@@ -12206,11 +12474,7 @@
             </a:r>
             <a:r>
               <a:rPr lang="fr-FR" dirty="0" smtClean="0"/>
-              <a:t>, autre </a:t>
-            </a:r>
-            <a:r>
-              <a:rPr lang="fr-FR" dirty="0" smtClean="0"/>
-              <a:t>?</a:t>
+              <a:t>, autre ?</a:t>
             </a:r>
             <a:endParaRPr lang="fr-FR" dirty="0"/>
           </a:p>
@@ -13005,15 +13269,7 @@
             <a:pPr algn="l"/>
             <a:r>
               <a:rPr lang="fr-FR" dirty="0" smtClean="0"/>
-              <a:t>III. </a:t>
-            </a:r>
-            <a:r>
-              <a:rPr lang="fr-FR" dirty="0" smtClean="0"/>
-              <a:t>Implémentation</a:t>
-            </a:r>
-            <a:r>
-              <a:rPr lang="fr-FR" dirty="0" smtClean="0"/>
-              <a:t/>
+              <a:t>III. Implémentation</a:t>
             </a:r>
             <a:br>
               <a:rPr lang="fr-FR" dirty="0" smtClean="0"/>
@@ -13251,7 +13507,7 @@
             <a:pPr algn="l"/>
             <a:r>
               <a:rPr lang="fr-FR" dirty="0" smtClean="0"/>
-              <a:t>IV. Problèmes liés à la segmentation</a:t>
+              <a:t>III. Implémentation</a:t>
             </a:r>
             <a:br>
               <a:rPr lang="fr-FR" dirty="0" smtClean="0"/>
@@ -13272,8 +13528,8 @@
         </p:nvSpPr>
         <p:spPr>
           <a:xfrm>
-            <a:off x="1484310" y="1810656"/>
-            <a:ext cx="10577061" cy="3632201"/>
+            <a:off x="1484310" y="1639614"/>
+            <a:ext cx="10577061" cy="4592642"/>
           </a:xfrm>
         </p:spPr>
         <p:txBody>
@@ -13282,54 +13538,78 @@
           </a:bodyPr>
           <a:lstStyle/>
           <a:p>
-            <a:pPr marL="0" indent="0">
+            <a:r>
+              <a:rPr lang="fr-FR" dirty="0" smtClean="0"/>
+              <a:t>ImageJ </a:t>
+            </a:r>
+            <a:r>
+              <a:rPr lang="fr-FR" dirty="0" smtClean="0">
+                <a:sym typeface="Wingdings" panose="05000000000000000000" pitchFamily="2" charset="2"/>
+              </a:rPr>
+              <a:t> Java</a:t>
+            </a:r>
+          </a:p>
+          <a:p>
+            <a:pPr lvl="1"/>
+            <a:r>
+              <a:rPr lang="fr-FR" dirty="0" smtClean="0">
+                <a:sym typeface="Wingdings" panose="05000000000000000000" pitchFamily="2" charset="2"/>
+              </a:rPr>
+              <a:t>Simple</a:t>
+            </a:r>
+          </a:p>
+          <a:p>
+            <a:pPr lvl="1"/>
+            <a:r>
+              <a:rPr lang="fr-FR" dirty="0" smtClean="0">
+                <a:sym typeface="Wingdings" panose="05000000000000000000" pitchFamily="2" charset="2"/>
+              </a:rPr>
+              <a:t>Contient des filtres existants</a:t>
+            </a:r>
+          </a:p>
+          <a:p>
+            <a:pPr lvl="1"/>
+            <a:r>
+              <a:rPr lang="fr-FR" dirty="0" smtClean="0">
+                <a:sym typeface="Wingdings" panose="05000000000000000000" pitchFamily="2" charset="2"/>
+              </a:rPr>
+              <a:t>Gestion E/S facile</a:t>
+            </a:r>
+          </a:p>
+          <a:p>
+            <a:pPr lvl="1"/>
+            <a:r>
+              <a:rPr lang="fr-FR" dirty="0" smtClean="0">
+                <a:sym typeface="Wingdings" panose="05000000000000000000" pitchFamily="2" charset="2"/>
+              </a:rPr>
+              <a:t>Environnement de développement</a:t>
+            </a:r>
+          </a:p>
+          <a:p>
+            <a:pPr lvl="1"/>
+            <a:r>
+              <a:rPr lang="fr-FR" dirty="0" smtClean="0">
+                <a:sym typeface="Wingdings" panose="05000000000000000000" pitchFamily="2" charset="2"/>
+              </a:rPr>
+              <a:t>Java pas le plus adapté dans le TI</a:t>
+            </a:r>
+          </a:p>
+          <a:p>
+            <a:pPr marL="457200" lvl="1" indent="0">
               <a:buNone/>
             </a:pPr>
-            <a:r>
-              <a:rPr lang="fr-FR" dirty="0" smtClean="0"/>
-              <a:t>TODO</a:t>
-            </a:r>
-          </a:p>
-          <a:p>
-            <a:pPr>
-              <a:buFontTx/>
-              <a:buChar char="-"/>
-            </a:pPr>
-            <a:r>
-              <a:rPr lang="fr-FR" dirty="0" smtClean="0"/>
-              <a:t>Image simple ça marche bien (montrer seuils, germes, ouverture, etc.)</a:t>
-            </a:r>
-          </a:p>
-          <a:p>
-            <a:pPr>
-              <a:buFontTx/>
-              <a:buChar char="-"/>
-            </a:pPr>
-            <a:r>
-              <a:rPr lang="fr-FR" dirty="0" smtClean="0"/>
-              <a:t>Image compliquée c’est la merde (montrer problèmes </a:t>
-            </a:r>
-            <a:r>
-              <a:rPr lang="fr-FR" dirty="0" err="1" smtClean="0"/>
-              <a:t>niv</a:t>
-            </a:r>
-            <a:r>
-              <a:rPr lang="fr-FR" dirty="0" smtClean="0"/>
-              <a:t>. Gris, seuils, prétraitements </a:t>
-            </a:r>
-            <a:r>
-              <a:rPr lang="fr-FR" dirty="0" err="1" smtClean="0"/>
-              <a:t>imageJ</a:t>
-            </a:r>
-            <a:r>
-              <a:rPr lang="fr-FR" dirty="0" smtClean="0"/>
-              <a:t>, </a:t>
-            </a:r>
-          </a:p>
-          <a:p>
-            <a:pPr marL="0" indent="0">
-              <a:buNone/>
-            </a:pPr>
+            <a:endParaRPr lang="fr-FR" dirty="0" smtClean="0">
+              <a:sym typeface="Wingdings" panose="05000000000000000000" pitchFamily="2" charset="2"/>
+            </a:endParaRPr>
+          </a:p>
+          <a:p>
+            <a:pPr lvl="1"/>
+            <a:endParaRPr lang="fr-FR" dirty="0" smtClean="0">
+              <a:sym typeface="Wingdings" panose="05000000000000000000" pitchFamily="2" charset="2"/>
+            </a:endParaRPr>
+          </a:p>
+          <a:p>
+            <a:pPr lvl="1"/>
             <a:endParaRPr lang="fr-FR" dirty="0"/>
           </a:p>
           <a:p>
@@ -13370,10 +13650,584 @@
           </a:p>
         </p:txBody>
       </p:sp>
+      <p:pic>
+        <p:nvPicPr>
+          <p:cNvPr id="4" name="Image 3"/>
+          <p:cNvPicPr>
+            <a:picLocks noChangeAspect="1"/>
+          </p:cNvPicPr>
+          <p:nvPr/>
+        </p:nvPicPr>
+        <p:blipFill>
+          <a:blip r:embed="rId2">
+            <a:extLst>
+              <a:ext uri="{28A0092B-C50C-407E-A947-70E740481C1C}">
+                <a14:useLocalDpi xmlns:a14="http://schemas.microsoft.com/office/drawing/2010/main" val="0"/>
+              </a:ext>
+            </a:extLst>
+          </a:blip>
+          <a:stretch>
+            <a:fillRect/>
+          </a:stretch>
+        </p:blipFill>
+        <p:spPr>
+          <a:xfrm>
+            <a:off x="5897205" y="3909848"/>
+            <a:ext cx="338769" cy="338769"/>
+          </a:xfrm>
+          <a:prstGeom prst="rect">
+            <a:avLst/>
+          </a:prstGeom>
+        </p:spPr>
+      </p:pic>
+      <p:pic>
+        <p:nvPicPr>
+          <p:cNvPr id="6" name="Image 5"/>
+          <p:cNvPicPr>
+            <a:picLocks noChangeAspect="1"/>
+          </p:cNvPicPr>
+          <p:nvPr/>
+        </p:nvPicPr>
+        <p:blipFill>
+          <a:blip r:embed="rId2">
+            <a:extLst>
+              <a:ext uri="{28A0092B-C50C-407E-A947-70E740481C1C}">
+                <a14:useLocalDpi xmlns:a14="http://schemas.microsoft.com/office/drawing/2010/main" val="0"/>
+              </a:ext>
+            </a:extLst>
+          </a:blip>
+          <a:stretch>
+            <a:fillRect/>
+          </a:stretch>
+        </p:blipFill>
+        <p:spPr>
+          <a:xfrm>
+            <a:off x="6066589" y="3438101"/>
+            <a:ext cx="338769" cy="338769"/>
+          </a:xfrm>
+          <a:prstGeom prst="rect">
+            <a:avLst/>
+          </a:prstGeom>
+        </p:spPr>
+      </p:pic>
+      <p:pic>
+        <p:nvPicPr>
+          <p:cNvPr id="7" name="Image 6"/>
+          <p:cNvPicPr>
+            <a:picLocks noChangeAspect="1"/>
+          </p:cNvPicPr>
+          <p:nvPr/>
+        </p:nvPicPr>
+        <p:blipFill>
+          <a:blip r:embed="rId3">
+            <a:extLst>
+              <a:ext uri="{28A0092B-C50C-407E-A947-70E740481C1C}">
+                <a14:useLocalDpi xmlns:a14="http://schemas.microsoft.com/office/drawing/2010/main" val="0"/>
+              </a:ext>
+            </a:extLst>
+          </a:blip>
+          <a:stretch>
+            <a:fillRect/>
+          </a:stretch>
+        </p:blipFill>
+        <p:spPr>
+          <a:xfrm>
+            <a:off x="4212412" y="2966915"/>
+            <a:ext cx="438414" cy="354019"/>
+          </a:xfrm>
+          <a:prstGeom prst="rect">
+            <a:avLst/>
+          </a:prstGeom>
+        </p:spPr>
+      </p:pic>
+      <p:pic>
+        <p:nvPicPr>
+          <p:cNvPr id="8" name="Image 7"/>
+          <p:cNvPicPr>
+            <a:picLocks noChangeAspect="1"/>
+          </p:cNvPicPr>
+          <p:nvPr/>
+        </p:nvPicPr>
+        <p:blipFill>
+          <a:blip r:embed="rId3">
+            <a:extLst>
+              <a:ext uri="{28A0092B-C50C-407E-A947-70E740481C1C}">
+                <a14:useLocalDpi xmlns:a14="http://schemas.microsoft.com/office/drawing/2010/main" val="0"/>
+              </a:ext>
+            </a:extLst>
+          </a:blip>
+          <a:stretch>
+            <a:fillRect/>
+          </a:stretch>
+        </p:blipFill>
+        <p:spPr>
+          <a:xfrm>
+            <a:off x="5458791" y="2581364"/>
+            <a:ext cx="438414" cy="354019"/>
+          </a:xfrm>
+          <a:prstGeom prst="rect">
+            <a:avLst/>
+          </a:prstGeom>
+        </p:spPr>
+      </p:pic>
+      <p:pic>
+        <p:nvPicPr>
+          <p:cNvPr id="9" name="Image 8"/>
+          <p:cNvPicPr>
+            <a:picLocks noChangeAspect="1"/>
+          </p:cNvPicPr>
+          <p:nvPr/>
+        </p:nvPicPr>
+        <p:blipFill>
+          <a:blip r:embed="rId3">
+            <a:extLst>
+              <a:ext uri="{28A0092B-C50C-407E-A947-70E740481C1C}">
+                <a14:useLocalDpi xmlns:a14="http://schemas.microsoft.com/office/drawing/2010/main" val="0"/>
+              </a:ext>
+            </a:extLst>
+          </a:blip>
+          <a:stretch>
+            <a:fillRect/>
+          </a:stretch>
+        </p:blipFill>
+        <p:spPr>
+          <a:xfrm>
+            <a:off x="3150868" y="2159875"/>
+            <a:ext cx="438414" cy="354019"/>
+          </a:xfrm>
+          <a:prstGeom prst="rect">
+            <a:avLst/>
+          </a:prstGeom>
+        </p:spPr>
+      </p:pic>
+      <p:pic>
+        <p:nvPicPr>
+          <p:cNvPr id="10" name="Image 9"/>
+          <p:cNvPicPr>
+            <a:picLocks noChangeAspect="1"/>
+          </p:cNvPicPr>
+          <p:nvPr/>
+        </p:nvPicPr>
+        <p:blipFill>
+          <a:blip r:embed="rId4">
+            <a:extLst>
+              <a:ext uri="{28A0092B-C50C-407E-A947-70E740481C1C}">
+                <a14:useLocalDpi xmlns:a14="http://schemas.microsoft.com/office/drawing/2010/main" val="0"/>
+              </a:ext>
+            </a:extLst>
+          </a:blip>
+          <a:stretch>
+            <a:fillRect/>
+          </a:stretch>
+        </p:blipFill>
+        <p:spPr>
+          <a:xfrm>
+            <a:off x="8625307" y="1200553"/>
+            <a:ext cx="1867161" cy="3886742"/>
+          </a:xfrm>
+          <a:prstGeom prst="rect">
+            <a:avLst/>
+          </a:prstGeom>
+          <a:ln>
+            <a:noFill/>
+          </a:ln>
+          <a:effectLst>
+            <a:outerShdw blurRad="292100" dist="139700" dir="2700000" algn="tl" rotWithShape="0">
+              <a:srgbClr val="333333">
+                <a:alpha val="65000"/>
+              </a:srgbClr>
+            </a:outerShdw>
+          </a:effectLst>
+        </p:spPr>
+      </p:pic>
+      <p:pic>
+        <p:nvPicPr>
+          <p:cNvPr id="12" name="Image 11"/>
+          <p:cNvPicPr>
+            <a:picLocks noChangeAspect="1"/>
+          </p:cNvPicPr>
+          <p:nvPr/>
+        </p:nvPicPr>
+        <p:blipFill>
+          <a:blip r:embed="rId5">
+            <a:extLst>
+              <a:ext uri="{28A0092B-C50C-407E-A947-70E740481C1C}">
+                <a14:useLocalDpi xmlns:a14="http://schemas.microsoft.com/office/drawing/2010/main" val="0"/>
+              </a:ext>
+            </a:extLst>
+          </a:blip>
+          <a:stretch>
+            <a:fillRect/>
+          </a:stretch>
+        </p:blipFill>
+        <p:spPr>
+          <a:xfrm>
+            <a:off x="2855907" y="4581036"/>
+            <a:ext cx="2071254" cy="2071254"/>
+          </a:xfrm>
+          <a:prstGeom prst="rect">
+            <a:avLst/>
+          </a:prstGeom>
+          <a:ln>
+            <a:noFill/>
+          </a:ln>
+          <a:effectLst>
+            <a:outerShdw blurRad="292100" dist="139700" dir="2700000" algn="tl" rotWithShape="0">
+              <a:srgbClr val="333333">
+                <a:alpha val="65000"/>
+              </a:srgbClr>
+            </a:outerShdw>
+          </a:effectLst>
+        </p:spPr>
+      </p:pic>
     </p:spTree>
     <p:extLst>
       <p:ext uri="{BB962C8B-B14F-4D97-AF65-F5344CB8AC3E}">
-        <p14:creationId xmlns:p14="http://schemas.microsoft.com/office/powerpoint/2010/main" val="1006993935"/>
+        <p14:creationId xmlns:p14="http://schemas.microsoft.com/office/powerpoint/2010/main" val="2073811053"/>
+      </p:ext>
+    </p:extLst>
+  </p:cSld>
+  <p:clrMapOvr>
+    <a:masterClrMapping/>
+  </p:clrMapOvr>
+  <p:timing>
+    <p:tnLst>
+      <p:par>
+        <p:cTn id="1" dur="indefinite" restart="never" nodeType="tmRoot"/>
+      </p:par>
+    </p:tnLst>
+  </p:timing>
+</p:sld>
+</file>
+
+<file path=ppt/slides/slide28.xml><?xml version="1.0" encoding="utf-8"?>
+<p:sld xmlns:a="http://schemas.openxmlformats.org/drawingml/2006/main" xmlns:r="http://schemas.openxmlformats.org/officeDocument/2006/relationships" xmlns:p="http://schemas.openxmlformats.org/presentationml/2006/main">
+  <p:cSld>
+    <p:spTree>
+      <p:nvGrpSpPr>
+        <p:cNvPr id="1" name=""/>
+        <p:cNvGrpSpPr/>
+        <p:nvPr/>
+      </p:nvGrpSpPr>
+      <p:grpSpPr>
+        <a:xfrm>
+          <a:off x="0" y="0"/>
+          <a:ext cx="0" cy="0"/>
+          <a:chOff x="0" y="0"/>
+          <a:chExt cx="0" cy="0"/>
+        </a:xfrm>
+      </p:grpSpPr>
+      <p:sp>
+        <p:nvSpPr>
+          <p:cNvPr id="2" name="Titre 1"/>
+          <p:cNvSpPr>
+            <a:spLocks noGrp="1"/>
+          </p:cNvSpPr>
+          <p:nvPr>
+            <p:ph type="title"/>
+          </p:nvPr>
+        </p:nvSpPr>
+        <p:spPr>
+          <a:xfrm>
+            <a:off x="1484310" y="312313"/>
+            <a:ext cx="10018713" cy="1327301"/>
+          </a:xfrm>
+        </p:spPr>
+        <p:txBody>
+          <a:bodyPr/>
+          <a:lstStyle/>
+          <a:p>
+            <a:pPr algn="l"/>
+            <a:r>
+              <a:rPr lang="fr-FR" dirty="0" smtClean="0"/>
+              <a:t>III. Implémentation</a:t>
+            </a:r>
+            <a:br>
+              <a:rPr lang="fr-FR" dirty="0" smtClean="0"/>
+            </a:br>
+            <a:endParaRPr lang="fr-FR" dirty="0"/>
+          </a:p>
+        </p:txBody>
+      </p:sp>
+      <p:sp>
+        <p:nvSpPr>
+          <p:cNvPr id="3" name="Espace réservé du contenu 2"/>
+          <p:cNvSpPr>
+            <a:spLocks noGrp="1"/>
+          </p:cNvSpPr>
+          <p:nvPr>
+            <p:ph idx="1"/>
+          </p:nvPr>
+        </p:nvSpPr>
+        <p:spPr>
+          <a:xfrm>
+            <a:off x="1484310" y="1639614"/>
+            <a:ext cx="10577061" cy="4592642"/>
+          </a:xfrm>
+        </p:spPr>
+        <p:txBody>
+          <a:bodyPr anchor="t">
+            <a:normAutofit/>
+          </a:bodyPr>
+          <a:lstStyle/>
+          <a:p>
+            <a:pPr marL="0" indent="0">
+              <a:buNone/>
+            </a:pPr>
+            <a:r>
+              <a:rPr lang="fr-FR" dirty="0" smtClean="0"/>
+              <a:t>Fonctionnalités implémentées : </a:t>
+            </a:r>
+          </a:p>
+          <a:p>
+            <a:r>
+              <a:rPr lang="fr-FR" dirty="0" smtClean="0"/>
+              <a:t>Algorithme de croissance par régions avec plusieurs germes</a:t>
+            </a:r>
+          </a:p>
+          <a:p>
+            <a:r>
+              <a:rPr lang="fr-FR" dirty="0" smtClean="0"/>
+              <a:t>Fusion de deux régions</a:t>
+            </a:r>
+          </a:p>
+          <a:p>
+            <a:r>
+              <a:rPr lang="fr-FR" dirty="0" smtClean="0"/>
+              <a:t>Ouverture / Fermeture morphologique après segmentation</a:t>
+            </a:r>
+          </a:p>
+          <a:p>
+            <a:pPr marL="0" indent="0">
+              <a:buNone/>
+            </a:pPr>
+            <a:endParaRPr lang="fr-FR" dirty="0" smtClean="0"/>
+          </a:p>
+          <a:p>
+            <a:pPr marL="0" indent="0">
+              <a:buNone/>
+            </a:pPr>
+            <a:endParaRPr lang="fr-FR" dirty="0" smtClean="0"/>
+          </a:p>
+          <a:p>
+            <a:pPr marL="514350" indent="-514350">
+              <a:buAutoNum type="romanUcPeriod"/>
+            </a:pPr>
+            <a:endParaRPr lang="fr-FR" dirty="0"/>
+          </a:p>
+        </p:txBody>
+      </p:sp>
+      <p:sp>
+        <p:nvSpPr>
+          <p:cNvPr id="5" name="Espace réservé du numéro de diapositive 4"/>
+          <p:cNvSpPr>
+            <a:spLocks noGrp="1"/>
+          </p:cNvSpPr>
+          <p:nvPr>
+            <p:ph type="sldNum" sz="quarter" idx="12"/>
+          </p:nvPr>
+        </p:nvSpPr>
+        <p:spPr/>
+        <p:txBody>
+          <a:bodyPr/>
+          <a:lstStyle/>
+          <a:p>
+            <a:fld id="{D57F1E4F-1CFF-5643-939E-217C01CDF565}" type="slidenum">
+              <a:rPr lang="en-US" smtClean="0"/>
+              <a:pPr/>
+              <a:t>28</a:t>
+            </a:fld>
+            <a:endParaRPr lang="en-US" dirty="0"/>
+          </a:p>
+        </p:txBody>
+      </p:sp>
+    </p:spTree>
+    <p:extLst>
+      <p:ext uri="{BB962C8B-B14F-4D97-AF65-F5344CB8AC3E}">
+        <p14:creationId xmlns:p14="http://schemas.microsoft.com/office/powerpoint/2010/main" val="1479471276"/>
+      </p:ext>
+    </p:extLst>
+  </p:cSld>
+  <p:clrMapOvr>
+    <a:masterClrMapping/>
+  </p:clrMapOvr>
+  <p:timing>
+    <p:tnLst>
+      <p:par>
+        <p:cTn id="1" dur="indefinite" restart="never" nodeType="tmRoot"/>
+      </p:par>
+    </p:tnLst>
+  </p:timing>
+</p:sld>
+</file>
+
+<file path=ppt/slides/slide29.xml><?xml version="1.0" encoding="utf-8"?>
+<p:sld xmlns:a="http://schemas.openxmlformats.org/drawingml/2006/main" xmlns:r="http://schemas.openxmlformats.org/officeDocument/2006/relationships" xmlns:p="http://schemas.openxmlformats.org/presentationml/2006/main">
+  <p:cSld>
+    <p:spTree>
+      <p:nvGrpSpPr>
+        <p:cNvPr id="1" name=""/>
+        <p:cNvGrpSpPr/>
+        <p:nvPr/>
+      </p:nvGrpSpPr>
+      <p:grpSpPr>
+        <a:xfrm>
+          <a:off x="0" y="0"/>
+          <a:ext cx="0" cy="0"/>
+          <a:chOff x="0" y="0"/>
+          <a:chExt cx="0" cy="0"/>
+        </a:xfrm>
+      </p:grpSpPr>
+      <p:sp>
+        <p:nvSpPr>
+          <p:cNvPr id="2" name="Titre 1"/>
+          <p:cNvSpPr>
+            <a:spLocks noGrp="1"/>
+          </p:cNvSpPr>
+          <p:nvPr>
+            <p:ph type="title"/>
+          </p:nvPr>
+        </p:nvSpPr>
+        <p:spPr>
+          <a:xfrm>
+            <a:off x="1484310" y="312313"/>
+            <a:ext cx="10018713" cy="1327301"/>
+          </a:xfrm>
+        </p:spPr>
+        <p:txBody>
+          <a:bodyPr/>
+          <a:lstStyle/>
+          <a:p>
+            <a:pPr algn="l"/>
+            <a:r>
+              <a:rPr lang="fr-FR" dirty="0" smtClean="0"/>
+              <a:t>III. Implémentation</a:t>
+            </a:r>
+            <a:br>
+              <a:rPr lang="fr-FR" dirty="0" smtClean="0"/>
+            </a:br>
+            <a:endParaRPr lang="fr-FR" dirty="0"/>
+          </a:p>
+        </p:txBody>
+      </p:sp>
+      <p:sp>
+        <p:nvSpPr>
+          <p:cNvPr id="3" name="Espace réservé du contenu 2"/>
+          <p:cNvSpPr>
+            <a:spLocks noGrp="1"/>
+          </p:cNvSpPr>
+          <p:nvPr>
+            <p:ph idx="1"/>
+          </p:nvPr>
+        </p:nvSpPr>
+        <p:spPr>
+          <a:xfrm>
+            <a:off x="1484310" y="1639614"/>
+            <a:ext cx="10577061" cy="4592642"/>
+          </a:xfrm>
+        </p:spPr>
+        <p:txBody>
+          <a:bodyPr anchor="t">
+            <a:normAutofit/>
+          </a:bodyPr>
+          <a:lstStyle/>
+          <a:p>
+            <a:pPr marL="0" indent="0">
+              <a:buNone/>
+            </a:pPr>
+            <a:r>
+              <a:rPr lang="fr-FR" dirty="0" smtClean="0"/>
+              <a:t>Modélisation : Diagramme UML</a:t>
+            </a:r>
+          </a:p>
+          <a:p>
+            <a:pPr marL="0" indent="0">
+              <a:buNone/>
+            </a:pPr>
+            <a:endParaRPr lang="fr-FR" dirty="0" smtClean="0"/>
+          </a:p>
+          <a:p>
+            <a:pPr marL="0" indent="0">
+              <a:buNone/>
+            </a:pPr>
+            <a:endParaRPr lang="fr-FR" dirty="0" smtClean="0"/>
+          </a:p>
+          <a:p>
+            <a:pPr marL="514350" indent="-514350">
+              <a:buAutoNum type="romanUcPeriod"/>
+            </a:pPr>
+            <a:endParaRPr lang="fr-FR" dirty="0"/>
+          </a:p>
+        </p:txBody>
+      </p:sp>
+      <p:sp>
+        <p:nvSpPr>
+          <p:cNvPr id="5" name="Espace réservé du numéro de diapositive 4"/>
+          <p:cNvSpPr>
+            <a:spLocks noGrp="1"/>
+          </p:cNvSpPr>
+          <p:nvPr>
+            <p:ph type="sldNum" sz="quarter" idx="12"/>
+          </p:nvPr>
+        </p:nvSpPr>
+        <p:spPr/>
+        <p:txBody>
+          <a:bodyPr/>
+          <a:lstStyle/>
+          <a:p>
+            <a:fld id="{D57F1E4F-1CFF-5643-939E-217C01CDF565}" type="slidenum">
+              <a:rPr lang="en-US" smtClean="0"/>
+              <a:pPr/>
+              <a:t>29</a:t>
+            </a:fld>
+            <a:endParaRPr lang="en-US" dirty="0"/>
+          </a:p>
+        </p:txBody>
+      </p:sp>
+      <p:pic>
+        <p:nvPicPr>
+          <p:cNvPr id="6" name="Image 5"/>
+          <p:cNvPicPr>
+            <a:picLocks noChangeAspect="1"/>
+          </p:cNvPicPr>
+          <p:nvPr/>
+        </p:nvPicPr>
+        <p:blipFill>
+          <a:blip r:embed="rId2">
+            <a:extLst>
+              <a:ext uri="{28A0092B-C50C-407E-A947-70E740481C1C}">
+                <a14:useLocalDpi xmlns:a14="http://schemas.microsoft.com/office/drawing/2010/main" val="0"/>
+              </a:ext>
+            </a:extLst>
+          </a:blip>
+          <a:stretch>
+            <a:fillRect/>
+          </a:stretch>
+        </p:blipFill>
+        <p:spPr>
+          <a:xfrm>
+            <a:off x="6092363" y="0"/>
+            <a:ext cx="3223439" cy="6858000"/>
+          </a:xfrm>
+          <a:prstGeom prst="rect">
+            <a:avLst/>
+          </a:prstGeom>
+          <a:ln>
+            <a:noFill/>
+          </a:ln>
+          <a:effectLst>
+            <a:outerShdw blurRad="292100" dist="139700" dir="2700000" algn="tl" rotWithShape="0">
+              <a:srgbClr val="333333">
+                <a:alpha val="65000"/>
+              </a:srgbClr>
+            </a:outerShdw>
+          </a:effectLst>
+        </p:spPr>
+      </p:pic>
+    </p:spTree>
+    <p:extLst>
+      <p:ext uri="{BB962C8B-B14F-4D97-AF65-F5344CB8AC3E}">
+        <p14:creationId xmlns:p14="http://schemas.microsoft.com/office/powerpoint/2010/main" val="4282021723"/>
       </p:ext>
     </p:extLst>
   </p:cSld>
@@ -13595,6 +14449,2187 @@
     <p:extLst>
       <p:ext uri="{BB962C8B-B14F-4D97-AF65-F5344CB8AC3E}">
         <p14:creationId xmlns:p14="http://schemas.microsoft.com/office/powerpoint/2010/main" val="2650845090"/>
+      </p:ext>
+    </p:extLst>
+  </p:cSld>
+  <p:clrMapOvr>
+    <a:masterClrMapping/>
+  </p:clrMapOvr>
+  <p:timing>
+    <p:tnLst>
+      <p:par>
+        <p:cTn id="1" dur="indefinite" restart="never" nodeType="tmRoot"/>
+      </p:par>
+    </p:tnLst>
+  </p:timing>
+</p:sld>
+</file>
+
+<file path=ppt/slides/slide30.xml><?xml version="1.0" encoding="utf-8"?>
+<p:sld xmlns:a="http://schemas.openxmlformats.org/drawingml/2006/main" xmlns:r="http://schemas.openxmlformats.org/officeDocument/2006/relationships" xmlns:p="http://schemas.openxmlformats.org/presentationml/2006/main">
+  <p:cSld>
+    <p:spTree>
+      <p:nvGrpSpPr>
+        <p:cNvPr id="1" name=""/>
+        <p:cNvGrpSpPr/>
+        <p:nvPr/>
+      </p:nvGrpSpPr>
+      <p:grpSpPr>
+        <a:xfrm>
+          <a:off x="0" y="0"/>
+          <a:ext cx="0" cy="0"/>
+          <a:chOff x="0" y="0"/>
+          <a:chExt cx="0" cy="0"/>
+        </a:xfrm>
+      </p:grpSpPr>
+      <p:sp>
+        <p:nvSpPr>
+          <p:cNvPr id="2" name="Titre 1"/>
+          <p:cNvSpPr>
+            <a:spLocks noGrp="1"/>
+          </p:cNvSpPr>
+          <p:nvPr>
+            <p:ph type="title"/>
+          </p:nvPr>
+        </p:nvSpPr>
+        <p:spPr>
+          <a:xfrm>
+            <a:off x="1484310" y="312313"/>
+            <a:ext cx="10018713" cy="1327301"/>
+          </a:xfrm>
+        </p:spPr>
+        <p:txBody>
+          <a:bodyPr/>
+          <a:lstStyle/>
+          <a:p>
+            <a:pPr algn="l"/>
+            <a:r>
+              <a:rPr lang="fr-FR" dirty="0" smtClean="0"/>
+              <a:t>III. Implémentation</a:t>
+            </a:r>
+            <a:br>
+              <a:rPr lang="fr-FR" dirty="0" smtClean="0"/>
+            </a:br>
+            <a:endParaRPr lang="fr-FR" dirty="0"/>
+          </a:p>
+        </p:txBody>
+      </p:sp>
+      <p:sp>
+        <p:nvSpPr>
+          <p:cNvPr id="3" name="Espace réservé du contenu 2"/>
+          <p:cNvSpPr>
+            <a:spLocks noGrp="1"/>
+          </p:cNvSpPr>
+          <p:nvPr>
+            <p:ph idx="1"/>
+          </p:nvPr>
+        </p:nvSpPr>
+        <p:spPr>
+          <a:xfrm>
+            <a:off x="1484310" y="993228"/>
+            <a:ext cx="10577061" cy="5239028"/>
+          </a:xfrm>
+        </p:spPr>
+        <p:txBody>
+          <a:bodyPr anchor="t">
+            <a:normAutofit/>
+          </a:bodyPr>
+          <a:lstStyle/>
+          <a:p>
+            <a:pPr marL="0" indent="0">
+              <a:buNone/>
+            </a:pPr>
+            <a:r>
+              <a:rPr lang="fr-FR" dirty="0" smtClean="0"/>
+              <a:t>Résultats d’exécution : (image de base, puis segmentée, puis avec fermeture)</a:t>
+            </a:r>
+          </a:p>
+          <a:p>
+            <a:pPr marL="0" indent="0">
+              <a:buNone/>
+            </a:pPr>
+            <a:endParaRPr lang="fr-FR" dirty="0" smtClean="0"/>
+          </a:p>
+          <a:p>
+            <a:pPr marL="0" indent="0">
+              <a:buNone/>
+            </a:pPr>
+            <a:endParaRPr lang="fr-FR" dirty="0" smtClean="0"/>
+          </a:p>
+          <a:p>
+            <a:pPr marL="514350" indent="-514350">
+              <a:buAutoNum type="romanUcPeriod"/>
+            </a:pPr>
+            <a:endParaRPr lang="fr-FR" dirty="0"/>
+          </a:p>
+        </p:txBody>
+      </p:sp>
+      <p:sp>
+        <p:nvSpPr>
+          <p:cNvPr id="5" name="Espace réservé du numéro de diapositive 4"/>
+          <p:cNvSpPr>
+            <a:spLocks noGrp="1"/>
+          </p:cNvSpPr>
+          <p:nvPr>
+            <p:ph type="sldNum" sz="quarter" idx="12"/>
+          </p:nvPr>
+        </p:nvSpPr>
+        <p:spPr/>
+        <p:txBody>
+          <a:bodyPr/>
+          <a:lstStyle/>
+          <a:p>
+            <a:fld id="{D57F1E4F-1CFF-5643-939E-217C01CDF565}" type="slidenum">
+              <a:rPr lang="en-US" smtClean="0"/>
+              <a:pPr/>
+              <a:t>30</a:t>
+            </a:fld>
+            <a:endParaRPr lang="en-US" dirty="0"/>
+          </a:p>
+        </p:txBody>
+      </p:sp>
+      <p:pic>
+        <p:nvPicPr>
+          <p:cNvPr id="8" name="Image 7"/>
+          <p:cNvPicPr>
+            <a:picLocks noChangeAspect="1"/>
+          </p:cNvPicPr>
+          <p:nvPr/>
+        </p:nvPicPr>
+        <p:blipFill>
+          <a:blip r:embed="rId2">
+            <a:extLst>
+              <a:ext uri="{28A0092B-C50C-407E-A947-70E740481C1C}">
+                <a14:useLocalDpi xmlns:a14="http://schemas.microsoft.com/office/drawing/2010/main" val="0"/>
+              </a:ext>
+            </a:extLst>
+          </a:blip>
+          <a:stretch>
+            <a:fillRect/>
+          </a:stretch>
+        </p:blipFill>
+        <p:spPr>
+          <a:xfrm>
+            <a:off x="221468" y="1639614"/>
+            <a:ext cx="11839903" cy="4287834"/>
+          </a:xfrm>
+          <a:prstGeom prst="rect">
+            <a:avLst/>
+          </a:prstGeom>
+          <a:ln>
+            <a:noFill/>
+          </a:ln>
+          <a:effectLst>
+            <a:outerShdw blurRad="292100" dist="139700" dir="2700000" algn="tl" rotWithShape="0">
+              <a:srgbClr val="333333">
+                <a:alpha val="65000"/>
+              </a:srgbClr>
+            </a:outerShdw>
+          </a:effectLst>
+        </p:spPr>
+      </p:pic>
+      <p:sp>
+        <p:nvSpPr>
+          <p:cNvPr id="9" name="ZoneTexte 8"/>
+          <p:cNvSpPr txBox="1"/>
+          <p:nvPr/>
+        </p:nvSpPr>
+        <p:spPr>
+          <a:xfrm>
+            <a:off x="2538247" y="6389168"/>
+            <a:ext cx="9285890" cy="369332"/>
+          </a:xfrm>
+          <a:prstGeom prst="rect">
+            <a:avLst/>
+          </a:prstGeom>
+          <a:noFill/>
+        </p:spPr>
+        <p:txBody>
+          <a:bodyPr wrap="square" rtlCol="0">
+            <a:spAutoFit/>
+          </a:bodyPr>
+          <a:lstStyle/>
+          <a:p>
+            <a:r>
+              <a:rPr lang="fr-FR" dirty="0" smtClean="0"/>
+              <a:t>Les germes sont positionnés « à la main » pour les tests, de manière à obtenir de bons résultats</a:t>
+            </a:r>
+            <a:endParaRPr lang="fr-FR" dirty="0"/>
+          </a:p>
+        </p:txBody>
+      </p:sp>
+      <p:sp>
+        <p:nvSpPr>
+          <p:cNvPr id="10" name="ZoneTexte 9"/>
+          <p:cNvSpPr txBox="1"/>
+          <p:nvPr/>
+        </p:nvSpPr>
+        <p:spPr>
+          <a:xfrm>
+            <a:off x="4501055" y="5895186"/>
+            <a:ext cx="5360275" cy="369332"/>
+          </a:xfrm>
+          <a:prstGeom prst="rect">
+            <a:avLst/>
+          </a:prstGeom>
+          <a:noFill/>
+        </p:spPr>
+        <p:txBody>
+          <a:bodyPr wrap="square" rtlCol="0">
+            <a:spAutoFit/>
+          </a:bodyPr>
+          <a:lstStyle/>
+          <a:p>
+            <a:r>
+              <a:rPr lang="fr-FR" dirty="0" smtClean="0"/>
+              <a:t>Seuil global : 30   Seuil local : 15</a:t>
+            </a:r>
+            <a:endParaRPr lang="fr-FR" dirty="0"/>
+          </a:p>
+        </p:txBody>
+      </p:sp>
+    </p:spTree>
+    <p:extLst>
+      <p:ext uri="{BB962C8B-B14F-4D97-AF65-F5344CB8AC3E}">
+        <p14:creationId xmlns:p14="http://schemas.microsoft.com/office/powerpoint/2010/main" val="1329431445"/>
+      </p:ext>
+    </p:extLst>
+  </p:cSld>
+  <p:clrMapOvr>
+    <a:masterClrMapping/>
+  </p:clrMapOvr>
+  <p:timing>
+    <p:tnLst>
+      <p:par>
+        <p:cTn id="1" dur="indefinite" restart="never" nodeType="tmRoot"/>
+      </p:par>
+    </p:tnLst>
+  </p:timing>
+</p:sld>
+</file>
+
+<file path=ppt/slides/slide31.xml><?xml version="1.0" encoding="utf-8"?>
+<p:sld xmlns:a="http://schemas.openxmlformats.org/drawingml/2006/main" xmlns:r="http://schemas.openxmlformats.org/officeDocument/2006/relationships" xmlns:p="http://schemas.openxmlformats.org/presentationml/2006/main">
+  <p:cSld>
+    <p:spTree>
+      <p:nvGrpSpPr>
+        <p:cNvPr id="1" name=""/>
+        <p:cNvGrpSpPr/>
+        <p:nvPr/>
+      </p:nvGrpSpPr>
+      <p:grpSpPr>
+        <a:xfrm>
+          <a:off x="0" y="0"/>
+          <a:ext cx="0" cy="0"/>
+          <a:chOff x="0" y="0"/>
+          <a:chExt cx="0" cy="0"/>
+        </a:xfrm>
+      </p:grpSpPr>
+      <p:sp>
+        <p:nvSpPr>
+          <p:cNvPr id="2" name="Titre 1"/>
+          <p:cNvSpPr>
+            <a:spLocks noGrp="1"/>
+          </p:cNvSpPr>
+          <p:nvPr>
+            <p:ph type="title"/>
+          </p:nvPr>
+        </p:nvSpPr>
+        <p:spPr>
+          <a:xfrm>
+            <a:off x="1484310" y="312313"/>
+            <a:ext cx="10018713" cy="1327301"/>
+          </a:xfrm>
+        </p:spPr>
+        <p:txBody>
+          <a:bodyPr/>
+          <a:lstStyle/>
+          <a:p>
+            <a:pPr algn="l"/>
+            <a:r>
+              <a:rPr lang="fr-FR" dirty="0" smtClean="0"/>
+              <a:t>III. Implémentation</a:t>
+            </a:r>
+            <a:br>
+              <a:rPr lang="fr-FR" dirty="0" smtClean="0"/>
+            </a:br>
+            <a:endParaRPr lang="fr-FR" dirty="0"/>
+          </a:p>
+        </p:txBody>
+      </p:sp>
+      <p:sp>
+        <p:nvSpPr>
+          <p:cNvPr id="3" name="Espace réservé du contenu 2"/>
+          <p:cNvSpPr>
+            <a:spLocks noGrp="1"/>
+          </p:cNvSpPr>
+          <p:nvPr>
+            <p:ph idx="1"/>
+          </p:nvPr>
+        </p:nvSpPr>
+        <p:spPr>
+          <a:xfrm>
+            <a:off x="1484310" y="993228"/>
+            <a:ext cx="10577061" cy="5239028"/>
+          </a:xfrm>
+        </p:spPr>
+        <p:txBody>
+          <a:bodyPr anchor="t">
+            <a:normAutofit/>
+          </a:bodyPr>
+          <a:lstStyle/>
+          <a:p>
+            <a:pPr marL="0" indent="0">
+              <a:buNone/>
+            </a:pPr>
+            <a:r>
+              <a:rPr lang="fr-FR" dirty="0" smtClean="0"/>
+              <a:t>Résultats d’exécution : méthode </a:t>
+            </a:r>
+            <a:r>
+              <a:rPr lang="fr-FR" dirty="0" err="1" smtClean="0"/>
+              <a:t>toString</a:t>
+            </a:r>
+            <a:r>
+              <a:rPr lang="fr-FR" dirty="0" smtClean="0"/>
+              <a:t>() de la base de cas associée</a:t>
+            </a:r>
+          </a:p>
+          <a:p>
+            <a:pPr marL="0" indent="0">
+              <a:buNone/>
+            </a:pPr>
+            <a:endParaRPr lang="fr-FR" dirty="0" smtClean="0"/>
+          </a:p>
+          <a:p>
+            <a:pPr marL="0" indent="0">
+              <a:buNone/>
+            </a:pPr>
+            <a:endParaRPr lang="fr-FR" dirty="0" smtClean="0"/>
+          </a:p>
+          <a:p>
+            <a:pPr marL="514350" indent="-514350">
+              <a:buAutoNum type="romanUcPeriod"/>
+            </a:pPr>
+            <a:endParaRPr lang="fr-FR" dirty="0"/>
+          </a:p>
+        </p:txBody>
+      </p:sp>
+      <p:sp>
+        <p:nvSpPr>
+          <p:cNvPr id="5" name="Espace réservé du numéro de diapositive 4"/>
+          <p:cNvSpPr>
+            <a:spLocks noGrp="1"/>
+          </p:cNvSpPr>
+          <p:nvPr>
+            <p:ph type="sldNum" sz="quarter" idx="12"/>
+          </p:nvPr>
+        </p:nvSpPr>
+        <p:spPr/>
+        <p:txBody>
+          <a:bodyPr/>
+          <a:lstStyle/>
+          <a:p>
+            <a:fld id="{D57F1E4F-1CFF-5643-939E-217C01CDF565}" type="slidenum">
+              <a:rPr lang="en-US" smtClean="0"/>
+              <a:pPr/>
+              <a:t>31</a:t>
+            </a:fld>
+            <a:endParaRPr lang="en-US" dirty="0"/>
+          </a:p>
+        </p:txBody>
+      </p:sp>
+      <p:pic>
+        <p:nvPicPr>
+          <p:cNvPr id="4" name="Image 3"/>
+          <p:cNvPicPr>
+            <a:picLocks noChangeAspect="1"/>
+          </p:cNvPicPr>
+          <p:nvPr/>
+        </p:nvPicPr>
+        <p:blipFill>
+          <a:blip r:embed="rId2">
+            <a:extLst>
+              <a:ext uri="{28A0092B-C50C-407E-A947-70E740481C1C}">
+                <a14:useLocalDpi xmlns:a14="http://schemas.microsoft.com/office/drawing/2010/main" val="0"/>
+              </a:ext>
+            </a:extLst>
+          </a:blip>
+          <a:stretch>
+            <a:fillRect/>
+          </a:stretch>
+        </p:blipFill>
+        <p:spPr>
+          <a:xfrm>
+            <a:off x="2177866" y="1464972"/>
+            <a:ext cx="8631600" cy="4941927"/>
+          </a:xfrm>
+          <a:prstGeom prst="rect">
+            <a:avLst/>
+          </a:prstGeom>
+          <a:ln>
+            <a:noFill/>
+          </a:ln>
+          <a:effectLst>
+            <a:outerShdw blurRad="292100" dist="139700" dir="2700000" algn="tl" rotWithShape="0">
+              <a:srgbClr val="333333">
+                <a:alpha val="65000"/>
+              </a:srgbClr>
+            </a:outerShdw>
+          </a:effectLst>
+        </p:spPr>
+      </p:pic>
+    </p:spTree>
+    <p:extLst>
+      <p:ext uri="{BB962C8B-B14F-4D97-AF65-F5344CB8AC3E}">
+        <p14:creationId xmlns:p14="http://schemas.microsoft.com/office/powerpoint/2010/main" val="3000142931"/>
+      </p:ext>
+    </p:extLst>
+  </p:cSld>
+  <p:clrMapOvr>
+    <a:masterClrMapping/>
+  </p:clrMapOvr>
+  <p:timing>
+    <p:tnLst>
+      <p:par>
+        <p:cTn id="1" dur="indefinite" restart="never" nodeType="tmRoot"/>
+      </p:par>
+    </p:tnLst>
+  </p:timing>
+</p:sld>
+</file>
+
+<file path=ppt/slides/slide32.xml><?xml version="1.0" encoding="utf-8"?>
+<p:sld xmlns:a="http://schemas.openxmlformats.org/drawingml/2006/main" xmlns:r="http://schemas.openxmlformats.org/officeDocument/2006/relationships" xmlns:p="http://schemas.openxmlformats.org/presentationml/2006/main">
+  <p:cSld>
+    <p:spTree>
+      <p:nvGrpSpPr>
+        <p:cNvPr id="1" name=""/>
+        <p:cNvGrpSpPr/>
+        <p:nvPr/>
+      </p:nvGrpSpPr>
+      <p:grpSpPr>
+        <a:xfrm>
+          <a:off x="0" y="0"/>
+          <a:ext cx="0" cy="0"/>
+          <a:chOff x="0" y="0"/>
+          <a:chExt cx="0" cy="0"/>
+        </a:xfrm>
+      </p:grpSpPr>
+      <p:sp>
+        <p:nvSpPr>
+          <p:cNvPr id="2" name="Titre 1"/>
+          <p:cNvSpPr>
+            <a:spLocks noGrp="1"/>
+          </p:cNvSpPr>
+          <p:nvPr>
+            <p:ph type="title"/>
+          </p:nvPr>
+        </p:nvSpPr>
+        <p:spPr>
+          <a:xfrm>
+            <a:off x="1484310" y="312313"/>
+            <a:ext cx="10018713" cy="1327301"/>
+          </a:xfrm>
+        </p:spPr>
+        <p:txBody>
+          <a:bodyPr/>
+          <a:lstStyle/>
+          <a:p>
+            <a:pPr algn="l"/>
+            <a:r>
+              <a:rPr lang="fr-FR" dirty="0" smtClean="0"/>
+              <a:t>III. Implémentation</a:t>
+            </a:r>
+            <a:br>
+              <a:rPr lang="fr-FR" dirty="0" smtClean="0"/>
+            </a:br>
+            <a:endParaRPr lang="fr-FR" dirty="0"/>
+          </a:p>
+        </p:txBody>
+      </p:sp>
+      <p:sp>
+        <p:nvSpPr>
+          <p:cNvPr id="3" name="Espace réservé du contenu 2"/>
+          <p:cNvSpPr>
+            <a:spLocks noGrp="1"/>
+          </p:cNvSpPr>
+          <p:nvPr>
+            <p:ph idx="1"/>
+          </p:nvPr>
+        </p:nvSpPr>
+        <p:spPr>
+          <a:xfrm>
+            <a:off x="1484310" y="993228"/>
+            <a:ext cx="10577061" cy="5239028"/>
+          </a:xfrm>
+        </p:spPr>
+        <p:txBody>
+          <a:bodyPr anchor="t">
+            <a:normAutofit/>
+          </a:bodyPr>
+          <a:lstStyle/>
+          <a:p>
+            <a:pPr marL="0" indent="0">
+              <a:buNone/>
+            </a:pPr>
+            <a:r>
+              <a:rPr lang="fr-FR" dirty="0" smtClean="0"/>
+              <a:t>Résultats d’exécution : Segmentation d’une tumeur (sans puis avec fermeture)</a:t>
+            </a:r>
+          </a:p>
+          <a:p>
+            <a:pPr marL="0" indent="0">
+              <a:buNone/>
+            </a:pPr>
+            <a:endParaRPr lang="fr-FR" dirty="0" smtClean="0"/>
+          </a:p>
+          <a:p>
+            <a:pPr marL="0" indent="0">
+              <a:buNone/>
+            </a:pPr>
+            <a:endParaRPr lang="fr-FR" dirty="0" smtClean="0"/>
+          </a:p>
+          <a:p>
+            <a:pPr marL="514350" indent="-514350">
+              <a:buAutoNum type="romanUcPeriod"/>
+            </a:pPr>
+            <a:endParaRPr lang="fr-FR" dirty="0"/>
+          </a:p>
+        </p:txBody>
+      </p:sp>
+      <p:sp>
+        <p:nvSpPr>
+          <p:cNvPr id="5" name="Espace réservé du numéro de diapositive 4"/>
+          <p:cNvSpPr>
+            <a:spLocks noGrp="1"/>
+          </p:cNvSpPr>
+          <p:nvPr>
+            <p:ph type="sldNum" sz="quarter" idx="12"/>
+          </p:nvPr>
+        </p:nvSpPr>
+        <p:spPr/>
+        <p:txBody>
+          <a:bodyPr/>
+          <a:lstStyle/>
+          <a:p>
+            <a:fld id="{D57F1E4F-1CFF-5643-939E-217C01CDF565}" type="slidenum">
+              <a:rPr lang="en-US" smtClean="0"/>
+              <a:pPr/>
+              <a:t>32</a:t>
+            </a:fld>
+            <a:endParaRPr lang="en-US" dirty="0"/>
+          </a:p>
+        </p:txBody>
+      </p:sp>
+      <p:pic>
+        <p:nvPicPr>
+          <p:cNvPr id="6" name="Image 5"/>
+          <p:cNvPicPr>
+            <a:picLocks noChangeAspect="1"/>
+          </p:cNvPicPr>
+          <p:nvPr/>
+        </p:nvPicPr>
+        <p:blipFill>
+          <a:blip r:embed="rId3">
+            <a:extLst>
+              <a:ext uri="{28A0092B-C50C-407E-A947-70E740481C1C}">
+                <a14:useLocalDpi xmlns:a14="http://schemas.microsoft.com/office/drawing/2010/main" val="0"/>
+              </a:ext>
+            </a:extLst>
+          </a:blip>
+          <a:stretch>
+            <a:fillRect/>
+          </a:stretch>
+        </p:blipFill>
+        <p:spPr>
+          <a:xfrm>
+            <a:off x="252249" y="1951023"/>
+            <a:ext cx="11682248" cy="3090819"/>
+          </a:xfrm>
+          <a:prstGeom prst="rect">
+            <a:avLst/>
+          </a:prstGeom>
+          <a:ln>
+            <a:noFill/>
+          </a:ln>
+          <a:effectLst>
+            <a:outerShdw blurRad="292100" dist="139700" dir="2700000" algn="tl" rotWithShape="0">
+              <a:srgbClr val="333333">
+                <a:alpha val="65000"/>
+              </a:srgbClr>
+            </a:outerShdw>
+          </a:effectLst>
+        </p:spPr>
+      </p:pic>
+      <p:sp>
+        <p:nvSpPr>
+          <p:cNvPr id="7" name="ZoneTexte 6"/>
+          <p:cNvSpPr txBox="1"/>
+          <p:nvPr/>
+        </p:nvSpPr>
+        <p:spPr>
+          <a:xfrm>
+            <a:off x="4508938" y="5168585"/>
+            <a:ext cx="5360275" cy="369332"/>
+          </a:xfrm>
+          <a:prstGeom prst="rect">
+            <a:avLst/>
+          </a:prstGeom>
+          <a:noFill/>
+        </p:spPr>
+        <p:txBody>
+          <a:bodyPr wrap="square" rtlCol="0">
+            <a:spAutoFit/>
+          </a:bodyPr>
+          <a:lstStyle/>
+          <a:p>
+            <a:r>
+              <a:rPr lang="fr-FR" dirty="0" smtClean="0"/>
+              <a:t>Seuil global : 30   Seuil local : 15</a:t>
+            </a:r>
+            <a:endParaRPr lang="fr-FR" dirty="0"/>
+          </a:p>
+        </p:txBody>
+      </p:sp>
+    </p:spTree>
+    <p:extLst>
+      <p:ext uri="{BB962C8B-B14F-4D97-AF65-F5344CB8AC3E}">
+        <p14:creationId xmlns:p14="http://schemas.microsoft.com/office/powerpoint/2010/main" val="51449911"/>
+      </p:ext>
+    </p:extLst>
+  </p:cSld>
+  <p:clrMapOvr>
+    <a:masterClrMapping/>
+  </p:clrMapOvr>
+  <p:timing>
+    <p:tnLst>
+      <p:par>
+        <p:cTn id="1" dur="indefinite" restart="never" nodeType="tmRoot"/>
+      </p:par>
+    </p:tnLst>
+  </p:timing>
+</p:sld>
+</file>
+
+<file path=ppt/slides/slide33.xml><?xml version="1.0" encoding="utf-8"?>
+<p:sld xmlns:a="http://schemas.openxmlformats.org/drawingml/2006/main" xmlns:r="http://schemas.openxmlformats.org/officeDocument/2006/relationships" xmlns:p="http://schemas.openxmlformats.org/presentationml/2006/main">
+  <p:cSld>
+    <p:spTree>
+      <p:nvGrpSpPr>
+        <p:cNvPr id="1" name=""/>
+        <p:cNvGrpSpPr/>
+        <p:nvPr/>
+      </p:nvGrpSpPr>
+      <p:grpSpPr>
+        <a:xfrm>
+          <a:off x="0" y="0"/>
+          <a:ext cx="0" cy="0"/>
+          <a:chOff x="0" y="0"/>
+          <a:chExt cx="0" cy="0"/>
+        </a:xfrm>
+      </p:grpSpPr>
+      <p:sp>
+        <p:nvSpPr>
+          <p:cNvPr id="2" name="Titre 1"/>
+          <p:cNvSpPr>
+            <a:spLocks noGrp="1"/>
+          </p:cNvSpPr>
+          <p:nvPr>
+            <p:ph type="title"/>
+          </p:nvPr>
+        </p:nvSpPr>
+        <p:spPr>
+          <a:xfrm>
+            <a:off x="1484310" y="312313"/>
+            <a:ext cx="10018713" cy="1327301"/>
+          </a:xfrm>
+        </p:spPr>
+        <p:txBody>
+          <a:bodyPr/>
+          <a:lstStyle/>
+          <a:p>
+            <a:pPr algn="l"/>
+            <a:r>
+              <a:rPr lang="fr-FR" dirty="0" smtClean="0"/>
+              <a:t>III. Implémentation</a:t>
+            </a:r>
+            <a:br>
+              <a:rPr lang="fr-FR" dirty="0" smtClean="0"/>
+            </a:br>
+            <a:endParaRPr lang="fr-FR" dirty="0"/>
+          </a:p>
+        </p:txBody>
+      </p:sp>
+      <p:sp>
+        <p:nvSpPr>
+          <p:cNvPr id="3" name="Espace réservé du contenu 2"/>
+          <p:cNvSpPr>
+            <a:spLocks noGrp="1"/>
+          </p:cNvSpPr>
+          <p:nvPr>
+            <p:ph idx="1"/>
+          </p:nvPr>
+        </p:nvSpPr>
+        <p:spPr>
+          <a:xfrm>
+            <a:off x="1484310" y="993228"/>
+            <a:ext cx="10577061" cy="5239028"/>
+          </a:xfrm>
+        </p:spPr>
+        <p:txBody>
+          <a:bodyPr anchor="t">
+            <a:normAutofit/>
+          </a:bodyPr>
+          <a:lstStyle/>
+          <a:p>
+            <a:pPr marL="0" indent="0">
+              <a:buNone/>
+            </a:pPr>
+            <a:r>
+              <a:rPr lang="fr-FR" dirty="0" smtClean="0"/>
+              <a:t>Résultats d’exécution : Exemple de fusion entre deux régions (en violet foncé) </a:t>
+            </a:r>
+          </a:p>
+          <a:p>
+            <a:pPr marL="0" indent="0">
+              <a:buNone/>
+            </a:pPr>
+            <a:endParaRPr lang="fr-FR" dirty="0" smtClean="0"/>
+          </a:p>
+          <a:p>
+            <a:pPr marL="0" indent="0">
+              <a:buNone/>
+            </a:pPr>
+            <a:endParaRPr lang="fr-FR" dirty="0" smtClean="0"/>
+          </a:p>
+          <a:p>
+            <a:pPr marL="514350" indent="-514350">
+              <a:buAutoNum type="romanUcPeriod"/>
+            </a:pPr>
+            <a:endParaRPr lang="fr-FR" dirty="0"/>
+          </a:p>
+        </p:txBody>
+      </p:sp>
+      <p:sp>
+        <p:nvSpPr>
+          <p:cNvPr id="5" name="Espace réservé du numéro de diapositive 4"/>
+          <p:cNvSpPr>
+            <a:spLocks noGrp="1"/>
+          </p:cNvSpPr>
+          <p:nvPr>
+            <p:ph type="sldNum" sz="quarter" idx="12"/>
+          </p:nvPr>
+        </p:nvSpPr>
+        <p:spPr/>
+        <p:txBody>
+          <a:bodyPr/>
+          <a:lstStyle/>
+          <a:p>
+            <a:fld id="{D57F1E4F-1CFF-5643-939E-217C01CDF565}" type="slidenum">
+              <a:rPr lang="en-US" smtClean="0"/>
+              <a:pPr/>
+              <a:t>33</a:t>
+            </a:fld>
+            <a:endParaRPr lang="en-US" dirty="0"/>
+          </a:p>
+        </p:txBody>
+      </p:sp>
+      <p:pic>
+        <p:nvPicPr>
+          <p:cNvPr id="4" name="Image 3"/>
+          <p:cNvPicPr>
+            <a:picLocks noChangeAspect="1"/>
+          </p:cNvPicPr>
+          <p:nvPr/>
+        </p:nvPicPr>
+        <p:blipFill>
+          <a:blip r:embed="rId2"/>
+          <a:stretch>
+            <a:fillRect/>
+          </a:stretch>
+        </p:blipFill>
+        <p:spPr>
+          <a:xfrm>
+            <a:off x="3749894" y="1639614"/>
+            <a:ext cx="4629150" cy="5019675"/>
+          </a:xfrm>
+          <a:prstGeom prst="rect">
+            <a:avLst/>
+          </a:prstGeom>
+          <a:ln>
+            <a:noFill/>
+          </a:ln>
+          <a:effectLst>
+            <a:outerShdw blurRad="292100" dist="139700" dir="2700000" algn="tl" rotWithShape="0">
+              <a:srgbClr val="333333">
+                <a:alpha val="65000"/>
+              </a:srgbClr>
+            </a:outerShdw>
+          </a:effectLst>
+        </p:spPr>
+      </p:pic>
+    </p:spTree>
+    <p:extLst>
+      <p:ext uri="{BB962C8B-B14F-4D97-AF65-F5344CB8AC3E}">
+        <p14:creationId xmlns:p14="http://schemas.microsoft.com/office/powerpoint/2010/main" val="1524824229"/>
+      </p:ext>
+    </p:extLst>
+  </p:cSld>
+  <p:clrMapOvr>
+    <a:masterClrMapping/>
+  </p:clrMapOvr>
+  <p:timing>
+    <p:tnLst>
+      <p:par>
+        <p:cTn id="1" dur="indefinite" restart="never" nodeType="tmRoot"/>
+      </p:par>
+    </p:tnLst>
+  </p:timing>
+</p:sld>
+</file>
+
+<file path=ppt/slides/slide34.xml><?xml version="1.0" encoding="utf-8"?>
+<p:sld xmlns:a="http://schemas.openxmlformats.org/drawingml/2006/main" xmlns:r="http://schemas.openxmlformats.org/officeDocument/2006/relationships" xmlns:p="http://schemas.openxmlformats.org/presentationml/2006/main">
+  <p:cSld>
+    <p:spTree>
+      <p:nvGrpSpPr>
+        <p:cNvPr id="1" name=""/>
+        <p:cNvGrpSpPr/>
+        <p:nvPr/>
+      </p:nvGrpSpPr>
+      <p:grpSpPr>
+        <a:xfrm>
+          <a:off x="0" y="0"/>
+          <a:ext cx="0" cy="0"/>
+          <a:chOff x="0" y="0"/>
+          <a:chExt cx="0" cy="0"/>
+        </a:xfrm>
+      </p:grpSpPr>
+      <p:sp>
+        <p:nvSpPr>
+          <p:cNvPr id="2" name="Titre 1"/>
+          <p:cNvSpPr>
+            <a:spLocks noGrp="1"/>
+          </p:cNvSpPr>
+          <p:nvPr>
+            <p:ph type="title"/>
+          </p:nvPr>
+        </p:nvSpPr>
+        <p:spPr>
+          <a:xfrm>
+            <a:off x="1484310" y="312313"/>
+            <a:ext cx="10018713" cy="1327301"/>
+          </a:xfrm>
+        </p:spPr>
+        <p:txBody>
+          <a:bodyPr/>
+          <a:lstStyle/>
+          <a:p>
+            <a:pPr algn="l"/>
+            <a:r>
+              <a:rPr lang="fr-FR" dirty="0" smtClean="0"/>
+              <a:t>IV. Problèmes liés à la segmentation</a:t>
+            </a:r>
+            <a:br>
+              <a:rPr lang="fr-FR" dirty="0" smtClean="0"/>
+            </a:br>
+            <a:endParaRPr lang="fr-FR" dirty="0"/>
+          </a:p>
+        </p:txBody>
+      </p:sp>
+      <p:sp>
+        <p:nvSpPr>
+          <p:cNvPr id="3" name="Espace réservé du contenu 2"/>
+          <p:cNvSpPr>
+            <a:spLocks noGrp="1"/>
+          </p:cNvSpPr>
+          <p:nvPr>
+            <p:ph idx="1"/>
+          </p:nvPr>
+        </p:nvSpPr>
+        <p:spPr>
+          <a:xfrm>
+            <a:off x="1484310" y="1810656"/>
+            <a:ext cx="10577061" cy="3632201"/>
+          </a:xfrm>
+        </p:spPr>
+        <p:txBody>
+          <a:bodyPr anchor="t">
+            <a:normAutofit/>
+          </a:bodyPr>
+          <a:lstStyle/>
+          <a:p>
+            <a:pPr marL="0" indent="0">
+              <a:buNone/>
+            </a:pPr>
+            <a:r>
+              <a:rPr lang="fr-FR" dirty="0" smtClean="0"/>
+              <a:t>TODO</a:t>
+            </a:r>
+          </a:p>
+          <a:p>
+            <a:pPr>
+              <a:buFontTx/>
+              <a:buChar char="-"/>
+            </a:pPr>
+            <a:r>
+              <a:rPr lang="fr-FR" dirty="0" smtClean="0"/>
+              <a:t>Image simple ça marche bien (montrer seuils, germes, ouverture, etc.)</a:t>
+            </a:r>
+          </a:p>
+          <a:p>
+            <a:pPr>
+              <a:buFontTx/>
+              <a:buChar char="-"/>
+            </a:pPr>
+            <a:r>
+              <a:rPr lang="fr-FR" dirty="0" smtClean="0"/>
+              <a:t>Image compliquée c’est la merde (montrer problèmes </a:t>
+            </a:r>
+            <a:r>
+              <a:rPr lang="fr-FR" dirty="0" err="1" smtClean="0"/>
+              <a:t>niv</a:t>
+            </a:r>
+            <a:r>
+              <a:rPr lang="fr-FR" dirty="0" smtClean="0"/>
+              <a:t>. Gris, seuils, prétraitements </a:t>
+            </a:r>
+            <a:r>
+              <a:rPr lang="fr-FR" dirty="0" err="1" smtClean="0"/>
+              <a:t>imageJ</a:t>
+            </a:r>
+            <a:r>
+              <a:rPr lang="fr-FR" dirty="0" smtClean="0"/>
+              <a:t>, </a:t>
+            </a:r>
+            <a:endParaRPr lang="fr-FR" dirty="0" smtClean="0"/>
+          </a:p>
+          <a:p>
+            <a:pPr>
+              <a:buFontTx/>
+              <a:buChar char="-"/>
+            </a:pPr>
+            <a:r>
+              <a:rPr lang="fr-FR" dirty="0" smtClean="0"/>
+              <a:t>Un seuil par germe ? Pour plus de précision ?</a:t>
+            </a:r>
+            <a:endParaRPr lang="fr-FR" dirty="0" smtClean="0"/>
+          </a:p>
+          <a:p>
+            <a:pPr marL="0" indent="0">
+              <a:buNone/>
+            </a:pPr>
+            <a:endParaRPr lang="fr-FR" dirty="0"/>
+          </a:p>
+          <a:p>
+            <a:pPr marL="0" indent="0">
+              <a:buNone/>
+            </a:pPr>
+            <a:endParaRPr lang="fr-FR" dirty="0" smtClean="0"/>
+          </a:p>
+          <a:p>
+            <a:pPr marL="514350" indent="-514350">
+              <a:buAutoNum type="romanUcPeriod"/>
+            </a:pPr>
+            <a:endParaRPr lang="fr-FR" dirty="0"/>
+          </a:p>
+        </p:txBody>
+      </p:sp>
+      <p:sp>
+        <p:nvSpPr>
+          <p:cNvPr id="5" name="Espace réservé du numéro de diapositive 4"/>
+          <p:cNvSpPr>
+            <a:spLocks noGrp="1"/>
+          </p:cNvSpPr>
+          <p:nvPr>
+            <p:ph type="sldNum" sz="quarter" idx="12"/>
+          </p:nvPr>
+        </p:nvSpPr>
+        <p:spPr/>
+        <p:txBody>
+          <a:bodyPr/>
+          <a:lstStyle/>
+          <a:p>
+            <a:fld id="{D57F1E4F-1CFF-5643-939E-217C01CDF565}" type="slidenum">
+              <a:rPr lang="en-US" smtClean="0"/>
+              <a:pPr/>
+              <a:t>34</a:t>
+            </a:fld>
+            <a:endParaRPr lang="en-US" dirty="0"/>
+          </a:p>
+        </p:txBody>
+      </p:sp>
+    </p:spTree>
+    <p:extLst>
+      <p:ext uri="{BB962C8B-B14F-4D97-AF65-F5344CB8AC3E}">
+        <p14:creationId xmlns:p14="http://schemas.microsoft.com/office/powerpoint/2010/main" val="1006993935"/>
+      </p:ext>
+    </p:extLst>
+  </p:cSld>
+  <p:clrMapOvr>
+    <a:masterClrMapping/>
+  </p:clrMapOvr>
+  <p:timing>
+    <p:tnLst>
+      <p:par>
+        <p:cTn id="1" dur="indefinite" restart="never" nodeType="tmRoot"/>
+      </p:par>
+    </p:tnLst>
+  </p:timing>
+</p:sld>
+</file>
+
+<file path=ppt/slides/slide35.xml><?xml version="1.0" encoding="utf-8"?>
+<p:sld xmlns:a="http://schemas.openxmlformats.org/drawingml/2006/main" xmlns:r="http://schemas.openxmlformats.org/officeDocument/2006/relationships" xmlns:p="http://schemas.openxmlformats.org/presentationml/2006/main">
+  <p:cSld>
+    <p:spTree>
+      <p:nvGrpSpPr>
+        <p:cNvPr id="1" name=""/>
+        <p:cNvGrpSpPr/>
+        <p:nvPr/>
+      </p:nvGrpSpPr>
+      <p:grpSpPr>
+        <a:xfrm>
+          <a:off x="0" y="0"/>
+          <a:ext cx="0" cy="0"/>
+          <a:chOff x="0" y="0"/>
+          <a:chExt cx="0" cy="0"/>
+        </a:xfrm>
+      </p:grpSpPr>
+      <p:sp>
+        <p:nvSpPr>
+          <p:cNvPr id="2" name="Titre 1"/>
+          <p:cNvSpPr>
+            <a:spLocks noGrp="1"/>
+          </p:cNvSpPr>
+          <p:nvPr>
+            <p:ph type="title"/>
+          </p:nvPr>
+        </p:nvSpPr>
+        <p:spPr>
+          <a:xfrm>
+            <a:off x="1484310" y="312313"/>
+            <a:ext cx="10018713" cy="1327301"/>
+          </a:xfrm>
+        </p:spPr>
+        <p:txBody>
+          <a:bodyPr/>
+          <a:lstStyle/>
+          <a:p>
+            <a:pPr algn="l"/>
+            <a:r>
+              <a:rPr lang="fr-FR" dirty="0" smtClean="0"/>
+              <a:t>IV. Problèmes liés à la segmentation</a:t>
+            </a:r>
+            <a:br>
+              <a:rPr lang="fr-FR" dirty="0" smtClean="0"/>
+            </a:br>
+            <a:endParaRPr lang="fr-FR" dirty="0"/>
+          </a:p>
+        </p:txBody>
+      </p:sp>
+      <p:sp>
+        <p:nvSpPr>
+          <p:cNvPr id="3" name="Espace réservé du contenu 2"/>
+          <p:cNvSpPr>
+            <a:spLocks noGrp="1"/>
+          </p:cNvSpPr>
+          <p:nvPr>
+            <p:ph idx="1"/>
+          </p:nvPr>
+        </p:nvSpPr>
+        <p:spPr>
+          <a:xfrm>
+            <a:off x="1484310" y="1135118"/>
+            <a:ext cx="10577061" cy="4307740"/>
+          </a:xfrm>
+        </p:spPr>
+        <p:txBody>
+          <a:bodyPr anchor="t">
+            <a:normAutofit/>
+          </a:bodyPr>
+          <a:lstStyle/>
+          <a:p>
+            <a:pPr marL="0" indent="0">
+              <a:buNone/>
+            </a:pPr>
+            <a:r>
+              <a:rPr lang="fr-FR" dirty="0" smtClean="0"/>
+              <a:t>Cas d’une image « compliquée » ou de « mauvaise qualité »</a:t>
+            </a:r>
+            <a:endParaRPr lang="fr-FR" dirty="0" smtClean="0"/>
+          </a:p>
+          <a:p>
+            <a:pPr marL="0" indent="0">
+              <a:buNone/>
+            </a:pPr>
+            <a:endParaRPr lang="fr-FR" dirty="0"/>
+          </a:p>
+          <a:p>
+            <a:pPr marL="0" indent="0">
+              <a:buNone/>
+            </a:pPr>
+            <a:endParaRPr lang="fr-FR" dirty="0" smtClean="0"/>
+          </a:p>
+          <a:p>
+            <a:pPr marL="514350" indent="-514350">
+              <a:buAutoNum type="romanUcPeriod"/>
+            </a:pPr>
+            <a:endParaRPr lang="fr-FR" dirty="0"/>
+          </a:p>
+        </p:txBody>
+      </p:sp>
+      <p:sp>
+        <p:nvSpPr>
+          <p:cNvPr id="5" name="Espace réservé du numéro de diapositive 4"/>
+          <p:cNvSpPr>
+            <a:spLocks noGrp="1"/>
+          </p:cNvSpPr>
+          <p:nvPr>
+            <p:ph type="sldNum" sz="quarter" idx="12"/>
+          </p:nvPr>
+        </p:nvSpPr>
+        <p:spPr/>
+        <p:txBody>
+          <a:bodyPr/>
+          <a:lstStyle/>
+          <a:p>
+            <a:fld id="{D57F1E4F-1CFF-5643-939E-217C01CDF565}" type="slidenum">
+              <a:rPr lang="en-US" smtClean="0"/>
+              <a:pPr/>
+              <a:t>35</a:t>
+            </a:fld>
+            <a:endParaRPr lang="en-US" dirty="0"/>
+          </a:p>
+        </p:txBody>
+      </p:sp>
+      <p:pic>
+        <p:nvPicPr>
+          <p:cNvPr id="4" name="Image 3"/>
+          <p:cNvPicPr>
+            <a:picLocks noChangeAspect="1"/>
+          </p:cNvPicPr>
+          <p:nvPr/>
+        </p:nvPicPr>
+        <p:blipFill>
+          <a:blip r:embed="rId2">
+            <a:extLst>
+              <a:ext uri="{28A0092B-C50C-407E-A947-70E740481C1C}">
+                <a14:useLocalDpi xmlns:a14="http://schemas.microsoft.com/office/drawing/2010/main" val="0"/>
+              </a:ext>
+            </a:extLst>
+          </a:blip>
+          <a:stretch>
+            <a:fillRect/>
+          </a:stretch>
+        </p:blipFill>
+        <p:spPr>
+          <a:xfrm>
+            <a:off x="2802728" y="1639614"/>
+            <a:ext cx="7381875" cy="4924425"/>
+          </a:xfrm>
+          <a:prstGeom prst="rect">
+            <a:avLst/>
+          </a:prstGeom>
+          <a:ln>
+            <a:noFill/>
+          </a:ln>
+          <a:effectLst>
+            <a:outerShdw blurRad="292100" dist="139700" dir="2700000" algn="tl" rotWithShape="0">
+              <a:srgbClr val="333333">
+                <a:alpha val="65000"/>
+              </a:srgbClr>
+            </a:outerShdw>
+          </a:effectLst>
+        </p:spPr>
+      </p:pic>
+    </p:spTree>
+    <p:extLst>
+      <p:ext uri="{BB962C8B-B14F-4D97-AF65-F5344CB8AC3E}">
+        <p14:creationId xmlns:p14="http://schemas.microsoft.com/office/powerpoint/2010/main" val="1107083860"/>
+      </p:ext>
+    </p:extLst>
+  </p:cSld>
+  <p:clrMapOvr>
+    <a:masterClrMapping/>
+  </p:clrMapOvr>
+  <p:timing>
+    <p:tnLst>
+      <p:par>
+        <p:cTn id="1" dur="indefinite" restart="never" nodeType="tmRoot"/>
+      </p:par>
+    </p:tnLst>
+  </p:timing>
+</p:sld>
+</file>
+
+<file path=ppt/slides/slide36.xml><?xml version="1.0" encoding="utf-8"?>
+<p:sld xmlns:a="http://schemas.openxmlformats.org/drawingml/2006/main" xmlns:r="http://schemas.openxmlformats.org/officeDocument/2006/relationships" xmlns:p="http://schemas.openxmlformats.org/presentationml/2006/main">
+  <p:cSld>
+    <p:spTree>
+      <p:nvGrpSpPr>
+        <p:cNvPr id="1" name=""/>
+        <p:cNvGrpSpPr/>
+        <p:nvPr/>
+      </p:nvGrpSpPr>
+      <p:grpSpPr>
+        <a:xfrm>
+          <a:off x="0" y="0"/>
+          <a:ext cx="0" cy="0"/>
+          <a:chOff x="0" y="0"/>
+          <a:chExt cx="0" cy="0"/>
+        </a:xfrm>
+      </p:grpSpPr>
+      <p:sp>
+        <p:nvSpPr>
+          <p:cNvPr id="2" name="Titre 1"/>
+          <p:cNvSpPr>
+            <a:spLocks noGrp="1"/>
+          </p:cNvSpPr>
+          <p:nvPr>
+            <p:ph type="title"/>
+          </p:nvPr>
+        </p:nvSpPr>
+        <p:spPr>
+          <a:xfrm>
+            <a:off x="1484310" y="312313"/>
+            <a:ext cx="10018713" cy="1327301"/>
+          </a:xfrm>
+        </p:spPr>
+        <p:txBody>
+          <a:bodyPr/>
+          <a:lstStyle/>
+          <a:p>
+            <a:pPr algn="l"/>
+            <a:r>
+              <a:rPr lang="fr-FR" dirty="0" smtClean="0"/>
+              <a:t>IV. Problèmes liés à la segmentation</a:t>
+            </a:r>
+            <a:br>
+              <a:rPr lang="fr-FR" dirty="0" smtClean="0"/>
+            </a:br>
+            <a:endParaRPr lang="fr-FR" dirty="0"/>
+          </a:p>
+        </p:txBody>
+      </p:sp>
+      <p:sp>
+        <p:nvSpPr>
+          <p:cNvPr id="3" name="Espace réservé du contenu 2"/>
+          <p:cNvSpPr>
+            <a:spLocks noGrp="1"/>
+          </p:cNvSpPr>
+          <p:nvPr>
+            <p:ph idx="1"/>
+          </p:nvPr>
+        </p:nvSpPr>
+        <p:spPr>
+          <a:xfrm>
+            <a:off x="1484310" y="1135118"/>
+            <a:ext cx="10577061" cy="4307740"/>
+          </a:xfrm>
+        </p:spPr>
+        <p:txBody>
+          <a:bodyPr anchor="t">
+            <a:normAutofit/>
+          </a:bodyPr>
+          <a:lstStyle/>
+          <a:p>
+            <a:pPr marL="0" indent="0">
+              <a:buNone/>
+            </a:pPr>
+            <a:r>
+              <a:rPr lang="fr-FR" dirty="0" smtClean="0"/>
+              <a:t>Résultats obtenus : mauvaise segmentation de la tumeur et du rein sein</a:t>
+            </a:r>
+            <a:endParaRPr lang="fr-FR" dirty="0" smtClean="0"/>
+          </a:p>
+          <a:p>
+            <a:pPr marL="0" indent="0">
+              <a:buNone/>
+            </a:pPr>
+            <a:endParaRPr lang="fr-FR" dirty="0"/>
+          </a:p>
+          <a:p>
+            <a:pPr marL="0" indent="0">
+              <a:buNone/>
+            </a:pPr>
+            <a:endParaRPr lang="fr-FR" dirty="0" smtClean="0"/>
+          </a:p>
+          <a:p>
+            <a:pPr marL="514350" indent="-514350">
+              <a:buAutoNum type="romanUcPeriod"/>
+            </a:pPr>
+            <a:endParaRPr lang="fr-FR" dirty="0"/>
+          </a:p>
+        </p:txBody>
+      </p:sp>
+      <p:sp>
+        <p:nvSpPr>
+          <p:cNvPr id="5" name="Espace réservé du numéro de diapositive 4"/>
+          <p:cNvSpPr>
+            <a:spLocks noGrp="1"/>
+          </p:cNvSpPr>
+          <p:nvPr>
+            <p:ph type="sldNum" sz="quarter" idx="12"/>
+          </p:nvPr>
+        </p:nvSpPr>
+        <p:spPr/>
+        <p:txBody>
+          <a:bodyPr/>
+          <a:lstStyle/>
+          <a:p>
+            <a:fld id="{D57F1E4F-1CFF-5643-939E-217C01CDF565}" type="slidenum">
+              <a:rPr lang="en-US" smtClean="0"/>
+              <a:pPr/>
+              <a:t>36</a:t>
+            </a:fld>
+            <a:endParaRPr lang="en-US" dirty="0"/>
+          </a:p>
+        </p:txBody>
+      </p:sp>
+      <p:sp>
+        <p:nvSpPr>
+          <p:cNvPr id="7" name="ZoneTexte 6"/>
+          <p:cNvSpPr txBox="1"/>
+          <p:nvPr/>
+        </p:nvSpPr>
+        <p:spPr>
+          <a:xfrm>
+            <a:off x="7220606" y="5665934"/>
+            <a:ext cx="5360275" cy="369332"/>
+          </a:xfrm>
+          <a:prstGeom prst="rect">
+            <a:avLst/>
+          </a:prstGeom>
+          <a:noFill/>
+        </p:spPr>
+        <p:txBody>
+          <a:bodyPr wrap="square" rtlCol="0">
+            <a:spAutoFit/>
+          </a:bodyPr>
+          <a:lstStyle/>
+          <a:p>
+            <a:r>
+              <a:rPr lang="fr-FR" dirty="0" smtClean="0"/>
+              <a:t>Seuil global : 10   Seuil local : 5</a:t>
+            </a:r>
+            <a:endParaRPr lang="fr-FR" dirty="0"/>
+          </a:p>
+        </p:txBody>
+      </p:sp>
+      <p:pic>
+        <p:nvPicPr>
+          <p:cNvPr id="8" name="Image 7"/>
+          <p:cNvPicPr>
+            <a:picLocks noChangeAspect="1"/>
+          </p:cNvPicPr>
+          <p:nvPr/>
+        </p:nvPicPr>
+        <p:blipFill>
+          <a:blip r:embed="rId3">
+            <a:extLst>
+              <a:ext uri="{28A0092B-C50C-407E-A947-70E740481C1C}">
+                <a14:useLocalDpi xmlns:a14="http://schemas.microsoft.com/office/drawing/2010/main" val="0"/>
+              </a:ext>
+            </a:extLst>
+          </a:blip>
+          <a:stretch>
+            <a:fillRect/>
+          </a:stretch>
+        </p:blipFill>
+        <p:spPr>
+          <a:xfrm>
+            <a:off x="599090" y="1639614"/>
+            <a:ext cx="11027876" cy="4001139"/>
+          </a:xfrm>
+          <a:prstGeom prst="rect">
+            <a:avLst/>
+          </a:prstGeom>
+          <a:ln>
+            <a:noFill/>
+          </a:ln>
+          <a:effectLst>
+            <a:outerShdw blurRad="292100" dist="139700" dir="2700000" algn="tl" rotWithShape="0">
+              <a:srgbClr val="333333">
+                <a:alpha val="65000"/>
+              </a:srgbClr>
+            </a:outerShdw>
+          </a:effectLst>
+        </p:spPr>
+      </p:pic>
+    </p:spTree>
+    <p:extLst>
+      <p:ext uri="{BB962C8B-B14F-4D97-AF65-F5344CB8AC3E}">
+        <p14:creationId xmlns:p14="http://schemas.microsoft.com/office/powerpoint/2010/main" val="372313777"/>
+      </p:ext>
+    </p:extLst>
+  </p:cSld>
+  <p:clrMapOvr>
+    <a:masterClrMapping/>
+  </p:clrMapOvr>
+  <p:timing>
+    <p:tnLst>
+      <p:par>
+        <p:cTn id="1" dur="indefinite" restart="never" nodeType="tmRoot"/>
+      </p:par>
+    </p:tnLst>
+  </p:timing>
+</p:sld>
+</file>
+
+<file path=ppt/slides/slide37.xml><?xml version="1.0" encoding="utf-8"?>
+<p:sld xmlns:a="http://schemas.openxmlformats.org/drawingml/2006/main" xmlns:r="http://schemas.openxmlformats.org/officeDocument/2006/relationships" xmlns:p="http://schemas.openxmlformats.org/presentationml/2006/main">
+  <p:cSld>
+    <p:spTree>
+      <p:nvGrpSpPr>
+        <p:cNvPr id="1" name=""/>
+        <p:cNvGrpSpPr/>
+        <p:nvPr/>
+      </p:nvGrpSpPr>
+      <p:grpSpPr>
+        <a:xfrm>
+          <a:off x="0" y="0"/>
+          <a:ext cx="0" cy="0"/>
+          <a:chOff x="0" y="0"/>
+          <a:chExt cx="0" cy="0"/>
+        </a:xfrm>
+      </p:grpSpPr>
+      <p:sp>
+        <p:nvSpPr>
+          <p:cNvPr id="2" name="Titre 1"/>
+          <p:cNvSpPr>
+            <a:spLocks noGrp="1"/>
+          </p:cNvSpPr>
+          <p:nvPr>
+            <p:ph type="title"/>
+          </p:nvPr>
+        </p:nvSpPr>
+        <p:spPr>
+          <a:xfrm>
+            <a:off x="1484310" y="312313"/>
+            <a:ext cx="10018713" cy="1327301"/>
+          </a:xfrm>
+        </p:spPr>
+        <p:txBody>
+          <a:bodyPr/>
+          <a:lstStyle/>
+          <a:p>
+            <a:pPr algn="l"/>
+            <a:r>
+              <a:rPr lang="fr-FR" dirty="0" smtClean="0"/>
+              <a:t>IV. Problèmes liés à la segmentation</a:t>
+            </a:r>
+            <a:br>
+              <a:rPr lang="fr-FR" dirty="0" smtClean="0"/>
+            </a:br>
+            <a:endParaRPr lang="fr-FR" dirty="0"/>
+          </a:p>
+        </p:txBody>
+      </p:sp>
+      <p:sp>
+        <p:nvSpPr>
+          <p:cNvPr id="3" name="Espace réservé du contenu 2"/>
+          <p:cNvSpPr>
+            <a:spLocks noGrp="1"/>
+          </p:cNvSpPr>
+          <p:nvPr>
+            <p:ph idx="1"/>
+          </p:nvPr>
+        </p:nvSpPr>
+        <p:spPr>
+          <a:xfrm>
+            <a:off x="1484310" y="1135118"/>
+            <a:ext cx="10577061" cy="4307740"/>
+          </a:xfrm>
+        </p:spPr>
+        <p:txBody>
+          <a:bodyPr anchor="t">
+            <a:normAutofit/>
+          </a:bodyPr>
+          <a:lstStyle/>
+          <a:p>
+            <a:pPr marL="0" indent="0">
+              <a:buNone/>
+            </a:pPr>
+            <a:r>
+              <a:rPr lang="fr-FR" dirty="0" smtClean="0"/>
+              <a:t>Résultats obtenus : isolation du rein sein sur cette image </a:t>
+            </a:r>
+            <a:r>
+              <a:rPr lang="fr-FR" dirty="0" smtClean="0">
+                <a:sym typeface="Wingdings" panose="05000000000000000000" pitchFamily="2" charset="2"/>
+              </a:rPr>
+              <a:t> gros seuils nécessaires</a:t>
+            </a:r>
+            <a:endParaRPr lang="fr-FR" dirty="0" smtClean="0"/>
+          </a:p>
+          <a:p>
+            <a:pPr marL="0" indent="0">
+              <a:buNone/>
+            </a:pPr>
+            <a:endParaRPr lang="fr-FR" dirty="0"/>
+          </a:p>
+          <a:p>
+            <a:pPr marL="0" indent="0">
+              <a:buNone/>
+            </a:pPr>
+            <a:endParaRPr lang="fr-FR" dirty="0" smtClean="0"/>
+          </a:p>
+          <a:p>
+            <a:pPr marL="514350" indent="-514350">
+              <a:buAutoNum type="romanUcPeriod"/>
+            </a:pPr>
+            <a:endParaRPr lang="fr-FR" dirty="0"/>
+          </a:p>
+        </p:txBody>
+      </p:sp>
+      <p:sp>
+        <p:nvSpPr>
+          <p:cNvPr id="5" name="Espace réservé du numéro de diapositive 4"/>
+          <p:cNvSpPr>
+            <a:spLocks noGrp="1"/>
+          </p:cNvSpPr>
+          <p:nvPr>
+            <p:ph type="sldNum" sz="quarter" idx="12"/>
+          </p:nvPr>
+        </p:nvSpPr>
+        <p:spPr/>
+        <p:txBody>
+          <a:bodyPr/>
+          <a:lstStyle/>
+          <a:p>
+            <a:fld id="{D57F1E4F-1CFF-5643-939E-217C01CDF565}" type="slidenum">
+              <a:rPr lang="en-US" smtClean="0"/>
+              <a:pPr/>
+              <a:t>37</a:t>
+            </a:fld>
+            <a:endParaRPr lang="en-US" dirty="0"/>
+          </a:p>
+        </p:txBody>
+      </p:sp>
+      <p:sp>
+        <p:nvSpPr>
+          <p:cNvPr id="7" name="ZoneTexte 6"/>
+          <p:cNvSpPr txBox="1"/>
+          <p:nvPr/>
+        </p:nvSpPr>
+        <p:spPr>
+          <a:xfrm>
+            <a:off x="7220606" y="5794178"/>
+            <a:ext cx="5360275" cy="369332"/>
+          </a:xfrm>
+          <a:prstGeom prst="rect">
+            <a:avLst/>
+          </a:prstGeom>
+          <a:noFill/>
+        </p:spPr>
+        <p:txBody>
+          <a:bodyPr wrap="square" rtlCol="0">
+            <a:spAutoFit/>
+          </a:bodyPr>
+          <a:lstStyle/>
+          <a:p>
+            <a:r>
+              <a:rPr lang="fr-FR" dirty="0" smtClean="0"/>
+              <a:t>Seuil global : 53  Seuil local : 15</a:t>
+            </a:r>
+            <a:endParaRPr lang="fr-FR" dirty="0"/>
+          </a:p>
+        </p:txBody>
+      </p:sp>
+      <p:pic>
+        <p:nvPicPr>
+          <p:cNvPr id="4" name="Image 3"/>
+          <p:cNvPicPr>
+            <a:picLocks noChangeAspect="1"/>
+          </p:cNvPicPr>
+          <p:nvPr/>
+        </p:nvPicPr>
+        <p:blipFill>
+          <a:blip r:embed="rId2"/>
+          <a:stretch>
+            <a:fillRect/>
+          </a:stretch>
+        </p:blipFill>
+        <p:spPr>
+          <a:xfrm>
+            <a:off x="904582" y="1781734"/>
+            <a:ext cx="10598441" cy="3836784"/>
+          </a:xfrm>
+          <a:prstGeom prst="rect">
+            <a:avLst/>
+          </a:prstGeom>
+          <a:ln>
+            <a:noFill/>
+          </a:ln>
+          <a:effectLst>
+            <a:outerShdw blurRad="292100" dist="139700" dir="2700000" algn="tl" rotWithShape="0">
+              <a:srgbClr val="333333">
+                <a:alpha val="65000"/>
+              </a:srgbClr>
+            </a:outerShdw>
+          </a:effectLst>
+        </p:spPr>
+      </p:pic>
+    </p:spTree>
+    <p:extLst>
+      <p:ext uri="{BB962C8B-B14F-4D97-AF65-F5344CB8AC3E}">
+        <p14:creationId xmlns:p14="http://schemas.microsoft.com/office/powerpoint/2010/main" val="794000173"/>
+      </p:ext>
+    </p:extLst>
+  </p:cSld>
+  <p:clrMapOvr>
+    <a:masterClrMapping/>
+  </p:clrMapOvr>
+  <p:timing>
+    <p:tnLst>
+      <p:par>
+        <p:cTn id="1" dur="indefinite" restart="never" nodeType="tmRoot"/>
+      </p:par>
+    </p:tnLst>
+  </p:timing>
+</p:sld>
+</file>
+
+<file path=ppt/slides/slide38.xml><?xml version="1.0" encoding="utf-8"?>
+<p:sld xmlns:a="http://schemas.openxmlformats.org/drawingml/2006/main" xmlns:r="http://schemas.openxmlformats.org/officeDocument/2006/relationships" xmlns:p="http://schemas.openxmlformats.org/presentationml/2006/main">
+  <p:cSld>
+    <p:spTree>
+      <p:nvGrpSpPr>
+        <p:cNvPr id="1" name=""/>
+        <p:cNvGrpSpPr/>
+        <p:nvPr/>
+      </p:nvGrpSpPr>
+      <p:grpSpPr>
+        <a:xfrm>
+          <a:off x="0" y="0"/>
+          <a:ext cx="0" cy="0"/>
+          <a:chOff x="0" y="0"/>
+          <a:chExt cx="0" cy="0"/>
+        </a:xfrm>
+      </p:grpSpPr>
+      <p:sp>
+        <p:nvSpPr>
+          <p:cNvPr id="2" name="Titre 1"/>
+          <p:cNvSpPr>
+            <a:spLocks noGrp="1"/>
+          </p:cNvSpPr>
+          <p:nvPr>
+            <p:ph type="title"/>
+          </p:nvPr>
+        </p:nvSpPr>
+        <p:spPr>
+          <a:xfrm>
+            <a:off x="1484310" y="312313"/>
+            <a:ext cx="10018713" cy="1327301"/>
+          </a:xfrm>
+        </p:spPr>
+        <p:txBody>
+          <a:bodyPr/>
+          <a:lstStyle/>
+          <a:p>
+            <a:pPr algn="l"/>
+            <a:r>
+              <a:rPr lang="fr-FR" dirty="0" smtClean="0"/>
+              <a:t>IV. Problèmes liés à la segmentation</a:t>
+            </a:r>
+            <a:br>
+              <a:rPr lang="fr-FR" dirty="0" smtClean="0"/>
+            </a:br>
+            <a:endParaRPr lang="fr-FR" dirty="0"/>
+          </a:p>
+        </p:txBody>
+      </p:sp>
+      <p:sp>
+        <p:nvSpPr>
+          <p:cNvPr id="3" name="Espace réservé du contenu 2"/>
+          <p:cNvSpPr>
+            <a:spLocks noGrp="1"/>
+          </p:cNvSpPr>
+          <p:nvPr>
+            <p:ph idx="1"/>
+          </p:nvPr>
+        </p:nvSpPr>
+        <p:spPr>
+          <a:xfrm>
+            <a:off x="1484310" y="1135118"/>
+            <a:ext cx="10577061" cy="4307740"/>
+          </a:xfrm>
+        </p:spPr>
+        <p:txBody>
+          <a:bodyPr anchor="t">
+            <a:normAutofit/>
+          </a:bodyPr>
+          <a:lstStyle/>
+          <a:p>
+            <a:pPr marL="0" indent="0">
+              <a:buNone/>
+            </a:pPr>
+            <a:r>
+              <a:rPr lang="fr-FR" dirty="0" smtClean="0"/>
+              <a:t>Conclusion :</a:t>
+            </a:r>
+          </a:p>
+          <a:p>
+            <a:r>
+              <a:rPr lang="fr-FR" dirty="0" smtClean="0"/>
+              <a:t> Il faudra sûrement utiliser des seuils différents pour chaque germe</a:t>
+            </a:r>
+          </a:p>
+          <a:p>
+            <a:r>
+              <a:rPr lang="fr-FR" dirty="0" smtClean="0"/>
+              <a:t>Un prétraitement est parfois nécessaire pour faire ressortir les organes</a:t>
+            </a:r>
+          </a:p>
+          <a:p>
+            <a:pPr marL="0" indent="0">
+              <a:buNone/>
+            </a:pPr>
+            <a:r>
+              <a:rPr lang="fr-FR" dirty="0"/>
+              <a:t>	</a:t>
+            </a:r>
+            <a:endParaRPr lang="fr-FR" dirty="0"/>
+          </a:p>
+          <a:p>
+            <a:pPr marL="0" indent="0">
+              <a:buNone/>
+            </a:pPr>
+            <a:endParaRPr lang="fr-FR" dirty="0" smtClean="0"/>
+          </a:p>
+          <a:p>
+            <a:pPr marL="514350" indent="-514350">
+              <a:buAutoNum type="romanUcPeriod"/>
+            </a:pPr>
+            <a:endParaRPr lang="fr-FR" dirty="0"/>
+          </a:p>
+        </p:txBody>
+      </p:sp>
+      <p:sp>
+        <p:nvSpPr>
+          <p:cNvPr id="5" name="Espace réservé du numéro de diapositive 4"/>
+          <p:cNvSpPr>
+            <a:spLocks noGrp="1"/>
+          </p:cNvSpPr>
+          <p:nvPr>
+            <p:ph type="sldNum" sz="quarter" idx="12"/>
+          </p:nvPr>
+        </p:nvSpPr>
+        <p:spPr/>
+        <p:txBody>
+          <a:bodyPr/>
+          <a:lstStyle/>
+          <a:p>
+            <a:fld id="{D57F1E4F-1CFF-5643-939E-217C01CDF565}" type="slidenum">
+              <a:rPr lang="en-US" smtClean="0"/>
+              <a:pPr/>
+              <a:t>38</a:t>
+            </a:fld>
+            <a:endParaRPr lang="en-US" dirty="0"/>
+          </a:p>
+        </p:txBody>
+      </p:sp>
+    </p:spTree>
+    <p:extLst>
+      <p:ext uri="{BB962C8B-B14F-4D97-AF65-F5344CB8AC3E}">
+        <p14:creationId xmlns:p14="http://schemas.microsoft.com/office/powerpoint/2010/main" val="1278964734"/>
+      </p:ext>
+    </p:extLst>
+  </p:cSld>
+  <p:clrMapOvr>
+    <a:masterClrMapping/>
+  </p:clrMapOvr>
+  <p:timing>
+    <p:tnLst>
+      <p:par>
+        <p:cTn id="1" dur="indefinite" restart="never" nodeType="tmRoot"/>
+      </p:par>
+    </p:tnLst>
+  </p:timing>
+</p:sld>
+</file>
+
+<file path=ppt/slides/slide39.xml><?xml version="1.0" encoding="utf-8"?>
+<p:sld xmlns:a="http://schemas.openxmlformats.org/drawingml/2006/main" xmlns:r="http://schemas.openxmlformats.org/officeDocument/2006/relationships" xmlns:p="http://schemas.openxmlformats.org/presentationml/2006/main">
+  <p:cSld>
+    <p:spTree>
+      <p:nvGrpSpPr>
+        <p:cNvPr id="1" name=""/>
+        <p:cNvGrpSpPr/>
+        <p:nvPr/>
+      </p:nvGrpSpPr>
+      <p:grpSpPr>
+        <a:xfrm>
+          <a:off x="0" y="0"/>
+          <a:ext cx="0" cy="0"/>
+          <a:chOff x="0" y="0"/>
+          <a:chExt cx="0" cy="0"/>
+        </a:xfrm>
+      </p:grpSpPr>
+      <p:sp>
+        <p:nvSpPr>
+          <p:cNvPr id="2" name="Titre 1"/>
+          <p:cNvSpPr>
+            <a:spLocks noGrp="1"/>
+          </p:cNvSpPr>
+          <p:nvPr>
+            <p:ph type="title"/>
+          </p:nvPr>
+        </p:nvSpPr>
+        <p:spPr>
+          <a:xfrm>
+            <a:off x="1484310" y="312313"/>
+            <a:ext cx="10018713" cy="1327301"/>
+          </a:xfrm>
+        </p:spPr>
+        <p:txBody>
+          <a:bodyPr/>
+          <a:lstStyle/>
+          <a:p>
+            <a:pPr algn="l"/>
+            <a:r>
+              <a:rPr lang="fr-FR" dirty="0" smtClean="0"/>
+              <a:t>IV. Problèmes liés à la segmentation</a:t>
+            </a:r>
+            <a:br>
+              <a:rPr lang="fr-FR" dirty="0" smtClean="0"/>
+            </a:br>
+            <a:endParaRPr lang="fr-FR" dirty="0"/>
+          </a:p>
+        </p:txBody>
+      </p:sp>
+      <p:sp>
+        <p:nvSpPr>
+          <p:cNvPr id="3" name="Espace réservé du contenu 2"/>
+          <p:cNvSpPr>
+            <a:spLocks noGrp="1"/>
+          </p:cNvSpPr>
+          <p:nvPr>
+            <p:ph idx="1"/>
+          </p:nvPr>
+        </p:nvSpPr>
+        <p:spPr>
+          <a:xfrm>
+            <a:off x="1484310" y="1135118"/>
+            <a:ext cx="10577061" cy="4307740"/>
+          </a:xfrm>
+        </p:spPr>
+        <p:txBody>
+          <a:bodyPr anchor="t">
+            <a:normAutofit/>
+          </a:bodyPr>
+          <a:lstStyle/>
+          <a:p>
+            <a:pPr marL="0" indent="0">
+              <a:buNone/>
+            </a:pPr>
+            <a:r>
+              <a:rPr lang="fr-FR" dirty="0" smtClean="0"/>
+              <a:t>Tentatives de prétraitements </a:t>
+            </a:r>
+          </a:p>
+          <a:p>
+            <a:pPr marL="0" indent="0">
+              <a:buNone/>
+            </a:pPr>
+            <a:r>
+              <a:rPr lang="fr-FR" dirty="0"/>
+              <a:t>	</a:t>
+            </a:r>
+            <a:endParaRPr lang="fr-FR" dirty="0"/>
+          </a:p>
+          <a:p>
+            <a:pPr marL="0" indent="0">
+              <a:buNone/>
+            </a:pPr>
+            <a:endParaRPr lang="fr-FR" dirty="0" smtClean="0"/>
+          </a:p>
+          <a:p>
+            <a:pPr marL="514350" indent="-514350">
+              <a:buAutoNum type="romanUcPeriod"/>
+            </a:pPr>
+            <a:endParaRPr lang="fr-FR" dirty="0"/>
+          </a:p>
+        </p:txBody>
+      </p:sp>
+      <p:sp>
+        <p:nvSpPr>
+          <p:cNvPr id="5" name="Espace réservé du numéro de diapositive 4"/>
+          <p:cNvSpPr>
+            <a:spLocks noGrp="1"/>
+          </p:cNvSpPr>
+          <p:nvPr>
+            <p:ph type="sldNum" sz="quarter" idx="12"/>
+          </p:nvPr>
+        </p:nvSpPr>
+        <p:spPr/>
+        <p:txBody>
+          <a:bodyPr/>
+          <a:lstStyle/>
+          <a:p>
+            <a:fld id="{D57F1E4F-1CFF-5643-939E-217C01CDF565}" type="slidenum">
+              <a:rPr lang="en-US" smtClean="0"/>
+              <a:pPr/>
+              <a:t>39</a:t>
+            </a:fld>
+            <a:endParaRPr lang="en-US" dirty="0"/>
+          </a:p>
+        </p:txBody>
+      </p:sp>
+      <p:pic>
+        <p:nvPicPr>
+          <p:cNvPr id="4" name="Image 3"/>
+          <p:cNvPicPr>
+            <a:picLocks noChangeAspect="1"/>
+          </p:cNvPicPr>
+          <p:nvPr/>
+        </p:nvPicPr>
+        <p:blipFill>
+          <a:blip r:embed="rId3">
+            <a:extLst>
+              <a:ext uri="{28A0092B-C50C-407E-A947-70E740481C1C}">
+                <a14:useLocalDpi xmlns:a14="http://schemas.microsoft.com/office/drawing/2010/main" val="0"/>
+              </a:ext>
+            </a:extLst>
+          </a:blip>
+          <a:stretch>
+            <a:fillRect/>
+          </a:stretch>
+        </p:blipFill>
+        <p:spPr>
+          <a:xfrm>
+            <a:off x="1642705" y="1814570"/>
+            <a:ext cx="4187014" cy="3036384"/>
+          </a:xfrm>
+          <a:prstGeom prst="rect">
+            <a:avLst/>
+          </a:prstGeom>
+          <a:ln>
+            <a:noFill/>
+          </a:ln>
+          <a:effectLst>
+            <a:outerShdw blurRad="292100" dist="139700" dir="2700000" algn="tl" rotWithShape="0">
+              <a:srgbClr val="333333">
+                <a:alpha val="65000"/>
+              </a:srgbClr>
+            </a:outerShdw>
+          </a:effectLst>
+        </p:spPr>
+      </p:pic>
+      <p:pic>
+        <p:nvPicPr>
+          <p:cNvPr id="6" name="Image 5"/>
+          <p:cNvPicPr>
+            <a:picLocks noChangeAspect="1"/>
+          </p:cNvPicPr>
+          <p:nvPr/>
+        </p:nvPicPr>
+        <p:blipFill>
+          <a:blip r:embed="rId4">
+            <a:extLst>
+              <a:ext uri="{28A0092B-C50C-407E-A947-70E740481C1C}">
+                <a14:useLocalDpi xmlns:a14="http://schemas.microsoft.com/office/drawing/2010/main" val="0"/>
+              </a:ext>
+            </a:extLst>
+          </a:blip>
+          <a:stretch>
+            <a:fillRect/>
+          </a:stretch>
+        </p:blipFill>
+        <p:spPr>
+          <a:xfrm>
+            <a:off x="6250998" y="1814569"/>
+            <a:ext cx="4075416" cy="2948836"/>
+          </a:xfrm>
+          <a:prstGeom prst="rect">
+            <a:avLst/>
+          </a:prstGeom>
+          <a:ln>
+            <a:noFill/>
+          </a:ln>
+          <a:effectLst>
+            <a:outerShdw blurRad="292100" dist="139700" dir="2700000" algn="tl" rotWithShape="0">
+              <a:srgbClr val="333333">
+                <a:alpha val="65000"/>
+              </a:srgbClr>
+            </a:outerShdw>
+          </a:effectLst>
+        </p:spPr>
+      </p:pic>
+      <p:sp>
+        <p:nvSpPr>
+          <p:cNvPr id="7" name="ZoneTexte 6"/>
+          <p:cNvSpPr txBox="1"/>
+          <p:nvPr/>
+        </p:nvSpPr>
+        <p:spPr>
+          <a:xfrm>
+            <a:off x="2900485" y="4874871"/>
+            <a:ext cx="2538249" cy="369332"/>
+          </a:xfrm>
+          <a:prstGeom prst="rect">
+            <a:avLst/>
+          </a:prstGeom>
+          <a:noFill/>
+        </p:spPr>
+        <p:txBody>
+          <a:bodyPr wrap="square" rtlCol="0">
+            <a:spAutoFit/>
+          </a:bodyPr>
+          <a:lstStyle/>
+          <a:p>
+            <a:r>
+              <a:rPr lang="fr-FR" dirty="0" err="1" smtClean="0"/>
+              <a:t>Unsharp</a:t>
+            </a:r>
+            <a:r>
+              <a:rPr lang="fr-FR" dirty="0" smtClean="0"/>
+              <a:t> </a:t>
+            </a:r>
+            <a:r>
+              <a:rPr lang="fr-FR" dirty="0" err="1" smtClean="0"/>
+              <a:t>mask</a:t>
+            </a:r>
+            <a:r>
+              <a:rPr lang="fr-FR" dirty="0" smtClean="0"/>
+              <a:t> </a:t>
+            </a:r>
+            <a:endParaRPr lang="fr-FR" dirty="0"/>
+          </a:p>
+        </p:txBody>
+      </p:sp>
+      <p:sp>
+        <p:nvSpPr>
+          <p:cNvPr id="8" name="ZoneTexte 7"/>
+          <p:cNvSpPr txBox="1"/>
+          <p:nvPr/>
+        </p:nvSpPr>
+        <p:spPr>
+          <a:xfrm>
+            <a:off x="6854908" y="4874871"/>
+            <a:ext cx="3775871" cy="369332"/>
+          </a:xfrm>
+          <a:prstGeom prst="rect">
+            <a:avLst/>
+          </a:prstGeom>
+          <a:noFill/>
+        </p:spPr>
+        <p:txBody>
+          <a:bodyPr wrap="square" rtlCol="0">
+            <a:spAutoFit/>
+          </a:bodyPr>
+          <a:lstStyle/>
+          <a:p>
+            <a:r>
+              <a:rPr lang="fr-FR" dirty="0" err="1"/>
+              <a:t>Unsharp</a:t>
+            </a:r>
+            <a:r>
+              <a:rPr lang="fr-FR" dirty="0"/>
+              <a:t> </a:t>
+            </a:r>
+            <a:r>
+              <a:rPr lang="fr-FR" dirty="0" err="1"/>
+              <a:t>mask</a:t>
+            </a:r>
+            <a:r>
+              <a:rPr lang="fr-FR" dirty="0"/>
+              <a:t> </a:t>
+            </a:r>
+            <a:r>
+              <a:rPr lang="fr-FR" dirty="0" smtClean="0"/>
+              <a:t> + Convolution</a:t>
+            </a:r>
+            <a:endParaRPr lang="fr-FR" dirty="0"/>
+          </a:p>
+        </p:txBody>
+      </p:sp>
+      <p:pic>
+        <p:nvPicPr>
+          <p:cNvPr id="10" name="Image 9"/>
+          <p:cNvPicPr>
+            <a:picLocks noChangeAspect="1"/>
+          </p:cNvPicPr>
+          <p:nvPr/>
+        </p:nvPicPr>
+        <p:blipFill>
+          <a:blip r:embed="rId5">
+            <a:extLst>
+              <a:ext uri="{28A0092B-C50C-407E-A947-70E740481C1C}">
+                <a14:useLocalDpi xmlns:a14="http://schemas.microsoft.com/office/drawing/2010/main" val="0"/>
+              </a:ext>
+            </a:extLst>
+          </a:blip>
+          <a:stretch>
+            <a:fillRect/>
+          </a:stretch>
+        </p:blipFill>
+        <p:spPr>
+          <a:xfrm>
+            <a:off x="7483731" y="5554324"/>
+            <a:ext cx="1609950" cy="990738"/>
+          </a:xfrm>
+          <a:prstGeom prst="rect">
+            <a:avLst/>
+          </a:prstGeom>
+        </p:spPr>
+      </p:pic>
+      <p:sp>
+        <p:nvSpPr>
+          <p:cNvPr id="11" name="ZoneTexte 10"/>
+          <p:cNvSpPr txBox="1"/>
+          <p:nvPr/>
+        </p:nvSpPr>
+        <p:spPr>
+          <a:xfrm>
+            <a:off x="2672039" y="5619332"/>
+            <a:ext cx="2128345" cy="646331"/>
+          </a:xfrm>
+          <a:prstGeom prst="rect">
+            <a:avLst/>
+          </a:prstGeom>
+          <a:noFill/>
+        </p:spPr>
+        <p:style>
+          <a:lnRef idx="2">
+            <a:schemeClr val="dk1"/>
+          </a:lnRef>
+          <a:fillRef idx="1">
+            <a:schemeClr val="lt1"/>
+          </a:fillRef>
+          <a:effectRef idx="0">
+            <a:schemeClr val="dk1"/>
+          </a:effectRef>
+          <a:fontRef idx="minor">
+            <a:schemeClr val="dk1"/>
+          </a:fontRef>
+        </p:style>
+        <p:txBody>
+          <a:bodyPr wrap="square" rtlCol="0">
+            <a:spAutoFit/>
+          </a:bodyPr>
+          <a:lstStyle/>
+          <a:p>
+            <a:r>
+              <a:rPr lang="fr-FR" dirty="0" smtClean="0"/>
+              <a:t>Radius : 30 pixels</a:t>
+            </a:r>
+          </a:p>
+          <a:p>
+            <a:r>
+              <a:rPr lang="fr-FR" dirty="0" smtClean="0"/>
+              <a:t>Poids Masque : 0,8</a:t>
+            </a:r>
+            <a:endParaRPr lang="fr-FR" dirty="0"/>
+          </a:p>
+        </p:txBody>
+      </p:sp>
+    </p:spTree>
+    <p:extLst>
+      <p:ext uri="{BB962C8B-B14F-4D97-AF65-F5344CB8AC3E}">
+        <p14:creationId xmlns:p14="http://schemas.microsoft.com/office/powerpoint/2010/main" val="2378459800"/>
       </p:ext>
     </p:extLst>
   </p:cSld>

</xml_diff>

<commit_message>
ajout de quelques commentaires sur la presentation
</commit_message>
<xml_diff>
--- a/Travail_realise/Presentations/Utilisation_du_RaPC_pour_la_segmentation_d_images.pptx
+++ b/Travail_realise/Presentations/Utilisation_du_RaPC_pour_la_segmentation_d_images.pptx
@@ -1284,6 +1284,14 @@
           <a:bodyPr/>
           <a:lstStyle/>
           <a:p>
+            <a:r>
+              <a:rPr lang="fr-FR" dirty="0" smtClean="0"/>
+              <a:t>Parler</a:t>
+            </a:r>
+            <a:r>
+              <a:rPr lang="fr-FR" baseline="0" dirty="0" smtClean="0"/>
+              <a:t> des poids aussi</a:t>
+            </a:r>
             <a:endParaRPr lang="fr-FR" dirty="0"/>
           </a:p>
         </p:txBody>
@@ -1305,7 +1313,7 @@
           <a:p>
             <a:fld id="{5984FE70-0D1D-40C7-9F56-3FAF97D50752}" type="slidenum">
               <a:rPr lang="fr-FR" smtClean="0"/>
-              <a:t>32</a:t>
+              <a:t>29</a:t>
             </a:fld>
             <a:endParaRPr lang="fr-FR"/>
           </a:p>
@@ -1314,7 +1322,7 @@
     </p:spTree>
     <p:extLst>
       <p:ext uri="{BB962C8B-B14F-4D97-AF65-F5344CB8AC3E}">
-        <p14:creationId xmlns:p14="http://schemas.microsoft.com/office/powerpoint/2010/main" val="3029521272"/>
+        <p14:creationId xmlns:p14="http://schemas.microsoft.com/office/powerpoint/2010/main" val="3405939330"/>
       </p:ext>
     </p:extLst>
   </p:cSld>
@@ -1368,20 +1376,6 @@
           <a:bodyPr/>
           <a:lstStyle/>
           <a:p>
-            <a:r>
-              <a:rPr lang="fr-FR" dirty="0" smtClean="0"/>
-              <a:t>Tumeur : seuils trop</a:t>
-            </a:r>
-            <a:r>
-              <a:rPr lang="fr-FR" baseline="0" dirty="0" smtClean="0"/>
-              <a:t> permissifs</a:t>
-            </a:r>
-          </a:p>
-          <a:p>
-            <a:r>
-              <a:rPr lang="fr-FR" baseline="0" dirty="0" smtClean="0"/>
-              <a:t>Rein : seuils trop contraignants</a:t>
-            </a:r>
             <a:endParaRPr lang="fr-FR" dirty="0"/>
           </a:p>
         </p:txBody>
@@ -1403,7 +1397,7 @@
           <a:p>
             <a:fld id="{5984FE70-0D1D-40C7-9F56-3FAF97D50752}" type="slidenum">
               <a:rPr lang="fr-FR" smtClean="0"/>
-              <a:t>36</a:t>
+              <a:t>32</a:t>
             </a:fld>
             <a:endParaRPr lang="fr-FR"/>
           </a:p>
@@ -1412,7 +1406,7 @@
     </p:spTree>
     <p:extLst>
       <p:ext uri="{BB962C8B-B14F-4D97-AF65-F5344CB8AC3E}">
-        <p14:creationId xmlns:p14="http://schemas.microsoft.com/office/powerpoint/2010/main" val="316203356"/>
+        <p14:creationId xmlns:p14="http://schemas.microsoft.com/office/powerpoint/2010/main" val="3029521272"/>
       </p:ext>
     </p:extLst>
   </p:cSld>
@@ -1466,7 +1460,21 @@
           <a:bodyPr/>
           <a:lstStyle/>
           <a:p>
-            <a:endParaRPr lang="fr-FR"/>
+            <a:r>
+              <a:rPr lang="fr-FR" dirty="0" smtClean="0"/>
+              <a:t>Tumeur : seuils trop</a:t>
+            </a:r>
+            <a:r>
+              <a:rPr lang="fr-FR" baseline="0" dirty="0" smtClean="0"/>
+              <a:t> permissifs</a:t>
+            </a:r>
+          </a:p>
+          <a:p>
+            <a:r>
+              <a:rPr lang="fr-FR" baseline="0" dirty="0" smtClean="0"/>
+              <a:t>Rein : seuils trop contraignants</a:t>
+            </a:r>
+            <a:endParaRPr lang="fr-FR" dirty="0"/>
           </a:p>
         </p:txBody>
       </p:sp>
@@ -1487,7 +1495,7 @@
           <a:p>
             <a:fld id="{5984FE70-0D1D-40C7-9F56-3FAF97D50752}" type="slidenum">
               <a:rPr lang="fr-FR" smtClean="0"/>
-              <a:t>39</a:t>
+              <a:t>36</a:t>
             </a:fld>
             <a:endParaRPr lang="fr-FR"/>
           </a:p>
@@ -1496,7 +1504,7 @@
     </p:spTree>
     <p:extLst>
       <p:ext uri="{BB962C8B-B14F-4D97-AF65-F5344CB8AC3E}">
-        <p14:creationId xmlns:p14="http://schemas.microsoft.com/office/powerpoint/2010/main" val="3570101583"/>
+        <p14:creationId xmlns:p14="http://schemas.microsoft.com/office/powerpoint/2010/main" val="316203356"/>
       </p:ext>
     </p:extLst>
   </p:cSld>
@@ -1613,6 +1621,90 @@
     <p:extLst>
       <p:ext uri="{BB962C8B-B14F-4D97-AF65-F5344CB8AC3E}">
         <p14:creationId xmlns:p14="http://schemas.microsoft.com/office/powerpoint/2010/main" val="4181792863"/>
+      </p:ext>
+    </p:extLst>
+  </p:cSld>
+  <p:clrMapOvr>
+    <a:masterClrMapping/>
+  </p:clrMapOvr>
+</p:notes>
+</file>
+
+<file path=ppt/notesSlides/notesSlide20.xml><?xml version="1.0" encoding="utf-8"?>
+<p:notes xmlns:a="http://schemas.openxmlformats.org/drawingml/2006/main" xmlns:r="http://schemas.openxmlformats.org/officeDocument/2006/relationships" xmlns:p="http://schemas.openxmlformats.org/presentationml/2006/main">
+  <p:cSld>
+    <p:spTree>
+      <p:nvGrpSpPr>
+        <p:cNvPr id="1" name=""/>
+        <p:cNvGrpSpPr/>
+        <p:nvPr/>
+      </p:nvGrpSpPr>
+      <p:grpSpPr>
+        <a:xfrm>
+          <a:off x="0" y="0"/>
+          <a:ext cx="0" cy="0"/>
+          <a:chOff x="0" y="0"/>
+          <a:chExt cx="0" cy="0"/>
+        </a:xfrm>
+      </p:grpSpPr>
+      <p:sp>
+        <p:nvSpPr>
+          <p:cNvPr id="2" name="Espace réservé de l'image des diapositives 1"/>
+          <p:cNvSpPr>
+            <a:spLocks noGrp="1" noRot="1" noChangeAspect="1"/>
+          </p:cNvSpPr>
+          <p:nvPr>
+            <p:ph type="sldImg"/>
+          </p:nvPr>
+        </p:nvSpPr>
+        <p:spPr/>
+      </p:sp>
+      <p:sp>
+        <p:nvSpPr>
+          <p:cNvPr id="3" name="Espace réservé des commentaires 2"/>
+          <p:cNvSpPr>
+            <a:spLocks noGrp="1"/>
+          </p:cNvSpPr>
+          <p:nvPr>
+            <p:ph type="body" idx="1"/>
+          </p:nvPr>
+        </p:nvSpPr>
+        <p:spPr/>
+        <p:txBody>
+          <a:bodyPr/>
+          <a:lstStyle/>
+          <a:p>
+            <a:endParaRPr lang="fr-FR"/>
+          </a:p>
+        </p:txBody>
+      </p:sp>
+      <p:sp>
+        <p:nvSpPr>
+          <p:cNvPr id="4" name="Espace réservé du numéro de diapositive 3"/>
+          <p:cNvSpPr>
+            <a:spLocks noGrp="1"/>
+          </p:cNvSpPr>
+          <p:nvPr>
+            <p:ph type="sldNum" sz="quarter" idx="10"/>
+          </p:nvPr>
+        </p:nvSpPr>
+        <p:spPr/>
+        <p:txBody>
+          <a:bodyPr/>
+          <a:lstStyle/>
+          <a:p>
+            <a:fld id="{5984FE70-0D1D-40C7-9F56-3FAF97D50752}" type="slidenum">
+              <a:rPr lang="fr-FR" smtClean="0"/>
+              <a:t>39</a:t>
+            </a:fld>
+            <a:endParaRPr lang="fr-FR"/>
+          </a:p>
+        </p:txBody>
+      </p:sp>
+    </p:spTree>
+    <p:extLst>
+      <p:ext uri="{BB962C8B-B14F-4D97-AF65-F5344CB8AC3E}">
+        <p14:creationId xmlns:p14="http://schemas.microsoft.com/office/powerpoint/2010/main" val="3570101583"/>
       </p:ext>
     </p:extLst>
   </p:cSld>
@@ -14193,7 +14285,7 @@
           <p:nvPr/>
         </p:nvPicPr>
         <p:blipFill>
-          <a:blip r:embed="rId2">
+          <a:blip r:embed="rId3">
             <a:extLst>
               <a:ext uri="{28A0092B-C50C-407E-A947-70E740481C1C}">
                 <a14:useLocalDpi xmlns:a14="http://schemas.microsoft.com/office/drawing/2010/main" val="0"/>

</xml_diff>

<commit_message>
Ajout fonction distance dans le code pour le choix du meilleur cas (RaPC simplifié)
</commit_message>
<xml_diff>
--- a/Travail_realise/Presentations/Utilisation_du_RaPC_pour_la_segmentation_d_images.pptx
+++ b/Travail_realise/Presentations/Utilisation_du_RaPC_pour_la_segmentation_d_images.pptx
@@ -235,7 +235,7 @@
           <a:p>
             <a:fld id="{3BF17BC6-DB60-45E7-9D02-F2D1FB25D0FA}" type="datetimeFigureOut">
               <a:rPr lang="fr-FR" smtClean="0"/>
-              <a:t>24/03/2017</a:t>
+              <a:t>27/03/2017</a:t>
             </a:fld>
             <a:endParaRPr lang="fr-FR"/>
           </a:p>
@@ -1674,6 +1674,30 @@
           <a:bodyPr/>
           <a:lstStyle/>
           <a:p>
+            <a:r>
+              <a:rPr lang="fr-FR" dirty="0" smtClean="0"/>
+              <a:t>Explication du </a:t>
+            </a:r>
+            <a:r>
+              <a:rPr lang="fr-FR" dirty="0" err="1" smtClean="0"/>
+              <a:t>unsharp</a:t>
+            </a:r>
+            <a:r>
+              <a:rPr lang="fr-FR" baseline="0" dirty="0" smtClean="0"/>
+              <a:t> </a:t>
+            </a:r>
+            <a:r>
+              <a:rPr lang="fr-FR" baseline="0" dirty="0" err="1" smtClean="0"/>
+              <a:t>mask</a:t>
+            </a:r>
+            <a:r>
+              <a:rPr lang="fr-FR" baseline="0" dirty="0" smtClean="0"/>
+              <a:t> dans «</a:t>
+            </a:r>
+            <a:r>
+              <a:rPr lang="fr-FR" baseline="0" smtClean="0"/>
+              <a:t> journail_de_travail.txt », 25/03</a:t>
+            </a:r>
             <a:endParaRPr lang="fr-FR"/>
           </a:p>
         </p:txBody>
@@ -2961,7 +2985,7 @@
           <a:p>
             <a:fld id="{B13A3E0C-43BD-4BD3-9D98-E47133C0F16B}" type="datetime1">
               <a:rPr lang="en-US" smtClean="0"/>
-              <a:t>3/24/2017</a:t>
+              <a:t>3/27/2017</a:t>
             </a:fld>
             <a:endParaRPr lang="en-US" dirty="0"/>
           </a:p>
@@ -3257,7 +3281,7 @@
           <a:p>
             <a:fld id="{DEAE60AC-6FB4-4151-AF18-32B957CEA5B2}" type="datetime1">
               <a:rPr lang="en-US" smtClean="0"/>
-              <a:t>3/24/2017</a:t>
+              <a:t>3/27/2017</a:t>
             </a:fld>
             <a:endParaRPr lang="en-US" dirty="0"/>
           </a:p>
@@ -3505,7 +3529,7 @@
           <a:p>
             <a:fld id="{49AF46AD-D75C-4BBC-B0EE-EB1C4A750FFF}" type="datetime1">
               <a:rPr lang="en-US" smtClean="0"/>
-              <a:t>3/24/2017</a:t>
+              <a:t>3/27/2017</a:t>
             </a:fld>
             <a:endParaRPr lang="en-US" dirty="0"/>
           </a:p>
@@ -4045,7 +4069,7 @@
           <a:p>
             <a:fld id="{B3EBDC74-5C10-4051-A6E3-AA9EF5D2777A}" type="datetime1">
               <a:rPr lang="en-US" smtClean="0"/>
-              <a:t>3/24/2017</a:t>
+              <a:t>3/27/2017</a:t>
             </a:fld>
             <a:endParaRPr lang="en-US" dirty="0"/>
           </a:p>
@@ -4293,7 +4317,7 @@
           <a:p>
             <a:fld id="{A45DC689-383C-4C65-9A99-BE249E8E6DA6}" type="datetime1">
               <a:rPr lang="en-US" smtClean="0"/>
-              <a:t>3/24/2017</a:t>
+              <a:t>3/27/2017</a:t>
             </a:fld>
             <a:endParaRPr lang="en-US" dirty="0"/>
           </a:p>
@@ -4825,7 +4849,7 @@
           <a:p>
             <a:fld id="{CD908F51-167A-4815-AAA7-25CFFE4B423B}" type="datetime1">
               <a:rPr lang="en-US" smtClean="0"/>
-              <a:t>3/24/2017</a:t>
+              <a:t>3/27/2017</a:t>
             </a:fld>
             <a:endParaRPr lang="en-US" dirty="0"/>
           </a:p>
@@ -5122,7 +5146,7 @@
           <a:p>
             <a:fld id="{575B863B-5F62-4D1B-A811-2497203129B2}" type="datetime1">
               <a:rPr lang="en-US" smtClean="0"/>
-              <a:t>3/24/2017</a:t>
+              <a:t>3/27/2017</a:t>
             </a:fld>
             <a:endParaRPr lang="en-US" dirty="0"/>
           </a:p>
@@ -5296,7 +5320,7 @@
           <a:p>
             <a:fld id="{2C9DBC4B-3B74-49C1-839E-BABE36E5940B}" type="datetime1">
               <a:rPr lang="en-US" smtClean="0"/>
-              <a:t>3/24/2017</a:t>
+              <a:t>3/27/2017</a:t>
             </a:fld>
             <a:endParaRPr lang="en-US" dirty="0"/>
           </a:p>
@@ -5476,7 +5500,7 @@
           <a:p>
             <a:fld id="{F235FBA5-93E2-443B-A8CE-27C1480288D2}" type="datetime1">
               <a:rPr lang="en-US" smtClean="0"/>
-              <a:t>3/24/2017</a:t>
+              <a:t>3/27/2017</a:t>
             </a:fld>
             <a:endParaRPr lang="en-US" dirty="0"/>
           </a:p>
@@ -5646,7 +5670,7 @@
           <a:p>
             <a:fld id="{41689828-3518-4A8E-AE0E-F7C6B57D9567}" type="datetime1">
               <a:rPr lang="en-US" smtClean="0"/>
-              <a:t>3/24/2017</a:t>
+              <a:t>3/27/2017</a:t>
             </a:fld>
             <a:endParaRPr lang="en-US" dirty="0"/>
           </a:p>
@@ -5897,7 +5921,7 @@
           <a:p>
             <a:fld id="{8049D5B7-E950-4F1F-896A-2428B09F2CC0}" type="datetime1">
               <a:rPr lang="en-US" smtClean="0"/>
-              <a:t>3/24/2017</a:t>
+              <a:t>3/27/2017</a:t>
             </a:fld>
             <a:endParaRPr lang="en-US" dirty="0"/>
           </a:p>
@@ -6194,7 +6218,7 @@
           <a:p>
             <a:fld id="{933C9C39-ED98-4B12-9750-FA3EA5E008D8}" type="datetime1">
               <a:rPr lang="en-US" smtClean="0"/>
-              <a:t>3/24/2017</a:t>
+              <a:t>3/27/2017</a:t>
             </a:fld>
             <a:endParaRPr lang="en-US" dirty="0"/>
           </a:p>
@@ -6636,7 +6660,7 @@
           <a:p>
             <a:fld id="{E9232F9C-7B0D-40AC-879E-D399781AA9DD}" type="datetime1">
               <a:rPr lang="en-US" smtClean="0"/>
-              <a:t>3/24/2017</a:t>
+              <a:t>3/27/2017</a:t>
             </a:fld>
             <a:endParaRPr lang="en-US" dirty="0"/>
           </a:p>
@@ -6754,7 +6778,7 @@
           <a:p>
             <a:fld id="{50646EB0-DC39-4154-9CE8-BEB693E1778F}" type="datetime1">
               <a:rPr lang="en-US" smtClean="0"/>
-              <a:t>3/24/2017</a:t>
+              <a:t>3/27/2017</a:t>
             </a:fld>
             <a:endParaRPr lang="en-US" dirty="0"/>
           </a:p>
@@ -6849,7 +6873,7 @@
           <a:p>
             <a:fld id="{1862B018-388A-4D00-857F-89E0E298EDB9}" type="datetime1">
               <a:rPr lang="en-US" smtClean="0"/>
-              <a:t>3/24/2017</a:t>
+              <a:t>3/27/2017</a:t>
             </a:fld>
             <a:endParaRPr lang="en-US" dirty="0"/>
           </a:p>
@@ -7132,7 +7156,7 @@
           <a:p>
             <a:fld id="{5876601C-147A-40D7-86CA-8C540E946C34}" type="datetime1">
               <a:rPr lang="en-US" smtClean="0"/>
-              <a:t>3/24/2017</a:t>
+              <a:t>3/27/2017</a:t>
             </a:fld>
             <a:endParaRPr lang="en-US" dirty="0"/>
           </a:p>
@@ -7423,7 +7447,7 @@
           <a:p>
             <a:fld id="{B25ACF09-D22D-44AC-9A23-30C84696D0B5}" type="datetime1">
               <a:rPr lang="en-US" smtClean="0"/>
-              <a:t>3/24/2017</a:t>
+              <a:t>3/27/2017</a:t>
             </a:fld>
             <a:endParaRPr lang="en-US" dirty="0"/>
           </a:p>
@@ -7953,7 +7977,7 @@
           <a:p>
             <a:fld id="{ED468347-93DD-4B15-A18F-1C554DAB4580}" type="datetime1">
               <a:rPr lang="en-US" smtClean="0"/>
-              <a:t>3/24/2017</a:t>
+              <a:t>3/27/2017</a:t>
             </a:fld>
             <a:endParaRPr lang="en-US" dirty="0"/>
           </a:p>
@@ -15495,7 +15519,6 @@
               <a:rPr lang="fr-FR" dirty="0" smtClean="0"/>
               <a:t>, </a:t>
             </a:r>
-            <a:endParaRPr lang="fr-FR" dirty="0" smtClean="0"/>
           </a:p>
           <a:p>
             <a:pPr>
@@ -15506,7 +15529,6 @@
               <a:rPr lang="fr-FR" dirty="0" smtClean="0"/>
               <a:t>Un seuil par germe ? Pour plus de précision ?</a:t>
             </a:r>
-            <a:endParaRPr lang="fr-FR" dirty="0" smtClean="0"/>
           </a:p>
           <a:p>
             <a:pPr marL="0" indent="0">
@@ -15650,7 +15672,6 @@
               <a:rPr lang="fr-FR" dirty="0" smtClean="0"/>
               <a:t>Cas d’une image « compliquée » ou de « mauvaise qualité »</a:t>
             </a:r>
-            <a:endParaRPr lang="fr-FR" dirty="0" smtClean="0"/>
           </a:p>
           <a:p>
             <a:pPr marL="0" indent="0">
@@ -15834,7 +15855,6 @@
               <a:rPr lang="fr-FR" dirty="0" smtClean="0"/>
               <a:t>Résultats obtenus : mauvaise segmentation de la tumeur et du rein sein</a:t>
             </a:r>
-            <a:endParaRPr lang="fr-FR" dirty="0" smtClean="0"/>
           </a:p>
           <a:p>
             <a:pPr marL="0" indent="0">
@@ -16283,7 +16303,6 @@
               <a:rPr lang="fr-FR" dirty="0"/>
               <a:t>	</a:t>
             </a:r>
-            <a:endParaRPr lang="fr-FR" dirty="0"/>
           </a:p>
           <a:p>
             <a:pPr marL="0" indent="0">
@@ -16430,7 +16449,6 @@
               <a:rPr lang="fr-FR" dirty="0"/>
               <a:t>	</a:t>
             </a:r>
-            <a:endParaRPr lang="fr-FR" dirty="0"/>
           </a:p>
           <a:p>
             <a:pPr marL="0" indent="0">

</xml_diff>

<commit_message>
ajouts diapo / tests pretraitements
</commit_message>
<xml_diff>
--- a/Travail_realise/Presentations/Utilisation_du_RaPC_pour_la_segmentation_d_images.pptx
+++ b/Travail_realise/Presentations/Utilisation_du_RaPC_pour_la_segmentation_d_images.pptx
@@ -5,7 +5,7 @@
     <p:sldMasterId id="2147483648" r:id="rId1"/>
   </p:sldMasterIdLst>
   <p:notesMasterIdLst>
-    <p:notesMasterId r:id="rId41"/>
+    <p:notesMasterId r:id="rId40"/>
   </p:notesMasterIdLst>
   <p:sldIdLst>
     <p:sldId id="256" r:id="rId2"/>
@@ -33,20 +33,19 @@
     <p:sldId id="280" r:id="rId24"/>
     <p:sldId id="281" r:id="rId25"/>
     <p:sldId id="273" r:id="rId26"/>
-    <p:sldId id="283" r:id="rId27"/>
-    <p:sldId id="285" r:id="rId28"/>
-    <p:sldId id="286" r:id="rId29"/>
-    <p:sldId id="288" r:id="rId30"/>
-    <p:sldId id="287" r:id="rId31"/>
-    <p:sldId id="289" r:id="rId32"/>
-    <p:sldId id="290" r:id="rId33"/>
-    <p:sldId id="291" r:id="rId34"/>
-    <p:sldId id="284" r:id="rId35"/>
-    <p:sldId id="292" r:id="rId36"/>
-    <p:sldId id="293" r:id="rId37"/>
-    <p:sldId id="294" r:id="rId38"/>
-    <p:sldId id="295" r:id="rId39"/>
-    <p:sldId id="296" r:id="rId40"/>
+    <p:sldId id="285" r:id="rId27"/>
+    <p:sldId id="286" r:id="rId28"/>
+    <p:sldId id="288" r:id="rId29"/>
+    <p:sldId id="287" r:id="rId30"/>
+    <p:sldId id="289" r:id="rId31"/>
+    <p:sldId id="290" r:id="rId32"/>
+    <p:sldId id="291" r:id="rId33"/>
+    <p:sldId id="292" r:id="rId34"/>
+    <p:sldId id="293" r:id="rId35"/>
+    <p:sldId id="294" r:id="rId36"/>
+    <p:sldId id="295" r:id="rId37"/>
+    <p:sldId id="296" r:id="rId38"/>
+    <p:sldId id="297" r:id="rId39"/>
   </p:sldIdLst>
   <p:sldSz cx="12192000" cy="6858000"/>
   <p:notesSz cx="6858000" cy="9144000"/>
@@ -235,7 +234,7 @@
           <a:p>
             <a:fld id="{3BF17BC6-DB60-45E7-9D02-F2D1FB25D0FA}" type="datetimeFigureOut">
               <a:rPr lang="fr-FR" smtClean="0"/>
-              <a:t>27/03/2017</a:t>
+              <a:t>29/03/2017</a:t>
             </a:fld>
             <a:endParaRPr lang="fr-FR"/>
           </a:p>
@@ -1286,11 +1285,11 @@
           <a:p>
             <a:r>
               <a:rPr lang="fr-FR" dirty="0" smtClean="0"/>
-              <a:t>Parler</a:t>
+              <a:t>Base de cas avec</a:t>
             </a:r>
             <a:r>
               <a:rPr lang="fr-FR" baseline="0" dirty="0" smtClean="0"/>
-              <a:t> des poids aussi</a:t>
+              <a:t> des poids possiblement ! (expliquer pour la taille)</a:t>
             </a:r>
             <a:endParaRPr lang="fr-FR" dirty="0"/>
           </a:p>
@@ -1313,7 +1312,7 @@
           <a:p>
             <a:fld id="{5984FE70-0D1D-40C7-9F56-3FAF97D50752}" type="slidenum">
               <a:rPr lang="fr-FR" smtClean="0"/>
-              <a:t>29</a:t>
+              <a:t>27</a:t>
             </a:fld>
             <a:endParaRPr lang="fr-FR"/>
           </a:p>
@@ -1322,7 +1321,7 @@
     </p:spTree>
     <p:extLst>
       <p:ext uri="{BB962C8B-B14F-4D97-AF65-F5344CB8AC3E}">
-        <p14:creationId xmlns:p14="http://schemas.microsoft.com/office/powerpoint/2010/main" val="3405939330"/>
+        <p14:creationId xmlns:p14="http://schemas.microsoft.com/office/powerpoint/2010/main" val="438759733"/>
       </p:ext>
     </p:extLst>
   </p:cSld>
@@ -1376,6 +1375,14 @@
           <a:bodyPr/>
           <a:lstStyle/>
           <a:p>
+            <a:r>
+              <a:rPr lang="fr-FR" dirty="0" smtClean="0"/>
+              <a:t>Parler</a:t>
+            </a:r>
+            <a:r>
+              <a:rPr lang="fr-FR" baseline="0" dirty="0" smtClean="0"/>
+              <a:t> des poids aussi</a:t>
+            </a:r>
             <a:endParaRPr lang="fr-FR" dirty="0"/>
           </a:p>
         </p:txBody>
@@ -1397,7 +1404,7 @@
           <a:p>
             <a:fld id="{5984FE70-0D1D-40C7-9F56-3FAF97D50752}" type="slidenum">
               <a:rPr lang="fr-FR" smtClean="0"/>
-              <a:t>32</a:t>
+              <a:t>28</a:t>
             </a:fld>
             <a:endParaRPr lang="fr-FR"/>
           </a:p>
@@ -1406,7 +1413,7 @@
     </p:spTree>
     <p:extLst>
       <p:ext uri="{BB962C8B-B14F-4D97-AF65-F5344CB8AC3E}">
-        <p14:creationId xmlns:p14="http://schemas.microsoft.com/office/powerpoint/2010/main" val="3029521272"/>
+        <p14:creationId xmlns:p14="http://schemas.microsoft.com/office/powerpoint/2010/main" val="3405939330"/>
       </p:ext>
     </p:extLst>
   </p:cSld>
@@ -1460,20 +1467,6 @@
           <a:bodyPr/>
           <a:lstStyle/>
           <a:p>
-            <a:r>
-              <a:rPr lang="fr-FR" dirty="0" smtClean="0"/>
-              <a:t>Tumeur : seuils trop</a:t>
-            </a:r>
-            <a:r>
-              <a:rPr lang="fr-FR" baseline="0" dirty="0" smtClean="0"/>
-              <a:t> permissifs</a:t>
-            </a:r>
-          </a:p>
-          <a:p>
-            <a:r>
-              <a:rPr lang="fr-FR" baseline="0" dirty="0" smtClean="0"/>
-              <a:t>Rein : seuils trop contraignants</a:t>
-            </a:r>
             <a:endParaRPr lang="fr-FR" dirty="0"/>
           </a:p>
         </p:txBody>
@@ -1495,7 +1488,7 @@
           <a:p>
             <a:fld id="{5984FE70-0D1D-40C7-9F56-3FAF97D50752}" type="slidenum">
               <a:rPr lang="fr-FR" smtClean="0"/>
-              <a:t>36</a:t>
+              <a:t>31</a:t>
             </a:fld>
             <a:endParaRPr lang="fr-FR"/>
           </a:p>
@@ -1504,7 +1497,7 @@
     </p:spTree>
     <p:extLst>
       <p:ext uri="{BB962C8B-B14F-4D97-AF65-F5344CB8AC3E}">
-        <p14:creationId xmlns:p14="http://schemas.microsoft.com/office/powerpoint/2010/main" val="316203356"/>
+        <p14:creationId xmlns:p14="http://schemas.microsoft.com/office/powerpoint/2010/main" val="3029521272"/>
       </p:ext>
     </p:extLst>
   </p:cSld>
@@ -1676,6 +1669,104 @@
           <a:p>
             <a:r>
               <a:rPr lang="fr-FR" dirty="0" smtClean="0"/>
+              <a:t>Tumeur : seuils trop</a:t>
+            </a:r>
+            <a:r>
+              <a:rPr lang="fr-FR" baseline="0" dirty="0" smtClean="0"/>
+              <a:t> permissifs</a:t>
+            </a:r>
+          </a:p>
+          <a:p>
+            <a:r>
+              <a:rPr lang="fr-FR" baseline="0" dirty="0" smtClean="0"/>
+              <a:t>Rein : seuils trop contraignants</a:t>
+            </a:r>
+            <a:endParaRPr lang="fr-FR" dirty="0"/>
+          </a:p>
+        </p:txBody>
+      </p:sp>
+      <p:sp>
+        <p:nvSpPr>
+          <p:cNvPr id="4" name="Espace réservé du numéro de diapositive 3"/>
+          <p:cNvSpPr>
+            <a:spLocks noGrp="1"/>
+          </p:cNvSpPr>
+          <p:nvPr>
+            <p:ph type="sldNum" sz="quarter" idx="10"/>
+          </p:nvPr>
+        </p:nvSpPr>
+        <p:spPr/>
+        <p:txBody>
+          <a:bodyPr/>
+          <a:lstStyle/>
+          <a:p>
+            <a:fld id="{5984FE70-0D1D-40C7-9F56-3FAF97D50752}" type="slidenum">
+              <a:rPr lang="fr-FR" smtClean="0"/>
+              <a:t>34</a:t>
+            </a:fld>
+            <a:endParaRPr lang="fr-FR"/>
+          </a:p>
+        </p:txBody>
+      </p:sp>
+    </p:spTree>
+    <p:extLst>
+      <p:ext uri="{BB962C8B-B14F-4D97-AF65-F5344CB8AC3E}">
+        <p14:creationId xmlns:p14="http://schemas.microsoft.com/office/powerpoint/2010/main" val="316203356"/>
+      </p:ext>
+    </p:extLst>
+  </p:cSld>
+  <p:clrMapOvr>
+    <a:masterClrMapping/>
+  </p:clrMapOvr>
+</p:notes>
+</file>
+
+<file path=ppt/notesSlides/notesSlide21.xml><?xml version="1.0" encoding="utf-8"?>
+<p:notes xmlns:a="http://schemas.openxmlformats.org/drawingml/2006/main" xmlns:r="http://schemas.openxmlformats.org/officeDocument/2006/relationships" xmlns:p="http://schemas.openxmlformats.org/presentationml/2006/main">
+  <p:cSld>
+    <p:spTree>
+      <p:nvGrpSpPr>
+        <p:cNvPr id="1" name=""/>
+        <p:cNvGrpSpPr/>
+        <p:nvPr/>
+      </p:nvGrpSpPr>
+      <p:grpSpPr>
+        <a:xfrm>
+          <a:off x="0" y="0"/>
+          <a:ext cx="0" cy="0"/>
+          <a:chOff x="0" y="0"/>
+          <a:chExt cx="0" cy="0"/>
+        </a:xfrm>
+      </p:grpSpPr>
+      <p:sp>
+        <p:nvSpPr>
+          <p:cNvPr id="2" name="Espace réservé de l'image des diapositives 1"/>
+          <p:cNvSpPr>
+            <a:spLocks noGrp="1" noRot="1" noChangeAspect="1"/>
+          </p:cNvSpPr>
+          <p:nvPr>
+            <p:ph type="sldImg"/>
+          </p:nvPr>
+        </p:nvSpPr>
+        <p:spPr/>
+      </p:sp>
+      <p:sp>
+        <p:nvSpPr>
+          <p:cNvPr id="3" name="Espace réservé des commentaires 2"/>
+          <p:cNvSpPr>
+            <a:spLocks noGrp="1"/>
+          </p:cNvSpPr>
+          <p:nvPr>
+            <p:ph type="body" idx="1"/>
+          </p:nvPr>
+        </p:nvSpPr>
+        <p:spPr/>
+        <p:txBody>
+          <a:bodyPr/>
+          <a:lstStyle/>
+          <a:p>
+            <a:r>
+              <a:rPr lang="fr-FR" dirty="0" smtClean="0"/>
               <a:t>Explication du </a:t>
             </a:r>
             <a:r>
@@ -1692,13 +1783,31 @@
             </a:r>
             <a:r>
               <a:rPr lang="fr-FR" baseline="0" dirty="0" smtClean="0"/>
-              <a:t> dans «</a:t>
-            </a:r>
-            <a:r>
-              <a:rPr lang="fr-FR" baseline="0" smtClean="0"/>
-              <a:t> journail_de_travail.txt », 25/03</a:t>
-            </a:r>
-            <a:endParaRPr lang="fr-FR"/>
+              <a:t> dans « journail_de_travail.txt », </a:t>
+            </a:r>
+            <a:r>
+              <a:rPr lang="fr-FR" baseline="0" dirty="0" smtClean="0"/>
+              <a:t>25/03</a:t>
+            </a:r>
+          </a:p>
+          <a:p>
+            <a:r>
+              <a:rPr lang="fr-FR" baseline="0" dirty="0" smtClean="0"/>
+              <a:t>Problème : Un prétraitement pour une image n’est pas forcément bon pour une autre ! </a:t>
+            </a:r>
+          </a:p>
+          <a:p>
+            <a:r>
+              <a:rPr lang="fr-FR" baseline="0" dirty="0" smtClean="0"/>
+              <a:t>Adapter les prétraitement à l’image </a:t>
+            </a:r>
+            <a:r>
+              <a:rPr lang="fr-FR" baseline="0" dirty="0" smtClean="0">
+                <a:sym typeface="Wingdings" panose="05000000000000000000" pitchFamily="2" charset="2"/>
+              </a:rPr>
+              <a:t> nouvelle partie solution dans le RàPC ?</a:t>
+            </a:r>
+            <a:endParaRPr lang="fr-FR" dirty="0"/>
           </a:p>
         </p:txBody>
       </p:sp>
@@ -1719,7 +1828,7 @@
           <a:p>
             <a:fld id="{5984FE70-0D1D-40C7-9F56-3FAF97D50752}" type="slidenum">
               <a:rPr lang="fr-FR" smtClean="0"/>
-              <a:t>39</a:t>
+              <a:t>37</a:t>
             </a:fld>
             <a:endParaRPr lang="fr-FR"/>
           </a:p>
@@ -1729,6 +1838,93 @@
     <p:extLst>
       <p:ext uri="{BB962C8B-B14F-4D97-AF65-F5344CB8AC3E}">
         <p14:creationId xmlns:p14="http://schemas.microsoft.com/office/powerpoint/2010/main" val="3570101583"/>
+      </p:ext>
+    </p:extLst>
+  </p:cSld>
+  <p:clrMapOvr>
+    <a:masterClrMapping/>
+  </p:clrMapOvr>
+</p:notes>
+</file>
+
+<file path=ppt/notesSlides/notesSlide22.xml><?xml version="1.0" encoding="utf-8"?>
+<p:notes xmlns:a="http://schemas.openxmlformats.org/drawingml/2006/main" xmlns:r="http://schemas.openxmlformats.org/officeDocument/2006/relationships" xmlns:p="http://schemas.openxmlformats.org/presentationml/2006/main">
+  <p:cSld>
+    <p:spTree>
+      <p:nvGrpSpPr>
+        <p:cNvPr id="1" name=""/>
+        <p:cNvGrpSpPr/>
+        <p:nvPr/>
+      </p:nvGrpSpPr>
+      <p:grpSpPr>
+        <a:xfrm>
+          <a:off x="0" y="0"/>
+          <a:ext cx="0" cy="0"/>
+          <a:chOff x="0" y="0"/>
+          <a:chExt cx="0" cy="0"/>
+        </a:xfrm>
+      </p:grpSpPr>
+      <p:sp>
+        <p:nvSpPr>
+          <p:cNvPr id="2" name="Espace réservé de l'image des diapositives 1"/>
+          <p:cNvSpPr>
+            <a:spLocks noGrp="1" noRot="1" noChangeAspect="1"/>
+          </p:cNvSpPr>
+          <p:nvPr>
+            <p:ph type="sldImg"/>
+          </p:nvPr>
+        </p:nvSpPr>
+        <p:spPr/>
+      </p:sp>
+      <p:sp>
+        <p:nvSpPr>
+          <p:cNvPr id="3" name="Espace réservé des commentaires 2"/>
+          <p:cNvSpPr>
+            <a:spLocks noGrp="1"/>
+          </p:cNvSpPr>
+          <p:nvPr>
+            <p:ph type="body" idx="1"/>
+          </p:nvPr>
+        </p:nvSpPr>
+        <p:spPr/>
+        <p:txBody>
+          <a:bodyPr/>
+          <a:lstStyle/>
+          <a:p>
+            <a:r>
+              <a:rPr lang="fr-FR" dirty="0" smtClean="0"/>
+              <a:t>Expliquer pour la taille</a:t>
+            </a:r>
+          </a:p>
+        </p:txBody>
+      </p:sp>
+      <p:sp>
+        <p:nvSpPr>
+          <p:cNvPr id="4" name="Espace réservé du numéro de diapositive 3"/>
+          <p:cNvSpPr>
+            <a:spLocks noGrp="1"/>
+          </p:cNvSpPr>
+          <p:nvPr>
+            <p:ph type="sldNum" sz="quarter" idx="10"/>
+          </p:nvPr>
+        </p:nvSpPr>
+        <p:spPr/>
+        <p:txBody>
+          <a:bodyPr/>
+          <a:lstStyle/>
+          <a:p>
+            <a:fld id="{5984FE70-0D1D-40C7-9F56-3FAF97D50752}" type="slidenum">
+              <a:rPr lang="fr-FR" smtClean="0"/>
+              <a:t>38</a:t>
+            </a:fld>
+            <a:endParaRPr lang="fr-FR"/>
+          </a:p>
+        </p:txBody>
+      </p:sp>
+    </p:spTree>
+    <p:extLst>
+      <p:ext uri="{BB962C8B-B14F-4D97-AF65-F5344CB8AC3E}">
+        <p14:creationId xmlns:p14="http://schemas.microsoft.com/office/powerpoint/2010/main" val="1731759716"/>
       </p:ext>
     </p:extLst>
   </p:cSld>
@@ -2985,7 +3181,7 @@
           <a:p>
             <a:fld id="{B13A3E0C-43BD-4BD3-9D98-E47133C0F16B}" type="datetime1">
               <a:rPr lang="en-US" smtClean="0"/>
-              <a:t>3/27/2017</a:t>
+              <a:t>3/29/2017</a:t>
             </a:fld>
             <a:endParaRPr lang="en-US" dirty="0"/>
           </a:p>
@@ -3281,7 +3477,7 @@
           <a:p>
             <a:fld id="{DEAE60AC-6FB4-4151-AF18-32B957CEA5B2}" type="datetime1">
               <a:rPr lang="en-US" smtClean="0"/>
-              <a:t>3/27/2017</a:t>
+              <a:t>3/29/2017</a:t>
             </a:fld>
             <a:endParaRPr lang="en-US" dirty="0"/>
           </a:p>
@@ -3529,7 +3725,7 @@
           <a:p>
             <a:fld id="{49AF46AD-D75C-4BBC-B0EE-EB1C4A750FFF}" type="datetime1">
               <a:rPr lang="en-US" smtClean="0"/>
-              <a:t>3/27/2017</a:t>
+              <a:t>3/29/2017</a:t>
             </a:fld>
             <a:endParaRPr lang="en-US" dirty="0"/>
           </a:p>
@@ -4069,7 +4265,7 @@
           <a:p>
             <a:fld id="{B3EBDC74-5C10-4051-A6E3-AA9EF5D2777A}" type="datetime1">
               <a:rPr lang="en-US" smtClean="0"/>
-              <a:t>3/27/2017</a:t>
+              <a:t>3/29/2017</a:t>
             </a:fld>
             <a:endParaRPr lang="en-US" dirty="0"/>
           </a:p>
@@ -4317,7 +4513,7 @@
           <a:p>
             <a:fld id="{A45DC689-383C-4C65-9A99-BE249E8E6DA6}" type="datetime1">
               <a:rPr lang="en-US" smtClean="0"/>
-              <a:t>3/27/2017</a:t>
+              <a:t>3/29/2017</a:t>
             </a:fld>
             <a:endParaRPr lang="en-US" dirty="0"/>
           </a:p>
@@ -4849,7 +5045,7 @@
           <a:p>
             <a:fld id="{CD908F51-167A-4815-AAA7-25CFFE4B423B}" type="datetime1">
               <a:rPr lang="en-US" smtClean="0"/>
-              <a:t>3/27/2017</a:t>
+              <a:t>3/29/2017</a:t>
             </a:fld>
             <a:endParaRPr lang="en-US" dirty="0"/>
           </a:p>
@@ -5146,7 +5342,7 @@
           <a:p>
             <a:fld id="{575B863B-5F62-4D1B-A811-2497203129B2}" type="datetime1">
               <a:rPr lang="en-US" smtClean="0"/>
-              <a:t>3/27/2017</a:t>
+              <a:t>3/29/2017</a:t>
             </a:fld>
             <a:endParaRPr lang="en-US" dirty="0"/>
           </a:p>
@@ -5320,7 +5516,7 @@
           <a:p>
             <a:fld id="{2C9DBC4B-3B74-49C1-839E-BABE36E5940B}" type="datetime1">
               <a:rPr lang="en-US" smtClean="0"/>
-              <a:t>3/27/2017</a:t>
+              <a:t>3/29/2017</a:t>
             </a:fld>
             <a:endParaRPr lang="en-US" dirty="0"/>
           </a:p>
@@ -5500,7 +5696,7 @@
           <a:p>
             <a:fld id="{F235FBA5-93E2-443B-A8CE-27C1480288D2}" type="datetime1">
               <a:rPr lang="en-US" smtClean="0"/>
-              <a:t>3/27/2017</a:t>
+              <a:t>3/29/2017</a:t>
             </a:fld>
             <a:endParaRPr lang="en-US" dirty="0"/>
           </a:p>
@@ -5670,7 +5866,7 @@
           <a:p>
             <a:fld id="{41689828-3518-4A8E-AE0E-F7C6B57D9567}" type="datetime1">
               <a:rPr lang="en-US" smtClean="0"/>
-              <a:t>3/27/2017</a:t>
+              <a:t>3/29/2017</a:t>
             </a:fld>
             <a:endParaRPr lang="en-US" dirty="0"/>
           </a:p>
@@ -5921,7 +6117,7 @@
           <a:p>
             <a:fld id="{8049D5B7-E950-4F1F-896A-2428B09F2CC0}" type="datetime1">
               <a:rPr lang="en-US" smtClean="0"/>
-              <a:t>3/27/2017</a:t>
+              <a:t>3/29/2017</a:t>
             </a:fld>
             <a:endParaRPr lang="en-US" dirty="0"/>
           </a:p>
@@ -6218,7 +6414,7 @@
           <a:p>
             <a:fld id="{933C9C39-ED98-4B12-9750-FA3EA5E008D8}" type="datetime1">
               <a:rPr lang="en-US" smtClean="0"/>
-              <a:t>3/27/2017</a:t>
+              <a:t>3/29/2017</a:t>
             </a:fld>
             <a:endParaRPr lang="en-US" dirty="0"/>
           </a:p>
@@ -6660,7 +6856,7 @@
           <a:p>
             <a:fld id="{E9232F9C-7B0D-40AC-879E-D399781AA9DD}" type="datetime1">
               <a:rPr lang="en-US" smtClean="0"/>
-              <a:t>3/27/2017</a:t>
+              <a:t>3/29/2017</a:t>
             </a:fld>
             <a:endParaRPr lang="en-US" dirty="0"/>
           </a:p>
@@ -6778,7 +6974,7 @@
           <a:p>
             <a:fld id="{50646EB0-DC39-4154-9CE8-BEB693E1778F}" type="datetime1">
               <a:rPr lang="en-US" smtClean="0"/>
-              <a:t>3/27/2017</a:t>
+              <a:t>3/29/2017</a:t>
             </a:fld>
             <a:endParaRPr lang="en-US" dirty="0"/>
           </a:p>
@@ -6873,7 +7069,7 @@
           <a:p>
             <a:fld id="{1862B018-388A-4D00-857F-89E0E298EDB9}" type="datetime1">
               <a:rPr lang="en-US" smtClean="0"/>
-              <a:t>3/27/2017</a:t>
+              <a:t>3/29/2017</a:t>
             </a:fld>
             <a:endParaRPr lang="en-US" dirty="0"/>
           </a:p>
@@ -7156,7 +7352,7 @@
           <a:p>
             <a:fld id="{5876601C-147A-40D7-86CA-8C540E946C34}" type="datetime1">
               <a:rPr lang="en-US" smtClean="0"/>
-              <a:t>3/27/2017</a:t>
+              <a:t>3/29/2017</a:t>
             </a:fld>
             <a:endParaRPr lang="en-US" dirty="0"/>
           </a:p>
@@ -7447,7 +7643,7 @@
           <a:p>
             <a:fld id="{B25ACF09-D22D-44AC-9A23-30C84696D0B5}" type="datetime1">
               <a:rPr lang="en-US" smtClean="0"/>
-              <a:t>3/27/2017</a:t>
+              <a:t>3/29/2017</a:t>
             </a:fld>
             <a:endParaRPr lang="en-US" dirty="0"/>
           </a:p>
@@ -7977,7 +8173,7 @@
           <a:p>
             <a:fld id="{ED468347-93DD-4B15-A18F-1C554DAB4580}" type="datetime1">
               <a:rPr lang="en-US" smtClean="0"/>
-              <a:t>3/27/2017</a:t>
+              <a:t>3/29/2017</a:t>
             </a:fld>
             <a:endParaRPr lang="en-US" dirty="0"/>
           </a:p>
@@ -13412,117 +13608,82 @@
         </p:spPr>
         <p:txBody>
           <a:bodyPr anchor="t">
-            <a:normAutofit fontScale="92500" lnSpcReduction="10000"/>
+            <a:normAutofit/>
           </a:bodyPr>
           <a:lstStyle/>
           <a:p>
-            <a:pPr marL="0" indent="0">
+            <a:r>
+              <a:rPr lang="fr-FR" dirty="0" smtClean="0"/>
+              <a:t>ImageJ </a:t>
+            </a:r>
+            <a:r>
+              <a:rPr lang="fr-FR" dirty="0" smtClean="0">
+                <a:sym typeface="Wingdings" panose="05000000000000000000" pitchFamily="2" charset="2"/>
+              </a:rPr>
+              <a:t> Java</a:t>
+            </a:r>
+          </a:p>
+          <a:p>
+            <a:pPr lvl="1"/>
+            <a:r>
+              <a:rPr lang="fr-FR" dirty="0" smtClean="0">
+                <a:sym typeface="Wingdings" panose="05000000000000000000" pitchFamily="2" charset="2"/>
+              </a:rPr>
+              <a:t>Simple</a:t>
+            </a:r>
+          </a:p>
+          <a:p>
+            <a:pPr lvl="1"/>
+            <a:r>
+              <a:rPr lang="fr-FR" dirty="0" smtClean="0">
+                <a:sym typeface="Wingdings" panose="05000000000000000000" pitchFamily="2" charset="2"/>
+              </a:rPr>
+              <a:t>Contient des filtres existants</a:t>
+            </a:r>
+          </a:p>
+          <a:p>
+            <a:pPr lvl="1"/>
+            <a:r>
+              <a:rPr lang="fr-FR" dirty="0" smtClean="0">
+                <a:sym typeface="Wingdings" panose="05000000000000000000" pitchFamily="2" charset="2"/>
+              </a:rPr>
+              <a:t>Gestion E/S facile</a:t>
+            </a:r>
+          </a:p>
+          <a:p>
+            <a:pPr lvl="1"/>
+            <a:r>
+              <a:rPr lang="fr-FR" dirty="0" smtClean="0">
+                <a:sym typeface="Wingdings" panose="05000000000000000000" pitchFamily="2" charset="2"/>
+              </a:rPr>
+              <a:t>Environnement de développement</a:t>
+            </a:r>
+          </a:p>
+          <a:p>
+            <a:pPr lvl="1"/>
+            <a:r>
+              <a:rPr lang="fr-FR" dirty="0" smtClean="0">
+                <a:sym typeface="Wingdings" panose="05000000000000000000" pitchFamily="2" charset="2"/>
+              </a:rPr>
+              <a:t>Java pas le plus adapté dans le TI</a:t>
+            </a:r>
+          </a:p>
+          <a:p>
+            <a:pPr marL="457200" lvl="1" indent="0">
               <a:buNone/>
             </a:pPr>
-            <a:r>
-              <a:rPr lang="fr-FR" dirty="0" smtClean="0"/>
-              <a:t>TODO</a:t>
-            </a:r>
-          </a:p>
-          <a:p>
-            <a:pPr>
-              <a:buFontTx/>
-              <a:buChar char="-"/>
-            </a:pPr>
-            <a:r>
-              <a:rPr lang="fr-FR" dirty="0" smtClean="0"/>
-              <a:t>Montrer comment j’ai codé : </a:t>
-            </a:r>
-          </a:p>
-          <a:p>
-            <a:pPr lvl="1">
-              <a:buFontTx/>
-              <a:buChar char="-"/>
-            </a:pPr>
-            <a:r>
-              <a:rPr lang="fr-FR" dirty="0" smtClean="0"/>
-              <a:t>ImageJ</a:t>
-            </a:r>
-          </a:p>
-          <a:p>
-            <a:pPr lvl="1">
-              <a:buFontTx/>
-              <a:buChar char="-"/>
-            </a:pPr>
-            <a:r>
-              <a:rPr lang="fr-FR" dirty="0" smtClean="0"/>
-              <a:t>UML</a:t>
-            </a:r>
-          </a:p>
-          <a:p>
-            <a:pPr lvl="1">
-              <a:buFontTx/>
-              <a:buChar char="-"/>
-            </a:pPr>
-            <a:r>
-              <a:rPr lang="fr-FR" dirty="0" smtClean="0"/>
-              <a:t>Base de cas </a:t>
-            </a:r>
-          </a:p>
-          <a:p>
-            <a:pPr lvl="1">
-              <a:buFontTx/>
-              <a:buChar char="-"/>
-            </a:pPr>
-            <a:r>
-              <a:rPr lang="fr-FR" dirty="0" smtClean="0"/>
-              <a:t>E/S</a:t>
-            </a:r>
-          </a:p>
-          <a:p>
-            <a:pPr lvl="1">
-              <a:buFontTx/>
-              <a:buChar char="-"/>
-            </a:pPr>
-            <a:r>
-              <a:rPr lang="fr-FR" dirty="0" smtClean="0"/>
-              <a:t>Exécution</a:t>
-            </a:r>
-          </a:p>
-          <a:p>
-            <a:pPr lvl="1">
-              <a:buFontTx/>
-              <a:buChar char="-"/>
-            </a:pPr>
-            <a:r>
-              <a:rPr lang="fr-FR" dirty="0" smtClean="0"/>
-              <a:t>Couleurs</a:t>
-            </a:r>
-          </a:p>
-          <a:p>
-            <a:pPr lvl="1">
-              <a:buFontTx/>
-              <a:buChar char="-"/>
-            </a:pPr>
-            <a:r>
-              <a:rPr lang="fr-FR" dirty="0" smtClean="0"/>
-              <a:t>Ouverture</a:t>
-            </a:r>
-          </a:p>
-          <a:p>
-            <a:pPr lvl="1">
-              <a:buFontTx/>
-              <a:buChar char="-"/>
-            </a:pPr>
-            <a:r>
-              <a:rPr lang="fr-FR" dirty="0" smtClean="0"/>
-              <a:t>Fusion possible des régions</a:t>
-            </a:r>
-          </a:p>
-          <a:p>
-            <a:pPr lvl="1">
-              <a:buFontTx/>
-              <a:buChar char="-"/>
-            </a:pPr>
-            <a:r>
-              <a:rPr lang="fr-FR" dirty="0" smtClean="0"/>
-              <a:t>Etc.</a:t>
-            </a:r>
+            <a:endParaRPr lang="fr-FR" dirty="0" smtClean="0">
+              <a:sym typeface="Wingdings" panose="05000000000000000000" pitchFamily="2" charset="2"/>
+            </a:endParaRPr>
+          </a:p>
+          <a:p>
+            <a:pPr lvl="1"/>
+            <a:endParaRPr lang="fr-FR" dirty="0" smtClean="0">
+              <a:sym typeface="Wingdings" panose="05000000000000000000" pitchFamily="2" charset="2"/>
+            </a:endParaRPr>
+          </a:p>
+          <a:p>
+            <a:pPr lvl="1"/>
             <a:endParaRPr lang="fr-FR" dirty="0"/>
           </a:p>
           <a:p>
@@ -13563,10 +13724,240 @@
           </a:p>
         </p:txBody>
       </p:sp>
+      <p:pic>
+        <p:nvPicPr>
+          <p:cNvPr id="4" name="Image 3"/>
+          <p:cNvPicPr>
+            <a:picLocks noChangeAspect="1"/>
+          </p:cNvPicPr>
+          <p:nvPr/>
+        </p:nvPicPr>
+        <p:blipFill>
+          <a:blip r:embed="rId2">
+            <a:extLst>
+              <a:ext uri="{28A0092B-C50C-407E-A947-70E740481C1C}">
+                <a14:useLocalDpi xmlns:a14="http://schemas.microsoft.com/office/drawing/2010/main" val="0"/>
+              </a:ext>
+            </a:extLst>
+          </a:blip>
+          <a:stretch>
+            <a:fillRect/>
+          </a:stretch>
+        </p:blipFill>
+        <p:spPr>
+          <a:xfrm>
+            <a:off x="5897205" y="3909848"/>
+            <a:ext cx="338769" cy="338769"/>
+          </a:xfrm>
+          <a:prstGeom prst="rect">
+            <a:avLst/>
+          </a:prstGeom>
+        </p:spPr>
+      </p:pic>
+      <p:pic>
+        <p:nvPicPr>
+          <p:cNvPr id="6" name="Image 5"/>
+          <p:cNvPicPr>
+            <a:picLocks noChangeAspect="1"/>
+          </p:cNvPicPr>
+          <p:nvPr/>
+        </p:nvPicPr>
+        <p:blipFill>
+          <a:blip r:embed="rId2">
+            <a:extLst>
+              <a:ext uri="{28A0092B-C50C-407E-A947-70E740481C1C}">
+                <a14:useLocalDpi xmlns:a14="http://schemas.microsoft.com/office/drawing/2010/main" val="0"/>
+              </a:ext>
+            </a:extLst>
+          </a:blip>
+          <a:stretch>
+            <a:fillRect/>
+          </a:stretch>
+        </p:blipFill>
+        <p:spPr>
+          <a:xfrm>
+            <a:off x="6066589" y="3438101"/>
+            <a:ext cx="338769" cy="338769"/>
+          </a:xfrm>
+          <a:prstGeom prst="rect">
+            <a:avLst/>
+          </a:prstGeom>
+        </p:spPr>
+      </p:pic>
+      <p:pic>
+        <p:nvPicPr>
+          <p:cNvPr id="7" name="Image 6"/>
+          <p:cNvPicPr>
+            <a:picLocks noChangeAspect="1"/>
+          </p:cNvPicPr>
+          <p:nvPr/>
+        </p:nvPicPr>
+        <p:blipFill>
+          <a:blip r:embed="rId3">
+            <a:extLst>
+              <a:ext uri="{28A0092B-C50C-407E-A947-70E740481C1C}">
+                <a14:useLocalDpi xmlns:a14="http://schemas.microsoft.com/office/drawing/2010/main" val="0"/>
+              </a:ext>
+            </a:extLst>
+          </a:blip>
+          <a:stretch>
+            <a:fillRect/>
+          </a:stretch>
+        </p:blipFill>
+        <p:spPr>
+          <a:xfrm>
+            <a:off x="4212412" y="2966915"/>
+            <a:ext cx="438414" cy="354019"/>
+          </a:xfrm>
+          <a:prstGeom prst="rect">
+            <a:avLst/>
+          </a:prstGeom>
+        </p:spPr>
+      </p:pic>
+      <p:pic>
+        <p:nvPicPr>
+          <p:cNvPr id="8" name="Image 7"/>
+          <p:cNvPicPr>
+            <a:picLocks noChangeAspect="1"/>
+          </p:cNvPicPr>
+          <p:nvPr/>
+        </p:nvPicPr>
+        <p:blipFill>
+          <a:blip r:embed="rId3">
+            <a:extLst>
+              <a:ext uri="{28A0092B-C50C-407E-A947-70E740481C1C}">
+                <a14:useLocalDpi xmlns:a14="http://schemas.microsoft.com/office/drawing/2010/main" val="0"/>
+              </a:ext>
+            </a:extLst>
+          </a:blip>
+          <a:stretch>
+            <a:fillRect/>
+          </a:stretch>
+        </p:blipFill>
+        <p:spPr>
+          <a:xfrm>
+            <a:off x="5458791" y="2581364"/>
+            <a:ext cx="438414" cy="354019"/>
+          </a:xfrm>
+          <a:prstGeom prst="rect">
+            <a:avLst/>
+          </a:prstGeom>
+        </p:spPr>
+      </p:pic>
+      <p:pic>
+        <p:nvPicPr>
+          <p:cNvPr id="9" name="Image 8"/>
+          <p:cNvPicPr>
+            <a:picLocks noChangeAspect="1"/>
+          </p:cNvPicPr>
+          <p:nvPr/>
+        </p:nvPicPr>
+        <p:blipFill>
+          <a:blip r:embed="rId3">
+            <a:extLst>
+              <a:ext uri="{28A0092B-C50C-407E-A947-70E740481C1C}">
+                <a14:useLocalDpi xmlns:a14="http://schemas.microsoft.com/office/drawing/2010/main" val="0"/>
+              </a:ext>
+            </a:extLst>
+          </a:blip>
+          <a:stretch>
+            <a:fillRect/>
+          </a:stretch>
+        </p:blipFill>
+        <p:spPr>
+          <a:xfrm>
+            <a:off x="3150868" y="2159875"/>
+            <a:ext cx="438414" cy="354019"/>
+          </a:xfrm>
+          <a:prstGeom prst="rect">
+            <a:avLst/>
+          </a:prstGeom>
+        </p:spPr>
+      </p:pic>
+      <p:pic>
+        <p:nvPicPr>
+          <p:cNvPr id="10" name="Image 9"/>
+          <p:cNvPicPr>
+            <a:picLocks noChangeAspect="1"/>
+          </p:cNvPicPr>
+          <p:nvPr/>
+        </p:nvPicPr>
+        <p:blipFill>
+          <a:blip r:embed="rId4">
+            <a:extLst>
+              <a:ext uri="{28A0092B-C50C-407E-A947-70E740481C1C}">
+                <a14:useLocalDpi xmlns:a14="http://schemas.microsoft.com/office/drawing/2010/main" val="0"/>
+              </a:ext>
+            </a:extLst>
+          </a:blip>
+          <a:stretch>
+            <a:fillRect/>
+          </a:stretch>
+        </p:blipFill>
+        <p:spPr>
+          <a:xfrm>
+            <a:off x="8625307" y="1200553"/>
+            <a:ext cx="1867161" cy="3886742"/>
+          </a:xfrm>
+          <a:prstGeom prst="rect">
+            <a:avLst/>
+          </a:prstGeom>
+          <a:ln>
+            <a:noFill/>
+          </a:ln>
+          <a:effectLst>
+            <a:outerShdw blurRad="292100" dist="139700" dir="2700000" algn="tl" rotWithShape="0">
+              <a:srgbClr val="333333">
+                <a:alpha val="65000"/>
+              </a:srgbClr>
+            </a:outerShdw>
+          </a:effectLst>
+        </p:spPr>
+      </p:pic>
+      <p:pic>
+        <p:nvPicPr>
+          <p:cNvPr id="12" name="Image 11"/>
+          <p:cNvPicPr>
+            <a:picLocks noChangeAspect="1"/>
+          </p:cNvPicPr>
+          <p:nvPr/>
+        </p:nvPicPr>
+        <p:blipFill>
+          <a:blip r:embed="rId5">
+            <a:extLst>
+              <a:ext uri="{28A0092B-C50C-407E-A947-70E740481C1C}">
+                <a14:useLocalDpi xmlns:a14="http://schemas.microsoft.com/office/drawing/2010/main" val="0"/>
+              </a:ext>
+            </a:extLst>
+          </a:blip>
+          <a:stretch>
+            <a:fillRect/>
+          </a:stretch>
+        </p:blipFill>
+        <p:spPr>
+          <a:xfrm>
+            <a:off x="2855907" y="4581036"/>
+            <a:ext cx="2071254" cy="2071254"/>
+          </a:xfrm>
+          <a:prstGeom prst="rect">
+            <a:avLst/>
+          </a:prstGeom>
+          <a:ln>
+            <a:noFill/>
+          </a:ln>
+          <a:effectLst>
+            <a:outerShdw blurRad="292100" dist="139700" dir="2700000" algn="tl" rotWithShape="0">
+              <a:srgbClr val="333333">
+                <a:alpha val="65000"/>
+              </a:srgbClr>
+            </a:outerShdw>
+          </a:effectLst>
+        </p:spPr>
+      </p:pic>
     </p:spTree>
     <p:extLst>
       <p:ext uri="{BB962C8B-B14F-4D97-AF65-F5344CB8AC3E}">
-        <p14:creationId xmlns:p14="http://schemas.microsoft.com/office/powerpoint/2010/main" val="1025363274"/>
+        <p14:creationId xmlns:p14="http://schemas.microsoft.com/office/powerpoint/2010/main" val="2073811053"/>
       </p:ext>
     </p:extLst>
   </p:cSld>
@@ -13654,79 +14045,60 @@
           </a:bodyPr>
           <a:lstStyle/>
           <a:p>
-            <a:r>
-              <a:rPr lang="fr-FR" dirty="0" smtClean="0"/>
-              <a:t>ImageJ </a:t>
-            </a:r>
-            <a:r>
-              <a:rPr lang="fr-FR" dirty="0" smtClean="0">
-                <a:sym typeface="Wingdings" panose="05000000000000000000" pitchFamily="2" charset="2"/>
-              </a:rPr>
-              <a:t> Java</a:t>
-            </a:r>
-          </a:p>
-          <a:p>
-            <a:pPr lvl="1"/>
-            <a:r>
-              <a:rPr lang="fr-FR" dirty="0" smtClean="0">
-                <a:sym typeface="Wingdings" panose="05000000000000000000" pitchFamily="2" charset="2"/>
-              </a:rPr>
-              <a:t>Simple</a:t>
-            </a:r>
-          </a:p>
-          <a:p>
-            <a:pPr lvl="1"/>
-            <a:r>
-              <a:rPr lang="fr-FR" dirty="0" smtClean="0">
-                <a:sym typeface="Wingdings" panose="05000000000000000000" pitchFamily="2" charset="2"/>
-              </a:rPr>
-              <a:t>Contient des filtres existants</a:t>
-            </a:r>
-          </a:p>
-          <a:p>
-            <a:pPr lvl="1"/>
-            <a:r>
-              <a:rPr lang="fr-FR" dirty="0" smtClean="0">
-                <a:sym typeface="Wingdings" panose="05000000000000000000" pitchFamily="2" charset="2"/>
-              </a:rPr>
-              <a:t>Gestion E/S facile</a:t>
-            </a:r>
-          </a:p>
-          <a:p>
-            <a:pPr lvl="1"/>
-            <a:r>
-              <a:rPr lang="fr-FR" dirty="0" smtClean="0">
-                <a:sym typeface="Wingdings" panose="05000000000000000000" pitchFamily="2" charset="2"/>
-              </a:rPr>
-              <a:t>Environnement de développement</a:t>
-            </a:r>
-          </a:p>
-          <a:p>
-            <a:pPr lvl="1"/>
-            <a:r>
-              <a:rPr lang="fr-FR" dirty="0" smtClean="0">
-                <a:sym typeface="Wingdings" panose="05000000000000000000" pitchFamily="2" charset="2"/>
-              </a:rPr>
-              <a:t>Java pas le plus adapté dans le TI</a:t>
-            </a:r>
-          </a:p>
-          <a:p>
-            <a:pPr marL="457200" lvl="1" indent="0">
+            <a:pPr marL="0" indent="0">
               <a:buNone/>
             </a:pPr>
-            <a:endParaRPr lang="fr-FR" dirty="0" smtClean="0">
-              <a:sym typeface="Wingdings" panose="05000000000000000000" pitchFamily="2" charset="2"/>
-            </a:endParaRPr>
-          </a:p>
-          <a:p>
-            <a:pPr lvl="1"/>
-            <a:endParaRPr lang="fr-FR" dirty="0" smtClean="0">
-              <a:sym typeface="Wingdings" panose="05000000000000000000" pitchFamily="2" charset="2"/>
-            </a:endParaRPr>
-          </a:p>
-          <a:p>
-            <a:pPr lvl="1"/>
-            <a:endParaRPr lang="fr-FR" dirty="0"/>
+            <a:r>
+              <a:rPr lang="fr-FR" dirty="0" smtClean="0"/>
+              <a:t>Fonctionnalités implémentées : </a:t>
+            </a:r>
+          </a:p>
+          <a:p>
+            <a:r>
+              <a:rPr lang="fr-FR" dirty="0" smtClean="0"/>
+              <a:t>Algorithme de croissance par régions avec plusieurs germes</a:t>
+            </a:r>
+          </a:p>
+          <a:p>
+            <a:r>
+              <a:rPr lang="fr-FR" dirty="0" smtClean="0"/>
+              <a:t>Fusion de deux régions</a:t>
+            </a:r>
+          </a:p>
+          <a:p>
+            <a:r>
+              <a:rPr lang="fr-FR" dirty="0" smtClean="0"/>
+              <a:t>Ouverture / Fermeture morphologique après </a:t>
+            </a:r>
+            <a:r>
+              <a:rPr lang="fr-FR" dirty="0" smtClean="0"/>
+              <a:t>segmentation</a:t>
+            </a:r>
+          </a:p>
+          <a:p>
+            <a:r>
+              <a:rPr lang="fr-FR" dirty="0" smtClean="0"/>
+              <a:t>Base de cas (première version)</a:t>
+            </a:r>
+          </a:p>
+          <a:p>
+            <a:r>
+              <a:rPr lang="fr-FR" dirty="0" smtClean="0"/>
+              <a:t>Lecture / Ecriture fichier base de cas (première version)</a:t>
+            </a:r>
+          </a:p>
+          <a:p>
+            <a:r>
+              <a:rPr lang="fr-FR" dirty="0" smtClean="0"/>
+              <a:t>« Mini RàPC » simplifié</a:t>
+            </a:r>
+            <a:endParaRPr lang="fr-FR" dirty="0" smtClean="0"/>
+          </a:p>
+          <a:p>
+            <a:pPr marL="0" indent="0">
+              <a:buNone/>
+            </a:pPr>
+            <a:endParaRPr lang="fr-FR" dirty="0" smtClean="0"/>
           </a:p>
           <a:p>
             <a:pPr marL="0" indent="0">
@@ -13766,240 +14138,10 @@
           </a:p>
         </p:txBody>
       </p:sp>
-      <p:pic>
-        <p:nvPicPr>
-          <p:cNvPr id="4" name="Image 3"/>
-          <p:cNvPicPr>
-            <a:picLocks noChangeAspect="1"/>
-          </p:cNvPicPr>
-          <p:nvPr/>
-        </p:nvPicPr>
-        <p:blipFill>
-          <a:blip r:embed="rId2">
-            <a:extLst>
-              <a:ext uri="{28A0092B-C50C-407E-A947-70E740481C1C}">
-                <a14:useLocalDpi xmlns:a14="http://schemas.microsoft.com/office/drawing/2010/main" val="0"/>
-              </a:ext>
-            </a:extLst>
-          </a:blip>
-          <a:stretch>
-            <a:fillRect/>
-          </a:stretch>
-        </p:blipFill>
-        <p:spPr>
-          <a:xfrm>
-            <a:off x="5897205" y="3909848"/>
-            <a:ext cx="338769" cy="338769"/>
-          </a:xfrm>
-          <a:prstGeom prst="rect">
-            <a:avLst/>
-          </a:prstGeom>
-        </p:spPr>
-      </p:pic>
-      <p:pic>
-        <p:nvPicPr>
-          <p:cNvPr id="6" name="Image 5"/>
-          <p:cNvPicPr>
-            <a:picLocks noChangeAspect="1"/>
-          </p:cNvPicPr>
-          <p:nvPr/>
-        </p:nvPicPr>
-        <p:blipFill>
-          <a:blip r:embed="rId2">
-            <a:extLst>
-              <a:ext uri="{28A0092B-C50C-407E-A947-70E740481C1C}">
-                <a14:useLocalDpi xmlns:a14="http://schemas.microsoft.com/office/drawing/2010/main" val="0"/>
-              </a:ext>
-            </a:extLst>
-          </a:blip>
-          <a:stretch>
-            <a:fillRect/>
-          </a:stretch>
-        </p:blipFill>
-        <p:spPr>
-          <a:xfrm>
-            <a:off x="6066589" y="3438101"/>
-            <a:ext cx="338769" cy="338769"/>
-          </a:xfrm>
-          <a:prstGeom prst="rect">
-            <a:avLst/>
-          </a:prstGeom>
-        </p:spPr>
-      </p:pic>
-      <p:pic>
-        <p:nvPicPr>
-          <p:cNvPr id="7" name="Image 6"/>
-          <p:cNvPicPr>
-            <a:picLocks noChangeAspect="1"/>
-          </p:cNvPicPr>
-          <p:nvPr/>
-        </p:nvPicPr>
-        <p:blipFill>
-          <a:blip r:embed="rId3">
-            <a:extLst>
-              <a:ext uri="{28A0092B-C50C-407E-A947-70E740481C1C}">
-                <a14:useLocalDpi xmlns:a14="http://schemas.microsoft.com/office/drawing/2010/main" val="0"/>
-              </a:ext>
-            </a:extLst>
-          </a:blip>
-          <a:stretch>
-            <a:fillRect/>
-          </a:stretch>
-        </p:blipFill>
-        <p:spPr>
-          <a:xfrm>
-            <a:off x="4212412" y="2966915"/>
-            <a:ext cx="438414" cy="354019"/>
-          </a:xfrm>
-          <a:prstGeom prst="rect">
-            <a:avLst/>
-          </a:prstGeom>
-        </p:spPr>
-      </p:pic>
-      <p:pic>
-        <p:nvPicPr>
-          <p:cNvPr id="8" name="Image 7"/>
-          <p:cNvPicPr>
-            <a:picLocks noChangeAspect="1"/>
-          </p:cNvPicPr>
-          <p:nvPr/>
-        </p:nvPicPr>
-        <p:blipFill>
-          <a:blip r:embed="rId3">
-            <a:extLst>
-              <a:ext uri="{28A0092B-C50C-407E-A947-70E740481C1C}">
-                <a14:useLocalDpi xmlns:a14="http://schemas.microsoft.com/office/drawing/2010/main" val="0"/>
-              </a:ext>
-            </a:extLst>
-          </a:blip>
-          <a:stretch>
-            <a:fillRect/>
-          </a:stretch>
-        </p:blipFill>
-        <p:spPr>
-          <a:xfrm>
-            <a:off x="5458791" y="2581364"/>
-            <a:ext cx="438414" cy="354019"/>
-          </a:xfrm>
-          <a:prstGeom prst="rect">
-            <a:avLst/>
-          </a:prstGeom>
-        </p:spPr>
-      </p:pic>
-      <p:pic>
-        <p:nvPicPr>
-          <p:cNvPr id="9" name="Image 8"/>
-          <p:cNvPicPr>
-            <a:picLocks noChangeAspect="1"/>
-          </p:cNvPicPr>
-          <p:nvPr/>
-        </p:nvPicPr>
-        <p:blipFill>
-          <a:blip r:embed="rId3">
-            <a:extLst>
-              <a:ext uri="{28A0092B-C50C-407E-A947-70E740481C1C}">
-                <a14:useLocalDpi xmlns:a14="http://schemas.microsoft.com/office/drawing/2010/main" val="0"/>
-              </a:ext>
-            </a:extLst>
-          </a:blip>
-          <a:stretch>
-            <a:fillRect/>
-          </a:stretch>
-        </p:blipFill>
-        <p:spPr>
-          <a:xfrm>
-            <a:off x="3150868" y="2159875"/>
-            <a:ext cx="438414" cy="354019"/>
-          </a:xfrm>
-          <a:prstGeom prst="rect">
-            <a:avLst/>
-          </a:prstGeom>
-        </p:spPr>
-      </p:pic>
-      <p:pic>
-        <p:nvPicPr>
-          <p:cNvPr id="10" name="Image 9"/>
-          <p:cNvPicPr>
-            <a:picLocks noChangeAspect="1"/>
-          </p:cNvPicPr>
-          <p:nvPr/>
-        </p:nvPicPr>
-        <p:blipFill>
-          <a:blip r:embed="rId4">
-            <a:extLst>
-              <a:ext uri="{28A0092B-C50C-407E-A947-70E740481C1C}">
-                <a14:useLocalDpi xmlns:a14="http://schemas.microsoft.com/office/drawing/2010/main" val="0"/>
-              </a:ext>
-            </a:extLst>
-          </a:blip>
-          <a:stretch>
-            <a:fillRect/>
-          </a:stretch>
-        </p:blipFill>
-        <p:spPr>
-          <a:xfrm>
-            <a:off x="8625307" y="1200553"/>
-            <a:ext cx="1867161" cy="3886742"/>
-          </a:xfrm>
-          <a:prstGeom prst="rect">
-            <a:avLst/>
-          </a:prstGeom>
-          <a:ln>
-            <a:noFill/>
-          </a:ln>
-          <a:effectLst>
-            <a:outerShdw blurRad="292100" dist="139700" dir="2700000" algn="tl" rotWithShape="0">
-              <a:srgbClr val="333333">
-                <a:alpha val="65000"/>
-              </a:srgbClr>
-            </a:outerShdw>
-          </a:effectLst>
-        </p:spPr>
-      </p:pic>
-      <p:pic>
-        <p:nvPicPr>
-          <p:cNvPr id="12" name="Image 11"/>
-          <p:cNvPicPr>
-            <a:picLocks noChangeAspect="1"/>
-          </p:cNvPicPr>
-          <p:nvPr/>
-        </p:nvPicPr>
-        <p:blipFill>
-          <a:blip r:embed="rId5">
-            <a:extLst>
-              <a:ext uri="{28A0092B-C50C-407E-A947-70E740481C1C}">
-                <a14:useLocalDpi xmlns:a14="http://schemas.microsoft.com/office/drawing/2010/main" val="0"/>
-              </a:ext>
-            </a:extLst>
-          </a:blip>
-          <a:stretch>
-            <a:fillRect/>
-          </a:stretch>
-        </p:blipFill>
-        <p:spPr>
-          <a:xfrm>
-            <a:off x="2855907" y="4581036"/>
-            <a:ext cx="2071254" cy="2071254"/>
-          </a:xfrm>
-          <a:prstGeom prst="rect">
-            <a:avLst/>
-          </a:prstGeom>
-          <a:ln>
-            <a:noFill/>
-          </a:ln>
-          <a:effectLst>
-            <a:outerShdw blurRad="292100" dist="139700" dir="2700000" algn="tl" rotWithShape="0">
-              <a:srgbClr val="333333">
-                <a:alpha val="65000"/>
-              </a:srgbClr>
-            </a:outerShdw>
-          </a:effectLst>
-        </p:spPr>
-      </p:pic>
     </p:spTree>
     <p:extLst>
       <p:ext uri="{BB962C8B-B14F-4D97-AF65-F5344CB8AC3E}">
-        <p14:creationId xmlns:p14="http://schemas.microsoft.com/office/powerpoint/2010/main" val="2073811053"/>
+        <p14:creationId xmlns:p14="http://schemas.microsoft.com/office/powerpoint/2010/main" val="1479471276"/>
       </p:ext>
     </p:extLst>
   </p:cSld>
@@ -14092,25 +14234,7 @@
             </a:pPr>
             <a:r>
               <a:rPr lang="fr-FR" dirty="0" smtClean="0"/>
-              <a:t>Fonctionnalités implémentées : </a:t>
-            </a:r>
-          </a:p>
-          <a:p>
-            <a:r>
-              <a:rPr lang="fr-FR" dirty="0" smtClean="0"/>
-              <a:t>Algorithme de croissance par régions avec plusieurs germes</a:t>
-            </a:r>
-          </a:p>
-          <a:p>
-            <a:r>
-              <a:rPr lang="fr-FR" dirty="0" smtClean="0"/>
-              <a:t>Fusion de deux régions</a:t>
-            </a:r>
-          </a:p>
-          <a:p>
-            <a:r>
-              <a:rPr lang="fr-FR" dirty="0" smtClean="0"/>
-              <a:t>Ouverture / Fermeture morphologique après segmentation</a:t>
+              <a:t>Modélisation : Diagramme UML</a:t>
             </a:r>
           </a:p>
           <a:p>
@@ -14157,10 +14281,50 @@
           </a:p>
         </p:txBody>
       </p:sp>
+      <p:pic>
+        <p:nvPicPr>
+          <p:cNvPr id="6" name="Image 5"/>
+          <p:cNvPicPr>
+            <a:picLocks noChangeAspect="1"/>
+          </p:cNvPicPr>
+          <p:nvPr/>
+        </p:nvPicPr>
+        <p:blipFill>
+          <a:blip r:embed="rId3">
+            <a:extLst>
+              <a:ext uri="{28A0092B-C50C-407E-A947-70E740481C1C}">
+                <a14:useLocalDpi xmlns:a14="http://schemas.microsoft.com/office/drawing/2010/main" val="0"/>
+              </a:ext>
+            </a:extLst>
+          </a:blip>
+          <a:stretch>
+            <a:fillRect/>
+          </a:stretch>
+        </p:blipFill>
+        <p:spPr>
+          <a:xfrm>
+            <a:off x="6092363" y="0"/>
+            <a:ext cx="3223439" cy="6858000"/>
+          </a:xfrm>
+          <a:prstGeom prst="rect">
+            <a:avLst/>
+          </a:prstGeom>
+          <a:ln>
+            <a:noFill/>
+          </a:ln>
+          <a:effectLst>
+            <a:outerShdw blurRad="292100" dist="139700" dir="2700000" algn="tl" rotWithShape="0">
+              <a:srgbClr val="333333">
+                <a:alpha val="65000"/>
+              </a:srgbClr>
+            </a:outerShdw>
+          </a:effectLst>
+        </p:spPr>
+      </p:pic>
     </p:spTree>
     <p:extLst>
       <p:ext uri="{BB962C8B-B14F-4D97-AF65-F5344CB8AC3E}">
-        <p14:creationId xmlns:p14="http://schemas.microsoft.com/office/powerpoint/2010/main" val="1479471276"/>
+        <p14:creationId xmlns:p14="http://schemas.microsoft.com/office/powerpoint/2010/main" val="4282021723"/>
       </p:ext>
     </p:extLst>
   </p:cSld>
@@ -14238,8 +14402,8 @@
         </p:nvSpPr>
         <p:spPr>
           <a:xfrm>
-            <a:off x="1484310" y="1639614"/>
-            <a:ext cx="10577061" cy="4592642"/>
+            <a:off x="1484310" y="993228"/>
+            <a:ext cx="10577061" cy="5239028"/>
           </a:xfrm>
         </p:spPr>
         <p:txBody>
@@ -14253,7 +14417,7 @@
             </a:pPr>
             <a:r>
               <a:rPr lang="fr-FR" dirty="0" smtClean="0"/>
-              <a:t>Modélisation : Diagramme UML</a:t>
+              <a:t>Résultats d’exécution : (image de base, puis segmentée, puis avec fermeture)</a:t>
             </a:r>
           </a:p>
           <a:p>
@@ -14302,14 +14466,14 @@
       </p:sp>
       <p:pic>
         <p:nvPicPr>
-          <p:cNvPr id="6" name="Image 5"/>
+          <p:cNvPr id="8" name="Image 7"/>
           <p:cNvPicPr>
             <a:picLocks noChangeAspect="1"/>
           </p:cNvPicPr>
           <p:nvPr/>
         </p:nvPicPr>
         <p:blipFill>
-          <a:blip r:embed="rId3">
+          <a:blip r:embed="rId2">
             <a:extLst>
               <a:ext uri="{28A0092B-C50C-407E-A947-70E740481C1C}">
                 <a14:useLocalDpi xmlns:a14="http://schemas.microsoft.com/office/drawing/2010/main" val="0"/>
@@ -14322,8 +14486,8 @@
         </p:blipFill>
         <p:spPr>
           <a:xfrm>
-            <a:off x="6092363" y="0"/>
-            <a:ext cx="3223439" cy="6858000"/>
+            <a:off x="221468" y="1639614"/>
+            <a:ext cx="11839903" cy="4287834"/>
           </a:xfrm>
           <a:prstGeom prst="rect">
             <a:avLst/>
@@ -14340,10 +14504,70 @@
           </a:effectLst>
         </p:spPr>
       </p:pic>
+      <p:sp>
+        <p:nvSpPr>
+          <p:cNvPr id="9" name="ZoneTexte 8"/>
+          <p:cNvSpPr txBox="1"/>
+          <p:nvPr/>
+        </p:nvSpPr>
+        <p:spPr>
+          <a:xfrm>
+            <a:off x="2538247" y="6389168"/>
+            <a:ext cx="9285890" cy="369332"/>
+          </a:xfrm>
+          <a:prstGeom prst="rect">
+            <a:avLst/>
+          </a:prstGeom>
+          <a:noFill/>
+        </p:spPr>
+        <p:txBody>
+          <a:bodyPr wrap="square" rtlCol="0">
+            <a:spAutoFit/>
+          </a:bodyPr>
+          <a:lstStyle/>
+          <a:p>
+            <a:r>
+              <a:rPr lang="fr-FR" dirty="0" smtClean="0"/>
+              <a:t>Les germes sont positionnés « à la main » pour les tests, de manière à obtenir de bons résultats</a:t>
+            </a:r>
+            <a:endParaRPr lang="fr-FR" dirty="0"/>
+          </a:p>
+        </p:txBody>
+      </p:sp>
+      <p:sp>
+        <p:nvSpPr>
+          <p:cNvPr id="10" name="ZoneTexte 9"/>
+          <p:cNvSpPr txBox="1"/>
+          <p:nvPr/>
+        </p:nvSpPr>
+        <p:spPr>
+          <a:xfrm>
+            <a:off x="4501055" y="5895186"/>
+            <a:ext cx="5360275" cy="369332"/>
+          </a:xfrm>
+          <a:prstGeom prst="rect">
+            <a:avLst/>
+          </a:prstGeom>
+          <a:noFill/>
+        </p:spPr>
+        <p:txBody>
+          <a:bodyPr wrap="square" rtlCol="0">
+            <a:spAutoFit/>
+          </a:bodyPr>
+          <a:lstStyle/>
+          <a:p>
+            <a:r>
+              <a:rPr lang="fr-FR" dirty="0" smtClean="0"/>
+              <a:t>Seuil global : 30   Seuil local : 15</a:t>
+            </a:r>
+            <a:endParaRPr lang="fr-FR" dirty="0"/>
+          </a:p>
+        </p:txBody>
+      </p:sp>
     </p:spTree>
     <p:extLst>
       <p:ext uri="{BB962C8B-B14F-4D97-AF65-F5344CB8AC3E}">
-        <p14:creationId xmlns:p14="http://schemas.microsoft.com/office/powerpoint/2010/main" val="4282021723"/>
+        <p14:creationId xmlns:p14="http://schemas.microsoft.com/office/powerpoint/2010/main" val="1329431445"/>
       </p:ext>
     </p:extLst>
   </p:cSld>
@@ -14657,7 +14881,15 @@
             </a:pPr>
             <a:r>
               <a:rPr lang="fr-FR" dirty="0" smtClean="0"/>
-              <a:t>Résultats d’exécution : (image de base, puis segmentée, puis avec fermeture)</a:t>
+              <a:t>Résultats d’exécution : méthode </a:t>
+            </a:r>
+            <a:r>
+              <a:rPr lang="fr-FR" dirty="0" err="1" smtClean="0"/>
+              <a:t>toString</a:t>
+            </a:r>
+            <a:r>
+              <a:rPr lang="fr-FR" dirty="0" smtClean="0"/>
+              <a:t>() de la base de cas associée</a:t>
             </a:r>
           </a:p>
           <a:p>
@@ -14706,7 +14938,7 @@
       </p:sp>
       <p:pic>
         <p:nvPicPr>
-          <p:cNvPr id="8" name="Image 7"/>
+          <p:cNvPr id="4" name="Image 3"/>
           <p:cNvPicPr>
             <a:picLocks noChangeAspect="1"/>
           </p:cNvPicPr>
@@ -14726,8 +14958,8 @@
         </p:blipFill>
         <p:spPr>
           <a:xfrm>
-            <a:off x="221468" y="1639614"/>
-            <a:ext cx="11839903" cy="4287834"/>
+            <a:off x="2177866" y="1464972"/>
+            <a:ext cx="8631600" cy="4941927"/>
           </a:xfrm>
           <a:prstGeom prst="rect">
             <a:avLst/>
@@ -14744,70 +14976,10 @@
           </a:effectLst>
         </p:spPr>
       </p:pic>
-      <p:sp>
-        <p:nvSpPr>
-          <p:cNvPr id="9" name="ZoneTexte 8"/>
-          <p:cNvSpPr txBox="1"/>
-          <p:nvPr/>
-        </p:nvSpPr>
-        <p:spPr>
-          <a:xfrm>
-            <a:off x="2538247" y="6389168"/>
-            <a:ext cx="9285890" cy="369332"/>
-          </a:xfrm>
-          <a:prstGeom prst="rect">
-            <a:avLst/>
-          </a:prstGeom>
-          <a:noFill/>
-        </p:spPr>
-        <p:txBody>
-          <a:bodyPr wrap="square" rtlCol="0">
-            <a:spAutoFit/>
-          </a:bodyPr>
-          <a:lstStyle/>
-          <a:p>
-            <a:r>
-              <a:rPr lang="fr-FR" dirty="0" smtClean="0"/>
-              <a:t>Les germes sont positionnés « à la main » pour les tests, de manière à obtenir de bons résultats</a:t>
-            </a:r>
-            <a:endParaRPr lang="fr-FR" dirty="0"/>
-          </a:p>
-        </p:txBody>
-      </p:sp>
-      <p:sp>
-        <p:nvSpPr>
-          <p:cNvPr id="10" name="ZoneTexte 9"/>
-          <p:cNvSpPr txBox="1"/>
-          <p:nvPr/>
-        </p:nvSpPr>
-        <p:spPr>
-          <a:xfrm>
-            <a:off x="4501055" y="5895186"/>
-            <a:ext cx="5360275" cy="369332"/>
-          </a:xfrm>
-          <a:prstGeom prst="rect">
-            <a:avLst/>
-          </a:prstGeom>
-          <a:noFill/>
-        </p:spPr>
-        <p:txBody>
-          <a:bodyPr wrap="square" rtlCol="0">
-            <a:spAutoFit/>
-          </a:bodyPr>
-          <a:lstStyle/>
-          <a:p>
-            <a:r>
-              <a:rPr lang="fr-FR" dirty="0" smtClean="0"/>
-              <a:t>Seuil global : 30   Seuil local : 15</a:t>
-            </a:r>
-            <a:endParaRPr lang="fr-FR" dirty="0"/>
-          </a:p>
-        </p:txBody>
-      </p:sp>
     </p:spTree>
     <p:extLst>
       <p:ext uri="{BB962C8B-B14F-4D97-AF65-F5344CB8AC3E}">
-        <p14:creationId xmlns:p14="http://schemas.microsoft.com/office/powerpoint/2010/main" val="1329431445"/>
+        <p14:creationId xmlns:p14="http://schemas.microsoft.com/office/powerpoint/2010/main" val="3000142931"/>
       </p:ext>
     </p:extLst>
   </p:cSld>
@@ -14900,15 +15072,7 @@
             </a:pPr>
             <a:r>
               <a:rPr lang="fr-FR" dirty="0" smtClean="0"/>
-              <a:t>Résultats d’exécution : méthode </a:t>
-            </a:r>
-            <a:r>
-              <a:rPr lang="fr-FR" dirty="0" err="1" smtClean="0"/>
-              <a:t>toString</a:t>
-            </a:r>
-            <a:r>
-              <a:rPr lang="fr-FR" dirty="0" smtClean="0"/>
-              <a:t>() de la base de cas associée</a:t>
+              <a:t>Résultats d’exécution : Segmentation d’une tumeur (sans puis avec fermeture)</a:t>
             </a:r>
           </a:p>
           <a:p>
@@ -14957,14 +15121,14 @@
       </p:sp>
       <p:pic>
         <p:nvPicPr>
-          <p:cNvPr id="4" name="Image 3"/>
+          <p:cNvPr id="6" name="Image 5"/>
           <p:cNvPicPr>
             <a:picLocks noChangeAspect="1"/>
           </p:cNvPicPr>
           <p:nvPr/>
         </p:nvPicPr>
         <p:blipFill>
-          <a:blip r:embed="rId2">
+          <a:blip r:embed="rId3">
             <a:extLst>
               <a:ext uri="{28A0092B-C50C-407E-A947-70E740481C1C}">
                 <a14:useLocalDpi xmlns:a14="http://schemas.microsoft.com/office/drawing/2010/main" val="0"/>
@@ -14977,8 +15141,8 @@
         </p:blipFill>
         <p:spPr>
           <a:xfrm>
-            <a:off x="2177866" y="1464972"/>
-            <a:ext cx="8631600" cy="4941927"/>
+            <a:off x="252249" y="1951023"/>
+            <a:ext cx="11682248" cy="3090819"/>
           </a:xfrm>
           <a:prstGeom prst="rect">
             <a:avLst/>
@@ -14995,10 +15159,40 @@
           </a:effectLst>
         </p:spPr>
       </p:pic>
+      <p:sp>
+        <p:nvSpPr>
+          <p:cNvPr id="7" name="ZoneTexte 6"/>
+          <p:cNvSpPr txBox="1"/>
+          <p:nvPr/>
+        </p:nvSpPr>
+        <p:spPr>
+          <a:xfrm>
+            <a:off x="4508938" y="5168585"/>
+            <a:ext cx="5360275" cy="369332"/>
+          </a:xfrm>
+          <a:prstGeom prst="rect">
+            <a:avLst/>
+          </a:prstGeom>
+          <a:noFill/>
+        </p:spPr>
+        <p:txBody>
+          <a:bodyPr wrap="square" rtlCol="0">
+            <a:spAutoFit/>
+          </a:bodyPr>
+          <a:lstStyle/>
+          <a:p>
+            <a:r>
+              <a:rPr lang="fr-FR" dirty="0" smtClean="0"/>
+              <a:t>Seuil global : 30   Seuil local : 15</a:t>
+            </a:r>
+            <a:endParaRPr lang="fr-FR" dirty="0"/>
+          </a:p>
+        </p:txBody>
+      </p:sp>
     </p:spTree>
     <p:extLst>
       <p:ext uri="{BB962C8B-B14F-4D97-AF65-F5344CB8AC3E}">
-        <p14:creationId xmlns:p14="http://schemas.microsoft.com/office/powerpoint/2010/main" val="3000142931"/>
+        <p14:creationId xmlns:p14="http://schemas.microsoft.com/office/powerpoint/2010/main" val="51449911"/>
       </p:ext>
     </p:extLst>
   </p:cSld>
@@ -15091,7 +15285,7 @@
             </a:pPr>
             <a:r>
               <a:rPr lang="fr-FR" dirty="0" smtClean="0"/>
-              <a:t>Résultats d’exécution : Segmentation d’une tumeur (sans puis avec fermeture)</a:t>
+              <a:t>Résultats d’exécution : Exemple de fusion entre deux régions (en violet foncé) </a:t>
             </a:r>
           </a:p>
           <a:p>
@@ -15140,28 +15334,22 @@
       </p:sp>
       <p:pic>
         <p:nvPicPr>
-          <p:cNvPr id="6" name="Image 5"/>
+          <p:cNvPr id="4" name="Image 3"/>
           <p:cNvPicPr>
             <a:picLocks noChangeAspect="1"/>
           </p:cNvPicPr>
           <p:nvPr/>
         </p:nvPicPr>
         <p:blipFill>
-          <a:blip r:embed="rId3">
-            <a:extLst>
-              <a:ext uri="{28A0092B-C50C-407E-A947-70E740481C1C}">
-                <a14:useLocalDpi xmlns:a14="http://schemas.microsoft.com/office/drawing/2010/main" val="0"/>
-              </a:ext>
-            </a:extLst>
-          </a:blip>
+          <a:blip r:embed="rId2"/>
           <a:stretch>
             <a:fillRect/>
           </a:stretch>
         </p:blipFill>
         <p:spPr>
           <a:xfrm>
-            <a:off x="252249" y="1951023"/>
-            <a:ext cx="11682248" cy="3090819"/>
+            <a:off x="3749894" y="1639614"/>
+            <a:ext cx="4629150" cy="5019675"/>
           </a:xfrm>
           <a:prstGeom prst="rect">
             <a:avLst/>
@@ -15178,40 +15366,10 @@
           </a:effectLst>
         </p:spPr>
       </p:pic>
-      <p:sp>
-        <p:nvSpPr>
-          <p:cNvPr id="7" name="ZoneTexte 6"/>
-          <p:cNvSpPr txBox="1"/>
-          <p:nvPr/>
-        </p:nvSpPr>
-        <p:spPr>
-          <a:xfrm>
-            <a:off x="4508938" y="5168585"/>
-            <a:ext cx="5360275" cy="369332"/>
-          </a:xfrm>
-          <a:prstGeom prst="rect">
-            <a:avLst/>
-          </a:prstGeom>
-          <a:noFill/>
-        </p:spPr>
-        <p:txBody>
-          <a:bodyPr wrap="square" rtlCol="0">
-            <a:spAutoFit/>
-          </a:bodyPr>
-          <a:lstStyle/>
-          <a:p>
-            <a:r>
-              <a:rPr lang="fr-FR" dirty="0" smtClean="0"/>
-              <a:t>Seuil global : 30   Seuil local : 15</a:t>
-            </a:r>
-            <a:endParaRPr lang="fr-FR" dirty="0"/>
-          </a:p>
-        </p:txBody>
-      </p:sp>
     </p:spTree>
     <p:extLst>
       <p:ext uri="{BB962C8B-B14F-4D97-AF65-F5344CB8AC3E}">
-        <p14:creationId xmlns:p14="http://schemas.microsoft.com/office/powerpoint/2010/main" val="51449911"/>
+        <p14:creationId xmlns:p14="http://schemas.microsoft.com/office/powerpoint/2010/main" val="1524824229"/>
       </p:ext>
     </p:extLst>
   </p:cSld>
@@ -15268,7 +15426,7 @@
             <a:pPr algn="l"/>
             <a:r>
               <a:rPr lang="fr-FR" dirty="0" smtClean="0"/>
-              <a:t>III. Implémentation</a:t>
+              <a:t>IV. Problèmes liés à la segmentation</a:t>
             </a:r>
             <a:br>
               <a:rPr lang="fr-FR" dirty="0" smtClean="0"/>
@@ -15289,8 +15447,8 @@
         </p:nvSpPr>
         <p:spPr>
           <a:xfrm>
-            <a:off x="1484310" y="993228"/>
-            <a:ext cx="10577061" cy="5239028"/>
+            <a:off x="1484310" y="1135118"/>
+            <a:ext cx="10577061" cy="4307740"/>
           </a:xfrm>
         </p:spPr>
         <p:txBody>
@@ -15304,14 +15462,14 @@
             </a:pPr>
             <a:r>
               <a:rPr lang="fr-FR" dirty="0" smtClean="0"/>
-              <a:t>Résultats d’exécution : Exemple de fusion entre deux régions (en violet foncé) </a:t>
+              <a:t>Cas d’une image « compliquée » ou de « mauvaise qualité »</a:t>
             </a:r>
           </a:p>
           <a:p>
             <a:pPr marL="0" indent="0">
               <a:buNone/>
             </a:pPr>
-            <a:endParaRPr lang="fr-FR" dirty="0" smtClean="0"/>
+            <a:endParaRPr lang="fr-FR" dirty="0"/>
           </a:p>
           <a:p>
             <a:pPr marL="0" indent="0">
@@ -15360,15 +15518,21 @@
           <p:nvPr/>
         </p:nvPicPr>
         <p:blipFill>
-          <a:blip r:embed="rId2"/>
+          <a:blip r:embed="rId2">
+            <a:extLst>
+              <a:ext uri="{28A0092B-C50C-407E-A947-70E740481C1C}">
+                <a14:useLocalDpi xmlns:a14="http://schemas.microsoft.com/office/drawing/2010/main" val="0"/>
+              </a:ext>
+            </a:extLst>
+          </a:blip>
           <a:stretch>
             <a:fillRect/>
           </a:stretch>
         </p:blipFill>
         <p:spPr>
           <a:xfrm>
-            <a:off x="3749894" y="1639614"/>
-            <a:ext cx="4629150" cy="5019675"/>
+            <a:off x="2802728" y="1639614"/>
+            <a:ext cx="7381875" cy="4924425"/>
           </a:xfrm>
           <a:prstGeom prst="rect">
             <a:avLst/>
@@ -15388,7 +15552,7 @@
     </p:spTree>
     <p:extLst>
       <p:ext uri="{BB962C8B-B14F-4D97-AF65-F5344CB8AC3E}">
-        <p14:creationId xmlns:p14="http://schemas.microsoft.com/office/powerpoint/2010/main" val="1524824229"/>
+        <p14:creationId xmlns:p14="http://schemas.microsoft.com/office/powerpoint/2010/main" val="1107083860"/>
       </p:ext>
     </p:extLst>
   </p:cSld>
@@ -15466,8 +15630,8 @@
         </p:nvSpPr>
         <p:spPr>
           <a:xfrm>
-            <a:off x="1484310" y="1810656"/>
-            <a:ext cx="10577061" cy="3632201"/>
+            <a:off x="1484310" y="1135118"/>
+            <a:ext cx="10577061" cy="4307740"/>
           </a:xfrm>
         </p:spPr>
         <p:txBody>
@@ -15481,53 +15645,7 @@
             </a:pPr>
             <a:r>
               <a:rPr lang="fr-FR" dirty="0" smtClean="0"/>
-              <a:t>TODO</a:t>
-            </a:r>
-          </a:p>
-          <a:p>
-            <a:pPr>
-              <a:buFontTx/>
-              <a:buChar char="-"/>
-            </a:pPr>
-            <a:r>
-              <a:rPr lang="fr-FR" dirty="0" smtClean="0"/>
-              <a:t>Image simple ça marche bien (montrer seuils, germes, ouverture, etc.)</a:t>
-            </a:r>
-          </a:p>
-          <a:p>
-            <a:pPr>
-              <a:buFontTx/>
-              <a:buChar char="-"/>
-            </a:pPr>
-            <a:r>
-              <a:rPr lang="fr-FR" dirty="0" smtClean="0"/>
-              <a:t>Image compliquée c’est la merde (montrer problèmes </a:t>
-            </a:r>
-            <a:r>
-              <a:rPr lang="fr-FR" dirty="0" err="1" smtClean="0"/>
-              <a:t>niv</a:t>
-            </a:r>
-            <a:r>
-              <a:rPr lang="fr-FR" dirty="0" smtClean="0"/>
-              <a:t>. Gris, seuils, prétraitements </a:t>
-            </a:r>
-            <a:r>
-              <a:rPr lang="fr-FR" dirty="0" err="1" smtClean="0"/>
-              <a:t>imageJ</a:t>
-            </a:r>
-            <a:r>
-              <a:rPr lang="fr-FR" dirty="0" smtClean="0"/>
-              <a:t>, </a:t>
-            </a:r>
-          </a:p>
-          <a:p>
-            <a:pPr>
-              <a:buFontTx/>
-              <a:buChar char="-"/>
-            </a:pPr>
-            <a:r>
-              <a:rPr lang="fr-FR" dirty="0" smtClean="0"/>
-              <a:t>Un seuil par germe ? Pour plus de précision ?</a:t>
+              <a:t>Résultats obtenus : mauvaise segmentation de la tumeur et du rein sein</a:t>
             </a:r>
           </a:p>
           <a:p>
@@ -15574,10 +15692,80 @@
           </a:p>
         </p:txBody>
       </p:sp>
+      <p:sp>
+        <p:nvSpPr>
+          <p:cNvPr id="7" name="ZoneTexte 6"/>
+          <p:cNvSpPr txBox="1"/>
+          <p:nvPr/>
+        </p:nvSpPr>
+        <p:spPr>
+          <a:xfrm>
+            <a:off x="7220606" y="5665934"/>
+            <a:ext cx="5360275" cy="369332"/>
+          </a:xfrm>
+          <a:prstGeom prst="rect">
+            <a:avLst/>
+          </a:prstGeom>
+          <a:noFill/>
+        </p:spPr>
+        <p:txBody>
+          <a:bodyPr wrap="square" rtlCol="0">
+            <a:spAutoFit/>
+          </a:bodyPr>
+          <a:lstStyle/>
+          <a:p>
+            <a:r>
+              <a:rPr lang="fr-FR" dirty="0" smtClean="0"/>
+              <a:t>Seuil global : 10   Seuil local : 5</a:t>
+            </a:r>
+            <a:endParaRPr lang="fr-FR" dirty="0"/>
+          </a:p>
+        </p:txBody>
+      </p:sp>
+      <p:pic>
+        <p:nvPicPr>
+          <p:cNvPr id="8" name="Image 7"/>
+          <p:cNvPicPr>
+            <a:picLocks noChangeAspect="1"/>
+          </p:cNvPicPr>
+          <p:nvPr/>
+        </p:nvPicPr>
+        <p:blipFill>
+          <a:blip r:embed="rId3">
+            <a:extLst>
+              <a:ext uri="{28A0092B-C50C-407E-A947-70E740481C1C}">
+                <a14:useLocalDpi xmlns:a14="http://schemas.microsoft.com/office/drawing/2010/main" val="0"/>
+              </a:ext>
+            </a:extLst>
+          </a:blip>
+          <a:stretch>
+            <a:fillRect/>
+          </a:stretch>
+        </p:blipFill>
+        <p:spPr>
+          <a:xfrm>
+            <a:off x="599090" y="1639614"/>
+            <a:ext cx="11027876" cy="4001139"/>
+          </a:xfrm>
+          <a:prstGeom prst="rect">
+            <a:avLst/>
+          </a:prstGeom>
+          <a:ln>
+            <a:noFill/>
+          </a:ln>
+          <a:effectLst>
+            <a:outerShdw blurRad="292100" dist="139700" dir="2700000" algn="tl" rotWithShape="0">
+              <a:srgbClr val="333333">
+                <a:alpha val="65000"/>
+              </a:srgbClr>
+            </a:outerShdw>
+          </a:effectLst>
+        </p:spPr>
+      </p:pic>
     </p:spTree>
     <p:extLst>
       <p:ext uri="{BB962C8B-B14F-4D97-AF65-F5344CB8AC3E}">
-        <p14:creationId xmlns:p14="http://schemas.microsoft.com/office/powerpoint/2010/main" val="1006993935"/>
+        <p14:creationId xmlns:p14="http://schemas.microsoft.com/office/powerpoint/2010/main" val="372313777"/>
       </p:ext>
     </p:extLst>
   </p:cSld>
@@ -15670,8 +15858,15 @@
             </a:pPr>
             <a:r>
               <a:rPr lang="fr-FR" dirty="0" smtClean="0"/>
-              <a:t>Cas d’une image « compliquée » ou de « mauvaise qualité »</a:t>
-            </a:r>
+              <a:t>Résultats obtenus : isolation du rein sein sur cette image </a:t>
+            </a:r>
+            <a:r>
+              <a:rPr lang="fr-FR" dirty="0" smtClean="0">
+                <a:sym typeface="Wingdings" panose="05000000000000000000" pitchFamily="2" charset="2"/>
+              </a:rPr>
+              <a:t> gros seuils nécessaires</a:t>
+            </a:r>
+            <a:endParaRPr lang="fr-FR" dirty="0" smtClean="0"/>
           </a:p>
           <a:p>
             <a:pPr marL="0" indent="0">
@@ -15714,6 +15909,36 @@
               <a:t>35</a:t>
             </a:fld>
             <a:endParaRPr lang="en-US" dirty="0"/>
+          </a:p>
+        </p:txBody>
+      </p:sp>
+      <p:sp>
+        <p:nvSpPr>
+          <p:cNvPr id="7" name="ZoneTexte 6"/>
+          <p:cNvSpPr txBox="1"/>
+          <p:nvPr/>
+        </p:nvSpPr>
+        <p:spPr>
+          <a:xfrm>
+            <a:off x="7220606" y="5794178"/>
+            <a:ext cx="5360275" cy="369332"/>
+          </a:xfrm>
+          <a:prstGeom prst="rect">
+            <a:avLst/>
+          </a:prstGeom>
+          <a:noFill/>
+        </p:spPr>
+        <p:txBody>
+          <a:bodyPr wrap="square" rtlCol="0">
+            <a:spAutoFit/>
+          </a:bodyPr>
+          <a:lstStyle/>
+          <a:p>
+            <a:r>
+              <a:rPr lang="fr-FR" dirty="0" smtClean="0"/>
+              <a:t>Seuil global : 53  Seuil local : 15</a:t>
+            </a:r>
+            <a:endParaRPr lang="fr-FR" dirty="0"/>
           </a:p>
         </p:txBody>
       </p:sp>
@@ -15726,21 +15951,15 @@
           <p:nvPr/>
         </p:nvPicPr>
         <p:blipFill>
-          <a:blip r:embed="rId2">
-            <a:extLst>
-              <a:ext uri="{28A0092B-C50C-407E-A947-70E740481C1C}">
-                <a14:useLocalDpi xmlns:a14="http://schemas.microsoft.com/office/drawing/2010/main" val="0"/>
-              </a:ext>
-            </a:extLst>
-          </a:blip>
+          <a:blip r:embed="rId2"/>
           <a:stretch>
             <a:fillRect/>
           </a:stretch>
         </p:blipFill>
         <p:spPr>
           <a:xfrm>
-            <a:off x="2802728" y="1639614"/>
-            <a:ext cx="7381875" cy="4924425"/>
+            <a:off x="904582" y="1781734"/>
+            <a:ext cx="10598441" cy="3836784"/>
           </a:xfrm>
           <a:prstGeom prst="rect">
             <a:avLst/>
@@ -15760,7 +15979,7 @@
     </p:spTree>
     <p:extLst>
       <p:ext uri="{BB962C8B-B14F-4D97-AF65-F5344CB8AC3E}">
-        <p14:creationId xmlns:p14="http://schemas.microsoft.com/office/powerpoint/2010/main" val="1107083860"/>
+        <p14:creationId xmlns:p14="http://schemas.microsoft.com/office/powerpoint/2010/main" val="794000173"/>
       </p:ext>
     </p:extLst>
   </p:cSld>
@@ -15851,16 +16070,41 @@
             <a:pPr marL="0" indent="0">
               <a:buNone/>
             </a:pPr>
-            <a:r>
-              <a:rPr lang="fr-FR" dirty="0" smtClean="0"/>
-              <a:t>Résultats obtenus : mauvaise segmentation de la tumeur et du rein sein</a:t>
-            </a:r>
+            <a:endParaRPr lang="fr-FR" dirty="0" smtClean="0"/>
           </a:p>
           <a:p>
             <a:pPr marL="0" indent="0">
               <a:buNone/>
             </a:pPr>
-            <a:endParaRPr lang="fr-FR" dirty="0"/>
+            <a:r>
+              <a:rPr lang="fr-FR" dirty="0" smtClean="0"/>
+              <a:t>Conclusion </a:t>
+            </a:r>
+            <a:r>
+              <a:rPr lang="fr-FR" dirty="0" smtClean="0"/>
+              <a:t>:</a:t>
+            </a:r>
+          </a:p>
+          <a:p>
+            <a:r>
+              <a:rPr lang="fr-FR" dirty="0" smtClean="0"/>
+              <a:t> Il faudra sûrement utiliser des seuils différents pour chaque germe</a:t>
+            </a:r>
+          </a:p>
+          <a:p>
+            <a:r>
+              <a:rPr lang="fr-FR" dirty="0" smtClean="0"/>
+              <a:t>Un prétraitement est parfois nécessaire pour faire ressortir les organes</a:t>
+            </a:r>
+          </a:p>
+          <a:p>
+            <a:pPr marL="0" indent="0">
+              <a:buNone/>
+            </a:pPr>
+            <a:r>
+              <a:rPr lang="fr-FR" dirty="0"/>
+              <a:t>	</a:t>
+            </a:r>
           </a:p>
           <a:p>
             <a:pPr marL="0" indent="0">
@@ -15900,80 +16144,10 @@
           </a:p>
         </p:txBody>
       </p:sp>
-      <p:sp>
-        <p:nvSpPr>
-          <p:cNvPr id="7" name="ZoneTexte 6"/>
-          <p:cNvSpPr txBox="1"/>
-          <p:nvPr/>
-        </p:nvSpPr>
-        <p:spPr>
-          <a:xfrm>
-            <a:off x="7220606" y="5665934"/>
-            <a:ext cx="5360275" cy="369332"/>
-          </a:xfrm>
-          <a:prstGeom prst="rect">
-            <a:avLst/>
-          </a:prstGeom>
-          <a:noFill/>
-        </p:spPr>
-        <p:txBody>
-          <a:bodyPr wrap="square" rtlCol="0">
-            <a:spAutoFit/>
-          </a:bodyPr>
-          <a:lstStyle/>
-          <a:p>
-            <a:r>
-              <a:rPr lang="fr-FR" dirty="0" smtClean="0"/>
-              <a:t>Seuil global : 10   Seuil local : 5</a:t>
-            </a:r>
-            <a:endParaRPr lang="fr-FR" dirty="0"/>
-          </a:p>
-        </p:txBody>
-      </p:sp>
-      <p:pic>
-        <p:nvPicPr>
-          <p:cNvPr id="8" name="Image 7"/>
-          <p:cNvPicPr>
-            <a:picLocks noChangeAspect="1"/>
-          </p:cNvPicPr>
-          <p:nvPr/>
-        </p:nvPicPr>
-        <p:blipFill>
-          <a:blip r:embed="rId3">
-            <a:extLst>
-              <a:ext uri="{28A0092B-C50C-407E-A947-70E740481C1C}">
-                <a14:useLocalDpi xmlns:a14="http://schemas.microsoft.com/office/drawing/2010/main" val="0"/>
-              </a:ext>
-            </a:extLst>
-          </a:blip>
-          <a:stretch>
-            <a:fillRect/>
-          </a:stretch>
-        </p:blipFill>
-        <p:spPr>
-          <a:xfrm>
-            <a:off x="599090" y="1639614"/>
-            <a:ext cx="11027876" cy="4001139"/>
-          </a:xfrm>
-          <a:prstGeom prst="rect">
-            <a:avLst/>
-          </a:prstGeom>
-          <a:ln>
-            <a:noFill/>
-          </a:ln>
-          <a:effectLst>
-            <a:outerShdw blurRad="292100" dist="139700" dir="2700000" algn="tl" rotWithShape="0">
-              <a:srgbClr val="333333">
-                <a:alpha val="65000"/>
-              </a:srgbClr>
-            </a:outerShdw>
-          </a:effectLst>
-        </p:spPr>
-      </p:pic>
     </p:spTree>
     <p:extLst>
       <p:ext uri="{BB962C8B-B14F-4D97-AF65-F5344CB8AC3E}">
-        <p14:creationId xmlns:p14="http://schemas.microsoft.com/office/powerpoint/2010/main" val="372313777"/>
+        <p14:creationId xmlns:p14="http://schemas.microsoft.com/office/powerpoint/2010/main" val="1278964734"/>
       </p:ext>
     </p:extLst>
   </p:cSld>
@@ -16066,21 +16240,17 @@
             </a:pPr>
             <a:r>
               <a:rPr lang="fr-FR" dirty="0" smtClean="0"/>
-              <a:t>Résultats obtenus : isolation du rein sein sur cette image </a:t>
-            </a:r>
-            <a:r>
-              <a:rPr lang="fr-FR" dirty="0" smtClean="0">
-                <a:sym typeface="Wingdings" panose="05000000000000000000" pitchFamily="2" charset="2"/>
-              </a:rPr>
-              <a:t> gros seuils nécessaires</a:t>
-            </a:r>
-            <a:endParaRPr lang="fr-FR" dirty="0" smtClean="0"/>
+              <a:t>Tentatives de prétraitements </a:t>
+            </a:r>
           </a:p>
           <a:p>
             <a:pPr marL="0" indent="0">
               <a:buNone/>
             </a:pPr>
-            <a:endParaRPr lang="fr-FR" dirty="0"/>
+            <a:r>
+              <a:rPr lang="fr-FR" dirty="0"/>
+              <a:t>	</a:t>
+            </a:r>
           </a:p>
           <a:p>
             <a:pPr marL="0" indent="0">
@@ -16117,36 +16287,6 @@
               <a:t>37</a:t>
             </a:fld>
             <a:endParaRPr lang="en-US" dirty="0"/>
-          </a:p>
-        </p:txBody>
-      </p:sp>
-      <p:sp>
-        <p:nvSpPr>
-          <p:cNvPr id="7" name="ZoneTexte 6"/>
-          <p:cNvSpPr txBox="1"/>
-          <p:nvPr/>
-        </p:nvSpPr>
-        <p:spPr>
-          <a:xfrm>
-            <a:off x="7220606" y="5794178"/>
-            <a:ext cx="5360275" cy="369332"/>
-          </a:xfrm>
-          <a:prstGeom prst="rect">
-            <a:avLst/>
-          </a:prstGeom>
-          <a:noFill/>
-        </p:spPr>
-        <p:txBody>
-          <a:bodyPr wrap="square" rtlCol="0">
-            <a:spAutoFit/>
-          </a:bodyPr>
-          <a:lstStyle/>
-          <a:p>
-            <a:r>
-              <a:rPr lang="fr-FR" dirty="0" smtClean="0"/>
-              <a:t>Seuil global : 53  Seuil local : 15</a:t>
-            </a:r>
-            <a:endParaRPr lang="fr-FR" dirty="0"/>
           </a:p>
         </p:txBody>
       </p:sp>
@@ -16159,15 +16299,21 @@
           <p:nvPr/>
         </p:nvPicPr>
         <p:blipFill>
-          <a:blip r:embed="rId2"/>
+          <a:blip r:embed="rId3">
+            <a:extLst>
+              <a:ext uri="{28A0092B-C50C-407E-A947-70E740481C1C}">
+                <a14:useLocalDpi xmlns:a14="http://schemas.microsoft.com/office/drawing/2010/main" val="0"/>
+              </a:ext>
+            </a:extLst>
+          </a:blip>
           <a:stretch>
             <a:fillRect/>
           </a:stretch>
         </p:blipFill>
         <p:spPr>
           <a:xfrm>
-            <a:off x="904582" y="1781734"/>
-            <a:ext cx="10598441" cy="3836784"/>
+            <a:off x="1642705" y="1814570"/>
+            <a:ext cx="4187014" cy="3036384"/>
           </a:xfrm>
           <a:prstGeom prst="rect">
             <a:avLst/>
@@ -16184,10 +16330,218 @@
           </a:effectLst>
         </p:spPr>
       </p:pic>
+      <p:pic>
+        <p:nvPicPr>
+          <p:cNvPr id="6" name="Image 5"/>
+          <p:cNvPicPr>
+            <a:picLocks noChangeAspect="1"/>
+          </p:cNvPicPr>
+          <p:nvPr/>
+        </p:nvPicPr>
+        <p:blipFill>
+          <a:blip r:embed="rId4">
+            <a:extLst>
+              <a:ext uri="{28A0092B-C50C-407E-A947-70E740481C1C}">
+                <a14:useLocalDpi xmlns:a14="http://schemas.microsoft.com/office/drawing/2010/main" val="0"/>
+              </a:ext>
+            </a:extLst>
+          </a:blip>
+          <a:stretch>
+            <a:fillRect/>
+          </a:stretch>
+        </p:blipFill>
+        <p:spPr>
+          <a:xfrm>
+            <a:off x="6250998" y="1814569"/>
+            <a:ext cx="4075416" cy="2948836"/>
+          </a:xfrm>
+          <a:prstGeom prst="rect">
+            <a:avLst/>
+          </a:prstGeom>
+          <a:ln>
+            <a:noFill/>
+          </a:ln>
+          <a:effectLst>
+            <a:outerShdw blurRad="292100" dist="139700" dir="2700000" algn="tl" rotWithShape="0">
+              <a:srgbClr val="333333">
+                <a:alpha val="65000"/>
+              </a:srgbClr>
+            </a:outerShdw>
+          </a:effectLst>
+        </p:spPr>
+      </p:pic>
+      <p:sp>
+        <p:nvSpPr>
+          <p:cNvPr id="7" name="ZoneTexte 6"/>
+          <p:cNvSpPr txBox="1"/>
+          <p:nvPr/>
+        </p:nvSpPr>
+        <p:spPr>
+          <a:xfrm>
+            <a:off x="2900485" y="4874871"/>
+            <a:ext cx="2538249" cy="369332"/>
+          </a:xfrm>
+          <a:prstGeom prst="rect">
+            <a:avLst/>
+          </a:prstGeom>
+          <a:noFill/>
+        </p:spPr>
+        <p:txBody>
+          <a:bodyPr wrap="square" rtlCol="0">
+            <a:spAutoFit/>
+          </a:bodyPr>
+          <a:lstStyle/>
+          <a:p>
+            <a:r>
+              <a:rPr lang="fr-FR" dirty="0" err="1" smtClean="0"/>
+              <a:t>Unsharp</a:t>
+            </a:r>
+            <a:r>
+              <a:rPr lang="fr-FR" dirty="0" smtClean="0"/>
+              <a:t> </a:t>
+            </a:r>
+            <a:r>
+              <a:rPr lang="fr-FR" dirty="0" err="1" smtClean="0"/>
+              <a:t>mask</a:t>
+            </a:r>
+            <a:r>
+              <a:rPr lang="fr-FR" dirty="0" smtClean="0"/>
+              <a:t> </a:t>
+            </a:r>
+            <a:endParaRPr lang="fr-FR" dirty="0"/>
+          </a:p>
+        </p:txBody>
+      </p:sp>
+      <p:sp>
+        <p:nvSpPr>
+          <p:cNvPr id="8" name="ZoneTexte 7"/>
+          <p:cNvSpPr txBox="1"/>
+          <p:nvPr/>
+        </p:nvSpPr>
+        <p:spPr>
+          <a:xfrm>
+            <a:off x="6854908" y="4874871"/>
+            <a:ext cx="3775871" cy="369332"/>
+          </a:xfrm>
+          <a:prstGeom prst="rect">
+            <a:avLst/>
+          </a:prstGeom>
+          <a:noFill/>
+        </p:spPr>
+        <p:txBody>
+          <a:bodyPr wrap="square" rtlCol="0">
+            <a:spAutoFit/>
+          </a:bodyPr>
+          <a:lstStyle/>
+          <a:p>
+            <a:r>
+              <a:rPr lang="fr-FR" dirty="0" err="1"/>
+              <a:t>Unsharp</a:t>
+            </a:r>
+            <a:r>
+              <a:rPr lang="fr-FR" dirty="0"/>
+              <a:t> </a:t>
+            </a:r>
+            <a:r>
+              <a:rPr lang="fr-FR" dirty="0" err="1"/>
+              <a:t>mask</a:t>
+            </a:r>
+            <a:r>
+              <a:rPr lang="fr-FR" dirty="0"/>
+              <a:t> </a:t>
+            </a:r>
+            <a:r>
+              <a:rPr lang="fr-FR" dirty="0" smtClean="0"/>
+              <a:t> + Convolution</a:t>
+            </a:r>
+            <a:endParaRPr lang="fr-FR" dirty="0"/>
+          </a:p>
+        </p:txBody>
+      </p:sp>
+      <p:pic>
+        <p:nvPicPr>
+          <p:cNvPr id="10" name="Image 9"/>
+          <p:cNvPicPr>
+            <a:picLocks noChangeAspect="1"/>
+          </p:cNvPicPr>
+          <p:nvPr/>
+        </p:nvPicPr>
+        <p:blipFill>
+          <a:blip r:embed="rId5">
+            <a:extLst>
+              <a:ext uri="{28A0092B-C50C-407E-A947-70E740481C1C}">
+                <a14:useLocalDpi xmlns:a14="http://schemas.microsoft.com/office/drawing/2010/main" val="0"/>
+              </a:ext>
+            </a:extLst>
+          </a:blip>
+          <a:stretch>
+            <a:fillRect/>
+          </a:stretch>
+        </p:blipFill>
+        <p:spPr>
+          <a:xfrm>
+            <a:off x="7483731" y="5554324"/>
+            <a:ext cx="1609950" cy="990738"/>
+          </a:xfrm>
+          <a:prstGeom prst="rect">
+            <a:avLst/>
+          </a:prstGeom>
+        </p:spPr>
+      </p:pic>
+      <p:sp>
+        <p:nvSpPr>
+          <p:cNvPr id="11" name="ZoneTexte 10"/>
+          <p:cNvSpPr txBox="1"/>
+          <p:nvPr/>
+        </p:nvSpPr>
+        <p:spPr>
+          <a:xfrm>
+            <a:off x="2672039" y="5619332"/>
+            <a:ext cx="2128345" cy="646331"/>
+          </a:xfrm>
+          <a:prstGeom prst="rect">
+            <a:avLst/>
+          </a:prstGeom>
+          <a:noFill/>
+        </p:spPr>
+        <p:style>
+          <a:lnRef idx="2">
+            <a:schemeClr val="dk1"/>
+          </a:lnRef>
+          <a:fillRef idx="1">
+            <a:schemeClr val="lt1"/>
+          </a:fillRef>
+          <a:effectRef idx="0">
+            <a:schemeClr val="dk1"/>
+          </a:effectRef>
+          <a:fontRef idx="minor">
+            <a:schemeClr val="dk1"/>
+          </a:fontRef>
+        </p:style>
+        <p:txBody>
+          <a:bodyPr wrap="square" rtlCol="0">
+            <a:spAutoFit/>
+          </a:bodyPr>
+          <a:lstStyle/>
+          <a:p>
+            <a:r>
+              <a:rPr lang="fr-FR" dirty="0" smtClean="0"/>
+              <a:t>Radius : 30 pixels</a:t>
+            </a:r>
+          </a:p>
+          <a:p>
+            <a:r>
+              <a:rPr lang="fr-FR" dirty="0" smtClean="0"/>
+              <a:t>Poids Masque : 0,8</a:t>
+            </a:r>
+            <a:endParaRPr lang="fr-FR" dirty="0"/>
+          </a:p>
+        </p:txBody>
+      </p:sp>
     </p:spTree>
     <p:extLst>
       <p:ext uri="{BB962C8B-B14F-4D97-AF65-F5344CB8AC3E}">
-        <p14:creationId xmlns:p14="http://schemas.microsoft.com/office/powerpoint/2010/main" val="794000173"/>
+        <p14:creationId xmlns:p14="http://schemas.microsoft.com/office/powerpoint/2010/main" val="2378459800"/>
       </p:ext>
     </p:extLst>
   </p:cSld>
@@ -16233,7 +16587,7 @@
         </p:nvSpPr>
         <p:spPr>
           <a:xfrm>
-            <a:off x="1484310" y="312313"/>
+            <a:off x="1484310" y="2625337"/>
             <a:ext cx="10018713" cy="1327301"/>
           </a:xfrm>
         </p:spPr>
@@ -16241,10 +16595,13 @@
           <a:bodyPr/>
           <a:lstStyle/>
           <a:p>
-            <a:pPr algn="l"/>
-            <a:r>
-              <a:rPr lang="fr-FR" dirty="0" smtClean="0"/>
-              <a:t>IV. Problèmes liés à la segmentation</a:t>
+            <a:r>
+              <a:rPr lang="fr-FR" dirty="0" smtClean="0"/>
+              <a:t>Démonstration Mini - RàPC</a:t>
+            </a:r>
+            <a:r>
+              <a:rPr lang="fr-FR" dirty="0" smtClean="0"/>
+              <a:t/>
             </a:r>
             <a:br>
               <a:rPr lang="fr-FR" dirty="0" smtClean="0"/>
@@ -16274,27 +16631,6 @@
             <a:normAutofit/>
           </a:bodyPr>
           <a:lstStyle/>
-          <a:p>
-            <a:pPr marL="0" indent="0">
-              <a:buNone/>
-            </a:pPr>
-            <a:r>
-              <a:rPr lang="fr-FR" dirty="0" smtClean="0"/>
-              <a:t>Conclusion :</a:t>
-            </a:r>
-          </a:p>
-          <a:p>
-            <a:r>
-              <a:rPr lang="fr-FR" dirty="0" smtClean="0"/>
-              <a:t> Il faudra sûrement utiliser des seuils différents pour chaque germe</a:t>
-            </a:r>
-          </a:p>
-          <a:p>
-            <a:r>
-              <a:rPr lang="fr-FR" dirty="0" smtClean="0"/>
-              <a:t>Un prétraitement est parfois nécessaire pour faire ressortir les organes</a:t>
-            </a:r>
-          </a:p>
           <a:p>
             <a:pPr marL="0" indent="0">
               <a:buNone/>
@@ -16345,401 +16681,7 @@
     </p:spTree>
     <p:extLst>
       <p:ext uri="{BB962C8B-B14F-4D97-AF65-F5344CB8AC3E}">
-        <p14:creationId xmlns:p14="http://schemas.microsoft.com/office/powerpoint/2010/main" val="1278964734"/>
-      </p:ext>
-    </p:extLst>
-  </p:cSld>
-  <p:clrMapOvr>
-    <a:masterClrMapping/>
-  </p:clrMapOvr>
-  <p:timing>
-    <p:tnLst>
-      <p:par>
-        <p:cTn id="1" dur="indefinite" restart="never" nodeType="tmRoot"/>
-      </p:par>
-    </p:tnLst>
-  </p:timing>
-</p:sld>
-</file>
-
-<file path=ppt/slides/slide39.xml><?xml version="1.0" encoding="utf-8"?>
-<p:sld xmlns:a="http://schemas.openxmlformats.org/drawingml/2006/main" xmlns:r="http://schemas.openxmlformats.org/officeDocument/2006/relationships" xmlns:p="http://schemas.openxmlformats.org/presentationml/2006/main">
-  <p:cSld>
-    <p:spTree>
-      <p:nvGrpSpPr>
-        <p:cNvPr id="1" name=""/>
-        <p:cNvGrpSpPr/>
-        <p:nvPr/>
-      </p:nvGrpSpPr>
-      <p:grpSpPr>
-        <a:xfrm>
-          <a:off x="0" y="0"/>
-          <a:ext cx="0" cy="0"/>
-          <a:chOff x="0" y="0"/>
-          <a:chExt cx="0" cy="0"/>
-        </a:xfrm>
-      </p:grpSpPr>
-      <p:sp>
-        <p:nvSpPr>
-          <p:cNvPr id="2" name="Titre 1"/>
-          <p:cNvSpPr>
-            <a:spLocks noGrp="1"/>
-          </p:cNvSpPr>
-          <p:nvPr>
-            <p:ph type="title"/>
-          </p:nvPr>
-        </p:nvSpPr>
-        <p:spPr>
-          <a:xfrm>
-            <a:off x="1484310" y="312313"/>
-            <a:ext cx="10018713" cy="1327301"/>
-          </a:xfrm>
-        </p:spPr>
-        <p:txBody>
-          <a:bodyPr/>
-          <a:lstStyle/>
-          <a:p>
-            <a:pPr algn="l"/>
-            <a:r>
-              <a:rPr lang="fr-FR" dirty="0" smtClean="0"/>
-              <a:t>IV. Problèmes liés à la segmentation</a:t>
-            </a:r>
-            <a:br>
-              <a:rPr lang="fr-FR" dirty="0" smtClean="0"/>
-            </a:br>
-            <a:endParaRPr lang="fr-FR" dirty="0"/>
-          </a:p>
-        </p:txBody>
-      </p:sp>
-      <p:sp>
-        <p:nvSpPr>
-          <p:cNvPr id="3" name="Espace réservé du contenu 2"/>
-          <p:cNvSpPr>
-            <a:spLocks noGrp="1"/>
-          </p:cNvSpPr>
-          <p:nvPr>
-            <p:ph idx="1"/>
-          </p:nvPr>
-        </p:nvSpPr>
-        <p:spPr>
-          <a:xfrm>
-            <a:off x="1484310" y="1135118"/>
-            <a:ext cx="10577061" cy="4307740"/>
-          </a:xfrm>
-        </p:spPr>
-        <p:txBody>
-          <a:bodyPr anchor="t">
-            <a:normAutofit/>
-          </a:bodyPr>
-          <a:lstStyle/>
-          <a:p>
-            <a:pPr marL="0" indent="0">
-              <a:buNone/>
-            </a:pPr>
-            <a:r>
-              <a:rPr lang="fr-FR" dirty="0" smtClean="0"/>
-              <a:t>Tentatives de prétraitements </a:t>
-            </a:r>
-          </a:p>
-          <a:p>
-            <a:pPr marL="0" indent="0">
-              <a:buNone/>
-            </a:pPr>
-            <a:r>
-              <a:rPr lang="fr-FR" dirty="0"/>
-              <a:t>	</a:t>
-            </a:r>
-          </a:p>
-          <a:p>
-            <a:pPr marL="0" indent="0">
-              <a:buNone/>
-            </a:pPr>
-            <a:endParaRPr lang="fr-FR" dirty="0" smtClean="0"/>
-          </a:p>
-          <a:p>
-            <a:pPr marL="514350" indent="-514350">
-              <a:buAutoNum type="romanUcPeriod"/>
-            </a:pPr>
-            <a:endParaRPr lang="fr-FR" dirty="0"/>
-          </a:p>
-        </p:txBody>
-      </p:sp>
-      <p:sp>
-        <p:nvSpPr>
-          <p:cNvPr id="5" name="Espace réservé du numéro de diapositive 4"/>
-          <p:cNvSpPr>
-            <a:spLocks noGrp="1"/>
-          </p:cNvSpPr>
-          <p:nvPr>
-            <p:ph type="sldNum" sz="quarter" idx="12"/>
-          </p:nvPr>
-        </p:nvSpPr>
-        <p:spPr/>
-        <p:txBody>
-          <a:bodyPr/>
-          <a:lstStyle/>
-          <a:p>
-            <a:fld id="{D57F1E4F-1CFF-5643-939E-217C01CDF565}" type="slidenum">
-              <a:rPr lang="en-US" smtClean="0"/>
-              <a:pPr/>
-              <a:t>39</a:t>
-            </a:fld>
-            <a:endParaRPr lang="en-US" dirty="0"/>
-          </a:p>
-        </p:txBody>
-      </p:sp>
-      <p:pic>
-        <p:nvPicPr>
-          <p:cNvPr id="4" name="Image 3"/>
-          <p:cNvPicPr>
-            <a:picLocks noChangeAspect="1"/>
-          </p:cNvPicPr>
-          <p:nvPr/>
-        </p:nvPicPr>
-        <p:blipFill>
-          <a:blip r:embed="rId3">
-            <a:extLst>
-              <a:ext uri="{28A0092B-C50C-407E-A947-70E740481C1C}">
-                <a14:useLocalDpi xmlns:a14="http://schemas.microsoft.com/office/drawing/2010/main" val="0"/>
-              </a:ext>
-            </a:extLst>
-          </a:blip>
-          <a:stretch>
-            <a:fillRect/>
-          </a:stretch>
-        </p:blipFill>
-        <p:spPr>
-          <a:xfrm>
-            <a:off x="1642705" y="1814570"/>
-            <a:ext cx="4187014" cy="3036384"/>
-          </a:xfrm>
-          <a:prstGeom prst="rect">
-            <a:avLst/>
-          </a:prstGeom>
-          <a:ln>
-            <a:noFill/>
-          </a:ln>
-          <a:effectLst>
-            <a:outerShdw blurRad="292100" dist="139700" dir="2700000" algn="tl" rotWithShape="0">
-              <a:srgbClr val="333333">
-                <a:alpha val="65000"/>
-              </a:srgbClr>
-            </a:outerShdw>
-          </a:effectLst>
-        </p:spPr>
-      </p:pic>
-      <p:pic>
-        <p:nvPicPr>
-          <p:cNvPr id="6" name="Image 5"/>
-          <p:cNvPicPr>
-            <a:picLocks noChangeAspect="1"/>
-          </p:cNvPicPr>
-          <p:nvPr/>
-        </p:nvPicPr>
-        <p:blipFill>
-          <a:blip r:embed="rId4">
-            <a:extLst>
-              <a:ext uri="{28A0092B-C50C-407E-A947-70E740481C1C}">
-                <a14:useLocalDpi xmlns:a14="http://schemas.microsoft.com/office/drawing/2010/main" val="0"/>
-              </a:ext>
-            </a:extLst>
-          </a:blip>
-          <a:stretch>
-            <a:fillRect/>
-          </a:stretch>
-        </p:blipFill>
-        <p:spPr>
-          <a:xfrm>
-            <a:off x="6250998" y="1814569"/>
-            <a:ext cx="4075416" cy="2948836"/>
-          </a:xfrm>
-          <a:prstGeom prst="rect">
-            <a:avLst/>
-          </a:prstGeom>
-          <a:ln>
-            <a:noFill/>
-          </a:ln>
-          <a:effectLst>
-            <a:outerShdw blurRad="292100" dist="139700" dir="2700000" algn="tl" rotWithShape="0">
-              <a:srgbClr val="333333">
-                <a:alpha val="65000"/>
-              </a:srgbClr>
-            </a:outerShdw>
-          </a:effectLst>
-        </p:spPr>
-      </p:pic>
-      <p:sp>
-        <p:nvSpPr>
-          <p:cNvPr id="7" name="ZoneTexte 6"/>
-          <p:cNvSpPr txBox="1"/>
-          <p:nvPr/>
-        </p:nvSpPr>
-        <p:spPr>
-          <a:xfrm>
-            <a:off x="2900485" y="4874871"/>
-            <a:ext cx="2538249" cy="369332"/>
-          </a:xfrm>
-          <a:prstGeom prst="rect">
-            <a:avLst/>
-          </a:prstGeom>
-          <a:noFill/>
-        </p:spPr>
-        <p:txBody>
-          <a:bodyPr wrap="square" rtlCol="0">
-            <a:spAutoFit/>
-          </a:bodyPr>
-          <a:lstStyle/>
-          <a:p>
-            <a:r>
-              <a:rPr lang="fr-FR" dirty="0" err="1" smtClean="0"/>
-              <a:t>Unsharp</a:t>
-            </a:r>
-            <a:r>
-              <a:rPr lang="fr-FR" dirty="0" smtClean="0"/>
-              <a:t> </a:t>
-            </a:r>
-            <a:r>
-              <a:rPr lang="fr-FR" dirty="0" err="1" smtClean="0"/>
-              <a:t>mask</a:t>
-            </a:r>
-            <a:r>
-              <a:rPr lang="fr-FR" dirty="0" smtClean="0"/>
-              <a:t> </a:t>
-            </a:r>
-            <a:endParaRPr lang="fr-FR" dirty="0"/>
-          </a:p>
-        </p:txBody>
-      </p:sp>
-      <p:sp>
-        <p:nvSpPr>
-          <p:cNvPr id="8" name="ZoneTexte 7"/>
-          <p:cNvSpPr txBox="1"/>
-          <p:nvPr/>
-        </p:nvSpPr>
-        <p:spPr>
-          <a:xfrm>
-            <a:off x="6854908" y="4874871"/>
-            <a:ext cx="3775871" cy="369332"/>
-          </a:xfrm>
-          <a:prstGeom prst="rect">
-            <a:avLst/>
-          </a:prstGeom>
-          <a:noFill/>
-        </p:spPr>
-        <p:txBody>
-          <a:bodyPr wrap="square" rtlCol="0">
-            <a:spAutoFit/>
-          </a:bodyPr>
-          <a:lstStyle/>
-          <a:p>
-            <a:r>
-              <a:rPr lang="fr-FR" dirty="0" err="1"/>
-              <a:t>Unsharp</a:t>
-            </a:r>
-            <a:r>
-              <a:rPr lang="fr-FR" dirty="0"/>
-              <a:t> </a:t>
-            </a:r>
-            <a:r>
-              <a:rPr lang="fr-FR" dirty="0" err="1"/>
-              <a:t>mask</a:t>
-            </a:r>
-            <a:r>
-              <a:rPr lang="fr-FR" dirty="0"/>
-              <a:t> </a:t>
-            </a:r>
-            <a:r>
-              <a:rPr lang="fr-FR" dirty="0" smtClean="0"/>
-              <a:t> + Convolution</a:t>
-            </a:r>
-            <a:endParaRPr lang="fr-FR" dirty="0"/>
-          </a:p>
-        </p:txBody>
-      </p:sp>
-      <p:pic>
-        <p:nvPicPr>
-          <p:cNvPr id="10" name="Image 9"/>
-          <p:cNvPicPr>
-            <a:picLocks noChangeAspect="1"/>
-          </p:cNvPicPr>
-          <p:nvPr/>
-        </p:nvPicPr>
-        <p:blipFill>
-          <a:blip r:embed="rId5">
-            <a:extLst>
-              <a:ext uri="{28A0092B-C50C-407E-A947-70E740481C1C}">
-                <a14:useLocalDpi xmlns:a14="http://schemas.microsoft.com/office/drawing/2010/main" val="0"/>
-              </a:ext>
-            </a:extLst>
-          </a:blip>
-          <a:stretch>
-            <a:fillRect/>
-          </a:stretch>
-        </p:blipFill>
-        <p:spPr>
-          <a:xfrm>
-            <a:off x="7483731" y="5554324"/>
-            <a:ext cx="1609950" cy="990738"/>
-          </a:xfrm>
-          <a:prstGeom prst="rect">
-            <a:avLst/>
-          </a:prstGeom>
-        </p:spPr>
-      </p:pic>
-      <p:sp>
-        <p:nvSpPr>
-          <p:cNvPr id="11" name="ZoneTexte 10"/>
-          <p:cNvSpPr txBox="1"/>
-          <p:nvPr/>
-        </p:nvSpPr>
-        <p:spPr>
-          <a:xfrm>
-            <a:off x="2672039" y="5619332"/>
-            <a:ext cx="2128345" cy="646331"/>
-          </a:xfrm>
-          <a:prstGeom prst="rect">
-            <a:avLst/>
-          </a:prstGeom>
-          <a:noFill/>
-        </p:spPr>
-        <p:style>
-          <a:lnRef idx="2">
-            <a:schemeClr val="dk1"/>
-          </a:lnRef>
-          <a:fillRef idx="1">
-            <a:schemeClr val="lt1"/>
-          </a:fillRef>
-          <a:effectRef idx="0">
-            <a:schemeClr val="dk1"/>
-          </a:effectRef>
-          <a:fontRef idx="minor">
-            <a:schemeClr val="dk1"/>
-          </a:fontRef>
-        </p:style>
-        <p:txBody>
-          <a:bodyPr wrap="square" rtlCol="0">
-            <a:spAutoFit/>
-          </a:bodyPr>
-          <a:lstStyle/>
-          <a:p>
-            <a:r>
-              <a:rPr lang="fr-FR" dirty="0" smtClean="0"/>
-              <a:t>Radius : 30 pixels</a:t>
-            </a:r>
-          </a:p>
-          <a:p>
-            <a:r>
-              <a:rPr lang="fr-FR" dirty="0" smtClean="0"/>
-              <a:t>Poids Masque : 0,8</a:t>
-            </a:r>
-            <a:endParaRPr lang="fr-FR" dirty="0"/>
-          </a:p>
-        </p:txBody>
-      </p:sp>
-    </p:spTree>
-    <p:extLst>
-      <p:ext uri="{BB962C8B-B14F-4D97-AF65-F5344CB8AC3E}">
-        <p14:creationId xmlns:p14="http://schemas.microsoft.com/office/powerpoint/2010/main" val="2378459800"/>
+        <p14:creationId xmlns:p14="http://schemas.microsoft.com/office/powerpoint/2010/main" val="607065872"/>
       </p:ext>
     </p:extLst>
   </p:cSld>

</xml_diff>

<commit_message>
restructuration du code (fonction segmentation), et ajout d'une suppression des muscles par segmentation
</commit_message>
<xml_diff>
--- a/Travail_realise/Presentations/Utilisation_du_RaPC_pour_la_segmentation_d_images.pptx
+++ b/Travail_realise/Presentations/Utilisation_du_RaPC_pour_la_segmentation_d_images.pptx
@@ -5,7 +5,7 @@
     <p:sldMasterId id="2147483648" r:id="rId1"/>
   </p:sldMasterIdLst>
   <p:notesMasterIdLst>
-    <p:notesMasterId r:id="rId40"/>
+    <p:notesMasterId r:id="rId43"/>
   </p:notesMasterIdLst>
   <p:sldIdLst>
     <p:sldId id="256" r:id="rId2"/>
@@ -37,15 +37,18 @@
     <p:sldId id="286" r:id="rId28"/>
     <p:sldId id="288" r:id="rId29"/>
     <p:sldId id="287" r:id="rId30"/>
-    <p:sldId id="289" r:id="rId31"/>
-    <p:sldId id="290" r:id="rId32"/>
-    <p:sldId id="291" r:id="rId33"/>
-    <p:sldId id="292" r:id="rId34"/>
-    <p:sldId id="293" r:id="rId35"/>
-    <p:sldId id="294" r:id="rId36"/>
-    <p:sldId id="295" r:id="rId37"/>
-    <p:sldId id="296" r:id="rId38"/>
-    <p:sldId id="297" r:id="rId39"/>
+    <p:sldId id="299" r:id="rId31"/>
+    <p:sldId id="289" r:id="rId32"/>
+    <p:sldId id="290" r:id="rId33"/>
+    <p:sldId id="291" r:id="rId34"/>
+    <p:sldId id="292" r:id="rId35"/>
+    <p:sldId id="293" r:id="rId36"/>
+    <p:sldId id="294" r:id="rId37"/>
+    <p:sldId id="295" r:id="rId38"/>
+    <p:sldId id="296" r:id="rId39"/>
+    <p:sldId id="300" r:id="rId40"/>
+    <p:sldId id="301" r:id="rId41"/>
+    <p:sldId id="297" r:id="rId42"/>
   </p:sldIdLst>
   <p:sldSz cx="12192000" cy="6858000"/>
   <p:notesSz cx="6858000" cy="9144000"/>
@@ -234,7 +237,7 @@
           <a:p>
             <a:fld id="{3BF17BC6-DB60-45E7-9D02-F2D1FB25D0FA}" type="datetimeFigureOut">
               <a:rPr lang="fr-FR" smtClean="0"/>
-              <a:t>29/03/2017</a:t>
+              <a:t>30/03/2017</a:t>
             </a:fld>
             <a:endParaRPr lang="fr-FR"/>
           </a:p>
@@ -1488,7 +1491,7 @@
           <a:p>
             <a:fld id="{5984FE70-0D1D-40C7-9F56-3FAF97D50752}" type="slidenum">
               <a:rPr lang="fr-FR" smtClean="0"/>
-              <a:t>31</a:t>
+              <a:t>30</a:t>
             </a:fld>
             <a:endParaRPr lang="fr-FR"/>
           </a:p>
@@ -1497,7 +1500,7 @@
     </p:spTree>
     <p:extLst>
       <p:ext uri="{BB962C8B-B14F-4D97-AF65-F5344CB8AC3E}">
-        <p14:creationId xmlns:p14="http://schemas.microsoft.com/office/powerpoint/2010/main" val="3029521272"/>
+        <p14:creationId xmlns:p14="http://schemas.microsoft.com/office/powerpoint/2010/main" val="2295250418"/>
       </p:ext>
     </p:extLst>
   </p:cSld>
@@ -1667,20 +1670,6 @@
           <a:bodyPr/>
           <a:lstStyle/>
           <a:p>
-            <a:r>
-              <a:rPr lang="fr-FR" dirty="0" smtClean="0"/>
-              <a:t>Tumeur : seuils trop</a:t>
-            </a:r>
-            <a:r>
-              <a:rPr lang="fr-FR" baseline="0" dirty="0" smtClean="0"/>
-              <a:t> permissifs</a:t>
-            </a:r>
-          </a:p>
-          <a:p>
-            <a:r>
-              <a:rPr lang="fr-FR" baseline="0" dirty="0" smtClean="0"/>
-              <a:t>Rein : seuils trop contraignants</a:t>
-            </a:r>
             <a:endParaRPr lang="fr-FR" dirty="0"/>
           </a:p>
         </p:txBody>
@@ -1702,7 +1691,7 @@
           <a:p>
             <a:fld id="{5984FE70-0D1D-40C7-9F56-3FAF97D50752}" type="slidenum">
               <a:rPr lang="fr-FR" smtClean="0"/>
-              <a:t>34</a:t>
+              <a:t>32</a:t>
             </a:fld>
             <a:endParaRPr lang="fr-FR"/>
           </a:p>
@@ -1711,7 +1700,7 @@
     </p:spTree>
     <p:extLst>
       <p:ext uri="{BB962C8B-B14F-4D97-AF65-F5344CB8AC3E}">
-        <p14:creationId xmlns:p14="http://schemas.microsoft.com/office/powerpoint/2010/main" val="316203356"/>
+        <p14:creationId xmlns:p14="http://schemas.microsoft.com/office/powerpoint/2010/main" val="3029521272"/>
       </p:ext>
     </p:extLst>
   </p:cSld>
@@ -1767,45 +1756,17 @@
           <a:p>
             <a:r>
               <a:rPr lang="fr-FR" dirty="0" smtClean="0"/>
-              <a:t>Explication du </a:t>
-            </a:r>
-            <a:r>
-              <a:rPr lang="fr-FR" dirty="0" err="1" smtClean="0"/>
-              <a:t>unsharp</a:t>
+              <a:t>Tumeur : seuils trop</a:t>
             </a:r>
             <a:r>
               <a:rPr lang="fr-FR" baseline="0" dirty="0" smtClean="0"/>
-              <a:t> </a:t>
-            </a:r>
-            <a:r>
-              <a:rPr lang="fr-FR" baseline="0" dirty="0" err="1" smtClean="0"/>
-              <a:t>mask</a:t>
-            </a:r>
+              <a:t> permissifs</a:t>
+            </a:r>
+          </a:p>
+          <a:p>
             <a:r>
               <a:rPr lang="fr-FR" baseline="0" dirty="0" smtClean="0"/>
-              <a:t> dans « journail_de_travail.txt », </a:t>
-            </a:r>
-            <a:r>
-              <a:rPr lang="fr-FR" baseline="0" dirty="0" smtClean="0"/>
-              <a:t>25/03</a:t>
-            </a:r>
-          </a:p>
-          <a:p>
-            <a:r>
-              <a:rPr lang="fr-FR" baseline="0" dirty="0" smtClean="0"/>
-              <a:t>Problème : Un prétraitement pour une image n’est pas forcément bon pour une autre ! </a:t>
-            </a:r>
-          </a:p>
-          <a:p>
-            <a:r>
-              <a:rPr lang="fr-FR" baseline="0" dirty="0" smtClean="0"/>
-              <a:t>Adapter les prétraitement à l’image </a:t>
-            </a:r>
-            <a:r>
-              <a:rPr lang="fr-FR" baseline="0" dirty="0" smtClean="0">
-                <a:sym typeface="Wingdings" panose="05000000000000000000" pitchFamily="2" charset="2"/>
-              </a:rPr>
-              <a:t> nouvelle partie solution dans le RàPC ?</a:t>
+              <a:t>Rein : seuils trop contraignants</a:t>
             </a:r>
             <a:endParaRPr lang="fr-FR" dirty="0"/>
           </a:p>
@@ -1828,7 +1789,7 @@
           <a:p>
             <a:fld id="{5984FE70-0D1D-40C7-9F56-3FAF97D50752}" type="slidenum">
               <a:rPr lang="fr-FR" smtClean="0"/>
-              <a:t>37</a:t>
+              <a:t>35</a:t>
             </a:fld>
             <a:endParaRPr lang="fr-FR"/>
           </a:p>
@@ -1837,7 +1798,7 @@
     </p:spTree>
     <p:extLst>
       <p:ext uri="{BB962C8B-B14F-4D97-AF65-F5344CB8AC3E}">
-        <p14:creationId xmlns:p14="http://schemas.microsoft.com/office/powerpoint/2010/main" val="3570101583"/>
+        <p14:creationId xmlns:p14="http://schemas.microsoft.com/office/powerpoint/2010/main" val="316203356"/>
       </p:ext>
     </p:extLst>
   </p:cSld>
@@ -1893,8 +1854,43 @@
           <a:p>
             <a:r>
               <a:rPr lang="fr-FR" dirty="0" smtClean="0"/>
-              <a:t>Expliquer pour la taille</a:t>
-            </a:r>
+              <a:t>Explication du </a:t>
+            </a:r>
+            <a:r>
+              <a:rPr lang="fr-FR" dirty="0" err="1" smtClean="0"/>
+              <a:t>unsharp</a:t>
+            </a:r>
+            <a:r>
+              <a:rPr lang="fr-FR" baseline="0" dirty="0" smtClean="0"/>
+              <a:t> </a:t>
+            </a:r>
+            <a:r>
+              <a:rPr lang="fr-FR" baseline="0" dirty="0" err="1" smtClean="0"/>
+              <a:t>mask</a:t>
+            </a:r>
+            <a:r>
+              <a:rPr lang="fr-FR" baseline="0" dirty="0" smtClean="0"/>
+              <a:t> dans « journail_de_travail.txt », 25/03</a:t>
+            </a:r>
+          </a:p>
+          <a:p>
+            <a:r>
+              <a:rPr lang="fr-FR" baseline="0" dirty="0" smtClean="0"/>
+              <a:t>Problème : Un prétraitement pour une image n’est pas forcément bon pour une autre ! </a:t>
+            </a:r>
+          </a:p>
+          <a:p>
+            <a:r>
+              <a:rPr lang="fr-FR" baseline="0" dirty="0" smtClean="0"/>
+              <a:t>Adapter les prétraitement à l’image </a:t>
+            </a:r>
+            <a:r>
+              <a:rPr lang="fr-FR" baseline="0" dirty="0" smtClean="0">
+                <a:sym typeface="Wingdings" panose="05000000000000000000" pitchFamily="2" charset="2"/>
+              </a:rPr>
+              <a:t> nouvelle partie solution dans le RàPC ?</a:t>
+            </a:r>
+            <a:endParaRPr lang="fr-FR" dirty="0"/>
           </a:p>
         </p:txBody>
       </p:sp>
@@ -1916,6 +1912,337 @@
             <a:fld id="{5984FE70-0D1D-40C7-9F56-3FAF97D50752}" type="slidenum">
               <a:rPr lang="fr-FR" smtClean="0"/>
               <a:t>38</a:t>
+            </a:fld>
+            <a:endParaRPr lang="fr-FR"/>
+          </a:p>
+        </p:txBody>
+      </p:sp>
+    </p:spTree>
+    <p:extLst>
+      <p:ext uri="{BB962C8B-B14F-4D97-AF65-F5344CB8AC3E}">
+        <p14:creationId xmlns:p14="http://schemas.microsoft.com/office/powerpoint/2010/main" val="3570101583"/>
+      </p:ext>
+    </p:extLst>
+  </p:cSld>
+  <p:clrMapOvr>
+    <a:masterClrMapping/>
+  </p:clrMapOvr>
+</p:notes>
+</file>
+
+<file path=ppt/notesSlides/notesSlide23.xml><?xml version="1.0" encoding="utf-8"?>
+<p:notes xmlns:a="http://schemas.openxmlformats.org/drawingml/2006/main" xmlns:r="http://schemas.openxmlformats.org/officeDocument/2006/relationships" xmlns:p="http://schemas.openxmlformats.org/presentationml/2006/main">
+  <p:cSld>
+    <p:spTree>
+      <p:nvGrpSpPr>
+        <p:cNvPr id="1" name=""/>
+        <p:cNvGrpSpPr/>
+        <p:nvPr/>
+      </p:nvGrpSpPr>
+      <p:grpSpPr>
+        <a:xfrm>
+          <a:off x="0" y="0"/>
+          <a:ext cx="0" cy="0"/>
+          <a:chOff x="0" y="0"/>
+          <a:chExt cx="0" cy="0"/>
+        </a:xfrm>
+      </p:grpSpPr>
+      <p:sp>
+        <p:nvSpPr>
+          <p:cNvPr id="2" name="Espace réservé de l'image des diapositives 1"/>
+          <p:cNvSpPr>
+            <a:spLocks noGrp="1" noRot="1" noChangeAspect="1"/>
+          </p:cNvSpPr>
+          <p:nvPr>
+            <p:ph type="sldImg"/>
+          </p:nvPr>
+        </p:nvSpPr>
+        <p:spPr/>
+      </p:sp>
+      <p:sp>
+        <p:nvSpPr>
+          <p:cNvPr id="3" name="Espace réservé des commentaires 2"/>
+          <p:cNvSpPr>
+            <a:spLocks noGrp="1"/>
+          </p:cNvSpPr>
+          <p:nvPr>
+            <p:ph type="body" idx="1"/>
+          </p:nvPr>
+        </p:nvSpPr>
+        <p:spPr/>
+        <p:txBody>
+          <a:bodyPr/>
+          <a:lstStyle/>
+          <a:p>
+            <a:r>
+              <a:rPr lang="fr-FR" dirty="0" smtClean="0"/>
+              <a:t>Explication du </a:t>
+            </a:r>
+            <a:r>
+              <a:rPr lang="fr-FR" dirty="0" err="1" smtClean="0"/>
+              <a:t>unsharp</a:t>
+            </a:r>
+            <a:r>
+              <a:rPr lang="fr-FR" baseline="0" dirty="0" smtClean="0"/>
+              <a:t> </a:t>
+            </a:r>
+            <a:r>
+              <a:rPr lang="fr-FR" baseline="0" dirty="0" err="1" smtClean="0"/>
+              <a:t>mask</a:t>
+            </a:r>
+            <a:r>
+              <a:rPr lang="fr-FR" baseline="0" dirty="0" smtClean="0"/>
+              <a:t> dans « journail_de_travail.txt », 25/03</a:t>
+            </a:r>
+          </a:p>
+          <a:p>
+            <a:r>
+              <a:rPr lang="fr-FR" baseline="0" dirty="0" smtClean="0"/>
+              <a:t>Problème : Un prétraitement pour une image n’est pas forcément bon pour une autre ! </a:t>
+            </a:r>
+          </a:p>
+          <a:p>
+            <a:r>
+              <a:rPr lang="fr-FR" baseline="0" dirty="0" smtClean="0"/>
+              <a:t>Adapter les prétraitement à l’image </a:t>
+            </a:r>
+            <a:r>
+              <a:rPr lang="fr-FR" baseline="0" dirty="0" smtClean="0">
+                <a:sym typeface="Wingdings" panose="05000000000000000000" pitchFamily="2" charset="2"/>
+              </a:rPr>
+              <a:t> nouvelle partie solution dans le RàPC ?</a:t>
+            </a:r>
+            <a:endParaRPr lang="fr-FR" dirty="0"/>
+          </a:p>
+        </p:txBody>
+      </p:sp>
+      <p:sp>
+        <p:nvSpPr>
+          <p:cNvPr id="4" name="Espace réservé du numéro de diapositive 3"/>
+          <p:cNvSpPr>
+            <a:spLocks noGrp="1"/>
+          </p:cNvSpPr>
+          <p:nvPr>
+            <p:ph type="sldNum" sz="quarter" idx="10"/>
+          </p:nvPr>
+        </p:nvSpPr>
+        <p:spPr/>
+        <p:txBody>
+          <a:bodyPr/>
+          <a:lstStyle/>
+          <a:p>
+            <a:fld id="{5984FE70-0D1D-40C7-9F56-3FAF97D50752}" type="slidenum">
+              <a:rPr lang="fr-FR" smtClean="0"/>
+              <a:t>39</a:t>
+            </a:fld>
+            <a:endParaRPr lang="fr-FR"/>
+          </a:p>
+        </p:txBody>
+      </p:sp>
+    </p:spTree>
+    <p:extLst>
+      <p:ext uri="{BB962C8B-B14F-4D97-AF65-F5344CB8AC3E}">
+        <p14:creationId xmlns:p14="http://schemas.microsoft.com/office/powerpoint/2010/main" val="3745156763"/>
+      </p:ext>
+    </p:extLst>
+  </p:cSld>
+  <p:clrMapOvr>
+    <a:masterClrMapping/>
+  </p:clrMapOvr>
+</p:notes>
+</file>
+
+<file path=ppt/notesSlides/notesSlide24.xml><?xml version="1.0" encoding="utf-8"?>
+<p:notes xmlns:a="http://schemas.openxmlformats.org/drawingml/2006/main" xmlns:r="http://schemas.openxmlformats.org/officeDocument/2006/relationships" xmlns:p="http://schemas.openxmlformats.org/presentationml/2006/main">
+  <p:cSld>
+    <p:spTree>
+      <p:nvGrpSpPr>
+        <p:cNvPr id="1" name=""/>
+        <p:cNvGrpSpPr/>
+        <p:nvPr/>
+      </p:nvGrpSpPr>
+      <p:grpSpPr>
+        <a:xfrm>
+          <a:off x="0" y="0"/>
+          <a:ext cx="0" cy="0"/>
+          <a:chOff x="0" y="0"/>
+          <a:chExt cx="0" cy="0"/>
+        </a:xfrm>
+      </p:grpSpPr>
+      <p:sp>
+        <p:nvSpPr>
+          <p:cNvPr id="2" name="Espace réservé de l'image des diapositives 1"/>
+          <p:cNvSpPr>
+            <a:spLocks noGrp="1" noRot="1" noChangeAspect="1"/>
+          </p:cNvSpPr>
+          <p:nvPr>
+            <p:ph type="sldImg"/>
+          </p:nvPr>
+        </p:nvSpPr>
+        <p:spPr/>
+      </p:sp>
+      <p:sp>
+        <p:nvSpPr>
+          <p:cNvPr id="3" name="Espace réservé des commentaires 2"/>
+          <p:cNvSpPr>
+            <a:spLocks noGrp="1"/>
+          </p:cNvSpPr>
+          <p:nvPr>
+            <p:ph type="body" idx="1"/>
+          </p:nvPr>
+        </p:nvSpPr>
+        <p:spPr/>
+        <p:txBody>
+          <a:bodyPr/>
+          <a:lstStyle/>
+          <a:p>
+            <a:r>
+              <a:rPr lang="fr-FR" dirty="0" smtClean="0"/>
+              <a:t>Explication du </a:t>
+            </a:r>
+            <a:r>
+              <a:rPr lang="fr-FR" dirty="0" err="1" smtClean="0"/>
+              <a:t>unsharp</a:t>
+            </a:r>
+            <a:r>
+              <a:rPr lang="fr-FR" baseline="0" dirty="0" smtClean="0"/>
+              <a:t> </a:t>
+            </a:r>
+            <a:r>
+              <a:rPr lang="fr-FR" baseline="0" dirty="0" err="1" smtClean="0"/>
+              <a:t>mask</a:t>
+            </a:r>
+            <a:r>
+              <a:rPr lang="fr-FR" baseline="0" dirty="0" smtClean="0"/>
+              <a:t> dans « journail_de_travail.txt », 25/03</a:t>
+            </a:r>
+          </a:p>
+          <a:p>
+            <a:r>
+              <a:rPr lang="fr-FR" baseline="0" dirty="0" smtClean="0"/>
+              <a:t>Problème : Un prétraitement pour une image n’est pas forcément bon pour une autre ! </a:t>
+            </a:r>
+          </a:p>
+          <a:p>
+            <a:r>
+              <a:rPr lang="fr-FR" baseline="0" dirty="0" smtClean="0"/>
+              <a:t>Adapter les prétraitement à l’image </a:t>
+            </a:r>
+            <a:r>
+              <a:rPr lang="fr-FR" baseline="0" dirty="0" smtClean="0">
+                <a:sym typeface="Wingdings" panose="05000000000000000000" pitchFamily="2" charset="2"/>
+              </a:rPr>
+              <a:t> nouvelle partie solution dans le RàPC ?</a:t>
+            </a:r>
+            <a:endParaRPr lang="fr-FR" dirty="0"/>
+          </a:p>
+        </p:txBody>
+      </p:sp>
+      <p:sp>
+        <p:nvSpPr>
+          <p:cNvPr id="4" name="Espace réservé du numéro de diapositive 3"/>
+          <p:cNvSpPr>
+            <a:spLocks noGrp="1"/>
+          </p:cNvSpPr>
+          <p:nvPr>
+            <p:ph type="sldNum" sz="quarter" idx="10"/>
+          </p:nvPr>
+        </p:nvSpPr>
+        <p:spPr/>
+        <p:txBody>
+          <a:bodyPr/>
+          <a:lstStyle/>
+          <a:p>
+            <a:fld id="{5984FE70-0D1D-40C7-9F56-3FAF97D50752}" type="slidenum">
+              <a:rPr lang="fr-FR" smtClean="0"/>
+              <a:t>40</a:t>
+            </a:fld>
+            <a:endParaRPr lang="fr-FR"/>
+          </a:p>
+        </p:txBody>
+      </p:sp>
+    </p:spTree>
+    <p:extLst>
+      <p:ext uri="{BB962C8B-B14F-4D97-AF65-F5344CB8AC3E}">
+        <p14:creationId xmlns:p14="http://schemas.microsoft.com/office/powerpoint/2010/main" val="1170380687"/>
+      </p:ext>
+    </p:extLst>
+  </p:cSld>
+  <p:clrMapOvr>
+    <a:masterClrMapping/>
+  </p:clrMapOvr>
+</p:notes>
+</file>
+
+<file path=ppt/notesSlides/notesSlide25.xml><?xml version="1.0" encoding="utf-8"?>
+<p:notes xmlns:a="http://schemas.openxmlformats.org/drawingml/2006/main" xmlns:r="http://schemas.openxmlformats.org/officeDocument/2006/relationships" xmlns:p="http://schemas.openxmlformats.org/presentationml/2006/main">
+  <p:cSld>
+    <p:spTree>
+      <p:nvGrpSpPr>
+        <p:cNvPr id="1" name=""/>
+        <p:cNvGrpSpPr/>
+        <p:nvPr/>
+      </p:nvGrpSpPr>
+      <p:grpSpPr>
+        <a:xfrm>
+          <a:off x="0" y="0"/>
+          <a:ext cx="0" cy="0"/>
+          <a:chOff x="0" y="0"/>
+          <a:chExt cx="0" cy="0"/>
+        </a:xfrm>
+      </p:grpSpPr>
+      <p:sp>
+        <p:nvSpPr>
+          <p:cNvPr id="2" name="Espace réservé de l'image des diapositives 1"/>
+          <p:cNvSpPr>
+            <a:spLocks noGrp="1" noRot="1" noChangeAspect="1"/>
+          </p:cNvSpPr>
+          <p:nvPr>
+            <p:ph type="sldImg"/>
+          </p:nvPr>
+        </p:nvSpPr>
+        <p:spPr/>
+      </p:sp>
+      <p:sp>
+        <p:nvSpPr>
+          <p:cNvPr id="3" name="Espace réservé des commentaires 2"/>
+          <p:cNvSpPr>
+            <a:spLocks noGrp="1"/>
+          </p:cNvSpPr>
+          <p:nvPr>
+            <p:ph type="body" idx="1"/>
+          </p:nvPr>
+        </p:nvSpPr>
+        <p:spPr/>
+        <p:txBody>
+          <a:bodyPr/>
+          <a:lstStyle/>
+          <a:p>
+            <a:r>
+              <a:rPr lang="fr-FR" dirty="0" smtClean="0"/>
+              <a:t>Expliquer pour la taille</a:t>
+            </a:r>
+          </a:p>
+        </p:txBody>
+      </p:sp>
+      <p:sp>
+        <p:nvSpPr>
+          <p:cNvPr id="4" name="Espace réservé du numéro de diapositive 3"/>
+          <p:cNvSpPr>
+            <a:spLocks noGrp="1"/>
+          </p:cNvSpPr>
+          <p:nvPr>
+            <p:ph type="sldNum" sz="quarter" idx="10"/>
+          </p:nvPr>
+        </p:nvSpPr>
+        <p:spPr/>
+        <p:txBody>
+          <a:bodyPr/>
+          <a:lstStyle/>
+          <a:p>
+            <a:fld id="{5984FE70-0D1D-40C7-9F56-3FAF97D50752}" type="slidenum">
+              <a:rPr lang="fr-FR" smtClean="0"/>
+              <a:t>41</a:t>
             </a:fld>
             <a:endParaRPr lang="fr-FR"/>
           </a:p>
@@ -3181,7 +3508,7 @@
           <a:p>
             <a:fld id="{B13A3E0C-43BD-4BD3-9D98-E47133C0F16B}" type="datetime1">
               <a:rPr lang="en-US" smtClean="0"/>
-              <a:t>3/29/2017</a:t>
+              <a:t>3/30/2017</a:t>
             </a:fld>
             <a:endParaRPr lang="en-US" dirty="0"/>
           </a:p>
@@ -3477,7 +3804,7 @@
           <a:p>
             <a:fld id="{DEAE60AC-6FB4-4151-AF18-32B957CEA5B2}" type="datetime1">
               <a:rPr lang="en-US" smtClean="0"/>
-              <a:t>3/29/2017</a:t>
+              <a:t>3/30/2017</a:t>
             </a:fld>
             <a:endParaRPr lang="en-US" dirty="0"/>
           </a:p>
@@ -3725,7 +4052,7 @@
           <a:p>
             <a:fld id="{49AF46AD-D75C-4BBC-B0EE-EB1C4A750FFF}" type="datetime1">
               <a:rPr lang="en-US" smtClean="0"/>
-              <a:t>3/29/2017</a:t>
+              <a:t>3/30/2017</a:t>
             </a:fld>
             <a:endParaRPr lang="en-US" dirty="0"/>
           </a:p>
@@ -4265,7 +4592,7 @@
           <a:p>
             <a:fld id="{B3EBDC74-5C10-4051-A6E3-AA9EF5D2777A}" type="datetime1">
               <a:rPr lang="en-US" smtClean="0"/>
-              <a:t>3/29/2017</a:t>
+              <a:t>3/30/2017</a:t>
             </a:fld>
             <a:endParaRPr lang="en-US" dirty="0"/>
           </a:p>
@@ -4513,7 +4840,7 @@
           <a:p>
             <a:fld id="{A45DC689-383C-4C65-9A99-BE249E8E6DA6}" type="datetime1">
               <a:rPr lang="en-US" smtClean="0"/>
-              <a:t>3/29/2017</a:t>
+              <a:t>3/30/2017</a:t>
             </a:fld>
             <a:endParaRPr lang="en-US" dirty="0"/>
           </a:p>
@@ -5045,7 +5372,7 @@
           <a:p>
             <a:fld id="{CD908F51-167A-4815-AAA7-25CFFE4B423B}" type="datetime1">
               <a:rPr lang="en-US" smtClean="0"/>
-              <a:t>3/29/2017</a:t>
+              <a:t>3/30/2017</a:t>
             </a:fld>
             <a:endParaRPr lang="en-US" dirty="0"/>
           </a:p>
@@ -5342,7 +5669,7 @@
           <a:p>
             <a:fld id="{575B863B-5F62-4D1B-A811-2497203129B2}" type="datetime1">
               <a:rPr lang="en-US" smtClean="0"/>
-              <a:t>3/29/2017</a:t>
+              <a:t>3/30/2017</a:t>
             </a:fld>
             <a:endParaRPr lang="en-US" dirty="0"/>
           </a:p>
@@ -5516,7 +5843,7 @@
           <a:p>
             <a:fld id="{2C9DBC4B-3B74-49C1-839E-BABE36E5940B}" type="datetime1">
               <a:rPr lang="en-US" smtClean="0"/>
-              <a:t>3/29/2017</a:t>
+              <a:t>3/30/2017</a:t>
             </a:fld>
             <a:endParaRPr lang="en-US" dirty="0"/>
           </a:p>
@@ -5696,7 +6023,7 @@
           <a:p>
             <a:fld id="{F235FBA5-93E2-443B-A8CE-27C1480288D2}" type="datetime1">
               <a:rPr lang="en-US" smtClean="0"/>
-              <a:t>3/29/2017</a:t>
+              <a:t>3/30/2017</a:t>
             </a:fld>
             <a:endParaRPr lang="en-US" dirty="0"/>
           </a:p>
@@ -5866,7 +6193,7 @@
           <a:p>
             <a:fld id="{41689828-3518-4A8E-AE0E-F7C6B57D9567}" type="datetime1">
               <a:rPr lang="en-US" smtClean="0"/>
-              <a:t>3/29/2017</a:t>
+              <a:t>3/30/2017</a:t>
             </a:fld>
             <a:endParaRPr lang="en-US" dirty="0"/>
           </a:p>
@@ -6117,7 +6444,7 @@
           <a:p>
             <a:fld id="{8049D5B7-E950-4F1F-896A-2428B09F2CC0}" type="datetime1">
               <a:rPr lang="en-US" smtClean="0"/>
-              <a:t>3/29/2017</a:t>
+              <a:t>3/30/2017</a:t>
             </a:fld>
             <a:endParaRPr lang="en-US" dirty="0"/>
           </a:p>
@@ -6414,7 +6741,7 @@
           <a:p>
             <a:fld id="{933C9C39-ED98-4B12-9750-FA3EA5E008D8}" type="datetime1">
               <a:rPr lang="en-US" smtClean="0"/>
-              <a:t>3/29/2017</a:t>
+              <a:t>3/30/2017</a:t>
             </a:fld>
             <a:endParaRPr lang="en-US" dirty="0"/>
           </a:p>
@@ -6856,7 +7183,7 @@
           <a:p>
             <a:fld id="{E9232F9C-7B0D-40AC-879E-D399781AA9DD}" type="datetime1">
               <a:rPr lang="en-US" smtClean="0"/>
-              <a:t>3/29/2017</a:t>
+              <a:t>3/30/2017</a:t>
             </a:fld>
             <a:endParaRPr lang="en-US" dirty="0"/>
           </a:p>
@@ -6974,7 +7301,7 @@
           <a:p>
             <a:fld id="{50646EB0-DC39-4154-9CE8-BEB693E1778F}" type="datetime1">
               <a:rPr lang="en-US" smtClean="0"/>
-              <a:t>3/29/2017</a:t>
+              <a:t>3/30/2017</a:t>
             </a:fld>
             <a:endParaRPr lang="en-US" dirty="0"/>
           </a:p>
@@ -7069,7 +7396,7 @@
           <a:p>
             <a:fld id="{1862B018-388A-4D00-857F-89E0E298EDB9}" type="datetime1">
               <a:rPr lang="en-US" smtClean="0"/>
-              <a:t>3/29/2017</a:t>
+              <a:t>3/30/2017</a:t>
             </a:fld>
             <a:endParaRPr lang="en-US" dirty="0"/>
           </a:p>
@@ -7352,7 +7679,7 @@
           <a:p>
             <a:fld id="{5876601C-147A-40D7-86CA-8C540E946C34}" type="datetime1">
               <a:rPr lang="en-US" smtClean="0"/>
-              <a:t>3/29/2017</a:t>
+              <a:t>3/30/2017</a:t>
             </a:fld>
             <a:endParaRPr lang="en-US" dirty="0"/>
           </a:p>
@@ -7643,7 +7970,7 @@
           <a:p>
             <a:fld id="{B25ACF09-D22D-44AC-9A23-30C84696D0B5}" type="datetime1">
               <a:rPr lang="en-US" smtClean="0"/>
-              <a:t>3/29/2017</a:t>
+              <a:t>3/30/2017</a:t>
             </a:fld>
             <a:endParaRPr lang="en-US" dirty="0"/>
           </a:p>
@@ -8173,7 +8500,7 @@
           <a:p>
             <a:fld id="{ED468347-93DD-4B15-A18F-1C554DAB4580}" type="datetime1">
               <a:rPr lang="en-US" smtClean="0"/>
-              <a:t>3/29/2017</a:t>
+              <a:t>3/30/2017</a:t>
             </a:fld>
             <a:endParaRPr lang="en-US" dirty="0"/>
           </a:p>
@@ -14068,11 +14395,7 @@
           <a:p>
             <a:r>
               <a:rPr lang="fr-FR" dirty="0" smtClean="0"/>
-              <a:t>Ouverture / Fermeture morphologique après </a:t>
-            </a:r>
-            <a:r>
-              <a:rPr lang="fr-FR" dirty="0" smtClean="0"/>
-              <a:t>segmentation</a:t>
+              <a:t>Ouverture / Fermeture morphologique après segmentation</a:t>
             </a:r>
           </a:p>
           <a:p>
@@ -14092,7 +14415,6 @@
               <a:rPr lang="fr-FR" dirty="0" smtClean="0"/>
               <a:t>« Mini RàPC » simplifié</a:t>
             </a:r>
-            <a:endParaRPr lang="fr-FR" dirty="0" smtClean="0"/>
           </a:p>
           <a:p>
             <a:pPr marL="0" indent="0">
@@ -14879,18 +15201,17 @@
             <a:pPr marL="0" indent="0">
               <a:buNone/>
             </a:pPr>
-            <a:r>
-              <a:rPr lang="fr-FR" dirty="0" smtClean="0"/>
-              <a:t>Résultats d’exécution : méthode </a:t>
-            </a:r>
-            <a:r>
-              <a:rPr lang="fr-FR" dirty="0" err="1" smtClean="0"/>
-              <a:t>toString</a:t>
-            </a:r>
-            <a:r>
-              <a:rPr lang="fr-FR" dirty="0" smtClean="0"/>
-              <a:t>() de la base de cas associée</a:t>
-            </a:r>
+            <a:endParaRPr lang="fr-FR" dirty="0" smtClean="0"/>
+          </a:p>
+          <a:p>
+            <a:pPr marL="0" indent="0">
+              <a:buNone/>
+            </a:pPr>
+            <a:r>
+              <a:rPr lang="fr-FR" dirty="0" smtClean="0"/>
+              <a:t>Fermeture morphologique :</a:t>
+            </a:r>
+            <a:endParaRPr lang="fr-FR" dirty="0" smtClean="0"/>
           </a:p>
           <a:p>
             <a:pPr marL="0" indent="0">
@@ -14936,50 +15257,97 @@
           </a:p>
         </p:txBody>
       </p:sp>
-      <p:pic>
-        <p:nvPicPr>
-          <p:cNvPr id="4" name="Image 3"/>
-          <p:cNvPicPr>
-            <a:picLocks noChangeAspect="1"/>
-          </p:cNvPicPr>
+      <p:sp>
+        <p:nvSpPr>
+          <p:cNvPr id="6" name="ZoneTexte 5"/>
+          <p:cNvSpPr txBox="1"/>
           <p:nvPr/>
-        </p:nvPicPr>
-        <p:blipFill>
-          <a:blip r:embed="rId2">
-            <a:extLst>
-              <a:ext uri="{28A0092B-C50C-407E-A947-70E740481C1C}">
-                <a14:useLocalDpi xmlns:a14="http://schemas.microsoft.com/office/drawing/2010/main" val="0"/>
-              </a:ext>
-            </a:extLst>
-          </a:blip>
-          <a:stretch>
-            <a:fillRect/>
-          </a:stretch>
-        </p:blipFill>
-        <p:spPr>
-          <a:xfrm>
-            <a:off x="2177866" y="1464972"/>
-            <a:ext cx="8631600" cy="4941927"/>
+        </p:nvSpPr>
+        <p:spPr>
+          <a:xfrm>
+            <a:off x="4066947" y="5585870"/>
+            <a:ext cx="5143500" cy="369332"/>
           </a:xfrm>
           <a:prstGeom prst="rect">
             <a:avLst/>
           </a:prstGeom>
-          <a:ln>
-            <a:noFill/>
-          </a:ln>
-          <a:effectLst>
-            <a:outerShdw blurRad="292100" dist="139700" dir="2700000" algn="tl" rotWithShape="0">
-              <a:srgbClr val="333333">
-                <a:alpha val="65000"/>
-              </a:srgbClr>
-            </a:outerShdw>
-          </a:effectLst>
-        </p:spPr>
-      </p:pic>
+          <a:noFill/>
+        </p:spPr>
+        <p:txBody>
+          <a:bodyPr wrap="square" rtlCol="0">
+            <a:spAutoFit/>
+          </a:bodyPr>
+          <a:lstStyle/>
+          <a:p>
+            <a:r>
+              <a:rPr lang="fr-FR" dirty="0" smtClean="0"/>
+              <a:t>Effet : comble les « trous » des objets de l’image</a:t>
+            </a:r>
+            <a:endParaRPr lang="fr-FR" dirty="0"/>
+          </a:p>
+        </p:txBody>
+      </p:sp>
+      <p:graphicFrame>
+        <p:nvGraphicFramePr>
+          <p:cNvPr id="13" name="Objet 12"/>
+          <p:cNvGraphicFramePr>
+            <a:graphicFrameLocks noChangeAspect="1"/>
+          </p:cNvGraphicFramePr>
+          <p:nvPr>
+            <p:extLst>
+              <p:ext uri="{D42A27DB-BD31-4B8C-83A1-F6EECF244321}">
+                <p14:modId xmlns:p14="http://schemas.microsoft.com/office/powerpoint/2010/main" val="2056211906"/>
+              </p:ext>
+            </p:extLst>
+          </p:nvPr>
+        </p:nvGraphicFramePr>
+        <p:xfrm>
+          <a:off x="1656589" y="2102757"/>
+          <a:ext cx="9846434" cy="2991757"/>
+        </p:xfrm>
+        <a:graphic>
+          <a:graphicData uri="http://schemas.openxmlformats.org/presentationml/2006/ole">
+            <mc:AlternateContent xmlns:mc="http://schemas.openxmlformats.org/markup-compatibility/2006">
+              <mc:Choice xmlns:v="urn:schemas-microsoft-com:vml" Requires="v">
+                <p:oleObj spid="_x0000_s2055" name="Feuille de calcul" r:id="rId4" imgW="8181895" imgH="2486031" progId="Excel.Sheet.12">
+                  <p:embed/>
+                </p:oleObj>
+              </mc:Choice>
+              <mc:Fallback>
+                <p:oleObj name="Feuille de calcul" r:id="rId4" imgW="8181895" imgH="2486031" progId="Excel.Sheet.12">
+                  <p:embed/>
+                  <p:pic>
+                    <p:nvPicPr>
+                      <p:cNvPr id="0" name=""/>
+                      <p:cNvPicPr/>
+                      <p:nvPr/>
+                    </p:nvPicPr>
+                    <p:blipFill>
+                      <a:blip r:embed="rId5"/>
+                      <a:stretch>
+                        <a:fillRect/>
+                      </a:stretch>
+                    </p:blipFill>
+                    <p:spPr>
+                      <a:xfrm>
+                        <a:off x="1656589" y="2102757"/>
+                        <a:ext cx="9846434" cy="2991757"/>
+                      </a:xfrm>
+                      <a:prstGeom prst="rect">
+                        <a:avLst/>
+                      </a:prstGeom>
+                    </p:spPr>
+                  </p:pic>
+                </p:oleObj>
+              </mc:Fallback>
+            </mc:AlternateContent>
+          </a:graphicData>
+        </a:graphic>
+      </p:graphicFrame>
     </p:spTree>
     <p:extLst>
       <p:ext uri="{BB962C8B-B14F-4D97-AF65-F5344CB8AC3E}">
-        <p14:creationId xmlns:p14="http://schemas.microsoft.com/office/powerpoint/2010/main" val="3000142931"/>
+        <p14:creationId xmlns:p14="http://schemas.microsoft.com/office/powerpoint/2010/main" val="2420808155"/>
       </p:ext>
     </p:extLst>
   </p:cSld>
@@ -15072,7 +15440,15 @@
             </a:pPr>
             <a:r>
               <a:rPr lang="fr-FR" dirty="0" smtClean="0"/>
-              <a:t>Résultats d’exécution : Segmentation d’une tumeur (sans puis avec fermeture)</a:t>
+              <a:t>Résultats d’exécution : méthode </a:t>
+            </a:r>
+            <a:r>
+              <a:rPr lang="fr-FR" dirty="0" err="1" smtClean="0"/>
+              <a:t>toString</a:t>
+            </a:r>
+            <a:r>
+              <a:rPr lang="fr-FR" dirty="0" smtClean="0"/>
+              <a:t>() de la base de cas associée</a:t>
             </a:r>
           </a:p>
           <a:p>
@@ -15121,14 +15497,14 @@
       </p:sp>
       <p:pic>
         <p:nvPicPr>
-          <p:cNvPr id="6" name="Image 5"/>
+          <p:cNvPr id="4" name="Image 3"/>
           <p:cNvPicPr>
             <a:picLocks noChangeAspect="1"/>
           </p:cNvPicPr>
           <p:nvPr/>
         </p:nvPicPr>
         <p:blipFill>
-          <a:blip r:embed="rId3">
+          <a:blip r:embed="rId2">
             <a:extLst>
               <a:ext uri="{28A0092B-C50C-407E-A947-70E740481C1C}">
                 <a14:useLocalDpi xmlns:a14="http://schemas.microsoft.com/office/drawing/2010/main" val="0"/>
@@ -15141,8 +15517,8 @@
         </p:blipFill>
         <p:spPr>
           <a:xfrm>
-            <a:off x="252249" y="1951023"/>
-            <a:ext cx="11682248" cy="3090819"/>
+            <a:off x="2177866" y="1464972"/>
+            <a:ext cx="8631600" cy="4941927"/>
           </a:xfrm>
           <a:prstGeom prst="rect">
             <a:avLst/>
@@ -15159,40 +15535,10 @@
           </a:effectLst>
         </p:spPr>
       </p:pic>
-      <p:sp>
-        <p:nvSpPr>
-          <p:cNvPr id="7" name="ZoneTexte 6"/>
-          <p:cNvSpPr txBox="1"/>
-          <p:nvPr/>
-        </p:nvSpPr>
-        <p:spPr>
-          <a:xfrm>
-            <a:off x="4508938" y="5168585"/>
-            <a:ext cx="5360275" cy="369332"/>
-          </a:xfrm>
-          <a:prstGeom prst="rect">
-            <a:avLst/>
-          </a:prstGeom>
-          <a:noFill/>
-        </p:spPr>
-        <p:txBody>
-          <a:bodyPr wrap="square" rtlCol="0">
-            <a:spAutoFit/>
-          </a:bodyPr>
-          <a:lstStyle/>
-          <a:p>
-            <a:r>
-              <a:rPr lang="fr-FR" dirty="0" smtClean="0"/>
-              <a:t>Seuil global : 30   Seuil local : 15</a:t>
-            </a:r>
-            <a:endParaRPr lang="fr-FR" dirty="0"/>
-          </a:p>
-        </p:txBody>
-      </p:sp>
     </p:spTree>
     <p:extLst>
       <p:ext uri="{BB962C8B-B14F-4D97-AF65-F5344CB8AC3E}">
-        <p14:creationId xmlns:p14="http://schemas.microsoft.com/office/powerpoint/2010/main" val="51449911"/>
+        <p14:creationId xmlns:p14="http://schemas.microsoft.com/office/powerpoint/2010/main" val="3000142931"/>
       </p:ext>
     </p:extLst>
   </p:cSld>
@@ -15285,7 +15631,7 @@
             </a:pPr>
             <a:r>
               <a:rPr lang="fr-FR" dirty="0" smtClean="0"/>
-              <a:t>Résultats d’exécution : Exemple de fusion entre deux régions (en violet foncé) </a:t>
+              <a:t>Résultats d’exécution : Segmentation d’une tumeur (sans puis avec fermeture)</a:t>
             </a:r>
           </a:p>
           <a:p>
@@ -15334,22 +15680,28 @@
       </p:sp>
       <p:pic>
         <p:nvPicPr>
-          <p:cNvPr id="4" name="Image 3"/>
+          <p:cNvPr id="6" name="Image 5"/>
           <p:cNvPicPr>
             <a:picLocks noChangeAspect="1"/>
           </p:cNvPicPr>
           <p:nvPr/>
         </p:nvPicPr>
         <p:blipFill>
-          <a:blip r:embed="rId2"/>
+          <a:blip r:embed="rId3">
+            <a:extLst>
+              <a:ext uri="{28A0092B-C50C-407E-A947-70E740481C1C}">
+                <a14:useLocalDpi xmlns:a14="http://schemas.microsoft.com/office/drawing/2010/main" val="0"/>
+              </a:ext>
+            </a:extLst>
+          </a:blip>
           <a:stretch>
             <a:fillRect/>
           </a:stretch>
         </p:blipFill>
         <p:spPr>
           <a:xfrm>
-            <a:off x="3749894" y="1639614"/>
-            <a:ext cx="4629150" cy="5019675"/>
+            <a:off x="252249" y="1951023"/>
+            <a:ext cx="11682248" cy="3090819"/>
           </a:xfrm>
           <a:prstGeom prst="rect">
             <a:avLst/>
@@ -15366,10 +15718,40 @@
           </a:effectLst>
         </p:spPr>
       </p:pic>
+      <p:sp>
+        <p:nvSpPr>
+          <p:cNvPr id="7" name="ZoneTexte 6"/>
+          <p:cNvSpPr txBox="1"/>
+          <p:nvPr/>
+        </p:nvSpPr>
+        <p:spPr>
+          <a:xfrm>
+            <a:off x="4508938" y="5168585"/>
+            <a:ext cx="5360275" cy="369332"/>
+          </a:xfrm>
+          <a:prstGeom prst="rect">
+            <a:avLst/>
+          </a:prstGeom>
+          <a:noFill/>
+        </p:spPr>
+        <p:txBody>
+          <a:bodyPr wrap="square" rtlCol="0">
+            <a:spAutoFit/>
+          </a:bodyPr>
+          <a:lstStyle/>
+          <a:p>
+            <a:r>
+              <a:rPr lang="fr-FR" dirty="0" smtClean="0"/>
+              <a:t>Seuil global : 30   Seuil local : 15</a:t>
+            </a:r>
+            <a:endParaRPr lang="fr-FR" dirty="0"/>
+          </a:p>
+        </p:txBody>
+      </p:sp>
     </p:spTree>
     <p:extLst>
       <p:ext uri="{BB962C8B-B14F-4D97-AF65-F5344CB8AC3E}">
-        <p14:creationId xmlns:p14="http://schemas.microsoft.com/office/powerpoint/2010/main" val="1524824229"/>
+        <p14:creationId xmlns:p14="http://schemas.microsoft.com/office/powerpoint/2010/main" val="51449911"/>
       </p:ext>
     </p:extLst>
   </p:cSld>
@@ -15426,7 +15808,7 @@
             <a:pPr algn="l"/>
             <a:r>
               <a:rPr lang="fr-FR" dirty="0" smtClean="0"/>
-              <a:t>IV. Problèmes liés à la segmentation</a:t>
+              <a:t>III. Implémentation</a:t>
             </a:r>
             <a:br>
               <a:rPr lang="fr-FR" dirty="0" smtClean="0"/>
@@ -15447,8 +15829,8 @@
         </p:nvSpPr>
         <p:spPr>
           <a:xfrm>
-            <a:off x="1484310" y="1135118"/>
-            <a:ext cx="10577061" cy="4307740"/>
+            <a:off x="1484310" y="993228"/>
+            <a:ext cx="10577061" cy="5239028"/>
           </a:xfrm>
         </p:spPr>
         <p:txBody>
@@ -15462,14 +15844,14 @@
             </a:pPr>
             <a:r>
               <a:rPr lang="fr-FR" dirty="0" smtClean="0"/>
-              <a:t>Cas d’une image « compliquée » ou de « mauvaise qualité »</a:t>
+              <a:t>Résultats d’exécution : Exemple de fusion entre deux régions (en violet foncé) </a:t>
             </a:r>
           </a:p>
           <a:p>
             <a:pPr marL="0" indent="0">
               <a:buNone/>
             </a:pPr>
-            <a:endParaRPr lang="fr-FR" dirty="0"/>
+            <a:endParaRPr lang="fr-FR" dirty="0" smtClean="0"/>
           </a:p>
           <a:p>
             <a:pPr marL="0" indent="0">
@@ -15518,21 +15900,15 @@
           <p:nvPr/>
         </p:nvPicPr>
         <p:blipFill>
-          <a:blip r:embed="rId2">
-            <a:extLst>
-              <a:ext uri="{28A0092B-C50C-407E-A947-70E740481C1C}">
-                <a14:useLocalDpi xmlns:a14="http://schemas.microsoft.com/office/drawing/2010/main" val="0"/>
-              </a:ext>
-            </a:extLst>
-          </a:blip>
+          <a:blip r:embed="rId2"/>
           <a:stretch>
             <a:fillRect/>
           </a:stretch>
         </p:blipFill>
         <p:spPr>
           <a:xfrm>
-            <a:off x="2802728" y="1639614"/>
-            <a:ext cx="7381875" cy="4924425"/>
+            <a:off x="3749894" y="1639614"/>
+            <a:ext cx="4629150" cy="5019675"/>
           </a:xfrm>
           <a:prstGeom prst="rect">
             <a:avLst/>
@@ -15552,7 +15928,7 @@
     </p:spTree>
     <p:extLst>
       <p:ext uri="{BB962C8B-B14F-4D97-AF65-F5344CB8AC3E}">
-        <p14:creationId xmlns:p14="http://schemas.microsoft.com/office/powerpoint/2010/main" val="1107083860"/>
+        <p14:creationId xmlns:p14="http://schemas.microsoft.com/office/powerpoint/2010/main" val="1524824229"/>
       </p:ext>
     </p:extLst>
   </p:cSld>
@@ -15645,7 +16021,7 @@
             </a:pPr>
             <a:r>
               <a:rPr lang="fr-FR" dirty="0" smtClean="0"/>
-              <a:t>Résultats obtenus : mauvaise segmentation de la tumeur et du rein sein</a:t>
+              <a:t>Cas d’une image « compliquée » ou de « mauvaise qualité »</a:t>
             </a:r>
           </a:p>
           <a:p>
@@ -15692,46 +16068,16 @@
           </a:p>
         </p:txBody>
       </p:sp>
-      <p:sp>
-        <p:nvSpPr>
-          <p:cNvPr id="7" name="ZoneTexte 6"/>
-          <p:cNvSpPr txBox="1"/>
-          <p:nvPr/>
-        </p:nvSpPr>
-        <p:spPr>
-          <a:xfrm>
-            <a:off x="7220606" y="5665934"/>
-            <a:ext cx="5360275" cy="369332"/>
-          </a:xfrm>
-          <a:prstGeom prst="rect">
-            <a:avLst/>
-          </a:prstGeom>
-          <a:noFill/>
-        </p:spPr>
-        <p:txBody>
-          <a:bodyPr wrap="square" rtlCol="0">
-            <a:spAutoFit/>
-          </a:bodyPr>
-          <a:lstStyle/>
-          <a:p>
-            <a:r>
-              <a:rPr lang="fr-FR" dirty="0" smtClean="0"/>
-              <a:t>Seuil global : 10   Seuil local : 5</a:t>
-            </a:r>
-            <a:endParaRPr lang="fr-FR" dirty="0"/>
-          </a:p>
-        </p:txBody>
-      </p:sp>
       <p:pic>
         <p:nvPicPr>
-          <p:cNvPr id="8" name="Image 7"/>
+          <p:cNvPr id="4" name="Image 3"/>
           <p:cNvPicPr>
             <a:picLocks noChangeAspect="1"/>
           </p:cNvPicPr>
           <p:nvPr/>
         </p:nvPicPr>
         <p:blipFill>
-          <a:blip r:embed="rId3">
+          <a:blip r:embed="rId2">
             <a:extLst>
               <a:ext uri="{28A0092B-C50C-407E-A947-70E740481C1C}">
                 <a14:useLocalDpi xmlns:a14="http://schemas.microsoft.com/office/drawing/2010/main" val="0"/>
@@ -15744,8 +16090,8 @@
         </p:blipFill>
         <p:spPr>
           <a:xfrm>
-            <a:off x="599090" y="1639614"/>
-            <a:ext cx="11027876" cy="4001139"/>
+            <a:off x="2802728" y="1639614"/>
+            <a:ext cx="7381875" cy="4924425"/>
           </a:xfrm>
           <a:prstGeom prst="rect">
             <a:avLst/>
@@ -15765,7 +16111,7 @@
     </p:spTree>
     <p:extLst>
       <p:ext uri="{BB962C8B-B14F-4D97-AF65-F5344CB8AC3E}">
-        <p14:creationId xmlns:p14="http://schemas.microsoft.com/office/powerpoint/2010/main" val="372313777"/>
+        <p14:creationId xmlns:p14="http://schemas.microsoft.com/office/powerpoint/2010/main" val="1107083860"/>
       </p:ext>
     </p:extLst>
   </p:cSld>
@@ -15858,15 +16204,8 @@
             </a:pPr>
             <a:r>
               <a:rPr lang="fr-FR" dirty="0" smtClean="0"/>
-              <a:t>Résultats obtenus : isolation du rein sein sur cette image </a:t>
-            </a:r>
-            <a:r>
-              <a:rPr lang="fr-FR" dirty="0" smtClean="0">
-                <a:sym typeface="Wingdings" panose="05000000000000000000" pitchFamily="2" charset="2"/>
-              </a:rPr>
-              <a:t> gros seuils nécessaires</a:t>
-            </a:r>
-            <a:endParaRPr lang="fr-FR" dirty="0" smtClean="0"/>
+              <a:t>Résultats obtenus : mauvaise segmentation de la tumeur et du rein sein</a:t>
+            </a:r>
           </a:p>
           <a:p>
             <a:pPr marL="0" indent="0">
@@ -15920,7 +16259,7 @@
         </p:nvSpPr>
         <p:spPr>
           <a:xfrm>
-            <a:off x="7220606" y="5794178"/>
+            <a:off x="7220606" y="5665934"/>
             <a:ext cx="5360275" cy="369332"/>
           </a:xfrm>
           <a:prstGeom prst="rect">
@@ -15936,7 +16275,7 @@
           <a:p>
             <a:r>
               <a:rPr lang="fr-FR" dirty="0" smtClean="0"/>
-              <a:t>Seuil global : 53  Seuil local : 15</a:t>
+              <a:t>Seuil global : 10   Seuil local : 5</a:t>
             </a:r>
             <a:endParaRPr lang="fr-FR" dirty="0"/>
           </a:p>
@@ -15944,22 +16283,28 @@
       </p:sp>
       <p:pic>
         <p:nvPicPr>
-          <p:cNvPr id="4" name="Image 3"/>
+          <p:cNvPr id="8" name="Image 7"/>
           <p:cNvPicPr>
             <a:picLocks noChangeAspect="1"/>
           </p:cNvPicPr>
           <p:nvPr/>
         </p:nvPicPr>
         <p:blipFill>
-          <a:blip r:embed="rId2"/>
+          <a:blip r:embed="rId3">
+            <a:extLst>
+              <a:ext uri="{28A0092B-C50C-407E-A947-70E740481C1C}">
+                <a14:useLocalDpi xmlns:a14="http://schemas.microsoft.com/office/drawing/2010/main" val="0"/>
+              </a:ext>
+            </a:extLst>
+          </a:blip>
           <a:stretch>
             <a:fillRect/>
           </a:stretch>
         </p:blipFill>
         <p:spPr>
           <a:xfrm>
-            <a:off x="904582" y="1781734"/>
-            <a:ext cx="10598441" cy="3836784"/>
+            <a:off x="599090" y="1639614"/>
+            <a:ext cx="11027876" cy="4001139"/>
           </a:xfrm>
           <a:prstGeom prst="rect">
             <a:avLst/>
@@ -15979,7 +16324,7 @@
     </p:spTree>
     <p:extLst>
       <p:ext uri="{BB962C8B-B14F-4D97-AF65-F5344CB8AC3E}">
-        <p14:creationId xmlns:p14="http://schemas.microsoft.com/office/powerpoint/2010/main" val="794000173"/>
+        <p14:creationId xmlns:p14="http://schemas.microsoft.com/office/powerpoint/2010/main" val="372313777"/>
       </p:ext>
     </p:extLst>
   </p:cSld>
@@ -16070,41 +16415,23 @@
             <a:pPr marL="0" indent="0">
               <a:buNone/>
             </a:pPr>
+            <a:r>
+              <a:rPr lang="fr-FR" dirty="0" smtClean="0"/>
+              <a:t>Résultats obtenus : isolation du rein sein sur cette image </a:t>
+            </a:r>
+            <a:r>
+              <a:rPr lang="fr-FR" dirty="0" smtClean="0">
+                <a:sym typeface="Wingdings" panose="05000000000000000000" pitchFamily="2" charset="2"/>
+              </a:rPr>
+              <a:t> gros seuils nécessaires</a:t>
+            </a:r>
             <a:endParaRPr lang="fr-FR" dirty="0" smtClean="0"/>
           </a:p>
           <a:p>
             <a:pPr marL="0" indent="0">
               <a:buNone/>
             </a:pPr>
-            <a:r>
-              <a:rPr lang="fr-FR" dirty="0" smtClean="0"/>
-              <a:t>Conclusion </a:t>
-            </a:r>
-            <a:r>
-              <a:rPr lang="fr-FR" dirty="0" smtClean="0"/>
-              <a:t>:</a:t>
-            </a:r>
-          </a:p>
-          <a:p>
-            <a:r>
-              <a:rPr lang="fr-FR" dirty="0" smtClean="0"/>
-              <a:t> Il faudra sûrement utiliser des seuils différents pour chaque germe</a:t>
-            </a:r>
-          </a:p>
-          <a:p>
-            <a:r>
-              <a:rPr lang="fr-FR" dirty="0" smtClean="0"/>
-              <a:t>Un prétraitement est parfois nécessaire pour faire ressortir les organes</a:t>
-            </a:r>
-          </a:p>
-          <a:p>
-            <a:pPr marL="0" indent="0">
-              <a:buNone/>
-            </a:pPr>
-            <a:r>
-              <a:rPr lang="fr-FR" dirty="0"/>
-              <a:t>	</a:t>
-            </a:r>
+            <a:endParaRPr lang="fr-FR" dirty="0"/>
           </a:p>
           <a:p>
             <a:pPr marL="0" indent="0">
@@ -16144,10 +16471,74 @@
           </a:p>
         </p:txBody>
       </p:sp>
+      <p:sp>
+        <p:nvSpPr>
+          <p:cNvPr id="7" name="ZoneTexte 6"/>
+          <p:cNvSpPr txBox="1"/>
+          <p:nvPr/>
+        </p:nvSpPr>
+        <p:spPr>
+          <a:xfrm>
+            <a:off x="7220606" y="5794178"/>
+            <a:ext cx="5360275" cy="369332"/>
+          </a:xfrm>
+          <a:prstGeom prst="rect">
+            <a:avLst/>
+          </a:prstGeom>
+          <a:noFill/>
+        </p:spPr>
+        <p:txBody>
+          <a:bodyPr wrap="square" rtlCol="0">
+            <a:spAutoFit/>
+          </a:bodyPr>
+          <a:lstStyle/>
+          <a:p>
+            <a:r>
+              <a:rPr lang="fr-FR" dirty="0" smtClean="0"/>
+              <a:t>Seuil global : 53  Seuil local : 15</a:t>
+            </a:r>
+            <a:endParaRPr lang="fr-FR" dirty="0"/>
+          </a:p>
+        </p:txBody>
+      </p:sp>
+      <p:pic>
+        <p:nvPicPr>
+          <p:cNvPr id="4" name="Image 3"/>
+          <p:cNvPicPr>
+            <a:picLocks noChangeAspect="1"/>
+          </p:cNvPicPr>
+          <p:nvPr/>
+        </p:nvPicPr>
+        <p:blipFill>
+          <a:blip r:embed="rId2"/>
+          <a:stretch>
+            <a:fillRect/>
+          </a:stretch>
+        </p:blipFill>
+        <p:spPr>
+          <a:xfrm>
+            <a:off x="904582" y="1781734"/>
+            <a:ext cx="10598441" cy="3836784"/>
+          </a:xfrm>
+          <a:prstGeom prst="rect">
+            <a:avLst/>
+          </a:prstGeom>
+          <a:ln>
+            <a:noFill/>
+          </a:ln>
+          <a:effectLst>
+            <a:outerShdw blurRad="292100" dist="139700" dir="2700000" algn="tl" rotWithShape="0">
+              <a:srgbClr val="333333">
+                <a:alpha val="65000"/>
+              </a:srgbClr>
+            </a:outerShdw>
+          </a:effectLst>
+        </p:spPr>
+      </p:pic>
     </p:spTree>
     <p:extLst>
       <p:ext uri="{BB962C8B-B14F-4D97-AF65-F5344CB8AC3E}">
-        <p14:creationId xmlns:p14="http://schemas.microsoft.com/office/powerpoint/2010/main" val="1278964734"/>
+        <p14:creationId xmlns:p14="http://schemas.microsoft.com/office/powerpoint/2010/main" val="794000173"/>
       </p:ext>
     </p:extLst>
   </p:cSld>
@@ -16238,9 +16629,27 @@
             <a:pPr marL="0" indent="0">
               <a:buNone/>
             </a:pPr>
-            <a:r>
-              <a:rPr lang="fr-FR" dirty="0" smtClean="0"/>
-              <a:t>Tentatives de prétraitements </a:t>
+            <a:endParaRPr lang="fr-FR" dirty="0" smtClean="0"/>
+          </a:p>
+          <a:p>
+            <a:pPr marL="0" indent="0">
+              <a:buNone/>
+            </a:pPr>
+            <a:r>
+              <a:rPr lang="fr-FR" dirty="0" smtClean="0"/>
+              <a:t>Conclusion :</a:t>
+            </a:r>
+          </a:p>
+          <a:p>
+            <a:r>
+              <a:rPr lang="fr-FR" dirty="0" smtClean="0"/>
+              <a:t> Il faudra sûrement utiliser des seuils différents pour chaque germe</a:t>
+            </a:r>
+          </a:p>
+          <a:p>
+            <a:r>
+              <a:rPr lang="fr-FR" dirty="0" smtClean="0"/>
+              <a:t>Un prétraitement est parfois nécessaire pour faire ressortir les organes</a:t>
             </a:r>
           </a:p>
           <a:p>
@@ -16290,258 +16699,10 @@
           </a:p>
         </p:txBody>
       </p:sp>
-      <p:pic>
-        <p:nvPicPr>
-          <p:cNvPr id="4" name="Image 3"/>
-          <p:cNvPicPr>
-            <a:picLocks noChangeAspect="1"/>
-          </p:cNvPicPr>
-          <p:nvPr/>
-        </p:nvPicPr>
-        <p:blipFill>
-          <a:blip r:embed="rId3">
-            <a:extLst>
-              <a:ext uri="{28A0092B-C50C-407E-A947-70E740481C1C}">
-                <a14:useLocalDpi xmlns:a14="http://schemas.microsoft.com/office/drawing/2010/main" val="0"/>
-              </a:ext>
-            </a:extLst>
-          </a:blip>
-          <a:stretch>
-            <a:fillRect/>
-          </a:stretch>
-        </p:blipFill>
-        <p:spPr>
-          <a:xfrm>
-            <a:off x="1642705" y="1814570"/>
-            <a:ext cx="4187014" cy="3036384"/>
-          </a:xfrm>
-          <a:prstGeom prst="rect">
-            <a:avLst/>
-          </a:prstGeom>
-          <a:ln>
-            <a:noFill/>
-          </a:ln>
-          <a:effectLst>
-            <a:outerShdw blurRad="292100" dist="139700" dir="2700000" algn="tl" rotWithShape="0">
-              <a:srgbClr val="333333">
-                <a:alpha val="65000"/>
-              </a:srgbClr>
-            </a:outerShdw>
-          </a:effectLst>
-        </p:spPr>
-      </p:pic>
-      <p:pic>
-        <p:nvPicPr>
-          <p:cNvPr id="6" name="Image 5"/>
-          <p:cNvPicPr>
-            <a:picLocks noChangeAspect="1"/>
-          </p:cNvPicPr>
-          <p:nvPr/>
-        </p:nvPicPr>
-        <p:blipFill>
-          <a:blip r:embed="rId4">
-            <a:extLst>
-              <a:ext uri="{28A0092B-C50C-407E-A947-70E740481C1C}">
-                <a14:useLocalDpi xmlns:a14="http://schemas.microsoft.com/office/drawing/2010/main" val="0"/>
-              </a:ext>
-            </a:extLst>
-          </a:blip>
-          <a:stretch>
-            <a:fillRect/>
-          </a:stretch>
-        </p:blipFill>
-        <p:spPr>
-          <a:xfrm>
-            <a:off x="6250998" y="1814569"/>
-            <a:ext cx="4075416" cy="2948836"/>
-          </a:xfrm>
-          <a:prstGeom prst="rect">
-            <a:avLst/>
-          </a:prstGeom>
-          <a:ln>
-            <a:noFill/>
-          </a:ln>
-          <a:effectLst>
-            <a:outerShdw blurRad="292100" dist="139700" dir="2700000" algn="tl" rotWithShape="0">
-              <a:srgbClr val="333333">
-                <a:alpha val="65000"/>
-              </a:srgbClr>
-            </a:outerShdw>
-          </a:effectLst>
-        </p:spPr>
-      </p:pic>
-      <p:sp>
-        <p:nvSpPr>
-          <p:cNvPr id="7" name="ZoneTexte 6"/>
-          <p:cNvSpPr txBox="1"/>
-          <p:nvPr/>
-        </p:nvSpPr>
-        <p:spPr>
-          <a:xfrm>
-            <a:off x="2900485" y="4874871"/>
-            <a:ext cx="2538249" cy="369332"/>
-          </a:xfrm>
-          <a:prstGeom prst="rect">
-            <a:avLst/>
-          </a:prstGeom>
-          <a:noFill/>
-        </p:spPr>
-        <p:txBody>
-          <a:bodyPr wrap="square" rtlCol="0">
-            <a:spAutoFit/>
-          </a:bodyPr>
-          <a:lstStyle/>
-          <a:p>
-            <a:r>
-              <a:rPr lang="fr-FR" dirty="0" err="1" smtClean="0"/>
-              <a:t>Unsharp</a:t>
-            </a:r>
-            <a:r>
-              <a:rPr lang="fr-FR" dirty="0" smtClean="0"/>
-              <a:t> </a:t>
-            </a:r>
-            <a:r>
-              <a:rPr lang="fr-FR" dirty="0" err="1" smtClean="0"/>
-              <a:t>mask</a:t>
-            </a:r>
-            <a:r>
-              <a:rPr lang="fr-FR" dirty="0" smtClean="0"/>
-              <a:t> </a:t>
-            </a:r>
-            <a:endParaRPr lang="fr-FR" dirty="0"/>
-          </a:p>
-        </p:txBody>
-      </p:sp>
-      <p:sp>
-        <p:nvSpPr>
-          <p:cNvPr id="8" name="ZoneTexte 7"/>
-          <p:cNvSpPr txBox="1"/>
-          <p:nvPr/>
-        </p:nvSpPr>
-        <p:spPr>
-          <a:xfrm>
-            <a:off x="6854908" y="4874871"/>
-            <a:ext cx="3775871" cy="369332"/>
-          </a:xfrm>
-          <a:prstGeom prst="rect">
-            <a:avLst/>
-          </a:prstGeom>
-          <a:noFill/>
-        </p:spPr>
-        <p:txBody>
-          <a:bodyPr wrap="square" rtlCol="0">
-            <a:spAutoFit/>
-          </a:bodyPr>
-          <a:lstStyle/>
-          <a:p>
-            <a:r>
-              <a:rPr lang="fr-FR" dirty="0" err="1"/>
-              <a:t>Unsharp</a:t>
-            </a:r>
-            <a:r>
-              <a:rPr lang="fr-FR" dirty="0"/>
-              <a:t> </a:t>
-            </a:r>
-            <a:r>
-              <a:rPr lang="fr-FR" dirty="0" err="1"/>
-              <a:t>mask</a:t>
-            </a:r>
-            <a:r>
-              <a:rPr lang="fr-FR" dirty="0"/>
-              <a:t> </a:t>
-            </a:r>
-            <a:r>
-              <a:rPr lang="fr-FR" dirty="0" smtClean="0"/>
-              <a:t> + Convolution</a:t>
-            </a:r>
-            <a:endParaRPr lang="fr-FR" dirty="0"/>
-          </a:p>
-        </p:txBody>
-      </p:sp>
-      <p:pic>
-        <p:nvPicPr>
-          <p:cNvPr id="10" name="Image 9"/>
-          <p:cNvPicPr>
-            <a:picLocks noChangeAspect="1"/>
-          </p:cNvPicPr>
-          <p:nvPr/>
-        </p:nvPicPr>
-        <p:blipFill>
-          <a:blip r:embed="rId5">
-            <a:extLst>
-              <a:ext uri="{28A0092B-C50C-407E-A947-70E740481C1C}">
-                <a14:useLocalDpi xmlns:a14="http://schemas.microsoft.com/office/drawing/2010/main" val="0"/>
-              </a:ext>
-            </a:extLst>
-          </a:blip>
-          <a:stretch>
-            <a:fillRect/>
-          </a:stretch>
-        </p:blipFill>
-        <p:spPr>
-          <a:xfrm>
-            <a:off x="7483731" y="5554324"/>
-            <a:ext cx="1609950" cy="990738"/>
-          </a:xfrm>
-          <a:prstGeom prst="rect">
-            <a:avLst/>
-          </a:prstGeom>
-        </p:spPr>
-      </p:pic>
-      <p:sp>
-        <p:nvSpPr>
-          <p:cNvPr id="11" name="ZoneTexte 10"/>
-          <p:cNvSpPr txBox="1"/>
-          <p:nvPr/>
-        </p:nvSpPr>
-        <p:spPr>
-          <a:xfrm>
-            <a:off x="2672039" y="5619332"/>
-            <a:ext cx="2128345" cy="646331"/>
-          </a:xfrm>
-          <a:prstGeom prst="rect">
-            <a:avLst/>
-          </a:prstGeom>
-          <a:noFill/>
-        </p:spPr>
-        <p:style>
-          <a:lnRef idx="2">
-            <a:schemeClr val="dk1"/>
-          </a:lnRef>
-          <a:fillRef idx="1">
-            <a:schemeClr val="lt1"/>
-          </a:fillRef>
-          <a:effectRef idx="0">
-            <a:schemeClr val="dk1"/>
-          </a:effectRef>
-          <a:fontRef idx="minor">
-            <a:schemeClr val="dk1"/>
-          </a:fontRef>
-        </p:style>
-        <p:txBody>
-          <a:bodyPr wrap="square" rtlCol="0">
-            <a:spAutoFit/>
-          </a:bodyPr>
-          <a:lstStyle/>
-          <a:p>
-            <a:r>
-              <a:rPr lang="fr-FR" dirty="0" smtClean="0"/>
-              <a:t>Radius : 30 pixels</a:t>
-            </a:r>
-          </a:p>
-          <a:p>
-            <a:r>
-              <a:rPr lang="fr-FR" dirty="0" smtClean="0"/>
-              <a:t>Poids Masque : 0,8</a:t>
-            </a:r>
-            <a:endParaRPr lang="fr-FR" dirty="0"/>
-          </a:p>
-        </p:txBody>
-      </p:sp>
     </p:spTree>
     <p:extLst>
       <p:ext uri="{BB962C8B-B14F-4D97-AF65-F5344CB8AC3E}">
-        <p14:creationId xmlns:p14="http://schemas.microsoft.com/office/powerpoint/2010/main" val="2378459800"/>
+        <p14:creationId xmlns:p14="http://schemas.microsoft.com/office/powerpoint/2010/main" val="1278964734"/>
       </p:ext>
     </p:extLst>
   </p:cSld>
@@ -16587,7 +16748,7 @@
         </p:nvSpPr>
         <p:spPr>
           <a:xfrm>
-            <a:off x="1484310" y="2625337"/>
+            <a:off x="1484310" y="312313"/>
             <a:ext cx="10018713" cy="1327301"/>
           </a:xfrm>
         </p:spPr>
@@ -16595,13 +16756,10 @@
           <a:bodyPr/>
           <a:lstStyle/>
           <a:p>
-            <a:r>
-              <a:rPr lang="fr-FR" dirty="0" smtClean="0"/>
-              <a:t>Démonstration Mini - RàPC</a:t>
-            </a:r>
-            <a:r>
-              <a:rPr lang="fr-FR" dirty="0" smtClean="0"/>
-              <a:t/>
+            <a:pPr algn="l"/>
+            <a:r>
+              <a:rPr lang="fr-FR" dirty="0" smtClean="0"/>
+              <a:t>IV. Problèmes liés à la segmentation</a:t>
             </a:r>
             <a:br>
               <a:rPr lang="fr-FR" dirty="0" smtClean="0"/>
@@ -16631,6 +16789,15 @@
             <a:normAutofit/>
           </a:bodyPr>
           <a:lstStyle/>
+          <a:p>
+            <a:pPr marL="0" indent="0">
+              <a:buNone/>
+            </a:pPr>
+            <a:r>
+              <a:rPr lang="fr-FR" dirty="0" smtClean="0"/>
+              <a:t>Tentatives de prétraitements </a:t>
+            </a:r>
+          </a:p>
           <a:p>
             <a:pPr marL="0" indent="0">
               <a:buNone/>
@@ -16678,10 +16845,545 @@
           </a:p>
         </p:txBody>
       </p:sp>
+      <p:pic>
+        <p:nvPicPr>
+          <p:cNvPr id="4" name="Image 3"/>
+          <p:cNvPicPr>
+            <a:picLocks noChangeAspect="1"/>
+          </p:cNvPicPr>
+          <p:nvPr/>
+        </p:nvPicPr>
+        <p:blipFill>
+          <a:blip r:embed="rId3">
+            <a:extLst>
+              <a:ext uri="{28A0092B-C50C-407E-A947-70E740481C1C}">
+                <a14:useLocalDpi xmlns:a14="http://schemas.microsoft.com/office/drawing/2010/main" val="0"/>
+              </a:ext>
+            </a:extLst>
+          </a:blip>
+          <a:stretch>
+            <a:fillRect/>
+          </a:stretch>
+        </p:blipFill>
+        <p:spPr>
+          <a:xfrm>
+            <a:off x="1642705" y="1814570"/>
+            <a:ext cx="4187014" cy="3036384"/>
+          </a:xfrm>
+          <a:prstGeom prst="rect">
+            <a:avLst/>
+          </a:prstGeom>
+          <a:ln>
+            <a:noFill/>
+          </a:ln>
+          <a:effectLst>
+            <a:outerShdw blurRad="292100" dist="139700" dir="2700000" algn="tl" rotWithShape="0">
+              <a:srgbClr val="333333">
+                <a:alpha val="65000"/>
+              </a:srgbClr>
+            </a:outerShdw>
+          </a:effectLst>
+        </p:spPr>
+      </p:pic>
+      <p:pic>
+        <p:nvPicPr>
+          <p:cNvPr id="6" name="Image 5"/>
+          <p:cNvPicPr>
+            <a:picLocks noChangeAspect="1"/>
+          </p:cNvPicPr>
+          <p:nvPr/>
+        </p:nvPicPr>
+        <p:blipFill>
+          <a:blip r:embed="rId4">
+            <a:extLst>
+              <a:ext uri="{28A0092B-C50C-407E-A947-70E740481C1C}">
+                <a14:useLocalDpi xmlns:a14="http://schemas.microsoft.com/office/drawing/2010/main" val="0"/>
+              </a:ext>
+            </a:extLst>
+          </a:blip>
+          <a:stretch>
+            <a:fillRect/>
+          </a:stretch>
+        </p:blipFill>
+        <p:spPr>
+          <a:xfrm>
+            <a:off x="6250998" y="1814569"/>
+            <a:ext cx="4075416" cy="2948836"/>
+          </a:xfrm>
+          <a:prstGeom prst="rect">
+            <a:avLst/>
+          </a:prstGeom>
+          <a:ln>
+            <a:noFill/>
+          </a:ln>
+          <a:effectLst>
+            <a:outerShdw blurRad="292100" dist="139700" dir="2700000" algn="tl" rotWithShape="0">
+              <a:srgbClr val="333333">
+                <a:alpha val="65000"/>
+              </a:srgbClr>
+            </a:outerShdw>
+          </a:effectLst>
+        </p:spPr>
+      </p:pic>
+      <p:sp>
+        <p:nvSpPr>
+          <p:cNvPr id="7" name="ZoneTexte 6"/>
+          <p:cNvSpPr txBox="1"/>
+          <p:nvPr/>
+        </p:nvSpPr>
+        <p:spPr>
+          <a:xfrm>
+            <a:off x="2900485" y="4874871"/>
+            <a:ext cx="2538249" cy="369332"/>
+          </a:xfrm>
+          <a:prstGeom prst="rect">
+            <a:avLst/>
+          </a:prstGeom>
+          <a:noFill/>
+        </p:spPr>
+        <p:txBody>
+          <a:bodyPr wrap="square" rtlCol="0">
+            <a:spAutoFit/>
+          </a:bodyPr>
+          <a:lstStyle/>
+          <a:p>
+            <a:r>
+              <a:rPr lang="fr-FR" dirty="0" err="1" smtClean="0"/>
+              <a:t>Unsharp</a:t>
+            </a:r>
+            <a:r>
+              <a:rPr lang="fr-FR" dirty="0" smtClean="0"/>
+              <a:t> </a:t>
+            </a:r>
+            <a:r>
+              <a:rPr lang="fr-FR" dirty="0" err="1" smtClean="0"/>
+              <a:t>mask</a:t>
+            </a:r>
+            <a:r>
+              <a:rPr lang="fr-FR" dirty="0" smtClean="0"/>
+              <a:t> </a:t>
+            </a:r>
+            <a:endParaRPr lang="fr-FR" dirty="0"/>
+          </a:p>
+        </p:txBody>
+      </p:sp>
+      <p:sp>
+        <p:nvSpPr>
+          <p:cNvPr id="8" name="ZoneTexte 7"/>
+          <p:cNvSpPr txBox="1"/>
+          <p:nvPr/>
+        </p:nvSpPr>
+        <p:spPr>
+          <a:xfrm>
+            <a:off x="6854908" y="4874871"/>
+            <a:ext cx="3775871" cy="369332"/>
+          </a:xfrm>
+          <a:prstGeom prst="rect">
+            <a:avLst/>
+          </a:prstGeom>
+          <a:noFill/>
+        </p:spPr>
+        <p:txBody>
+          <a:bodyPr wrap="square" rtlCol="0">
+            <a:spAutoFit/>
+          </a:bodyPr>
+          <a:lstStyle/>
+          <a:p>
+            <a:r>
+              <a:rPr lang="fr-FR" dirty="0" err="1"/>
+              <a:t>Unsharp</a:t>
+            </a:r>
+            <a:r>
+              <a:rPr lang="fr-FR" dirty="0"/>
+              <a:t> </a:t>
+            </a:r>
+            <a:r>
+              <a:rPr lang="fr-FR" dirty="0" err="1"/>
+              <a:t>mask</a:t>
+            </a:r>
+            <a:r>
+              <a:rPr lang="fr-FR" dirty="0"/>
+              <a:t> </a:t>
+            </a:r>
+            <a:r>
+              <a:rPr lang="fr-FR" dirty="0" smtClean="0"/>
+              <a:t> + Convolution</a:t>
+            </a:r>
+            <a:endParaRPr lang="fr-FR" dirty="0"/>
+          </a:p>
+        </p:txBody>
+      </p:sp>
+      <p:pic>
+        <p:nvPicPr>
+          <p:cNvPr id="10" name="Image 9"/>
+          <p:cNvPicPr>
+            <a:picLocks noChangeAspect="1"/>
+          </p:cNvPicPr>
+          <p:nvPr/>
+        </p:nvPicPr>
+        <p:blipFill>
+          <a:blip r:embed="rId5">
+            <a:extLst>
+              <a:ext uri="{28A0092B-C50C-407E-A947-70E740481C1C}">
+                <a14:useLocalDpi xmlns:a14="http://schemas.microsoft.com/office/drawing/2010/main" val="0"/>
+              </a:ext>
+            </a:extLst>
+          </a:blip>
+          <a:stretch>
+            <a:fillRect/>
+          </a:stretch>
+        </p:blipFill>
+        <p:spPr>
+          <a:xfrm>
+            <a:off x="7483731" y="5554324"/>
+            <a:ext cx="1609950" cy="990738"/>
+          </a:xfrm>
+          <a:prstGeom prst="rect">
+            <a:avLst/>
+          </a:prstGeom>
+        </p:spPr>
+      </p:pic>
+      <p:sp>
+        <p:nvSpPr>
+          <p:cNvPr id="11" name="ZoneTexte 10"/>
+          <p:cNvSpPr txBox="1"/>
+          <p:nvPr/>
+        </p:nvSpPr>
+        <p:spPr>
+          <a:xfrm>
+            <a:off x="2672039" y="5619332"/>
+            <a:ext cx="2128345" cy="646331"/>
+          </a:xfrm>
+          <a:prstGeom prst="rect">
+            <a:avLst/>
+          </a:prstGeom>
+          <a:noFill/>
+        </p:spPr>
+        <p:style>
+          <a:lnRef idx="2">
+            <a:schemeClr val="dk1"/>
+          </a:lnRef>
+          <a:fillRef idx="1">
+            <a:schemeClr val="lt1"/>
+          </a:fillRef>
+          <a:effectRef idx="0">
+            <a:schemeClr val="dk1"/>
+          </a:effectRef>
+          <a:fontRef idx="minor">
+            <a:schemeClr val="dk1"/>
+          </a:fontRef>
+        </p:style>
+        <p:txBody>
+          <a:bodyPr wrap="square" rtlCol="0">
+            <a:spAutoFit/>
+          </a:bodyPr>
+          <a:lstStyle/>
+          <a:p>
+            <a:r>
+              <a:rPr lang="fr-FR" dirty="0" smtClean="0"/>
+              <a:t>Radius : 30 pixels</a:t>
+            </a:r>
+          </a:p>
+          <a:p>
+            <a:r>
+              <a:rPr lang="fr-FR" dirty="0" smtClean="0"/>
+              <a:t>Poids Masque : 0,8</a:t>
+            </a:r>
+            <a:endParaRPr lang="fr-FR" dirty="0"/>
+          </a:p>
+        </p:txBody>
+      </p:sp>
     </p:spTree>
     <p:extLst>
       <p:ext uri="{BB962C8B-B14F-4D97-AF65-F5344CB8AC3E}">
-        <p14:creationId xmlns:p14="http://schemas.microsoft.com/office/powerpoint/2010/main" val="607065872"/>
+        <p14:creationId xmlns:p14="http://schemas.microsoft.com/office/powerpoint/2010/main" val="2378459800"/>
+      </p:ext>
+    </p:extLst>
+  </p:cSld>
+  <p:clrMapOvr>
+    <a:masterClrMapping/>
+  </p:clrMapOvr>
+  <p:timing>
+    <p:tnLst>
+      <p:par>
+        <p:cTn id="1" dur="indefinite" restart="never" nodeType="tmRoot"/>
+      </p:par>
+    </p:tnLst>
+  </p:timing>
+</p:sld>
+</file>
+
+<file path=ppt/slides/slide39.xml><?xml version="1.0" encoding="utf-8"?>
+<p:sld xmlns:a="http://schemas.openxmlformats.org/drawingml/2006/main" xmlns:r="http://schemas.openxmlformats.org/officeDocument/2006/relationships" xmlns:p="http://schemas.openxmlformats.org/presentationml/2006/main">
+  <p:cSld>
+    <p:spTree>
+      <p:nvGrpSpPr>
+        <p:cNvPr id="1" name=""/>
+        <p:cNvGrpSpPr/>
+        <p:nvPr/>
+      </p:nvGrpSpPr>
+      <p:grpSpPr>
+        <a:xfrm>
+          <a:off x="0" y="0"/>
+          <a:ext cx="0" cy="0"/>
+          <a:chOff x="0" y="0"/>
+          <a:chExt cx="0" cy="0"/>
+        </a:xfrm>
+      </p:grpSpPr>
+      <p:sp>
+        <p:nvSpPr>
+          <p:cNvPr id="2" name="Titre 1"/>
+          <p:cNvSpPr>
+            <a:spLocks noGrp="1"/>
+          </p:cNvSpPr>
+          <p:nvPr>
+            <p:ph type="title"/>
+          </p:nvPr>
+        </p:nvSpPr>
+        <p:spPr>
+          <a:xfrm>
+            <a:off x="1484310" y="312313"/>
+            <a:ext cx="10018713" cy="1327301"/>
+          </a:xfrm>
+        </p:spPr>
+        <p:txBody>
+          <a:bodyPr/>
+          <a:lstStyle/>
+          <a:p>
+            <a:pPr algn="l"/>
+            <a:r>
+              <a:rPr lang="fr-FR" dirty="0" smtClean="0"/>
+              <a:t>IV. Problèmes liés à la segmentation</a:t>
+            </a:r>
+            <a:br>
+              <a:rPr lang="fr-FR" dirty="0" smtClean="0"/>
+            </a:br>
+            <a:endParaRPr lang="fr-FR" dirty="0"/>
+          </a:p>
+        </p:txBody>
+      </p:sp>
+      <p:sp>
+        <p:nvSpPr>
+          <p:cNvPr id="3" name="Espace réservé du contenu 2"/>
+          <p:cNvSpPr>
+            <a:spLocks noGrp="1"/>
+          </p:cNvSpPr>
+          <p:nvPr>
+            <p:ph idx="1"/>
+          </p:nvPr>
+        </p:nvSpPr>
+        <p:spPr>
+          <a:xfrm>
+            <a:off x="1484310" y="1135118"/>
+            <a:ext cx="10577061" cy="4307740"/>
+          </a:xfrm>
+        </p:spPr>
+        <p:txBody>
+          <a:bodyPr anchor="t">
+            <a:normAutofit/>
+          </a:bodyPr>
+          <a:lstStyle/>
+          <a:p>
+            <a:pPr marL="0" indent="0">
+              <a:buNone/>
+            </a:pPr>
+            <a:r>
+              <a:rPr lang="fr-FR" dirty="0" smtClean="0"/>
+              <a:t>Tentatives de </a:t>
+            </a:r>
+            <a:r>
+              <a:rPr lang="fr-FR" dirty="0" smtClean="0"/>
+              <a:t>prétraitements, premiers résultats :  </a:t>
+            </a:r>
+            <a:endParaRPr lang="fr-FR" dirty="0" smtClean="0"/>
+          </a:p>
+          <a:p>
+            <a:pPr marL="0" indent="0">
+              <a:buNone/>
+            </a:pPr>
+            <a:r>
+              <a:rPr lang="fr-FR" dirty="0"/>
+              <a:t>	</a:t>
+            </a:r>
+          </a:p>
+          <a:p>
+            <a:pPr marL="0" indent="0">
+              <a:buNone/>
+            </a:pPr>
+            <a:endParaRPr lang="fr-FR" dirty="0" smtClean="0"/>
+          </a:p>
+          <a:p>
+            <a:pPr marL="514350" indent="-514350">
+              <a:buAutoNum type="romanUcPeriod"/>
+            </a:pPr>
+            <a:endParaRPr lang="fr-FR" dirty="0"/>
+          </a:p>
+        </p:txBody>
+      </p:sp>
+      <p:sp>
+        <p:nvSpPr>
+          <p:cNvPr id="5" name="Espace réservé du numéro de diapositive 4"/>
+          <p:cNvSpPr>
+            <a:spLocks noGrp="1"/>
+          </p:cNvSpPr>
+          <p:nvPr>
+            <p:ph type="sldNum" sz="quarter" idx="12"/>
+          </p:nvPr>
+        </p:nvSpPr>
+        <p:spPr/>
+        <p:txBody>
+          <a:bodyPr/>
+          <a:lstStyle/>
+          <a:p>
+            <a:fld id="{D57F1E4F-1CFF-5643-939E-217C01CDF565}" type="slidenum">
+              <a:rPr lang="en-US" smtClean="0"/>
+              <a:pPr/>
+              <a:t>39</a:t>
+            </a:fld>
+            <a:endParaRPr lang="en-US" dirty="0"/>
+          </a:p>
+        </p:txBody>
+      </p:sp>
+      <p:sp>
+        <p:nvSpPr>
+          <p:cNvPr id="7" name="ZoneTexte 6"/>
+          <p:cNvSpPr txBox="1"/>
+          <p:nvPr/>
+        </p:nvSpPr>
+        <p:spPr>
+          <a:xfrm>
+            <a:off x="2443285" y="5548907"/>
+            <a:ext cx="3557465" cy="369332"/>
+          </a:xfrm>
+          <a:prstGeom prst="rect">
+            <a:avLst/>
+          </a:prstGeom>
+          <a:noFill/>
+        </p:spPr>
+        <p:txBody>
+          <a:bodyPr wrap="square" rtlCol="0">
+            <a:spAutoFit/>
+          </a:bodyPr>
+          <a:lstStyle/>
+          <a:p>
+            <a:r>
+              <a:rPr lang="fr-FR" dirty="0" smtClean="0"/>
+              <a:t>Filtre </a:t>
+            </a:r>
+            <a:r>
+              <a:rPr lang="fr-FR" dirty="0" err="1" smtClean="0"/>
+              <a:t>moyenneur</a:t>
+            </a:r>
+            <a:r>
+              <a:rPr lang="fr-FR" dirty="0" smtClean="0"/>
+              <a:t>  + </a:t>
+            </a:r>
+            <a:r>
+              <a:rPr lang="fr-FR" dirty="0" err="1" smtClean="0"/>
+              <a:t>Unsharp</a:t>
+            </a:r>
+            <a:r>
+              <a:rPr lang="fr-FR" dirty="0" smtClean="0"/>
+              <a:t> </a:t>
+            </a:r>
+            <a:r>
+              <a:rPr lang="fr-FR" dirty="0" err="1" smtClean="0"/>
+              <a:t>mask</a:t>
+            </a:r>
+            <a:r>
+              <a:rPr lang="fr-FR" dirty="0" smtClean="0"/>
+              <a:t> </a:t>
+            </a:r>
+            <a:endParaRPr lang="fr-FR" dirty="0"/>
+          </a:p>
+        </p:txBody>
+      </p:sp>
+      <p:pic>
+        <p:nvPicPr>
+          <p:cNvPr id="9" name="Image 8"/>
+          <p:cNvPicPr>
+            <a:picLocks noChangeAspect="1"/>
+          </p:cNvPicPr>
+          <p:nvPr/>
+        </p:nvPicPr>
+        <p:blipFill>
+          <a:blip r:embed="rId3">
+            <a:extLst>
+              <a:ext uri="{28A0092B-C50C-407E-A947-70E740481C1C}">
+                <a14:useLocalDpi xmlns:a14="http://schemas.microsoft.com/office/drawing/2010/main" val="0"/>
+              </a:ext>
+            </a:extLst>
+          </a:blip>
+          <a:stretch>
+            <a:fillRect/>
+          </a:stretch>
+        </p:blipFill>
+        <p:spPr>
+          <a:xfrm>
+            <a:off x="1411289" y="1649702"/>
+            <a:ext cx="10553700" cy="3793156"/>
+          </a:xfrm>
+          <a:prstGeom prst="rect">
+            <a:avLst/>
+          </a:prstGeom>
+          <a:ln>
+            <a:noFill/>
+          </a:ln>
+          <a:effectLst>
+            <a:outerShdw blurRad="292100" dist="139700" dir="2700000" algn="tl" rotWithShape="0">
+              <a:srgbClr val="333333">
+                <a:alpha val="65000"/>
+              </a:srgbClr>
+            </a:outerShdw>
+          </a:effectLst>
+        </p:spPr>
+      </p:pic>
+      <p:sp>
+        <p:nvSpPr>
+          <p:cNvPr id="12" name="ZoneTexte 11"/>
+          <p:cNvSpPr txBox="1"/>
+          <p:nvPr/>
+        </p:nvSpPr>
+        <p:spPr>
+          <a:xfrm>
+            <a:off x="7734956" y="5518789"/>
+            <a:ext cx="5360275" cy="369332"/>
+          </a:xfrm>
+          <a:prstGeom prst="rect">
+            <a:avLst/>
+          </a:prstGeom>
+          <a:noFill/>
+        </p:spPr>
+        <p:txBody>
+          <a:bodyPr wrap="square" rtlCol="0">
+            <a:spAutoFit/>
+          </a:bodyPr>
+          <a:lstStyle/>
+          <a:p>
+            <a:r>
+              <a:rPr lang="fr-FR" dirty="0" smtClean="0"/>
+              <a:t>Seuil global : </a:t>
+            </a:r>
+            <a:r>
+              <a:rPr lang="fr-FR" dirty="0" smtClean="0"/>
+              <a:t>30</a:t>
+            </a:r>
+            <a:r>
+              <a:rPr lang="fr-FR" dirty="0" smtClean="0"/>
+              <a:t>  </a:t>
+            </a:r>
+            <a:r>
+              <a:rPr lang="fr-FR" dirty="0" smtClean="0"/>
+              <a:t>Seuil local : 15</a:t>
+            </a:r>
+            <a:endParaRPr lang="fr-FR" dirty="0"/>
+          </a:p>
+        </p:txBody>
+      </p:sp>
+    </p:spTree>
+    <p:extLst>
+      <p:ext uri="{BB962C8B-B14F-4D97-AF65-F5344CB8AC3E}">
+        <p14:creationId xmlns:p14="http://schemas.microsoft.com/office/powerpoint/2010/main" val="1609447675"/>
       </p:ext>
     </p:extLst>
   </p:cSld>
@@ -16926,6 +17628,455 @@
     <p:extLst>
       <p:ext uri="{BB962C8B-B14F-4D97-AF65-F5344CB8AC3E}">
         <p14:creationId xmlns:p14="http://schemas.microsoft.com/office/powerpoint/2010/main" val="907493784"/>
+      </p:ext>
+    </p:extLst>
+  </p:cSld>
+  <p:clrMapOvr>
+    <a:masterClrMapping/>
+  </p:clrMapOvr>
+  <p:timing>
+    <p:tnLst>
+      <p:par>
+        <p:cTn id="1" dur="indefinite" restart="never" nodeType="tmRoot"/>
+      </p:par>
+    </p:tnLst>
+  </p:timing>
+</p:sld>
+</file>
+
+<file path=ppt/slides/slide40.xml><?xml version="1.0" encoding="utf-8"?>
+<p:sld xmlns:a="http://schemas.openxmlformats.org/drawingml/2006/main" xmlns:r="http://schemas.openxmlformats.org/officeDocument/2006/relationships" xmlns:p="http://schemas.openxmlformats.org/presentationml/2006/main">
+  <p:cSld>
+    <p:spTree>
+      <p:nvGrpSpPr>
+        <p:cNvPr id="1" name=""/>
+        <p:cNvGrpSpPr/>
+        <p:nvPr/>
+      </p:nvGrpSpPr>
+      <p:grpSpPr>
+        <a:xfrm>
+          <a:off x="0" y="0"/>
+          <a:ext cx="0" cy="0"/>
+          <a:chOff x="0" y="0"/>
+          <a:chExt cx="0" cy="0"/>
+        </a:xfrm>
+      </p:grpSpPr>
+      <p:sp>
+        <p:nvSpPr>
+          <p:cNvPr id="2" name="Titre 1"/>
+          <p:cNvSpPr>
+            <a:spLocks noGrp="1"/>
+          </p:cNvSpPr>
+          <p:nvPr>
+            <p:ph type="title"/>
+          </p:nvPr>
+        </p:nvSpPr>
+        <p:spPr>
+          <a:xfrm>
+            <a:off x="1484310" y="312313"/>
+            <a:ext cx="10018713" cy="1327301"/>
+          </a:xfrm>
+        </p:spPr>
+        <p:txBody>
+          <a:bodyPr/>
+          <a:lstStyle/>
+          <a:p>
+            <a:pPr algn="l"/>
+            <a:r>
+              <a:rPr lang="fr-FR" dirty="0" smtClean="0"/>
+              <a:t>IV. Problèmes liés à la segmentation</a:t>
+            </a:r>
+            <a:br>
+              <a:rPr lang="fr-FR" dirty="0" smtClean="0"/>
+            </a:br>
+            <a:endParaRPr lang="fr-FR" dirty="0"/>
+          </a:p>
+        </p:txBody>
+      </p:sp>
+      <p:sp>
+        <p:nvSpPr>
+          <p:cNvPr id="3" name="Espace réservé du contenu 2"/>
+          <p:cNvSpPr>
+            <a:spLocks noGrp="1"/>
+          </p:cNvSpPr>
+          <p:nvPr>
+            <p:ph idx="1"/>
+          </p:nvPr>
+        </p:nvSpPr>
+        <p:spPr>
+          <a:xfrm>
+            <a:off x="1484310" y="1135118"/>
+            <a:ext cx="10577061" cy="4307740"/>
+          </a:xfrm>
+        </p:spPr>
+        <p:txBody>
+          <a:bodyPr anchor="t">
+            <a:normAutofit/>
+          </a:bodyPr>
+          <a:lstStyle/>
+          <a:p>
+            <a:pPr marL="0" indent="0">
+              <a:buNone/>
+            </a:pPr>
+            <a:r>
+              <a:rPr lang="fr-FR" dirty="0" smtClean="0"/>
+              <a:t>Problème du prétraitement : </a:t>
+            </a:r>
+            <a:endParaRPr lang="fr-FR" dirty="0" smtClean="0"/>
+          </a:p>
+          <a:p>
+            <a:pPr marL="0" indent="0">
+              <a:buNone/>
+            </a:pPr>
+            <a:r>
+              <a:rPr lang="fr-FR" dirty="0"/>
+              <a:t>	</a:t>
+            </a:r>
+          </a:p>
+          <a:p>
+            <a:pPr marL="0" indent="0">
+              <a:buNone/>
+            </a:pPr>
+            <a:endParaRPr lang="fr-FR" dirty="0" smtClean="0"/>
+          </a:p>
+          <a:p>
+            <a:pPr marL="514350" indent="-514350">
+              <a:buAutoNum type="romanUcPeriod"/>
+            </a:pPr>
+            <a:endParaRPr lang="fr-FR" dirty="0"/>
+          </a:p>
+        </p:txBody>
+      </p:sp>
+      <p:sp>
+        <p:nvSpPr>
+          <p:cNvPr id="5" name="Espace réservé du numéro de diapositive 4"/>
+          <p:cNvSpPr>
+            <a:spLocks noGrp="1"/>
+          </p:cNvSpPr>
+          <p:nvPr>
+            <p:ph type="sldNum" sz="quarter" idx="12"/>
+          </p:nvPr>
+        </p:nvSpPr>
+        <p:spPr/>
+        <p:txBody>
+          <a:bodyPr/>
+          <a:lstStyle/>
+          <a:p>
+            <a:fld id="{D57F1E4F-1CFF-5643-939E-217C01CDF565}" type="slidenum">
+              <a:rPr lang="en-US" smtClean="0"/>
+              <a:pPr/>
+              <a:t>40</a:t>
+            </a:fld>
+            <a:endParaRPr lang="en-US" dirty="0"/>
+          </a:p>
+        </p:txBody>
+      </p:sp>
+      <p:sp>
+        <p:nvSpPr>
+          <p:cNvPr id="7" name="ZoneTexte 6"/>
+          <p:cNvSpPr txBox="1"/>
+          <p:nvPr/>
+        </p:nvSpPr>
+        <p:spPr>
+          <a:xfrm>
+            <a:off x="2443285" y="5548907"/>
+            <a:ext cx="3557465" cy="369332"/>
+          </a:xfrm>
+          <a:prstGeom prst="rect">
+            <a:avLst/>
+          </a:prstGeom>
+          <a:noFill/>
+        </p:spPr>
+        <p:txBody>
+          <a:bodyPr wrap="square" rtlCol="0">
+            <a:spAutoFit/>
+          </a:bodyPr>
+          <a:lstStyle/>
+          <a:p>
+            <a:r>
+              <a:rPr lang="fr-FR" dirty="0" smtClean="0"/>
+              <a:t>Filtre </a:t>
+            </a:r>
+            <a:r>
+              <a:rPr lang="fr-FR" dirty="0" err="1" smtClean="0"/>
+              <a:t>moyenneur</a:t>
+            </a:r>
+            <a:r>
+              <a:rPr lang="fr-FR" dirty="0" smtClean="0"/>
+              <a:t>  + </a:t>
+            </a:r>
+            <a:r>
+              <a:rPr lang="fr-FR" dirty="0" err="1" smtClean="0"/>
+              <a:t>Unsharp</a:t>
+            </a:r>
+            <a:r>
+              <a:rPr lang="fr-FR" dirty="0" smtClean="0"/>
+              <a:t> </a:t>
+            </a:r>
+            <a:r>
+              <a:rPr lang="fr-FR" dirty="0" err="1" smtClean="0"/>
+              <a:t>mask</a:t>
+            </a:r>
+            <a:r>
+              <a:rPr lang="fr-FR" dirty="0" smtClean="0"/>
+              <a:t> </a:t>
+            </a:r>
+            <a:endParaRPr lang="fr-FR" dirty="0"/>
+          </a:p>
+        </p:txBody>
+      </p:sp>
+      <p:sp>
+        <p:nvSpPr>
+          <p:cNvPr id="12" name="ZoneTexte 11"/>
+          <p:cNvSpPr txBox="1"/>
+          <p:nvPr/>
+        </p:nvSpPr>
+        <p:spPr>
+          <a:xfrm>
+            <a:off x="7658756" y="5548907"/>
+            <a:ext cx="5360275" cy="369332"/>
+          </a:xfrm>
+          <a:prstGeom prst="rect">
+            <a:avLst/>
+          </a:prstGeom>
+          <a:noFill/>
+        </p:spPr>
+        <p:txBody>
+          <a:bodyPr wrap="square" rtlCol="0">
+            <a:spAutoFit/>
+          </a:bodyPr>
+          <a:lstStyle/>
+          <a:p>
+            <a:r>
+              <a:rPr lang="fr-FR" dirty="0" smtClean="0"/>
+              <a:t>Seuil global : </a:t>
+            </a:r>
+            <a:r>
+              <a:rPr lang="fr-FR" dirty="0" smtClean="0"/>
+              <a:t>30</a:t>
+            </a:r>
+            <a:r>
+              <a:rPr lang="fr-FR" dirty="0" smtClean="0"/>
+              <a:t>  </a:t>
+            </a:r>
+            <a:r>
+              <a:rPr lang="fr-FR" dirty="0" smtClean="0"/>
+              <a:t>Seuil local : 15</a:t>
+            </a:r>
+            <a:endParaRPr lang="fr-FR" dirty="0"/>
+          </a:p>
+        </p:txBody>
+      </p:sp>
+      <p:pic>
+        <p:nvPicPr>
+          <p:cNvPr id="4" name="Image 3"/>
+          <p:cNvPicPr>
+            <a:picLocks noChangeAspect="1"/>
+          </p:cNvPicPr>
+          <p:nvPr/>
+        </p:nvPicPr>
+        <p:blipFill>
+          <a:blip r:embed="rId3">
+            <a:extLst>
+              <a:ext uri="{28A0092B-C50C-407E-A947-70E740481C1C}">
+                <a14:useLocalDpi xmlns:a14="http://schemas.microsoft.com/office/drawing/2010/main" val="0"/>
+              </a:ext>
+            </a:extLst>
+          </a:blip>
+          <a:stretch>
+            <a:fillRect/>
+          </a:stretch>
+        </p:blipFill>
+        <p:spPr>
+          <a:xfrm>
+            <a:off x="1695086" y="1639614"/>
+            <a:ext cx="9807937" cy="3849757"/>
+          </a:xfrm>
+          <a:prstGeom prst="rect">
+            <a:avLst/>
+          </a:prstGeom>
+          <a:ln>
+            <a:noFill/>
+          </a:ln>
+          <a:effectLst>
+            <a:outerShdw blurRad="292100" dist="139700" dir="2700000" algn="tl" rotWithShape="0">
+              <a:srgbClr val="333333">
+                <a:alpha val="65000"/>
+              </a:srgbClr>
+            </a:outerShdw>
+          </a:effectLst>
+        </p:spPr>
+      </p:pic>
+      <p:sp>
+        <p:nvSpPr>
+          <p:cNvPr id="6" name="ZoneTexte 5"/>
+          <p:cNvSpPr txBox="1"/>
+          <p:nvPr/>
+        </p:nvSpPr>
+        <p:spPr>
+          <a:xfrm>
+            <a:off x="2746191" y="6080997"/>
+            <a:ext cx="8205665" cy="646331"/>
+          </a:xfrm>
+          <a:prstGeom prst="rect">
+            <a:avLst/>
+          </a:prstGeom>
+          <a:noFill/>
+        </p:spPr>
+        <p:txBody>
+          <a:bodyPr wrap="square" rtlCol="0">
+            <a:spAutoFit/>
+          </a:bodyPr>
+          <a:lstStyle/>
+          <a:p>
+            <a:r>
+              <a:rPr lang="fr-FR" dirty="0" smtClean="0"/>
+              <a:t>Un même prétraitement ne fonctionne pas forcément pour deux images différentes, et peut détériorer les résultats</a:t>
+            </a:r>
+            <a:endParaRPr lang="fr-FR" dirty="0"/>
+          </a:p>
+        </p:txBody>
+      </p:sp>
+    </p:spTree>
+    <p:extLst>
+      <p:ext uri="{BB962C8B-B14F-4D97-AF65-F5344CB8AC3E}">
+        <p14:creationId xmlns:p14="http://schemas.microsoft.com/office/powerpoint/2010/main" val="3567308330"/>
+      </p:ext>
+    </p:extLst>
+  </p:cSld>
+  <p:clrMapOvr>
+    <a:masterClrMapping/>
+  </p:clrMapOvr>
+  <p:timing>
+    <p:tnLst>
+      <p:par>
+        <p:cTn id="1" dur="indefinite" restart="never" nodeType="tmRoot"/>
+      </p:par>
+    </p:tnLst>
+  </p:timing>
+</p:sld>
+</file>
+
+<file path=ppt/slides/slide41.xml><?xml version="1.0" encoding="utf-8"?>
+<p:sld xmlns:a="http://schemas.openxmlformats.org/drawingml/2006/main" xmlns:r="http://schemas.openxmlformats.org/officeDocument/2006/relationships" xmlns:p="http://schemas.openxmlformats.org/presentationml/2006/main">
+  <p:cSld>
+    <p:spTree>
+      <p:nvGrpSpPr>
+        <p:cNvPr id="1" name=""/>
+        <p:cNvGrpSpPr/>
+        <p:nvPr/>
+      </p:nvGrpSpPr>
+      <p:grpSpPr>
+        <a:xfrm>
+          <a:off x="0" y="0"/>
+          <a:ext cx="0" cy="0"/>
+          <a:chOff x="0" y="0"/>
+          <a:chExt cx="0" cy="0"/>
+        </a:xfrm>
+      </p:grpSpPr>
+      <p:sp>
+        <p:nvSpPr>
+          <p:cNvPr id="2" name="Titre 1"/>
+          <p:cNvSpPr>
+            <a:spLocks noGrp="1"/>
+          </p:cNvSpPr>
+          <p:nvPr>
+            <p:ph type="title"/>
+          </p:nvPr>
+        </p:nvSpPr>
+        <p:spPr>
+          <a:xfrm>
+            <a:off x="1484310" y="2625337"/>
+            <a:ext cx="10018713" cy="1327301"/>
+          </a:xfrm>
+        </p:spPr>
+        <p:txBody>
+          <a:bodyPr/>
+          <a:lstStyle/>
+          <a:p>
+            <a:r>
+              <a:rPr lang="fr-FR" dirty="0" smtClean="0"/>
+              <a:t>Démonstration Mini - RàPC</a:t>
+            </a:r>
+            <a:br>
+              <a:rPr lang="fr-FR" dirty="0" smtClean="0"/>
+            </a:br>
+            <a:endParaRPr lang="fr-FR" dirty="0"/>
+          </a:p>
+        </p:txBody>
+      </p:sp>
+      <p:sp>
+        <p:nvSpPr>
+          <p:cNvPr id="3" name="Espace réservé du contenu 2"/>
+          <p:cNvSpPr>
+            <a:spLocks noGrp="1"/>
+          </p:cNvSpPr>
+          <p:nvPr>
+            <p:ph idx="1"/>
+          </p:nvPr>
+        </p:nvSpPr>
+        <p:spPr>
+          <a:xfrm>
+            <a:off x="1484310" y="1135118"/>
+            <a:ext cx="10577061" cy="4307740"/>
+          </a:xfrm>
+        </p:spPr>
+        <p:txBody>
+          <a:bodyPr anchor="t">
+            <a:normAutofit/>
+          </a:bodyPr>
+          <a:lstStyle/>
+          <a:p>
+            <a:pPr marL="0" indent="0">
+              <a:buNone/>
+            </a:pPr>
+            <a:r>
+              <a:rPr lang="fr-FR" dirty="0"/>
+              <a:t>	</a:t>
+            </a:r>
+          </a:p>
+          <a:p>
+            <a:pPr marL="0" indent="0">
+              <a:buNone/>
+            </a:pPr>
+            <a:endParaRPr lang="fr-FR" dirty="0" smtClean="0"/>
+          </a:p>
+          <a:p>
+            <a:pPr marL="514350" indent="-514350">
+              <a:buAutoNum type="romanUcPeriod"/>
+            </a:pPr>
+            <a:endParaRPr lang="fr-FR" dirty="0"/>
+          </a:p>
+        </p:txBody>
+      </p:sp>
+      <p:sp>
+        <p:nvSpPr>
+          <p:cNvPr id="5" name="Espace réservé du numéro de diapositive 4"/>
+          <p:cNvSpPr>
+            <a:spLocks noGrp="1"/>
+          </p:cNvSpPr>
+          <p:nvPr>
+            <p:ph type="sldNum" sz="quarter" idx="12"/>
+          </p:nvPr>
+        </p:nvSpPr>
+        <p:spPr/>
+        <p:txBody>
+          <a:bodyPr/>
+          <a:lstStyle/>
+          <a:p>
+            <a:fld id="{D57F1E4F-1CFF-5643-939E-217C01CDF565}" type="slidenum">
+              <a:rPr lang="en-US" smtClean="0"/>
+              <a:pPr/>
+              <a:t>41</a:t>
+            </a:fld>
+            <a:endParaRPr lang="en-US" dirty="0"/>
+          </a:p>
+        </p:txBody>
+      </p:sp>
+    </p:spTree>
+    <p:extLst>
+      <p:ext uri="{BB962C8B-B14F-4D97-AF65-F5344CB8AC3E}">
+        <p14:creationId xmlns:p14="http://schemas.microsoft.com/office/powerpoint/2010/main" val="607065872"/>
       </p:ext>
     </p:extLst>
   </p:cSld>

</xml_diff>